<commit_message>
docs/SICAS_2017/Cole_Drop-In Reporting with Groovy.pptx
</commit_message>
<xml_diff>
--- a/docs/SICAS_2017/Cole_Drop-In Reporting with Groovy.pptx
+++ b/docs/SICAS_2017/Cole_Drop-In Reporting with Groovy.pptx
@@ -3273,7 +3273,7 @@
                 <a:spcPct val="100000"/>
               </a:lnSpc>
             </a:pPr>
-            <a:fld id="{50E7FF4C-440F-4653-89E2-6A40D5717064}" type="datetime">
+            <a:fld id="{2911FE89-17B2-4E49-B81B-623D69C9FDBB}" type="datetime">
               <a:rPr b="0" lang="en-US" sz="900" spc="-1" strike="noStrike">
                 <a:solidFill>
                   <a:srgbClr val="ffffff"/>
@@ -3364,7 +3364,7 @@
                 <a:spcPct val="100000"/>
               </a:lnSpc>
             </a:pPr>
-            <a:fld id="{E1F7A032-87D4-43B9-A558-76D06191D82A}" type="slidenum">
+            <a:fld id="{9D39142A-BFD0-488D-8D90-8EA39BC458EF}" type="slidenum">
               <a:rPr b="0" lang="en-US" sz="1050" spc="-1" strike="noStrike">
                 <a:solidFill>
                   <a:srgbClr val="ffffff"/>
@@ -4140,7 +4140,7 @@
                 <a:spcPct val="100000"/>
               </a:lnSpc>
             </a:pPr>
-            <a:fld id="{9E72CF83-14B0-4184-9DC8-0647C7A33E9E}" type="datetime">
+            <a:fld id="{8DD625CD-E727-4B59-8483-8EFCBAD1305A}" type="datetime">
               <a:rPr b="0" lang="en-US" sz="900" spc="-1" strike="noStrike">
                 <a:solidFill>
                   <a:srgbClr val="ffffff"/>
@@ -4231,7 +4231,7 @@
                 <a:spcPct val="100000"/>
               </a:lnSpc>
             </a:pPr>
-            <a:fld id="{FF6E4C26-34F3-44BE-B3AA-C5CE3F787115}" type="slidenum">
+            <a:fld id="{CC26AAC6-FF65-4B5A-9B67-61E63420C739}" type="slidenum">
               <a:rPr b="0" lang="en-US" sz="1050" spc="-1" strike="noStrike">
                 <a:solidFill>
                   <a:srgbClr val="ffffff"/>
@@ -4611,7 +4611,7 @@
                 </a:uFill>
                 <a:latin typeface="Calibri Light"/>
               </a:rPr>
-              <a:t>Slide Heading Here</a:t>
+              <a:t>Pause for effect...</a:t>
             </a:r>
             <a:endParaRPr b="0" lang="en-US" sz="1800" spc="-1" strike="noStrike">
               <a:solidFill>
@@ -4659,133 +4659,6 @@
               <a:buFont typeface="Wingdings 2" charset="2"/>
               <a:buChar char=""/>
             </a:pPr>
-            <a:r>
-              <a:rPr b="0" lang="en-US" sz="2000" spc="-1" strike="noStrike">
-                <a:solidFill>
-                  <a:srgbClr val="404040"/>
-                </a:solidFill>
-                <a:uFill>
-                  <a:solidFill>
-                    <a:srgbClr val="ffffff"/>
-                  </a:solidFill>
-                </a:uFill>
-                <a:latin typeface="Calibri"/>
-              </a:rPr>
-              <a:t>Presentation Text</a:t>
-            </a:r>
-            <a:endParaRPr b="0" lang="en-US" sz="2000" spc="-1" strike="noStrike">
-              <a:solidFill>
-                <a:srgbClr val="404040"/>
-              </a:solidFill>
-              <a:uFill>
-                <a:solidFill>
-                  <a:srgbClr val="ffffff"/>
-                </a:solidFill>
-              </a:uFill>
-              <a:latin typeface="Calibri"/>
-            </a:endParaRPr>
-          </a:p>
-          <a:p>
-            <a:pPr lvl="3" marL="377280" indent="-198720">
-              <a:lnSpc>
-                <a:spcPct val="100000"/>
-              </a:lnSpc>
-              <a:buClr>
-                <a:srgbClr val="4e67c8"/>
-              </a:buClr>
-              <a:buSzPct val="80000"/>
-              <a:buFont typeface="Wingdings 2" charset="2"/>
-              <a:buChar char=""/>
-            </a:pPr>
-            <a:r>
-              <a:rPr b="0" lang="en-US" sz="1500" spc="-1" strike="noStrike">
-                <a:solidFill>
-                  <a:srgbClr val="404040"/>
-                </a:solidFill>
-                <a:uFill>
-                  <a:solidFill>
-                    <a:srgbClr val="ffffff"/>
-                  </a:solidFill>
-                </a:uFill>
-                <a:latin typeface="Calibri"/>
-              </a:rPr>
-              <a:t>Screen Captures</a:t>
-            </a:r>
-            <a:endParaRPr b="0" lang="en-US" sz="1400" spc="-1" strike="noStrike">
-              <a:solidFill>
-                <a:srgbClr val="404040"/>
-              </a:solidFill>
-              <a:uFill>
-                <a:solidFill>
-                  <a:srgbClr val="ffffff"/>
-                </a:solidFill>
-              </a:uFill>
-              <a:latin typeface="Calibri"/>
-            </a:endParaRPr>
-          </a:p>
-          <a:p>
-            <a:pPr lvl="3" marL="377280" indent="-198720">
-              <a:lnSpc>
-                <a:spcPct val="100000"/>
-              </a:lnSpc>
-              <a:buClr>
-                <a:srgbClr val="4e67c8"/>
-              </a:buClr>
-              <a:buSzPct val="80000"/>
-              <a:buFont typeface="Wingdings 2" charset="2"/>
-              <a:buChar char=""/>
-            </a:pPr>
-            <a:r>
-              <a:rPr b="0" lang="en-US" sz="1500" spc="-1" strike="noStrike">
-                <a:solidFill>
-                  <a:srgbClr val="404040"/>
-                </a:solidFill>
-                <a:uFill>
-                  <a:solidFill>
-                    <a:srgbClr val="ffffff"/>
-                  </a:solidFill>
-                </a:uFill>
-                <a:latin typeface="Calibri"/>
-              </a:rPr>
-              <a:t>Etc.</a:t>
-            </a:r>
-            <a:endParaRPr b="0" lang="en-US" sz="1400" spc="-1" strike="noStrike">
-              <a:solidFill>
-                <a:srgbClr val="404040"/>
-              </a:solidFill>
-              <a:uFill>
-                <a:solidFill>
-                  <a:srgbClr val="ffffff"/>
-                </a:solidFill>
-              </a:uFill>
-              <a:latin typeface="Calibri"/>
-            </a:endParaRPr>
-          </a:p>
-          <a:p>
-            <a:pPr marL="199080" indent="-198720">
-              <a:lnSpc>
-                <a:spcPct val="100000"/>
-              </a:lnSpc>
-              <a:buClr>
-                <a:srgbClr val="4e67c8"/>
-              </a:buClr>
-              <a:buFont typeface="Wingdings 2" charset="2"/>
-              <a:buChar char=""/>
-            </a:pPr>
-            <a:r>
-              <a:rPr b="0" lang="en-US" sz="2000" spc="-1" strike="noStrike">
-                <a:solidFill>
-                  <a:srgbClr val="404040"/>
-                </a:solidFill>
-                <a:uFill>
-                  <a:solidFill>
-                    <a:srgbClr val="ffffff"/>
-                  </a:solidFill>
-                </a:uFill>
-                <a:latin typeface="Calibri"/>
-              </a:rPr>
-              <a:t>Presenters – duplicate this slide as many times as needed</a:t>
-            </a:r>
             <a:endParaRPr b="0" lang="en-US" sz="2000" spc="-1" strike="noStrike">
               <a:solidFill>
                 <a:srgbClr val="404040"/>
@@ -4970,7 +4843,7 @@
                 </a:uFill>
                 <a:latin typeface="Calibri Light"/>
               </a:rPr>
-              <a:t>Slide Heading Here</a:t>
+              <a:t>What do these reports look like?</a:t>
             </a:r>
             <a:endParaRPr b="0" lang="en-US" sz="1800" spc="-1" strike="noStrike">
               <a:solidFill>
@@ -20881,7 +20754,7 @@
                 </a:uFill>
                 <a:latin typeface="Calibri"/>
               </a:rPr>
-              <a:t> </a:t>
+              <a:t>A Java Library (JAR file) that creates and runs the reports</a:t>
             </a:r>
             <a:endParaRPr b="0" lang="en-US" sz="2000" spc="-1" strike="noStrike">
               <a:solidFill>
@@ -20918,85 +20791,9 @@
                 </a:uFill>
                 <a:latin typeface="Calibri"/>
               </a:rPr>
-              <a:t>Presentation Text</a:t>
+              <a:t>A Grails application that handles the interaction with the client</a:t>
             </a:r>
             <a:endParaRPr b="0" lang="en-US" sz="2000" spc="-1" strike="noStrike">
-              <a:solidFill>
-                <a:srgbClr val="404040"/>
-              </a:solidFill>
-              <a:uFill>
-                <a:solidFill>
-                  <a:srgbClr val="ffffff"/>
-                </a:solidFill>
-              </a:uFill>
-              <a:latin typeface="Calibri"/>
-            </a:endParaRPr>
-          </a:p>
-          <a:p>
-            <a:pPr lvl="3" marL="377280" indent="-198720">
-              <a:lnSpc>
-                <a:spcPct val="100000"/>
-              </a:lnSpc>
-              <a:buClr>
-                <a:srgbClr val="4e67c8"/>
-              </a:buClr>
-              <a:buSzPct val="80000"/>
-              <a:buFont typeface="Wingdings 2" charset="2"/>
-              <a:buChar char=""/>
-            </a:pPr>
-            <a:r>
-              <a:rPr b="0" lang="en-US" sz="1500" spc="-1" strike="noStrike">
-                <a:solidFill>
-                  <a:srgbClr val="404040"/>
-                </a:solidFill>
-                <a:uFill>
-                  <a:solidFill>
-                    <a:srgbClr val="ffffff"/>
-                  </a:solidFill>
-                </a:uFill>
-                <a:latin typeface="Calibri"/>
-              </a:rPr>
-              <a:t>Screen Captures</a:t>
-            </a:r>
-            <a:endParaRPr b="0" lang="en-US" sz="1400" spc="-1" strike="noStrike">
-              <a:solidFill>
-                <a:srgbClr val="404040"/>
-              </a:solidFill>
-              <a:uFill>
-                <a:solidFill>
-                  <a:srgbClr val="ffffff"/>
-                </a:solidFill>
-              </a:uFill>
-              <a:latin typeface="Calibri"/>
-            </a:endParaRPr>
-          </a:p>
-          <a:p>
-            <a:pPr lvl="3" marL="377280" indent="-198720">
-              <a:lnSpc>
-                <a:spcPct val="100000"/>
-              </a:lnSpc>
-              <a:buClr>
-                <a:srgbClr val="4e67c8"/>
-              </a:buClr>
-              <a:buSzPct val="80000"/>
-              <a:buFont typeface="Wingdings 2" charset="2"/>
-              <a:buChar char=""/>
-            </a:pPr>
-            <a:r>
-              <a:rPr b="0" lang="en-US" sz="1500" spc="-1" strike="noStrike">
-                <a:solidFill>
-                  <a:srgbClr val="404040"/>
-                </a:solidFill>
-                <a:uFill>
-                  <a:solidFill>
-                    <a:srgbClr val="ffffff"/>
-                  </a:solidFill>
-                </a:uFill>
-                <a:latin typeface="Calibri"/>
-              </a:rPr>
-              <a:t>Etc.</a:t>
-            </a:r>
-            <a:endParaRPr b="0" lang="en-US" sz="1400" spc="-1" strike="noStrike">
               <a:solidFill>
                 <a:srgbClr val="404040"/>
               </a:solidFill>
@@ -21031,9 +20828,218 @@
                 </a:uFill>
                 <a:latin typeface="Calibri"/>
               </a:rPr>
-              <a:t>Presenters – duplicate this slide as many times as needed</a:t>
+              <a:t>Report definitions are stored in a directory on the server</a:t>
             </a:r>
             <a:endParaRPr b="0" lang="en-US" sz="2000" spc="-1" strike="noStrike">
+              <a:solidFill>
+                <a:srgbClr val="404040"/>
+              </a:solidFill>
+              <a:uFill>
+                <a:solidFill>
+                  <a:srgbClr val="ffffff"/>
+                </a:solidFill>
+              </a:uFill>
+              <a:latin typeface="Calibri"/>
+            </a:endParaRPr>
+          </a:p>
+          <a:p>
+            <a:pPr lvl="1" marL="864000" indent="-324000">
+              <a:buClr>
+                <a:srgbClr val="000000"/>
+              </a:buClr>
+              <a:buSzPct val="75000"/>
+              <a:buFont typeface="Symbol" charset="2"/>
+              <a:buChar char=""/>
+            </a:pPr>
+            <a:r>
+              <a:rPr b="0" lang="en-US" sz="2000" spc="-1" strike="noStrike">
+                <a:solidFill>
+                  <a:srgbClr val="404040"/>
+                </a:solidFill>
+                <a:uFill>
+                  <a:solidFill>
+                    <a:srgbClr val="ffffff"/>
+                  </a:solidFill>
+                </a:uFill>
+                <a:latin typeface="Calibri"/>
+              </a:rPr>
+              <a:t>Protected by Git</a:t>
+            </a:r>
+            <a:endParaRPr b="0" lang="en-US" sz="1400" spc="-1" strike="noStrike">
+              <a:solidFill>
+                <a:srgbClr val="404040"/>
+              </a:solidFill>
+              <a:uFill>
+                <a:solidFill>
+                  <a:srgbClr val="ffffff"/>
+                </a:solidFill>
+              </a:uFill>
+              <a:latin typeface="Calibri"/>
+            </a:endParaRPr>
+          </a:p>
+          <a:p>
+            <a:pPr lvl="1" marL="864000" indent="-324000">
+              <a:buClr>
+                <a:srgbClr val="000000"/>
+              </a:buClr>
+              <a:buSzPct val="75000"/>
+              <a:buFont typeface="Symbol" charset="2"/>
+              <a:buChar char=""/>
+            </a:pPr>
+            <a:r>
+              <a:rPr b="0" lang="en-US" sz="2000" spc="-1" strike="noStrike">
+                <a:solidFill>
+                  <a:srgbClr val="404040"/>
+                </a:solidFill>
+                <a:uFill>
+                  <a:solidFill>
+                    <a:srgbClr val="ffffff"/>
+                  </a:solidFill>
+                </a:uFill>
+                <a:latin typeface="Calibri"/>
+              </a:rPr>
+              <a:t>Easy to search, edit, or modify through common tools</a:t>
+            </a:r>
+            <a:endParaRPr b="0" lang="en-US" sz="1400" spc="-1" strike="noStrike">
+              <a:solidFill>
+                <a:srgbClr val="404040"/>
+              </a:solidFill>
+              <a:uFill>
+                <a:solidFill>
+                  <a:srgbClr val="ffffff"/>
+                </a:solidFill>
+              </a:uFill>
+              <a:latin typeface="Calibri"/>
+            </a:endParaRPr>
+          </a:p>
+          <a:p>
+            <a:pPr lvl="1" marL="864000" indent="-324000">
+              <a:buClr>
+                <a:srgbClr val="000000"/>
+              </a:buClr>
+              <a:buSzPct val="75000"/>
+              <a:buFont typeface="Symbol" charset="2"/>
+              <a:buChar char=""/>
+            </a:pPr>
+            <a:r>
+              <a:rPr b="0" lang="en-US" sz="2000" spc="-1" strike="noStrike">
+                <a:solidFill>
+                  <a:srgbClr val="404040"/>
+                </a:solidFill>
+                <a:uFill>
+                  <a:solidFill>
+                    <a:srgbClr val="ffffff"/>
+                  </a:solidFill>
+                </a:uFill>
+                <a:latin typeface="Calibri"/>
+              </a:rPr>
+              <a:t>No binary formats</a:t>
+            </a:r>
+            <a:endParaRPr b="0" lang="en-US" sz="1400" spc="-1" strike="noStrike">
+              <a:solidFill>
+                <a:srgbClr val="404040"/>
+              </a:solidFill>
+              <a:uFill>
+                <a:solidFill>
+                  <a:srgbClr val="ffffff"/>
+                </a:solidFill>
+              </a:uFill>
+              <a:latin typeface="Calibri"/>
+            </a:endParaRPr>
+          </a:p>
+          <a:p>
+            <a:pPr marL="199080" indent="-198720">
+              <a:buClr>
+                <a:srgbClr val="4e67c8"/>
+              </a:buClr>
+              <a:buFont typeface="Wingdings 2" charset="2"/>
+              <a:buChar char=""/>
+            </a:pPr>
+            <a:r>
+              <a:rPr b="0" lang="en-US" sz="2000" spc="-1" strike="noStrike">
+                <a:solidFill>
+                  <a:srgbClr val="404040"/>
+                </a:solidFill>
+                <a:uFill>
+                  <a:solidFill>
+                    <a:srgbClr val="ffffff"/>
+                  </a:solidFill>
+                </a:uFill>
+                <a:latin typeface="Calibri"/>
+              </a:rPr>
+              <a:t>All free or open-source tools</a:t>
+            </a:r>
+            <a:endParaRPr b="0" lang="en-US" sz="2000" spc="-1" strike="noStrike">
+              <a:solidFill>
+                <a:srgbClr val="404040"/>
+              </a:solidFill>
+              <a:uFill>
+                <a:solidFill>
+                  <a:srgbClr val="ffffff"/>
+                </a:solidFill>
+              </a:uFill>
+              <a:latin typeface="Calibri"/>
+            </a:endParaRPr>
+          </a:p>
+          <a:p>
+            <a:pPr lvl="1" marL="864000" indent="-324000">
+              <a:buClr>
+                <a:srgbClr val="000000"/>
+              </a:buClr>
+              <a:buSzPct val="75000"/>
+              <a:buFont typeface="Symbol" charset="2"/>
+              <a:buChar char=""/>
+            </a:pPr>
+            <a:r>
+              <a:rPr b="0" lang="en-US" sz="2000" spc="-1" strike="noStrike">
+                <a:solidFill>
+                  <a:srgbClr val="404040"/>
+                </a:solidFill>
+                <a:uFill>
+                  <a:solidFill>
+                    <a:srgbClr val="ffffff"/>
+                  </a:solidFill>
+                </a:uFill>
+                <a:latin typeface="Calibri"/>
+              </a:rPr>
+              <a:t>No licensing fees</a:t>
+            </a:r>
+            <a:endParaRPr b="0" lang="en-US" sz="1400" spc="-1" strike="noStrike">
+              <a:solidFill>
+                <a:srgbClr val="404040"/>
+              </a:solidFill>
+              <a:uFill>
+                <a:solidFill>
+                  <a:srgbClr val="ffffff"/>
+                </a:solidFill>
+              </a:uFill>
+              <a:latin typeface="Calibri"/>
+            </a:endParaRPr>
+          </a:p>
+          <a:p>
+            <a:pPr lvl="1" marL="864000" indent="-324000">
+              <a:buClr>
+                <a:srgbClr val="000000"/>
+              </a:buClr>
+              <a:buSzPct val="75000"/>
+              <a:buFont typeface="Symbol" charset="2"/>
+              <a:buChar char=""/>
+            </a:pPr>
+            <a:r>
+              <a:rPr b="0" lang="en-US" sz="2000" spc="-1" strike="noStrike">
+                <a:solidFill>
+                  <a:srgbClr val="404040"/>
+                </a:solidFill>
+                <a:uFill>
+                  <a:solidFill>
+                    <a:srgbClr val="ffffff"/>
+                  </a:solidFill>
+                </a:uFill>
+                <a:latin typeface="Calibri"/>
+              </a:rPr>
+              <a:t>High quality</a:t>
+            </a:r>
+            <a:endParaRPr b="0" lang="en-US" sz="1400" spc="-1" strike="noStrike">
               <a:solidFill>
                 <a:srgbClr val="404040"/>
               </a:solidFill>

</xml_diff>

<commit_message>
Restore changes to powerpoint slides.
</commit_message>
<xml_diff>
--- a/docs/SICAS_2017/Cole_Drop-In Reporting with Groovy.pptx
+++ b/docs/SICAS_2017/Cole_Drop-In Reporting with Groovy.pptx
@@ -3273,7 +3273,7 @@
                 <a:spcPct val="100000"/>
               </a:lnSpc>
             </a:pPr>
-            <a:fld id="{2911FE89-17B2-4E49-B81B-623D69C9FDBB}" type="datetime">
+            <a:fld id="{5F484363-E25A-4708-822D-484A81770507}" type="datetime">
               <a:rPr b="0" lang="en-US" sz="900" spc="-1" strike="noStrike">
                 <a:solidFill>
                   <a:srgbClr val="ffffff"/>
@@ -3285,7 +3285,7 @@
                 </a:uFill>
                 <a:latin typeface="Calibri"/>
               </a:rPr>
-              <a:t>9/2/17</a:t>
+              <a:t>9/4/17</a:t>
             </a:fld>
             <a:endParaRPr b="0" lang="en-US" sz="1400" spc="-1" strike="noStrike">
               <a:solidFill>
@@ -3364,7 +3364,7 @@
                 <a:spcPct val="100000"/>
               </a:lnSpc>
             </a:pPr>
-            <a:fld id="{9D39142A-BFD0-488D-8D90-8EA39BC458EF}" type="slidenum">
+            <a:fld id="{D30C9474-1F58-4487-9407-70F501B6A96E}" type="slidenum">
               <a:rPr b="0" lang="en-US" sz="1050" spc="-1" strike="noStrike">
                 <a:solidFill>
                   <a:srgbClr val="ffffff"/>
@@ -4140,7 +4140,7 @@
                 <a:spcPct val="100000"/>
               </a:lnSpc>
             </a:pPr>
-            <a:fld id="{8DD625CD-E727-4B59-8483-8EFCBAD1305A}" type="datetime">
+            <a:fld id="{4414047A-414F-4F0F-977B-C60DCD2629A7}" type="datetime">
               <a:rPr b="0" lang="en-US" sz="900" spc="-1" strike="noStrike">
                 <a:solidFill>
                   <a:srgbClr val="ffffff"/>
@@ -4152,7 +4152,7 @@
                 </a:uFill>
                 <a:latin typeface="Calibri"/>
               </a:rPr>
-              <a:t>9/2/17</a:t>
+              <a:t>9/4/17</a:t>
             </a:fld>
             <a:endParaRPr b="0" lang="en-US" sz="1400" spc="-1" strike="noStrike">
               <a:solidFill>
@@ -4231,7 +4231,7 @@
                 <a:spcPct val="100000"/>
               </a:lnSpc>
             </a:pPr>
-            <a:fld id="{CC26AAC6-FF65-4B5A-9B67-61E63420C739}" type="slidenum">
+            <a:fld id="{2590D37D-85A0-47AF-AB04-5FE358A160CB}" type="slidenum">
               <a:rPr b="0" lang="en-US" sz="1050" spc="-1" strike="noStrike">
                 <a:solidFill>
                   <a:srgbClr val="ffffff"/>
@@ -4649,34 +4649,6 @@
         <p:txBody>
           <a:bodyPr lIns="0" rIns="0"/>
           <a:p>
-            <a:pPr marL="199080" indent="-198720">
-              <a:lnSpc>
-                <a:spcPct val="100000"/>
-              </a:lnSpc>
-              <a:buClr>
-                <a:srgbClr val="4e67c8"/>
-              </a:buClr>
-              <a:buFont typeface="Wingdings 2" charset="2"/>
-              <a:buChar char=""/>
-            </a:pPr>
-            <a:endParaRPr b="0" lang="en-US" sz="2000" spc="-1" strike="noStrike">
-              <a:solidFill>
-                <a:srgbClr val="404040"/>
-              </a:solidFill>
-              <a:uFill>
-                <a:solidFill>
-                  <a:srgbClr val="ffffff"/>
-                </a:solidFill>
-              </a:uFill>
-              <a:latin typeface="Calibri"/>
-            </a:endParaRPr>
-          </a:p>
-          <a:p>
-            <a:pPr>
-              <a:lnSpc>
-                <a:spcPct val="90000"/>
-              </a:lnSpc>
-            </a:pPr>
             <a:endParaRPr b="0" lang="en-US" sz="2000" spc="-1" strike="noStrike">
               <a:solidFill>
                 <a:srgbClr val="404040"/>
@@ -4903,7 +4875,7 @@
                 </a:uFill>
                 <a:latin typeface="Calibri"/>
               </a:rPr>
-              <a:t>Presentation Text</a:t>
+              <a:t>Let’s look at some examples</a:t>
             </a:r>
             <a:endParaRPr b="0" lang="en-US" sz="2000" spc="-1" strike="noStrike">
               <a:solidFill>
@@ -4918,19 +4890,16 @@
             </a:endParaRPr>
           </a:p>
           <a:p>
-            <a:pPr lvl="3" marL="377280" indent="-198720">
-              <a:lnSpc>
-                <a:spcPct val="100000"/>
-              </a:lnSpc>
+            <a:pPr lvl="1" marL="864000" indent="-324000">
               <a:buClr>
-                <a:srgbClr val="4e67c8"/>
+                <a:srgbClr val="000000"/>
               </a:buClr>
-              <a:buSzPct val="80000"/>
-              <a:buFont typeface="Wingdings 2" charset="2"/>
-              <a:buChar char=""/>
-            </a:pPr>
-            <a:r>
-              <a:rPr b="0" lang="en-US" sz="1500" spc="-1" strike="noStrike">
+              <a:buSzPct val="75000"/>
+              <a:buFont typeface="Symbol" charset="2"/>
+              <a:buChar char=""/>
+            </a:pPr>
+            <a:r>
+              <a:rPr b="0" lang="en-US" sz="2000" spc="-1" strike="noStrike">
                 <a:solidFill>
                   <a:srgbClr val="404040"/>
                 </a:solidFill>
@@ -4941,7 +4910,7 @@
                 </a:uFill>
                 <a:latin typeface="Calibri"/>
               </a:rPr>
-              <a:t>Screen Captures</a:t>
+              <a:t>SQL</a:t>
             </a:r>
             <a:endParaRPr b="0" lang="en-US" sz="1400" spc="-1" strike="noStrike">
               <a:solidFill>
@@ -4956,19 +4925,16 @@
             </a:endParaRPr>
           </a:p>
           <a:p>
-            <a:pPr lvl="3" marL="377280" indent="-198720">
-              <a:lnSpc>
-                <a:spcPct val="100000"/>
-              </a:lnSpc>
+            <a:pPr lvl="1" marL="864000" indent="-324000">
               <a:buClr>
-                <a:srgbClr val="4e67c8"/>
+                <a:srgbClr val="000000"/>
               </a:buClr>
-              <a:buSzPct val="80000"/>
-              <a:buFont typeface="Wingdings 2" charset="2"/>
-              <a:buChar char=""/>
-            </a:pPr>
-            <a:r>
-              <a:rPr b="0" lang="en-US" sz="1500" spc="-1" strike="noStrike">
+              <a:buSzPct val="75000"/>
+              <a:buFont typeface="Symbol" charset="2"/>
+              <a:buChar char=""/>
+            </a:pPr>
+            <a:r>
+              <a:rPr b="0" lang="en-US" sz="2000" spc="-1" strike="noStrike">
                 <a:solidFill>
                   <a:srgbClr val="404040"/>
                 </a:solidFill>
@@ -4979,7 +4945,77 @@
                 </a:uFill>
                 <a:latin typeface="Calibri"/>
               </a:rPr>
-              <a:t>Etc.</a:t>
+              <a:t>A Groovy report with an SQL query</a:t>
+            </a:r>
+            <a:endParaRPr b="0" lang="en-US" sz="1400" spc="-1" strike="noStrike">
+              <a:solidFill>
+                <a:srgbClr val="404040"/>
+              </a:solidFill>
+              <a:uFill>
+                <a:solidFill>
+                  <a:srgbClr val="ffffff"/>
+                </a:solidFill>
+              </a:uFill>
+              <a:latin typeface="Calibri"/>
+            </a:endParaRPr>
+          </a:p>
+          <a:p>
+            <a:pPr lvl="1" marL="864000" indent="-324000">
+              <a:buClr>
+                <a:srgbClr val="000000"/>
+              </a:buClr>
+              <a:buSzPct val="75000"/>
+              <a:buFont typeface="Symbol" charset="2"/>
+              <a:buChar char=""/>
+            </a:pPr>
+            <a:r>
+              <a:rPr b="0" lang="en-US" sz="2000" spc="-1" strike="noStrike">
+                <a:solidFill>
+                  <a:srgbClr val="404040"/>
+                </a:solidFill>
+                <a:uFill>
+                  <a:solidFill>
+                    <a:srgbClr val="ffffff"/>
+                  </a:solidFill>
+                </a:uFill>
+                <a:latin typeface="Calibri"/>
+              </a:rPr>
+              <a:t>Dynamic SQL</a:t>
+            </a:r>
+            <a:endParaRPr b="0" lang="en-US" sz="1400" spc="-1" strike="noStrike">
+              <a:solidFill>
+                <a:srgbClr val="404040"/>
+              </a:solidFill>
+              <a:uFill>
+                <a:solidFill>
+                  <a:srgbClr val="ffffff"/>
+                </a:solidFill>
+              </a:uFill>
+              <a:latin typeface="Calibri"/>
+            </a:endParaRPr>
+          </a:p>
+          <a:p>
+            <a:pPr lvl="1" marL="864000" indent="-324000">
+              <a:buClr>
+                <a:srgbClr val="000000"/>
+              </a:buClr>
+              <a:buSzPct val="75000"/>
+              <a:buFont typeface="Symbol" charset="2"/>
+              <a:buChar char=""/>
+            </a:pPr>
+            <a:r>
+              <a:rPr b="0" lang="en-US" sz="2000" spc="-1" strike="noStrike">
+                <a:solidFill>
+                  <a:srgbClr val="404040"/>
+                </a:solidFill>
+                <a:uFill>
+                  <a:solidFill>
+                    <a:srgbClr val="ffffff"/>
+                  </a:solidFill>
+                </a:uFill>
+                <a:latin typeface="Calibri"/>
+              </a:rPr>
+              <a:t>A report with data created from arbitrary Groovy code</a:t>
             </a:r>
             <a:endParaRPr b="0" lang="en-US" sz="1400" spc="-1" strike="noStrike">
               <a:solidFill>
@@ -20313,38 +20349,6 @@
                 </a:uFill>
                 <a:latin typeface="Calibri"/>
               </a:rPr>
-              <a:t>We decided to use Jasper Reports to create polished printed reports.</a:t>
-            </a:r>
-            <a:endParaRPr b="0" lang="en-US" sz="2000" spc="-1" strike="noStrike">
-              <a:solidFill>
-                <a:srgbClr val="404040"/>
-              </a:solidFill>
-              <a:uFill>
-                <a:solidFill>
-                  <a:srgbClr val="ffffff"/>
-                </a:solidFill>
-              </a:uFill>
-              <a:latin typeface="Calibri"/>
-            </a:endParaRPr>
-          </a:p>
-          <a:p>
-            <a:pPr>
-              <a:lnSpc>
-                <a:spcPct val="100000"/>
-              </a:lnSpc>
-            </a:pPr>
-            <a:r>
-              <a:rPr b="0" lang="en-US" sz="2000" spc="-1" strike="noStrike">
-                <a:solidFill>
-                  <a:srgbClr val="404040"/>
-                </a:solidFill>
-                <a:uFill>
-                  <a:solidFill>
-                    <a:srgbClr val="ffffff"/>
-                  </a:solidFill>
-                </a:uFill>
-                <a:latin typeface="Calibri"/>
-              </a:rPr>
               <a:t>We liked Jasper Reports for several reasons.</a:t>
             </a:r>
             <a:endParaRPr b="0" lang="en-US" sz="2000" spc="-1" strike="noStrike">
@@ -20419,7 +20423,7 @@
                 </a:uFill>
                 <a:latin typeface="Calibri"/>
               </a:rPr>
-              <a:t>It allows you to develop your reports through a GUI or through a text editor.</a:t>
+              <a:t>It is Java-Based and you can include it in Java programs.</a:t>
             </a:r>
             <a:endParaRPr b="0" lang="en-US" sz="2000" spc="-1" strike="noStrike">
               <a:solidFill>
@@ -20456,7 +20460,7 @@
                 </a:uFill>
                 <a:latin typeface="Calibri"/>
               </a:rPr>
-              <a:t>It is Java-Based and you can include it in Java programs.</a:t>
+              <a:t>It has XML source code</a:t>
             </a:r>
             <a:endParaRPr b="0" lang="en-US" sz="2000" spc="-1" strike="noStrike">
               <a:solidFill>
@@ -20493,7 +20497,7 @@
                 </a:uFill>
                 <a:latin typeface="Calibri"/>
               </a:rPr>
-              <a:t>The reports it creates have XML source code.</a:t>
+              <a:t>You can develop it through either a GUI or a text editor</a:t>
             </a:r>
             <a:endParaRPr b="0" lang="en-US" sz="2000" spc="-1" strike="noStrike">
               <a:solidFill>
@@ -20648,7 +20652,7 @@
         </p:nvSpPr>
         <p:spPr>
           <a:xfrm>
-            <a:off x="822960" y="286560"/>
+            <a:off x="822960" y="395280"/>
             <a:ext cx="7543440" cy="1450440"/>
           </a:xfrm>
           <a:prstGeom prst="rect">
@@ -20948,12 +20952,10 @@
             </a:endParaRPr>
           </a:p>
           <a:p>
-            <a:pPr marL="199080" indent="-198720">
-              <a:buClr>
-                <a:srgbClr val="4e67c8"/>
-              </a:buClr>
-              <a:buFont typeface="Wingdings 2" charset="2"/>
-              <a:buChar char=""/>
+            <a:pPr>
+              <a:lnSpc>
+                <a:spcPct val="100000"/>
+              </a:lnSpc>
             </a:pPr>
             <a:r>
               <a:rPr b="0" lang="en-US" sz="2000" spc="-1" strike="noStrike">
@@ -20969,26 +20971,23 @@
               </a:rPr>
               <a:t>All free or open-source tools</a:t>
             </a:r>
-            <a:endParaRPr b="0" lang="en-US" sz="2000" spc="-1" strike="noStrike">
-              <a:solidFill>
-                <a:srgbClr val="404040"/>
-              </a:solidFill>
-              <a:uFill>
-                <a:solidFill>
-                  <a:srgbClr val="ffffff"/>
-                </a:solidFill>
-              </a:uFill>
-              <a:latin typeface="Calibri"/>
-            </a:endParaRPr>
-          </a:p>
-          <a:p>
-            <a:pPr lvl="1" marL="864000" indent="-324000">
-              <a:buClr>
+            <a:endParaRPr b="0" lang="en-US" sz="1800" spc="-1" strike="noStrike">
+              <a:solidFill>
                 <a:srgbClr val="000000"/>
-              </a:buClr>
-              <a:buSzPct val="75000"/>
-              <a:buFont typeface="Symbol" charset="2"/>
-              <a:buChar char=""/>
+              </a:solidFill>
+              <a:uFill>
+                <a:solidFill>
+                  <a:srgbClr val="ffffff"/>
+                </a:solidFill>
+              </a:uFill>
+              <a:latin typeface="Arial"/>
+            </a:endParaRPr>
+          </a:p>
+          <a:p>
+            <a:pPr>
+              <a:lnSpc>
+                <a:spcPct val="100000"/>
+              </a:lnSpc>
             </a:pPr>
             <a:r>
               <a:rPr b="0" lang="en-US" sz="2000" spc="-1" strike="noStrike">
@@ -21002,28 +21001,25 @@
                 </a:uFill>
                 <a:latin typeface="Calibri"/>
               </a:rPr>
-              <a:t>No licensing fees</a:t>
-            </a:r>
-            <a:endParaRPr b="0" lang="en-US" sz="1400" spc="-1" strike="noStrike">
-              <a:solidFill>
-                <a:srgbClr val="404040"/>
-              </a:solidFill>
-              <a:uFill>
-                <a:solidFill>
-                  <a:srgbClr val="ffffff"/>
-                </a:solidFill>
-              </a:uFill>
-              <a:latin typeface="Calibri"/>
-            </a:endParaRPr>
-          </a:p>
-          <a:p>
-            <a:pPr lvl="1" marL="864000" indent="-324000">
-              <a:buClr>
+              <a:t>- No licensing fees</a:t>
+            </a:r>
+            <a:endParaRPr b="0" lang="en-US" sz="1800" spc="-1" strike="noStrike">
+              <a:solidFill>
                 <a:srgbClr val="000000"/>
-              </a:buClr>
-              <a:buSzPct val="75000"/>
-              <a:buFont typeface="Symbol" charset="2"/>
-              <a:buChar char=""/>
+              </a:solidFill>
+              <a:uFill>
+                <a:solidFill>
+                  <a:srgbClr val="ffffff"/>
+                </a:solidFill>
+              </a:uFill>
+              <a:latin typeface="Arial"/>
+            </a:endParaRPr>
+          </a:p>
+          <a:p>
+            <a:pPr>
+              <a:lnSpc>
+                <a:spcPct val="100000"/>
+              </a:lnSpc>
             </a:pPr>
             <a:r>
               <a:rPr b="0" lang="en-US" sz="2000" spc="-1" strike="noStrike">
@@ -21037,36 +21033,18 @@
                 </a:uFill>
                 <a:latin typeface="Calibri"/>
               </a:rPr>
-              <a:t>High quality</a:t>
-            </a:r>
-            <a:endParaRPr b="0" lang="en-US" sz="1400" spc="-1" strike="noStrike">
-              <a:solidFill>
-                <a:srgbClr val="404040"/>
-              </a:solidFill>
-              <a:uFill>
-                <a:solidFill>
-                  <a:srgbClr val="ffffff"/>
-                </a:solidFill>
-              </a:uFill>
-              <a:latin typeface="Calibri"/>
-            </a:endParaRPr>
-          </a:p>
-          <a:p>
-            <a:pPr>
-              <a:lnSpc>
-                <a:spcPct val="90000"/>
-              </a:lnSpc>
-            </a:pPr>
-            <a:endParaRPr b="0" lang="en-US" sz="2000" spc="-1" strike="noStrike">
-              <a:solidFill>
-                <a:srgbClr val="404040"/>
-              </a:solidFill>
-              <a:uFill>
-                <a:solidFill>
-                  <a:srgbClr val="ffffff"/>
-                </a:solidFill>
-              </a:uFill>
-              <a:latin typeface="Calibri"/>
+              <a:t>- High quality</a:t>
+            </a:r>
+            <a:endParaRPr b="0" lang="en-US" sz="1800" spc="-1" strike="noStrike">
+              <a:solidFill>
+                <a:srgbClr val="000000"/>
+              </a:solidFill>
+              <a:uFill>
+                <a:solidFill>
+                  <a:srgbClr val="ffffff"/>
+                </a:solidFill>
+              </a:uFill>
+              <a:latin typeface="Arial"/>
             </a:endParaRPr>
           </a:p>
         </p:txBody>

</xml_diff>

<commit_message>
Save changes before quitting for day.
</commit_message>
<xml_diff>
--- a/docs/SICAS_2017/Cole_Drop-In Reporting with Groovy.pptx
+++ b/docs/SICAS_2017/Cole_Drop-In Reporting with Groovy.pptx
@@ -36,9 +36,9 @@
     <p:sldId id="279" r:id="rId27"/>
     <p:sldId id="281" r:id="rId28"/>
     <p:sldId id="282" r:id="rId29"/>
-    <p:sldId id="283" r:id="rId30"/>
+    <p:sldId id="285" r:id="rId30"/>
     <p:sldId id="284" r:id="rId31"/>
-    <p:sldId id="285" r:id="rId32"/>
+    <p:sldId id="283" r:id="rId32"/>
     <p:sldId id="286" r:id="rId33"/>
     <p:sldId id="287" r:id="rId34"/>
     <p:sldId id="288" r:id="rId35"/>
@@ -26929,7 +26929,7 @@
               </a:lnSpc>
             </a:pPr>
             <a:r>
-              <a:rPr lang="en-US" sz="4800" spc="-46">
+              <a:rPr lang="en-US" sz="4800" spc="-46" dirty="0">
                 <a:solidFill>
                   <a:srgbClr val="31489F"/>
                 </a:solidFill>
@@ -26990,44 +26990,7 @@
           <a:bodyPr lIns="0" tIns="45000" rIns="0" bIns="45000"/>
           <a:lstStyle/>
           <a:p>
-            <a:pPr marL="199080" indent="-198360">
-              <a:lnSpc>
-                <a:spcPct val="100000"/>
-              </a:lnSpc>
-              <a:buClr>
-                <a:srgbClr val="4E67C8"/>
-              </a:buClr>
-              <a:buFont typeface="Wingdings 2" charset="2"/>
-              <a:buChar char=""/>
-            </a:pPr>
-            <a:r>
-              <a:rPr lang="en-US" sz="2000" b="0" strike="noStrike" spc="-1">
-                <a:solidFill>
-                  <a:srgbClr val="404040"/>
-                </a:solidFill>
-                <a:uFill>
-                  <a:solidFill>
-                    <a:srgbClr val="FFFFFF"/>
-                  </a:solidFill>
-                </a:uFill>
-                <a:latin typeface="Calibri"/>
-              </a:rPr>
-              <a:t>Presentation Text</a:t>
-            </a:r>
-            <a:endParaRPr lang="en-US" sz="1800" b="0" strike="noStrike" spc="-1">
-              <a:solidFill>
-                <a:srgbClr val="000000"/>
-              </a:solidFill>
-              <a:uFill>
-                <a:solidFill>
-                  <a:srgbClr val="FFFFFF"/>
-                </a:solidFill>
-              </a:uFill>
-              <a:latin typeface="Arial"/>
-            </a:endParaRPr>
-          </a:p>
-          <a:p>
-            <a:pPr marL="377280" lvl="3" indent="-198360">
+            <a:pPr marL="178920" lvl="3">
               <a:lnSpc>
                 <a:spcPct val="100000"/>
               </a:lnSpc>
@@ -27035,117 +26998,8 @@
                 <a:srgbClr val="4E67C8"/>
               </a:buClr>
               <a:buSzPct val="80000"/>
-              <a:buFont typeface="Wingdings 2" charset="2"/>
-              <a:buChar char=""/>
-            </a:pPr>
-            <a:r>
-              <a:rPr lang="en-US" sz="1500" b="0" strike="noStrike" spc="-1">
-                <a:solidFill>
-                  <a:srgbClr val="404040"/>
-                </a:solidFill>
-                <a:uFill>
-                  <a:solidFill>
-                    <a:srgbClr val="FFFFFF"/>
-                  </a:solidFill>
-                </a:uFill>
-                <a:latin typeface="Calibri"/>
-              </a:rPr>
-              <a:t>Screen Captures</a:t>
-            </a:r>
-            <a:endParaRPr lang="en-US" sz="1800" b="0" strike="noStrike" spc="-1">
-              <a:solidFill>
-                <a:srgbClr val="000000"/>
-              </a:solidFill>
-              <a:uFill>
-                <a:solidFill>
-                  <a:srgbClr val="FFFFFF"/>
-                </a:solidFill>
-              </a:uFill>
-              <a:latin typeface="Arial"/>
-            </a:endParaRPr>
-          </a:p>
-          <a:p>
-            <a:pPr marL="377280" lvl="3" indent="-198360">
-              <a:lnSpc>
-                <a:spcPct val="100000"/>
-              </a:lnSpc>
-              <a:buClr>
-                <a:srgbClr val="4E67C8"/>
-              </a:buClr>
-              <a:buSzPct val="80000"/>
-              <a:buFont typeface="Wingdings 2" charset="2"/>
-              <a:buChar char=""/>
-            </a:pPr>
-            <a:r>
-              <a:rPr lang="en-US" sz="1500" b="0" strike="noStrike" spc="-1">
-                <a:solidFill>
-                  <a:srgbClr val="404040"/>
-                </a:solidFill>
-                <a:uFill>
-                  <a:solidFill>
-                    <a:srgbClr val="FFFFFF"/>
-                  </a:solidFill>
-                </a:uFill>
-                <a:latin typeface="Calibri"/>
-              </a:rPr>
-              <a:t>Etc.</a:t>
-            </a:r>
-            <a:endParaRPr lang="en-US" sz="1800" b="0" strike="noStrike" spc="-1">
-              <a:solidFill>
-                <a:srgbClr val="000000"/>
-              </a:solidFill>
-              <a:uFill>
-                <a:solidFill>
-                  <a:srgbClr val="FFFFFF"/>
-                </a:solidFill>
-              </a:uFill>
-              <a:latin typeface="Arial"/>
-            </a:endParaRPr>
-          </a:p>
-          <a:p>
-            <a:pPr marL="199080" indent="-198360">
-              <a:lnSpc>
-                <a:spcPct val="100000"/>
-              </a:lnSpc>
-              <a:buClr>
-                <a:srgbClr val="4E67C8"/>
-              </a:buClr>
-              <a:buFont typeface="Wingdings 2" charset="2"/>
-              <a:buChar char=""/>
-            </a:pPr>
-            <a:r>
-              <a:rPr lang="en-US" sz="2000" b="0" strike="noStrike" spc="-1">
-                <a:solidFill>
-                  <a:srgbClr val="404040"/>
-                </a:solidFill>
-                <a:uFill>
-                  <a:solidFill>
-                    <a:srgbClr val="FFFFFF"/>
-                  </a:solidFill>
-                </a:uFill>
-                <a:latin typeface="Calibri"/>
-              </a:rPr>
-              <a:t>Presenters – duplicate this slide as many times as needed</a:t>
-            </a:r>
-            <a:endParaRPr lang="en-US" sz="1800" b="0" strike="noStrike" spc="-1">
-              <a:solidFill>
-                <a:srgbClr val="000000"/>
-              </a:solidFill>
-              <a:uFill>
-                <a:solidFill>
-                  <a:srgbClr val="FFFFFF"/>
-                </a:solidFill>
-              </a:uFill>
-              <a:latin typeface="Arial"/>
-            </a:endParaRPr>
-          </a:p>
-          <a:p>
-            <a:pPr>
-              <a:lnSpc>
-                <a:spcPct val="90000"/>
-              </a:lnSpc>
-            </a:pPr>
-            <a:endParaRPr lang="en-US" sz="1800" b="0" strike="noStrike" spc="-1">
+            </a:pPr>
+            <a:endParaRPr lang="en-US" sz="1800" b="0" strike="noStrike" spc="-1" dirty="0">
               <a:solidFill>
                 <a:srgbClr val="000000"/>
               </a:solidFill>
@@ -27225,6 +27079,1665 @@
               </a:uFill>
               <a:latin typeface="Arial"/>
             </a:endParaRPr>
+          </a:p>
+        </p:txBody>
+      </p:sp>
+      <p:sp>
+        <p:nvSpPr>
+          <p:cNvPr id="2" name="Rectangle 1"/>
+          <p:cNvSpPr>
+            <a:spLocks noChangeArrowheads="1"/>
+          </p:cNvSpPr>
+          <p:nvPr/>
+        </p:nvSpPr>
+        <p:spPr bwMode="auto">
+          <a:xfrm>
+            <a:off x="894678" y="1764159"/>
+            <a:ext cx="7273145" cy="4185761"/>
+          </a:xfrm>
+          <a:prstGeom prst="rect">
+            <a:avLst/>
+          </a:prstGeom>
+          <a:solidFill>
+            <a:schemeClr val="tx1"/>
+          </a:solidFill>
+          <a:ln>
+            <a:noFill/>
+          </a:ln>
+          <a:effectLst/>
+        </p:spPr>
+        <p:txBody>
+          <a:bodyPr vert="horz" wrap="none" lIns="91440" tIns="45720" rIns="91440" bIns="45720" numCol="1" anchor="ctr" anchorCtr="0" compatLnSpc="1">
+            <a:prstTxWarp prst="textNoShape">
+              <a:avLst/>
+            </a:prstTxWarp>
+            <a:spAutoFit/>
+          </a:bodyPr>
+          <a:lstStyle/>
+          <a:p>
+            <a:pPr marL="0" marR="0" lvl="0" indent="0" algn="l" defTabSz="914400" rtl="0" eaLnBrk="0" fontAlgn="base" latinLnBrk="0" hangingPunct="0">
+              <a:lnSpc>
+                <a:spcPct val="100000"/>
+              </a:lnSpc>
+              <a:spcBef>
+                <a:spcPct val="0"/>
+              </a:spcBef>
+              <a:spcAft>
+                <a:spcPct val="0"/>
+              </a:spcAft>
+              <a:buClrTx/>
+              <a:buSzTx/>
+              <a:buFontTx/>
+              <a:buNone/>
+              <a:tabLst/>
+            </a:pPr>
+            <a:r>
+              <a:rPr kumimoji="0" lang="en-GB" altLang="en-US" sz="1400" b="0" i="0" u="none" strike="noStrike" cap="none" normalizeH="0" baseline="0" dirty="0" smtClean="0">
+                <a:ln>
+                  <a:noFill/>
+                </a:ln>
+                <a:solidFill>
+                  <a:srgbClr val="00FF00"/>
+                </a:solidFill>
+                <a:effectLst/>
+                <a:latin typeface="Courier New" panose="02070309020205020404" pitchFamily="49" charset="0"/>
+                <a:cs typeface="Courier New" panose="02070309020205020404" pitchFamily="49" charset="0"/>
+              </a:rPr>
+              <a:t>// Loop through all the rows in the table and test each query</a:t>
+            </a:r>
+            <a:endParaRPr kumimoji="0" lang="en-GB" altLang="en-US" sz="1400" b="0" i="0" u="none" strike="noStrike" cap="none" normalizeH="0" baseline="0" dirty="0" smtClean="0">
+              <a:ln>
+                <a:noFill/>
+              </a:ln>
+              <a:solidFill>
+                <a:srgbClr val="FFFFFF"/>
+              </a:solidFill>
+              <a:effectLst/>
+              <a:latin typeface="Courier New" panose="02070309020205020404" pitchFamily="49" charset="0"/>
+              <a:cs typeface="Courier New" panose="02070309020205020404" pitchFamily="49" charset="0"/>
+            </a:endParaRPr>
+          </a:p>
+          <a:p>
+            <a:pPr marL="0" marR="0" lvl="0" indent="0" algn="l" defTabSz="914400" rtl="0" eaLnBrk="0" fontAlgn="base" latinLnBrk="0" hangingPunct="0">
+              <a:lnSpc>
+                <a:spcPct val="100000"/>
+              </a:lnSpc>
+              <a:spcBef>
+                <a:spcPct val="0"/>
+              </a:spcBef>
+              <a:spcAft>
+                <a:spcPct val="0"/>
+              </a:spcAft>
+              <a:buClrTx/>
+              <a:buSzTx/>
+              <a:buFontTx/>
+              <a:buNone/>
+              <a:tabLst/>
+            </a:pPr>
+            <a:r>
+              <a:rPr kumimoji="0" lang="en-GB" altLang="en-US" sz="1400" b="0" i="0" u="none" strike="noStrike" cap="none" normalizeH="0" baseline="0" dirty="0" err="1" smtClean="0">
+                <a:ln>
+                  <a:noFill/>
+                </a:ln>
+                <a:solidFill>
+                  <a:srgbClr val="FFFFFF"/>
+                </a:solidFill>
+                <a:effectLst/>
+                <a:latin typeface="Courier New" panose="02070309020205020404" pitchFamily="49" charset="0"/>
+                <a:cs typeface="Courier New" panose="02070309020205020404" pitchFamily="49" charset="0"/>
+              </a:rPr>
+              <a:t>queries.each</a:t>
+            </a:r>
+            <a:r>
+              <a:rPr kumimoji="0" lang="en-GB" altLang="en-US" sz="1400" b="0" i="0" u="none" strike="noStrike" cap="none" normalizeH="0" baseline="0" dirty="0" smtClean="0">
+                <a:ln>
+                  <a:noFill/>
+                </a:ln>
+                <a:solidFill>
+                  <a:srgbClr val="FFFFFF"/>
+                </a:solidFill>
+                <a:effectLst/>
+                <a:latin typeface="Courier New" panose="02070309020205020404" pitchFamily="49" charset="0"/>
+                <a:cs typeface="Courier New" panose="02070309020205020404" pitchFamily="49" charset="0"/>
+              </a:rPr>
+              <a:t> { </a:t>
+            </a:r>
+          </a:p>
+          <a:p>
+            <a:pPr marL="0" marR="0" lvl="0" indent="0" algn="l" defTabSz="914400" rtl="0" eaLnBrk="0" fontAlgn="base" latinLnBrk="0" hangingPunct="0">
+              <a:lnSpc>
+                <a:spcPct val="100000"/>
+              </a:lnSpc>
+              <a:spcBef>
+                <a:spcPct val="0"/>
+              </a:spcBef>
+              <a:spcAft>
+                <a:spcPct val="0"/>
+              </a:spcAft>
+              <a:buClrTx/>
+              <a:buSzTx/>
+              <a:buFontTx/>
+              <a:buNone/>
+              <a:tabLst/>
+            </a:pPr>
+            <a:r>
+              <a:rPr lang="en-GB" altLang="en-US" sz="1400" dirty="0">
+                <a:solidFill>
+                  <a:srgbClr val="FFFFFF"/>
+                </a:solidFill>
+                <a:latin typeface="Courier New" panose="02070309020205020404" pitchFamily="49" charset="0"/>
+                <a:cs typeface="Courier New" panose="02070309020205020404" pitchFamily="49" charset="0"/>
+              </a:rPr>
+              <a:t> </a:t>
+            </a:r>
+            <a:r>
+              <a:rPr lang="en-GB" altLang="en-US" sz="1400" dirty="0" smtClean="0">
+                <a:solidFill>
+                  <a:srgbClr val="FFFFFF"/>
+                </a:solidFill>
+                <a:latin typeface="Courier New" panose="02070309020205020404" pitchFamily="49" charset="0"/>
+                <a:cs typeface="Courier New" panose="02070309020205020404" pitchFamily="49" charset="0"/>
+              </a:rPr>
+              <a:t> </a:t>
+            </a:r>
+            <a:r>
+              <a:rPr kumimoji="0" lang="en-GB" altLang="en-US" sz="1400" b="0" i="0" u="none" strike="noStrike" cap="none" normalizeH="0" baseline="0" dirty="0" smtClean="0">
+                <a:ln>
+                  <a:noFill/>
+                </a:ln>
+                <a:solidFill>
+                  <a:srgbClr val="FFFFFF"/>
+                </a:solidFill>
+                <a:effectLst/>
+                <a:latin typeface="Courier New" panose="02070309020205020404" pitchFamily="49" charset="0"/>
+                <a:cs typeface="Courier New" panose="02070309020205020404" pitchFamily="49" charset="0"/>
+              </a:rPr>
+              <a:t>q -&gt; </a:t>
+            </a:r>
+          </a:p>
+          <a:p>
+            <a:pPr marL="0" marR="0" lvl="0" indent="0" algn="l" defTabSz="914400" rtl="0" eaLnBrk="0" fontAlgn="base" latinLnBrk="0" hangingPunct="0">
+              <a:lnSpc>
+                <a:spcPct val="100000"/>
+              </a:lnSpc>
+              <a:spcBef>
+                <a:spcPct val="0"/>
+              </a:spcBef>
+              <a:spcAft>
+                <a:spcPct val="0"/>
+              </a:spcAft>
+              <a:buClrTx/>
+              <a:buSzTx/>
+              <a:buFontTx/>
+              <a:buNone/>
+              <a:tabLst/>
+            </a:pPr>
+            <a:r>
+              <a:rPr lang="en-GB" altLang="en-US" sz="1400" dirty="0">
+                <a:solidFill>
+                  <a:srgbClr val="FFFFFF"/>
+                </a:solidFill>
+                <a:latin typeface="Courier New" panose="02070309020205020404" pitchFamily="49" charset="0"/>
+                <a:cs typeface="Courier New" panose="02070309020205020404" pitchFamily="49" charset="0"/>
+              </a:rPr>
+              <a:t> </a:t>
+            </a:r>
+            <a:r>
+              <a:rPr lang="en-GB" altLang="en-US" sz="1400" dirty="0" smtClean="0">
+                <a:solidFill>
+                  <a:srgbClr val="FFFFFF"/>
+                </a:solidFill>
+                <a:latin typeface="Courier New" panose="02070309020205020404" pitchFamily="49" charset="0"/>
+                <a:cs typeface="Courier New" panose="02070309020205020404" pitchFamily="49" charset="0"/>
+              </a:rPr>
+              <a:t>   </a:t>
+            </a:r>
+            <a:r>
+              <a:rPr kumimoji="0" lang="en-GB" altLang="en-US" sz="1400" b="0" i="0" u="none" strike="noStrike" cap="none" normalizeH="0" baseline="0" dirty="0" err="1" smtClean="0">
+                <a:ln>
+                  <a:noFill/>
+                </a:ln>
+                <a:solidFill>
+                  <a:srgbClr val="FFFFFF"/>
+                </a:solidFill>
+                <a:effectLst/>
+                <a:latin typeface="Courier New" panose="02070309020205020404" pitchFamily="49" charset="0"/>
+                <a:cs typeface="Courier New" panose="02070309020205020404" pitchFamily="49" charset="0"/>
+              </a:rPr>
+              <a:t>query_row</a:t>
+            </a:r>
+            <a:r>
+              <a:rPr kumimoji="0" lang="en-GB" altLang="en-US" sz="1400" b="0" i="0" u="none" strike="noStrike" cap="none" normalizeH="0" baseline="0" dirty="0" smtClean="0">
+                <a:ln>
+                  <a:noFill/>
+                </a:ln>
+                <a:solidFill>
+                  <a:srgbClr val="FFFFFF"/>
+                </a:solidFill>
+                <a:effectLst/>
+                <a:latin typeface="Courier New" panose="02070309020205020404" pitchFamily="49" charset="0"/>
+                <a:cs typeface="Courier New" panose="02070309020205020404" pitchFamily="49" charset="0"/>
+              </a:rPr>
+              <a:t> = [id: q.id, </a:t>
+            </a:r>
+            <a:r>
+              <a:rPr kumimoji="0" lang="en-GB" altLang="en-US" sz="1400" b="0" i="0" u="none" strike="noStrike" cap="none" normalizeH="0" baseline="0" dirty="0" err="1" smtClean="0">
+                <a:ln>
+                  <a:noFill/>
+                </a:ln>
+                <a:solidFill>
+                  <a:srgbClr val="FFFFFF"/>
+                </a:solidFill>
+                <a:effectLst/>
+                <a:latin typeface="Courier New" panose="02070309020205020404" pitchFamily="49" charset="0"/>
+                <a:cs typeface="Courier New" panose="02070309020205020404" pitchFamily="49" charset="0"/>
+              </a:rPr>
+              <a:t>sql_query</a:t>
+            </a:r>
+            <a:r>
+              <a:rPr kumimoji="0" lang="en-GB" altLang="en-US" sz="1400" b="0" i="0" u="none" strike="noStrike" cap="none" normalizeH="0" baseline="0" dirty="0" smtClean="0">
+                <a:ln>
+                  <a:noFill/>
+                </a:ln>
+                <a:solidFill>
+                  <a:srgbClr val="FFFFFF"/>
+                </a:solidFill>
+                <a:effectLst/>
+                <a:latin typeface="Courier New" panose="02070309020205020404" pitchFamily="49" charset="0"/>
+                <a:cs typeface="Courier New" panose="02070309020205020404" pitchFamily="49" charset="0"/>
+              </a:rPr>
+              <a:t>: </a:t>
+            </a:r>
+            <a:r>
+              <a:rPr kumimoji="0" lang="en-GB" altLang="en-US" sz="1400" b="0" i="0" u="none" strike="noStrike" cap="none" normalizeH="0" baseline="0" dirty="0" err="1" smtClean="0">
+                <a:ln>
+                  <a:noFill/>
+                </a:ln>
+                <a:solidFill>
+                  <a:srgbClr val="FFFFFF"/>
+                </a:solidFill>
+                <a:effectLst/>
+                <a:latin typeface="Courier New" panose="02070309020205020404" pitchFamily="49" charset="0"/>
+                <a:cs typeface="Courier New" panose="02070309020205020404" pitchFamily="49" charset="0"/>
+              </a:rPr>
+              <a:t>q.sql_query</a:t>
+            </a:r>
+            <a:r>
+              <a:rPr kumimoji="0" lang="en-GB" altLang="en-US" sz="1400" b="0" i="0" u="none" strike="noStrike" cap="none" normalizeH="0" baseline="0" dirty="0" smtClean="0">
+                <a:ln>
+                  <a:noFill/>
+                </a:ln>
+                <a:solidFill>
+                  <a:srgbClr val="FFFFFF"/>
+                </a:solidFill>
+                <a:effectLst/>
+                <a:latin typeface="Courier New" panose="02070309020205020404" pitchFamily="49" charset="0"/>
+                <a:cs typeface="Courier New" panose="02070309020205020404" pitchFamily="49" charset="0"/>
+              </a:rPr>
+              <a:t>, error: </a:t>
+            </a:r>
+            <a:r>
+              <a:rPr kumimoji="0" lang="en-GB" altLang="en-US" sz="1400" b="0" i="0" u="none" strike="noStrike" cap="none" normalizeH="0" baseline="0" dirty="0" smtClean="0">
+                <a:ln>
+                  <a:noFill/>
+                </a:ln>
+                <a:solidFill>
+                  <a:srgbClr val="FFA07A"/>
+                </a:solidFill>
+                <a:effectLst/>
+                <a:latin typeface="Courier New" panose="02070309020205020404" pitchFamily="49" charset="0"/>
+                <a:cs typeface="Courier New" panose="02070309020205020404" pitchFamily="49" charset="0"/>
+              </a:rPr>
+              <a:t>''</a:t>
+            </a:r>
+            <a:r>
+              <a:rPr kumimoji="0" lang="en-GB" altLang="en-US" sz="1400" b="0" i="0" u="none" strike="noStrike" cap="none" normalizeH="0" baseline="0" dirty="0" smtClean="0">
+                <a:ln>
+                  <a:noFill/>
+                </a:ln>
+                <a:solidFill>
+                  <a:srgbClr val="FFFFFF"/>
+                </a:solidFill>
+                <a:effectLst/>
+                <a:latin typeface="Courier New" panose="02070309020205020404" pitchFamily="49" charset="0"/>
+                <a:cs typeface="Courier New" panose="02070309020205020404" pitchFamily="49" charset="0"/>
+              </a:rPr>
+              <a:t>]; </a:t>
+            </a:r>
+          </a:p>
+          <a:p>
+            <a:pPr marL="0" marR="0" lvl="0" indent="0" algn="l" defTabSz="914400" rtl="0" eaLnBrk="0" fontAlgn="base" latinLnBrk="0" hangingPunct="0">
+              <a:lnSpc>
+                <a:spcPct val="100000"/>
+              </a:lnSpc>
+              <a:spcBef>
+                <a:spcPct val="0"/>
+              </a:spcBef>
+              <a:spcAft>
+                <a:spcPct val="0"/>
+              </a:spcAft>
+              <a:buClrTx/>
+              <a:buSzTx/>
+              <a:buFontTx/>
+              <a:buNone/>
+              <a:tabLst/>
+            </a:pPr>
+            <a:r>
+              <a:rPr lang="en-GB" altLang="en-US" sz="1400" dirty="0">
+                <a:solidFill>
+                  <a:srgbClr val="FFFFFF"/>
+                </a:solidFill>
+                <a:latin typeface="Courier New" panose="02070309020205020404" pitchFamily="49" charset="0"/>
+                <a:cs typeface="Courier New" panose="02070309020205020404" pitchFamily="49" charset="0"/>
+              </a:rPr>
+              <a:t> </a:t>
+            </a:r>
+            <a:r>
+              <a:rPr lang="en-GB" altLang="en-US" sz="1400" dirty="0" smtClean="0">
+                <a:solidFill>
+                  <a:srgbClr val="FFFFFF"/>
+                </a:solidFill>
+                <a:latin typeface="Courier New" panose="02070309020205020404" pitchFamily="49" charset="0"/>
+                <a:cs typeface="Courier New" panose="02070309020205020404" pitchFamily="49" charset="0"/>
+              </a:rPr>
+              <a:t>   </a:t>
+            </a:r>
+            <a:r>
+              <a:rPr kumimoji="0" lang="en-GB" altLang="en-US" sz="1400" b="0" i="0" u="none" strike="noStrike" cap="none" normalizeH="0" baseline="0" dirty="0" smtClean="0">
+                <a:ln>
+                  <a:noFill/>
+                </a:ln>
+                <a:solidFill>
+                  <a:srgbClr val="00FF00"/>
+                </a:solidFill>
+                <a:effectLst/>
+                <a:latin typeface="Courier New" panose="02070309020205020404" pitchFamily="49" charset="0"/>
+                <a:cs typeface="Courier New" panose="02070309020205020404" pitchFamily="49" charset="0"/>
+              </a:rPr>
+              <a:t>// Test the query from the table by invoking </a:t>
+            </a:r>
+            <a:r>
+              <a:rPr kumimoji="0" lang="en-GB" altLang="en-US" sz="1400" b="0" i="0" u="none" strike="noStrike" cap="none" normalizeH="0" baseline="0" dirty="0" err="1" smtClean="0">
+                <a:ln>
+                  <a:noFill/>
+                </a:ln>
+                <a:solidFill>
+                  <a:srgbClr val="00FF00"/>
+                </a:solidFill>
+                <a:effectLst/>
+                <a:latin typeface="Courier New" panose="02070309020205020404" pitchFamily="49" charset="0"/>
+                <a:cs typeface="Courier New" panose="02070309020205020404" pitchFamily="49" charset="0"/>
+              </a:rPr>
+              <a:t>explain_plan</a:t>
+            </a:r>
+            <a:r>
+              <a:rPr kumimoji="0" lang="en-GB" altLang="en-US" sz="1400" b="0" i="0" u="none" strike="noStrike" cap="none" normalizeH="0" baseline="0" dirty="0" smtClean="0">
+                <a:ln>
+                  <a:noFill/>
+                </a:ln>
+                <a:solidFill>
+                  <a:srgbClr val="00FF00"/>
+                </a:solidFill>
+                <a:effectLst/>
+                <a:latin typeface="Courier New" panose="02070309020205020404" pitchFamily="49" charset="0"/>
+                <a:cs typeface="Courier New" panose="02070309020205020404" pitchFamily="49" charset="0"/>
+              </a:rPr>
+              <a:t>. If</a:t>
+            </a:r>
+            <a:r>
+              <a:rPr kumimoji="0" lang="en-GB" altLang="en-US" sz="1400" b="0" i="0" u="none" strike="noStrike" cap="none" normalizeH="0" baseline="0" dirty="0" smtClean="0">
+                <a:ln>
+                  <a:noFill/>
+                </a:ln>
+                <a:solidFill>
+                  <a:srgbClr val="FFFFFF"/>
+                </a:solidFill>
+                <a:effectLst/>
+                <a:latin typeface="Courier New" panose="02070309020205020404" pitchFamily="49" charset="0"/>
+                <a:cs typeface="Courier New" panose="02070309020205020404" pitchFamily="49" charset="0"/>
+              </a:rPr>
+              <a:t> </a:t>
+            </a:r>
+          </a:p>
+          <a:p>
+            <a:pPr marL="0" marR="0" lvl="0" indent="0" algn="l" defTabSz="914400" rtl="0" eaLnBrk="0" fontAlgn="base" latinLnBrk="0" hangingPunct="0">
+              <a:lnSpc>
+                <a:spcPct val="100000"/>
+              </a:lnSpc>
+              <a:spcBef>
+                <a:spcPct val="0"/>
+              </a:spcBef>
+              <a:spcAft>
+                <a:spcPct val="0"/>
+              </a:spcAft>
+              <a:buClrTx/>
+              <a:buSzTx/>
+              <a:buFontTx/>
+              <a:buNone/>
+              <a:tabLst/>
+            </a:pPr>
+            <a:r>
+              <a:rPr lang="en-GB" altLang="en-US" sz="1400" dirty="0">
+                <a:solidFill>
+                  <a:srgbClr val="FFFFFF"/>
+                </a:solidFill>
+                <a:latin typeface="Courier New" panose="02070309020205020404" pitchFamily="49" charset="0"/>
+                <a:cs typeface="Courier New" panose="02070309020205020404" pitchFamily="49" charset="0"/>
+              </a:rPr>
+              <a:t> </a:t>
+            </a:r>
+            <a:r>
+              <a:rPr lang="en-GB" altLang="en-US" sz="1400" dirty="0" smtClean="0">
+                <a:solidFill>
+                  <a:srgbClr val="FFFFFF"/>
+                </a:solidFill>
+                <a:latin typeface="Courier New" panose="02070309020205020404" pitchFamily="49" charset="0"/>
+                <a:cs typeface="Courier New" panose="02070309020205020404" pitchFamily="49" charset="0"/>
+              </a:rPr>
+              <a:t>   </a:t>
+            </a:r>
+            <a:r>
+              <a:rPr kumimoji="0" lang="en-GB" altLang="en-US" sz="1400" b="0" i="0" u="none" strike="noStrike" cap="none" normalizeH="0" baseline="0" dirty="0" smtClean="0">
+                <a:ln>
+                  <a:noFill/>
+                </a:ln>
+                <a:solidFill>
+                  <a:srgbClr val="00FF00"/>
+                </a:solidFill>
+                <a:effectLst/>
+                <a:latin typeface="Courier New" panose="02070309020205020404" pitchFamily="49" charset="0"/>
+                <a:cs typeface="Courier New" panose="02070309020205020404" pitchFamily="49" charset="0"/>
+              </a:rPr>
+              <a:t>// the query fails to compile, it will throw a </a:t>
+            </a:r>
+            <a:r>
+              <a:rPr kumimoji="0" lang="en-GB" altLang="en-US" sz="1400" b="0" i="0" u="none" strike="noStrike" cap="none" normalizeH="0" baseline="0" dirty="0" err="1" smtClean="0">
+                <a:ln>
+                  <a:noFill/>
+                </a:ln>
+                <a:solidFill>
+                  <a:srgbClr val="00FF00"/>
+                </a:solidFill>
+                <a:effectLst/>
+                <a:latin typeface="Courier New" panose="02070309020205020404" pitchFamily="49" charset="0"/>
+                <a:cs typeface="Courier New" panose="02070309020205020404" pitchFamily="49" charset="0"/>
+              </a:rPr>
+              <a:t>SQLException</a:t>
+            </a:r>
+            <a:r>
+              <a:rPr kumimoji="0" lang="en-GB" altLang="en-US" sz="1400" b="0" i="0" u="none" strike="noStrike" cap="none" normalizeH="0" baseline="0" dirty="0" smtClean="0">
+                <a:ln>
+                  <a:noFill/>
+                </a:ln>
+                <a:solidFill>
+                  <a:srgbClr val="00FF00"/>
+                </a:solidFill>
+                <a:effectLst/>
+                <a:latin typeface="Courier New" panose="02070309020205020404" pitchFamily="49" charset="0"/>
+                <a:cs typeface="Courier New" panose="02070309020205020404" pitchFamily="49" charset="0"/>
+              </a:rPr>
+              <a:t>.</a:t>
+            </a:r>
+            <a:r>
+              <a:rPr kumimoji="0" lang="en-GB" altLang="en-US" sz="1400" b="0" i="0" u="none" strike="noStrike" cap="none" normalizeH="0" baseline="0" dirty="0" smtClean="0">
+                <a:ln>
+                  <a:noFill/>
+                </a:ln>
+                <a:solidFill>
+                  <a:srgbClr val="FFFFFF"/>
+                </a:solidFill>
+                <a:effectLst/>
+                <a:latin typeface="Courier New" panose="02070309020205020404" pitchFamily="49" charset="0"/>
+                <a:cs typeface="Courier New" panose="02070309020205020404" pitchFamily="49" charset="0"/>
+              </a:rPr>
+              <a:t> </a:t>
+            </a:r>
+          </a:p>
+          <a:p>
+            <a:pPr marL="0" marR="0" lvl="0" indent="0" algn="l" defTabSz="914400" rtl="0" eaLnBrk="0" fontAlgn="base" latinLnBrk="0" hangingPunct="0">
+              <a:lnSpc>
+                <a:spcPct val="100000"/>
+              </a:lnSpc>
+              <a:spcBef>
+                <a:spcPct val="0"/>
+              </a:spcBef>
+              <a:spcAft>
+                <a:spcPct val="0"/>
+              </a:spcAft>
+              <a:buClrTx/>
+              <a:buSzTx/>
+              <a:buFontTx/>
+              <a:buNone/>
+              <a:tabLst/>
+            </a:pPr>
+            <a:r>
+              <a:rPr lang="en-GB" altLang="en-US" sz="1400" dirty="0">
+                <a:solidFill>
+                  <a:srgbClr val="FFFFFF"/>
+                </a:solidFill>
+                <a:latin typeface="Courier New" panose="02070309020205020404" pitchFamily="49" charset="0"/>
+                <a:cs typeface="Courier New" panose="02070309020205020404" pitchFamily="49" charset="0"/>
+              </a:rPr>
+              <a:t> </a:t>
+            </a:r>
+            <a:r>
+              <a:rPr lang="en-GB" altLang="en-US" sz="1400" dirty="0" smtClean="0">
+                <a:solidFill>
+                  <a:srgbClr val="FFFFFF"/>
+                </a:solidFill>
+                <a:latin typeface="Courier New" panose="02070309020205020404" pitchFamily="49" charset="0"/>
+                <a:cs typeface="Courier New" panose="02070309020205020404" pitchFamily="49" charset="0"/>
+              </a:rPr>
+              <a:t>   </a:t>
+            </a:r>
+            <a:r>
+              <a:rPr kumimoji="0" lang="en-GB" altLang="en-US" sz="1400" b="0" i="0" u="none" strike="noStrike" cap="none" normalizeH="0" baseline="0" dirty="0" smtClean="0">
+                <a:ln>
+                  <a:noFill/>
+                </a:ln>
+                <a:solidFill>
+                  <a:srgbClr val="00FFFF"/>
+                </a:solidFill>
+                <a:effectLst/>
+                <a:latin typeface="Courier New" panose="02070309020205020404" pitchFamily="49" charset="0"/>
+                <a:cs typeface="Courier New" panose="02070309020205020404" pitchFamily="49" charset="0"/>
+              </a:rPr>
+              <a:t>try</a:t>
+            </a:r>
+            <a:r>
+              <a:rPr kumimoji="0" lang="en-GB" altLang="en-US" sz="1400" b="0" i="0" u="none" strike="noStrike" cap="none" normalizeH="0" baseline="0" dirty="0" smtClean="0">
+                <a:ln>
+                  <a:noFill/>
+                </a:ln>
+                <a:solidFill>
+                  <a:srgbClr val="FFFFFF"/>
+                </a:solidFill>
+                <a:effectLst/>
+                <a:latin typeface="Courier New" panose="02070309020205020404" pitchFamily="49" charset="0"/>
+                <a:cs typeface="Courier New" panose="02070309020205020404" pitchFamily="49" charset="0"/>
+              </a:rPr>
+              <a:t> { </a:t>
+            </a:r>
+          </a:p>
+          <a:p>
+            <a:pPr marL="0" marR="0" lvl="0" indent="0" algn="l" defTabSz="914400" rtl="0" eaLnBrk="0" fontAlgn="base" latinLnBrk="0" hangingPunct="0">
+              <a:lnSpc>
+                <a:spcPct val="100000"/>
+              </a:lnSpc>
+              <a:spcBef>
+                <a:spcPct val="0"/>
+              </a:spcBef>
+              <a:spcAft>
+                <a:spcPct val="0"/>
+              </a:spcAft>
+              <a:buClrTx/>
+              <a:buSzTx/>
+              <a:buFontTx/>
+              <a:buNone/>
+              <a:tabLst/>
+            </a:pPr>
+            <a:r>
+              <a:rPr lang="en-GB" altLang="en-US" sz="1400" dirty="0">
+                <a:solidFill>
+                  <a:srgbClr val="FFFFFF"/>
+                </a:solidFill>
+                <a:latin typeface="Courier New" panose="02070309020205020404" pitchFamily="49" charset="0"/>
+                <a:cs typeface="Courier New" panose="02070309020205020404" pitchFamily="49" charset="0"/>
+              </a:rPr>
+              <a:t> </a:t>
+            </a:r>
+            <a:r>
+              <a:rPr lang="en-GB" altLang="en-US" sz="1400" dirty="0" smtClean="0">
+                <a:solidFill>
+                  <a:srgbClr val="FFFFFF"/>
+                </a:solidFill>
+                <a:latin typeface="Courier New" panose="02070309020205020404" pitchFamily="49" charset="0"/>
+                <a:cs typeface="Courier New" panose="02070309020205020404" pitchFamily="49" charset="0"/>
+              </a:rPr>
+              <a:t>     </a:t>
+            </a:r>
+            <a:r>
+              <a:rPr kumimoji="0" lang="en-GB" altLang="en-US" sz="1400" b="0" i="0" u="none" strike="noStrike" cap="none" normalizeH="0" baseline="0" dirty="0" smtClean="0">
+                <a:ln>
+                  <a:noFill/>
+                </a:ln>
+                <a:solidFill>
+                  <a:srgbClr val="00FF00"/>
+                </a:solidFill>
+                <a:effectLst/>
+                <a:latin typeface="Courier New" panose="02070309020205020404" pitchFamily="49" charset="0"/>
+                <a:cs typeface="Courier New" panose="02070309020205020404" pitchFamily="49" charset="0"/>
+              </a:rPr>
+              <a:t>// Beware of </a:t>
+            </a:r>
+            <a:r>
+              <a:rPr kumimoji="0" lang="en-GB" altLang="en-US" sz="1400" b="0" i="0" u="none" strike="noStrike" cap="none" normalizeH="0" baseline="0" dirty="0" err="1" smtClean="0">
+                <a:ln>
+                  <a:noFill/>
+                </a:ln>
+                <a:solidFill>
+                  <a:srgbClr val="00FF00"/>
+                </a:solidFill>
+                <a:effectLst/>
+                <a:latin typeface="Courier New" panose="02070309020205020404" pitchFamily="49" charset="0"/>
+                <a:cs typeface="Courier New" panose="02070309020205020404" pitchFamily="49" charset="0"/>
+              </a:rPr>
+              <a:t>Groovy's</a:t>
+            </a:r>
+            <a:r>
+              <a:rPr kumimoji="0" lang="en-GB" altLang="en-US" sz="1400" b="0" i="0" u="none" strike="noStrike" cap="none" normalizeH="0" baseline="0" dirty="0" smtClean="0">
+                <a:ln>
+                  <a:noFill/>
+                </a:ln>
+                <a:solidFill>
+                  <a:srgbClr val="00FF00"/>
+                </a:solidFill>
+                <a:effectLst/>
+                <a:latin typeface="Courier New" panose="02070309020205020404" pitchFamily="49" charset="0"/>
+                <a:cs typeface="Courier New" panose="02070309020205020404" pitchFamily="49" charset="0"/>
+              </a:rPr>
+              <a:t> </a:t>
+            </a:r>
+            <a:r>
+              <a:rPr kumimoji="0" lang="en-GB" altLang="en-US" sz="1400" b="0" i="0" u="none" strike="noStrike" cap="none" normalizeH="0" baseline="0" dirty="0" err="1" smtClean="0">
+                <a:ln>
+                  <a:noFill/>
+                </a:ln>
+                <a:solidFill>
+                  <a:srgbClr val="00FF00"/>
+                </a:solidFill>
+                <a:effectLst/>
+                <a:latin typeface="Courier New" panose="02070309020205020404" pitchFamily="49" charset="0"/>
+                <a:cs typeface="Courier New" panose="02070309020205020404" pitchFamily="49" charset="0"/>
+              </a:rPr>
+              <a:t>GString</a:t>
+            </a:r>
+            <a:r>
+              <a:rPr kumimoji="0" lang="en-GB" altLang="en-US" sz="1400" b="0" i="0" u="none" strike="noStrike" cap="none" normalizeH="0" baseline="0" dirty="0" smtClean="0">
+                <a:ln>
+                  <a:noFill/>
+                </a:ln>
+                <a:solidFill>
+                  <a:srgbClr val="00FF00"/>
+                </a:solidFill>
+                <a:effectLst/>
+                <a:latin typeface="Courier New" panose="02070309020205020404" pitchFamily="49" charset="0"/>
+                <a:cs typeface="Courier New" panose="02070309020205020404" pitchFamily="49" charset="0"/>
+              </a:rPr>
+              <a:t> </a:t>
+            </a:r>
+          </a:p>
+          <a:p>
+            <a:pPr marL="0" marR="0" lvl="0" indent="0" algn="l" defTabSz="914400" rtl="0" eaLnBrk="0" fontAlgn="base" latinLnBrk="0" hangingPunct="0">
+              <a:lnSpc>
+                <a:spcPct val="100000"/>
+              </a:lnSpc>
+              <a:spcBef>
+                <a:spcPct val="0"/>
+              </a:spcBef>
+              <a:spcAft>
+                <a:spcPct val="0"/>
+              </a:spcAft>
+              <a:buClrTx/>
+              <a:buSzTx/>
+              <a:buFontTx/>
+              <a:buNone/>
+              <a:tabLst/>
+            </a:pPr>
+            <a:r>
+              <a:rPr lang="en-GB" altLang="en-US" sz="1400" dirty="0">
+                <a:solidFill>
+                  <a:srgbClr val="00FF00"/>
+                </a:solidFill>
+                <a:latin typeface="Courier New" panose="02070309020205020404" pitchFamily="49" charset="0"/>
+                <a:cs typeface="Courier New" panose="02070309020205020404" pitchFamily="49" charset="0"/>
+              </a:rPr>
+              <a:t> </a:t>
+            </a:r>
+            <a:r>
+              <a:rPr lang="en-GB" altLang="en-US" sz="1400" dirty="0" smtClean="0">
+                <a:solidFill>
+                  <a:srgbClr val="00FF00"/>
+                </a:solidFill>
+                <a:latin typeface="Courier New" panose="02070309020205020404" pitchFamily="49" charset="0"/>
+                <a:cs typeface="Courier New" panose="02070309020205020404" pitchFamily="49" charset="0"/>
+              </a:rPr>
+              <a:t>     </a:t>
+            </a:r>
+            <a:r>
+              <a:rPr kumimoji="0" lang="en-GB" altLang="en-US" sz="1400" b="0" i="0" u="none" strike="noStrike" cap="none" normalizeH="0" baseline="0" dirty="0" smtClean="0">
+                <a:ln>
+                  <a:noFill/>
+                </a:ln>
+                <a:solidFill>
+                  <a:srgbClr val="98FB98"/>
+                </a:solidFill>
+                <a:effectLst/>
+                <a:latin typeface="Courier New" panose="02070309020205020404" pitchFamily="49" charset="0"/>
+                <a:cs typeface="Courier New" panose="02070309020205020404" pitchFamily="49" charset="0"/>
+              </a:rPr>
+              <a:t>String</a:t>
+            </a:r>
+            <a:r>
+              <a:rPr kumimoji="0" lang="en-GB" altLang="en-US" sz="1400" b="0" i="0" u="none" strike="noStrike" cap="none" normalizeH="0" baseline="0" dirty="0" smtClean="0">
+                <a:ln>
+                  <a:noFill/>
+                </a:ln>
+                <a:solidFill>
+                  <a:srgbClr val="FFFFFF"/>
+                </a:solidFill>
+                <a:effectLst/>
+                <a:latin typeface="Courier New" panose="02070309020205020404" pitchFamily="49" charset="0"/>
+                <a:cs typeface="Courier New" panose="02070309020205020404" pitchFamily="49" charset="0"/>
+              </a:rPr>
+              <a:t> </a:t>
+            </a:r>
+            <a:r>
+              <a:rPr kumimoji="0" lang="en-GB" altLang="en-US" sz="1400" b="0" i="0" u="none" strike="noStrike" cap="none" normalizeH="0" baseline="0" dirty="0" err="1" smtClean="0">
+                <a:ln>
+                  <a:noFill/>
+                </a:ln>
+                <a:solidFill>
+                  <a:srgbClr val="EEDD82"/>
+                </a:solidFill>
+                <a:effectLst/>
+                <a:latin typeface="Courier New" panose="02070309020205020404" pitchFamily="49" charset="0"/>
+                <a:cs typeface="Courier New" panose="02070309020205020404" pitchFamily="49" charset="0"/>
+              </a:rPr>
+              <a:t>explainQuery</a:t>
+            </a:r>
+            <a:r>
+              <a:rPr kumimoji="0" lang="en-GB" altLang="en-US" sz="1400" b="0" i="0" u="none" strike="noStrike" cap="none" normalizeH="0" baseline="0" dirty="0" smtClean="0">
+                <a:ln>
+                  <a:noFill/>
+                </a:ln>
+                <a:solidFill>
+                  <a:srgbClr val="FFFFFF"/>
+                </a:solidFill>
+                <a:effectLst/>
+                <a:latin typeface="Courier New" panose="02070309020205020404" pitchFamily="49" charset="0"/>
+                <a:cs typeface="Courier New" panose="02070309020205020404" pitchFamily="49" charset="0"/>
+              </a:rPr>
+              <a:t> = </a:t>
+            </a:r>
+            <a:r>
+              <a:rPr kumimoji="0" lang="en-GB" altLang="en-US" sz="1400" b="0" i="0" u="none" strike="noStrike" cap="none" normalizeH="0" baseline="0" dirty="0" smtClean="0">
+                <a:ln>
+                  <a:noFill/>
+                </a:ln>
+                <a:solidFill>
+                  <a:srgbClr val="FFA07A"/>
+                </a:solidFill>
+                <a:effectLst/>
+                <a:latin typeface="Courier New" panose="02070309020205020404" pitchFamily="49" charset="0"/>
+                <a:cs typeface="Courier New" panose="02070309020205020404" pitchFamily="49" charset="0"/>
+              </a:rPr>
+              <a:t>"explain plan for ${</a:t>
+            </a:r>
+            <a:r>
+              <a:rPr kumimoji="0" lang="en-GB" altLang="en-US" sz="1400" b="0" i="0" u="none" strike="noStrike" cap="none" normalizeH="0" baseline="0" dirty="0" err="1" smtClean="0">
+                <a:ln>
+                  <a:noFill/>
+                </a:ln>
+                <a:solidFill>
+                  <a:srgbClr val="FFA07A"/>
+                </a:solidFill>
+                <a:effectLst/>
+                <a:latin typeface="Courier New" panose="02070309020205020404" pitchFamily="49" charset="0"/>
+                <a:cs typeface="Courier New" panose="02070309020205020404" pitchFamily="49" charset="0"/>
+              </a:rPr>
+              <a:t>q.sql_query</a:t>
+            </a:r>
+            <a:r>
+              <a:rPr kumimoji="0" lang="en-GB" altLang="en-US" sz="1400" b="0" i="0" u="none" strike="noStrike" cap="none" normalizeH="0" baseline="0" dirty="0" smtClean="0">
+                <a:ln>
+                  <a:noFill/>
+                </a:ln>
+                <a:solidFill>
+                  <a:srgbClr val="FFA07A"/>
+                </a:solidFill>
+                <a:effectLst/>
+                <a:latin typeface="Courier New" panose="02070309020205020404" pitchFamily="49" charset="0"/>
+                <a:cs typeface="Courier New" panose="02070309020205020404" pitchFamily="49" charset="0"/>
+              </a:rPr>
+              <a:t>}"</a:t>
+            </a:r>
+            <a:r>
+              <a:rPr kumimoji="0" lang="en-GB" altLang="en-US" sz="1400" b="0" i="0" u="none" strike="noStrike" cap="none" normalizeH="0" baseline="0" dirty="0" smtClean="0">
+                <a:ln>
+                  <a:noFill/>
+                </a:ln>
+                <a:solidFill>
+                  <a:srgbClr val="FFFFFF"/>
+                </a:solidFill>
+                <a:effectLst/>
+                <a:latin typeface="Courier New" panose="02070309020205020404" pitchFamily="49" charset="0"/>
+                <a:cs typeface="Courier New" panose="02070309020205020404" pitchFamily="49" charset="0"/>
+              </a:rPr>
+              <a:t> </a:t>
+            </a:r>
+          </a:p>
+          <a:p>
+            <a:pPr marL="0" marR="0" lvl="0" indent="0" algn="l" defTabSz="914400" rtl="0" eaLnBrk="0" fontAlgn="base" latinLnBrk="0" hangingPunct="0">
+              <a:lnSpc>
+                <a:spcPct val="100000"/>
+              </a:lnSpc>
+              <a:spcBef>
+                <a:spcPct val="0"/>
+              </a:spcBef>
+              <a:spcAft>
+                <a:spcPct val="0"/>
+              </a:spcAft>
+              <a:buClrTx/>
+              <a:buSzTx/>
+              <a:buFontTx/>
+              <a:buNone/>
+              <a:tabLst/>
+            </a:pPr>
+            <a:r>
+              <a:rPr lang="en-GB" altLang="en-US" sz="1400" dirty="0">
+                <a:solidFill>
+                  <a:srgbClr val="FFFFFF"/>
+                </a:solidFill>
+                <a:latin typeface="Courier New" panose="02070309020205020404" pitchFamily="49" charset="0"/>
+                <a:cs typeface="Courier New" panose="02070309020205020404" pitchFamily="49" charset="0"/>
+              </a:rPr>
+              <a:t> </a:t>
+            </a:r>
+            <a:r>
+              <a:rPr lang="en-GB" altLang="en-US" sz="1400" dirty="0" smtClean="0">
+                <a:solidFill>
+                  <a:srgbClr val="FFFFFF"/>
+                </a:solidFill>
+                <a:latin typeface="Courier New" panose="02070309020205020404" pitchFamily="49" charset="0"/>
+                <a:cs typeface="Courier New" panose="02070309020205020404" pitchFamily="49" charset="0"/>
+              </a:rPr>
+              <a:t>     </a:t>
+            </a:r>
+            <a:r>
+              <a:rPr kumimoji="0" lang="en-GB" altLang="en-US" sz="1400" b="0" i="0" u="none" strike="noStrike" cap="none" normalizeH="0" baseline="0" dirty="0" err="1" smtClean="0">
+                <a:ln>
+                  <a:noFill/>
+                </a:ln>
+                <a:solidFill>
+                  <a:srgbClr val="FFFFFF"/>
+                </a:solidFill>
+                <a:effectLst/>
+                <a:latin typeface="Courier New" panose="02070309020205020404" pitchFamily="49" charset="0"/>
+                <a:cs typeface="Courier New" panose="02070309020205020404" pitchFamily="49" charset="0"/>
+              </a:rPr>
+              <a:t>sql.execute</a:t>
+            </a:r>
+            <a:r>
+              <a:rPr kumimoji="0" lang="en-GB" altLang="en-US" sz="1400" b="0" i="0" u="none" strike="noStrike" cap="none" normalizeH="0" baseline="0" dirty="0" smtClean="0">
+                <a:ln>
+                  <a:noFill/>
+                </a:ln>
+                <a:solidFill>
+                  <a:srgbClr val="FFFFFF"/>
+                </a:solidFill>
+                <a:effectLst/>
+                <a:latin typeface="Courier New" panose="02070309020205020404" pitchFamily="49" charset="0"/>
+                <a:cs typeface="Courier New" panose="02070309020205020404" pitchFamily="49" charset="0"/>
+              </a:rPr>
+              <a:t>(</a:t>
+            </a:r>
+            <a:r>
+              <a:rPr kumimoji="0" lang="en-GB" altLang="en-US" sz="1400" b="0" i="0" u="none" strike="noStrike" cap="none" normalizeH="0" baseline="0" dirty="0" err="1" smtClean="0">
+                <a:ln>
+                  <a:noFill/>
+                </a:ln>
+                <a:solidFill>
+                  <a:srgbClr val="FFFFFF"/>
+                </a:solidFill>
+                <a:effectLst/>
+                <a:latin typeface="Courier New" panose="02070309020205020404" pitchFamily="49" charset="0"/>
+                <a:cs typeface="Courier New" panose="02070309020205020404" pitchFamily="49" charset="0"/>
+              </a:rPr>
+              <a:t>explainQuery</a:t>
+            </a:r>
+            <a:r>
+              <a:rPr kumimoji="0" lang="en-GB" altLang="en-US" sz="1400" b="0" i="0" u="none" strike="noStrike" cap="none" normalizeH="0" baseline="0" dirty="0" smtClean="0">
+                <a:ln>
+                  <a:noFill/>
+                </a:ln>
+                <a:solidFill>
+                  <a:srgbClr val="FFFFFF"/>
+                </a:solidFill>
+                <a:effectLst/>
+                <a:latin typeface="Courier New" panose="02070309020205020404" pitchFamily="49" charset="0"/>
+                <a:cs typeface="Courier New" panose="02070309020205020404" pitchFamily="49" charset="0"/>
+              </a:rPr>
+              <a:t>); </a:t>
+            </a:r>
+          </a:p>
+          <a:p>
+            <a:pPr marL="0" marR="0" lvl="0" indent="0" algn="l" defTabSz="914400" rtl="0" eaLnBrk="0" fontAlgn="base" latinLnBrk="0" hangingPunct="0">
+              <a:lnSpc>
+                <a:spcPct val="100000"/>
+              </a:lnSpc>
+              <a:spcBef>
+                <a:spcPct val="0"/>
+              </a:spcBef>
+              <a:spcAft>
+                <a:spcPct val="0"/>
+              </a:spcAft>
+              <a:buClrTx/>
+              <a:buSzTx/>
+              <a:buFontTx/>
+              <a:buNone/>
+              <a:tabLst/>
+            </a:pPr>
+            <a:r>
+              <a:rPr lang="en-GB" altLang="en-US" sz="1400" dirty="0">
+                <a:solidFill>
+                  <a:srgbClr val="FFFFFF"/>
+                </a:solidFill>
+                <a:latin typeface="Courier New" panose="02070309020205020404" pitchFamily="49" charset="0"/>
+                <a:cs typeface="Courier New" panose="02070309020205020404" pitchFamily="49" charset="0"/>
+              </a:rPr>
+              <a:t> </a:t>
+            </a:r>
+            <a:r>
+              <a:rPr lang="en-GB" altLang="en-US" sz="1400" dirty="0" smtClean="0">
+                <a:solidFill>
+                  <a:srgbClr val="FFFFFF"/>
+                </a:solidFill>
+                <a:latin typeface="Courier New" panose="02070309020205020404" pitchFamily="49" charset="0"/>
+                <a:cs typeface="Courier New" panose="02070309020205020404" pitchFamily="49" charset="0"/>
+              </a:rPr>
+              <a:t>   </a:t>
+            </a:r>
+            <a:r>
+              <a:rPr kumimoji="0" lang="en-GB" altLang="en-US" sz="1400" b="0" i="0" u="none" strike="noStrike" cap="none" normalizeH="0" baseline="0" dirty="0" smtClean="0">
+                <a:ln>
+                  <a:noFill/>
+                </a:ln>
+                <a:solidFill>
+                  <a:srgbClr val="FFFFFF"/>
+                </a:solidFill>
+                <a:effectLst/>
+                <a:latin typeface="Courier New" panose="02070309020205020404" pitchFamily="49" charset="0"/>
+                <a:cs typeface="Courier New" panose="02070309020205020404" pitchFamily="49" charset="0"/>
+              </a:rPr>
+              <a:t>} </a:t>
+            </a:r>
+            <a:r>
+              <a:rPr kumimoji="0" lang="en-GB" altLang="en-US" sz="1400" b="0" i="0" u="none" strike="noStrike" cap="none" normalizeH="0" baseline="0" dirty="0" smtClean="0">
+                <a:ln>
+                  <a:noFill/>
+                </a:ln>
+                <a:solidFill>
+                  <a:srgbClr val="00FFFF"/>
+                </a:solidFill>
+                <a:effectLst/>
+                <a:latin typeface="Courier New" panose="02070309020205020404" pitchFamily="49" charset="0"/>
+                <a:cs typeface="Courier New" panose="02070309020205020404" pitchFamily="49" charset="0"/>
+              </a:rPr>
+              <a:t>catch</a:t>
+            </a:r>
+            <a:r>
+              <a:rPr kumimoji="0" lang="en-GB" altLang="en-US" sz="1400" b="0" i="0" u="none" strike="noStrike" cap="none" normalizeH="0" baseline="0" dirty="0" smtClean="0">
+                <a:ln>
+                  <a:noFill/>
+                </a:ln>
+                <a:solidFill>
+                  <a:srgbClr val="FFFFFF"/>
+                </a:solidFill>
+                <a:effectLst/>
+                <a:latin typeface="Courier New" panose="02070309020205020404" pitchFamily="49" charset="0"/>
+                <a:cs typeface="Courier New" panose="02070309020205020404" pitchFamily="49" charset="0"/>
+              </a:rPr>
+              <a:t> (</a:t>
+            </a:r>
+            <a:r>
+              <a:rPr kumimoji="0" lang="en-GB" altLang="en-US" sz="1400" b="0" i="0" u="none" strike="noStrike" cap="none" normalizeH="0" baseline="0" dirty="0" err="1" smtClean="0">
+                <a:ln>
+                  <a:noFill/>
+                </a:ln>
+                <a:solidFill>
+                  <a:srgbClr val="7FFFD4"/>
+                </a:solidFill>
+                <a:effectLst/>
+                <a:latin typeface="Courier New" panose="02070309020205020404" pitchFamily="49" charset="0"/>
+                <a:cs typeface="Courier New" panose="02070309020205020404" pitchFamily="49" charset="0"/>
+              </a:rPr>
+              <a:t>java</a:t>
+            </a:r>
+            <a:r>
+              <a:rPr kumimoji="0" lang="en-GB" altLang="en-US" sz="1400" b="0" i="0" u="none" strike="noStrike" cap="none" normalizeH="0" baseline="0" dirty="0" err="1" smtClean="0">
+                <a:ln>
+                  <a:noFill/>
+                </a:ln>
+                <a:solidFill>
+                  <a:srgbClr val="FFFFFF"/>
+                </a:solidFill>
+                <a:effectLst/>
+                <a:latin typeface="Courier New" panose="02070309020205020404" pitchFamily="49" charset="0"/>
+                <a:cs typeface="Courier New" panose="02070309020205020404" pitchFamily="49" charset="0"/>
+              </a:rPr>
+              <a:t>.</a:t>
+            </a:r>
+            <a:r>
+              <a:rPr kumimoji="0" lang="en-GB" altLang="en-US" sz="1400" b="0" i="0" u="none" strike="noStrike" cap="none" normalizeH="0" baseline="0" dirty="0" err="1" smtClean="0">
+                <a:ln>
+                  <a:noFill/>
+                </a:ln>
+                <a:solidFill>
+                  <a:srgbClr val="7FFFD4"/>
+                </a:solidFill>
+                <a:effectLst/>
+                <a:latin typeface="Courier New" panose="02070309020205020404" pitchFamily="49" charset="0"/>
+                <a:cs typeface="Courier New" panose="02070309020205020404" pitchFamily="49" charset="0"/>
+              </a:rPr>
+              <a:t>sql</a:t>
+            </a:r>
+            <a:r>
+              <a:rPr kumimoji="0" lang="en-GB" altLang="en-US" sz="1400" b="0" i="0" u="none" strike="noStrike" cap="none" normalizeH="0" baseline="0" dirty="0" err="1" smtClean="0">
+                <a:ln>
+                  <a:noFill/>
+                </a:ln>
+                <a:solidFill>
+                  <a:srgbClr val="FFFFFF"/>
+                </a:solidFill>
+                <a:effectLst/>
+                <a:latin typeface="Courier New" panose="02070309020205020404" pitchFamily="49" charset="0"/>
+                <a:cs typeface="Courier New" panose="02070309020205020404" pitchFamily="49" charset="0"/>
+              </a:rPr>
+              <a:t>.</a:t>
+            </a:r>
+            <a:r>
+              <a:rPr kumimoji="0" lang="en-GB" altLang="en-US" sz="1400" b="0" i="0" u="none" strike="noStrike" cap="none" normalizeH="0" baseline="0" dirty="0" err="1" smtClean="0">
+                <a:ln>
+                  <a:noFill/>
+                </a:ln>
+                <a:solidFill>
+                  <a:srgbClr val="98FB98"/>
+                </a:solidFill>
+                <a:effectLst/>
+                <a:latin typeface="Courier New" panose="02070309020205020404" pitchFamily="49" charset="0"/>
+                <a:cs typeface="Courier New" panose="02070309020205020404" pitchFamily="49" charset="0"/>
+              </a:rPr>
+              <a:t>SQLException</a:t>
+            </a:r>
+            <a:r>
+              <a:rPr kumimoji="0" lang="en-GB" altLang="en-US" sz="1400" b="0" i="0" u="none" strike="noStrike" cap="none" normalizeH="0" baseline="0" dirty="0" smtClean="0">
+                <a:ln>
+                  <a:noFill/>
+                </a:ln>
+                <a:solidFill>
+                  <a:srgbClr val="FFFFFF"/>
+                </a:solidFill>
+                <a:effectLst/>
+                <a:latin typeface="Courier New" panose="02070309020205020404" pitchFamily="49" charset="0"/>
+                <a:cs typeface="Courier New" panose="02070309020205020404" pitchFamily="49" charset="0"/>
+              </a:rPr>
+              <a:t> </a:t>
+            </a:r>
+            <a:r>
+              <a:rPr kumimoji="0" lang="en-GB" altLang="en-US" sz="1400" b="0" i="0" u="none" strike="noStrike" cap="none" normalizeH="0" baseline="0" dirty="0" smtClean="0">
+                <a:ln>
+                  <a:noFill/>
+                </a:ln>
+                <a:solidFill>
+                  <a:srgbClr val="EEDD82"/>
+                </a:solidFill>
+                <a:effectLst/>
+                <a:latin typeface="Courier New" panose="02070309020205020404" pitchFamily="49" charset="0"/>
+                <a:cs typeface="Courier New" panose="02070309020205020404" pitchFamily="49" charset="0"/>
+              </a:rPr>
+              <a:t>e</a:t>
+            </a:r>
+            <a:r>
+              <a:rPr kumimoji="0" lang="en-GB" altLang="en-US" sz="1400" b="0" i="0" u="none" strike="noStrike" cap="none" normalizeH="0" baseline="0" dirty="0" smtClean="0">
+                <a:ln>
+                  <a:noFill/>
+                </a:ln>
+                <a:solidFill>
+                  <a:srgbClr val="FFFFFF"/>
+                </a:solidFill>
+                <a:effectLst/>
+                <a:latin typeface="Courier New" panose="02070309020205020404" pitchFamily="49" charset="0"/>
+                <a:cs typeface="Courier New" panose="02070309020205020404" pitchFamily="49" charset="0"/>
+              </a:rPr>
+              <a:t>) { </a:t>
+            </a:r>
+          </a:p>
+          <a:p>
+            <a:pPr marL="0" marR="0" lvl="0" indent="0" algn="l" defTabSz="914400" rtl="0" eaLnBrk="0" fontAlgn="base" latinLnBrk="0" hangingPunct="0">
+              <a:lnSpc>
+                <a:spcPct val="100000"/>
+              </a:lnSpc>
+              <a:spcBef>
+                <a:spcPct val="0"/>
+              </a:spcBef>
+              <a:spcAft>
+                <a:spcPct val="0"/>
+              </a:spcAft>
+              <a:buClrTx/>
+              <a:buSzTx/>
+              <a:buFontTx/>
+              <a:buNone/>
+              <a:tabLst/>
+            </a:pPr>
+            <a:r>
+              <a:rPr lang="en-GB" altLang="en-US" sz="1400" dirty="0">
+                <a:solidFill>
+                  <a:srgbClr val="FFFFFF"/>
+                </a:solidFill>
+                <a:latin typeface="Courier New" panose="02070309020205020404" pitchFamily="49" charset="0"/>
+                <a:cs typeface="Courier New" panose="02070309020205020404" pitchFamily="49" charset="0"/>
+              </a:rPr>
+              <a:t> </a:t>
+            </a:r>
+            <a:r>
+              <a:rPr lang="en-GB" altLang="en-US" sz="1400" dirty="0" smtClean="0">
+                <a:solidFill>
+                  <a:srgbClr val="FFFFFF"/>
+                </a:solidFill>
+                <a:latin typeface="Courier New" panose="02070309020205020404" pitchFamily="49" charset="0"/>
+                <a:cs typeface="Courier New" panose="02070309020205020404" pitchFamily="49" charset="0"/>
+              </a:rPr>
+              <a:t>     </a:t>
+            </a:r>
+            <a:r>
+              <a:rPr kumimoji="0" lang="en-GB" altLang="en-US" sz="1400" b="0" i="0" u="none" strike="noStrike" cap="none" normalizeH="0" baseline="0" dirty="0" err="1" smtClean="0">
+                <a:ln>
+                  <a:noFill/>
+                </a:ln>
+                <a:solidFill>
+                  <a:srgbClr val="FFFFFF"/>
+                </a:solidFill>
+                <a:effectLst/>
+                <a:latin typeface="Courier New" panose="02070309020205020404" pitchFamily="49" charset="0"/>
+                <a:cs typeface="Courier New" panose="02070309020205020404" pitchFamily="49" charset="0"/>
+              </a:rPr>
+              <a:t>query_row.error</a:t>
+            </a:r>
+            <a:r>
+              <a:rPr kumimoji="0" lang="en-GB" altLang="en-US" sz="1400" b="0" i="0" u="none" strike="noStrike" cap="none" normalizeH="0" baseline="0" dirty="0" smtClean="0">
+                <a:ln>
+                  <a:noFill/>
+                </a:ln>
+                <a:solidFill>
+                  <a:srgbClr val="FFFFFF"/>
+                </a:solidFill>
+                <a:effectLst/>
+                <a:latin typeface="Courier New" panose="02070309020205020404" pitchFamily="49" charset="0"/>
+                <a:cs typeface="Courier New" panose="02070309020205020404" pitchFamily="49" charset="0"/>
+              </a:rPr>
+              <a:t> = </a:t>
+            </a:r>
+            <a:r>
+              <a:rPr kumimoji="0" lang="en-GB" altLang="en-US" sz="1400" b="0" i="0" u="none" strike="noStrike" cap="none" normalizeH="0" baseline="0" dirty="0" err="1" smtClean="0">
+                <a:ln>
+                  <a:noFill/>
+                </a:ln>
+                <a:solidFill>
+                  <a:srgbClr val="FFFFFF"/>
+                </a:solidFill>
+                <a:effectLst/>
+                <a:latin typeface="Courier New" panose="02070309020205020404" pitchFamily="49" charset="0"/>
+                <a:cs typeface="Courier New" panose="02070309020205020404" pitchFamily="49" charset="0"/>
+              </a:rPr>
+              <a:t>e.getMessage</a:t>
+            </a:r>
+            <a:r>
+              <a:rPr kumimoji="0" lang="en-GB" altLang="en-US" sz="1400" b="0" i="0" u="none" strike="noStrike" cap="none" normalizeH="0" baseline="0" dirty="0" smtClean="0">
+                <a:ln>
+                  <a:noFill/>
+                </a:ln>
+                <a:solidFill>
+                  <a:srgbClr val="FFFFFF"/>
+                </a:solidFill>
+                <a:effectLst/>
+                <a:latin typeface="Courier New" panose="02070309020205020404" pitchFamily="49" charset="0"/>
+                <a:cs typeface="Courier New" panose="02070309020205020404" pitchFamily="49" charset="0"/>
+              </a:rPr>
+              <a:t>(); </a:t>
+            </a:r>
+          </a:p>
+          <a:p>
+            <a:pPr marL="0" marR="0" lvl="0" indent="0" algn="l" defTabSz="914400" rtl="0" eaLnBrk="0" fontAlgn="base" latinLnBrk="0" hangingPunct="0">
+              <a:lnSpc>
+                <a:spcPct val="100000"/>
+              </a:lnSpc>
+              <a:spcBef>
+                <a:spcPct val="0"/>
+              </a:spcBef>
+              <a:spcAft>
+                <a:spcPct val="0"/>
+              </a:spcAft>
+              <a:buClrTx/>
+              <a:buSzTx/>
+              <a:buFontTx/>
+              <a:buNone/>
+              <a:tabLst/>
+            </a:pPr>
+            <a:r>
+              <a:rPr lang="en-GB" altLang="en-US" sz="1400" dirty="0">
+                <a:solidFill>
+                  <a:srgbClr val="FFFFFF"/>
+                </a:solidFill>
+                <a:latin typeface="Courier New" panose="02070309020205020404" pitchFamily="49" charset="0"/>
+                <a:cs typeface="Courier New" panose="02070309020205020404" pitchFamily="49" charset="0"/>
+              </a:rPr>
+              <a:t> </a:t>
+            </a:r>
+            <a:r>
+              <a:rPr lang="en-GB" altLang="en-US" sz="1400" dirty="0" smtClean="0">
+                <a:solidFill>
+                  <a:srgbClr val="FFFFFF"/>
+                </a:solidFill>
+                <a:latin typeface="Courier New" panose="02070309020205020404" pitchFamily="49" charset="0"/>
+                <a:cs typeface="Courier New" panose="02070309020205020404" pitchFamily="49" charset="0"/>
+              </a:rPr>
+              <a:t>   </a:t>
+            </a:r>
+            <a:r>
+              <a:rPr kumimoji="0" lang="en-GB" altLang="en-US" sz="1400" b="0" i="0" u="none" strike="noStrike" cap="none" normalizeH="0" baseline="0" dirty="0" smtClean="0">
+                <a:ln>
+                  <a:noFill/>
+                </a:ln>
+                <a:solidFill>
+                  <a:srgbClr val="FFFFFF"/>
+                </a:solidFill>
+                <a:effectLst/>
+                <a:latin typeface="Courier New" panose="02070309020205020404" pitchFamily="49" charset="0"/>
+                <a:cs typeface="Courier New" panose="02070309020205020404" pitchFamily="49" charset="0"/>
+              </a:rPr>
+              <a:t>} </a:t>
+            </a:r>
+          </a:p>
+          <a:p>
+            <a:pPr marL="0" marR="0" lvl="0" indent="0" algn="l" defTabSz="914400" rtl="0" eaLnBrk="0" fontAlgn="base" latinLnBrk="0" hangingPunct="0">
+              <a:lnSpc>
+                <a:spcPct val="100000"/>
+              </a:lnSpc>
+              <a:spcBef>
+                <a:spcPct val="0"/>
+              </a:spcBef>
+              <a:spcAft>
+                <a:spcPct val="0"/>
+              </a:spcAft>
+              <a:buClrTx/>
+              <a:buSzTx/>
+              <a:buFontTx/>
+              <a:buNone/>
+              <a:tabLst/>
+            </a:pPr>
+            <a:r>
+              <a:rPr lang="en-GB" altLang="en-US" sz="1400" dirty="0">
+                <a:solidFill>
+                  <a:srgbClr val="FFFFFF"/>
+                </a:solidFill>
+                <a:latin typeface="Courier New" panose="02070309020205020404" pitchFamily="49" charset="0"/>
+                <a:cs typeface="Courier New" panose="02070309020205020404" pitchFamily="49" charset="0"/>
+              </a:rPr>
+              <a:t> </a:t>
+            </a:r>
+            <a:r>
+              <a:rPr lang="en-GB" altLang="en-US" sz="1400" dirty="0" smtClean="0">
+                <a:solidFill>
+                  <a:srgbClr val="FFFFFF"/>
+                </a:solidFill>
+                <a:latin typeface="Courier New" panose="02070309020205020404" pitchFamily="49" charset="0"/>
+                <a:cs typeface="Courier New" panose="02070309020205020404" pitchFamily="49" charset="0"/>
+              </a:rPr>
+              <a:t>   </a:t>
+            </a:r>
+            <a:r>
+              <a:rPr kumimoji="0" lang="en-GB" altLang="en-US" sz="1400" b="0" i="0" u="none" strike="noStrike" cap="none" normalizeH="0" baseline="0" dirty="0" smtClean="0">
+                <a:ln>
+                  <a:noFill/>
+                </a:ln>
+                <a:solidFill>
+                  <a:srgbClr val="00FFFF"/>
+                </a:solidFill>
+                <a:effectLst/>
+                <a:latin typeface="Courier New" panose="02070309020205020404" pitchFamily="49" charset="0"/>
+                <a:cs typeface="Courier New" panose="02070309020205020404" pitchFamily="49" charset="0"/>
+              </a:rPr>
+              <a:t>if</a:t>
+            </a:r>
+            <a:r>
+              <a:rPr kumimoji="0" lang="en-GB" altLang="en-US" sz="1400" b="0" i="0" u="none" strike="noStrike" cap="none" normalizeH="0" baseline="0" dirty="0" smtClean="0">
+                <a:ln>
+                  <a:noFill/>
+                </a:ln>
+                <a:solidFill>
+                  <a:srgbClr val="FFFFFF"/>
+                </a:solidFill>
+                <a:effectLst/>
+                <a:latin typeface="Courier New" panose="02070309020205020404" pitchFamily="49" charset="0"/>
+                <a:cs typeface="Courier New" panose="02070309020205020404" pitchFamily="49" charset="0"/>
+              </a:rPr>
+              <a:t> (</a:t>
+            </a:r>
+            <a:r>
+              <a:rPr kumimoji="0" lang="en-GB" altLang="en-US" sz="1400" b="0" i="0" u="none" strike="noStrike" cap="none" normalizeH="0" baseline="0" dirty="0" err="1" smtClean="0">
+                <a:ln>
+                  <a:noFill/>
+                </a:ln>
+                <a:solidFill>
+                  <a:srgbClr val="FFFFFF"/>
+                </a:solidFill>
+                <a:effectLst/>
+                <a:latin typeface="Courier New" panose="02070309020205020404" pitchFamily="49" charset="0"/>
+                <a:cs typeface="Courier New" panose="02070309020205020404" pitchFamily="49" charset="0"/>
+              </a:rPr>
+              <a:t>query_row.error?.size</a:t>
+            </a:r>
+            <a:r>
+              <a:rPr kumimoji="0" lang="en-GB" altLang="en-US" sz="1400" b="0" i="0" u="none" strike="noStrike" cap="none" normalizeH="0" baseline="0" dirty="0" smtClean="0">
+                <a:ln>
+                  <a:noFill/>
+                </a:ln>
+                <a:solidFill>
+                  <a:srgbClr val="FFFFFF"/>
+                </a:solidFill>
+                <a:effectLst/>
+                <a:latin typeface="Courier New" panose="02070309020205020404" pitchFamily="49" charset="0"/>
+                <a:cs typeface="Courier New" panose="02070309020205020404" pitchFamily="49" charset="0"/>
+              </a:rPr>
+              <a:t>()) { </a:t>
+            </a:r>
+          </a:p>
+          <a:p>
+            <a:pPr marL="0" marR="0" lvl="0" indent="0" algn="l" defTabSz="914400" rtl="0" eaLnBrk="0" fontAlgn="base" latinLnBrk="0" hangingPunct="0">
+              <a:lnSpc>
+                <a:spcPct val="100000"/>
+              </a:lnSpc>
+              <a:spcBef>
+                <a:spcPct val="0"/>
+              </a:spcBef>
+              <a:spcAft>
+                <a:spcPct val="0"/>
+              </a:spcAft>
+              <a:buClrTx/>
+              <a:buSzTx/>
+              <a:buFontTx/>
+              <a:buNone/>
+              <a:tabLst/>
+            </a:pPr>
+            <a:r>
+              <a:rPr lang="en-GB" altLang="en-US" sz="1400" dirty="0">
+                <a:solidFill>
+                  <a:srgbClr val="FFFFFF"/>
+                </a:solidFill>
+                <a:latin typeface="Courier New" panose="02070309020205020404" pitchFamily="49" charset="0"/>
+                <a:cs typeface="Courier New" panose="02070309020205020404" pitchFamily="49" charset="0"/>
+              </a:rPr>
+              <a:t> </a:t>
+            </a:r>
+            <a:r>
+              <a:rPr lang="en-GB" altLang="en-US" sz="1400" dirty="0" smtClean="0">
+                <a:solidFill>
+                  <a:srgbClr val="FFFFFF"/>
+                </a:solidFill>
+                <a:latin typeface="Courier New" panose="02070309020205020404" pitchFamily="49" charset="0"/>
+                <a:cs typeface="Courier New" panose="02070309020205020404" pitchFamily="49" charset="0"/>
+              </a:rPr>
+              <a:t>     </a:t>
+            </a:r>
+            <a:r>
+              <a:rPr kumimoji="0" lang="en-GB" altLang="en-US" sz="1400" b="0" i="0" u="none" strike="noStrike" cap="none" normalizeH="0" baseline="0" dirty="0" smtClean="0">
+                <a:ln>
+                  <a:noFill/>
+                </a:ln>
+                <a:solidFill>
+                  <a:srgbClr val="00FF00"/>
+                </a:solidFill>
+                <a:effectLst/>
+                <a:latin typeface="Courier New" panose="02070309020205020404" pitchFamily="49" charset="0"/>
+                <a:cs typeface="Courier New" panose="02070309020205020404" pitchFamily="49" charset="0"/>
+              </a:rPr>
+              <a:t>// "row" is a predefined method that add a row</a:t>
+            </a:r>
+            <a:r>
+              <a:rPr kumimoji="0" lang="en-GB" altLang="en-US" sz="1400" b="0" i="0" u="none" strike="noStrike" cap="none" normalizeH="0" baseline="0" dirty="0" smtClean="0">
+                <a:ln>
+                  <a:noFill/>
+                </a:ln>
+                <a:solidFill>
+                  <a:srgbClr val="FFFFFF"/>
+                </a:solidFill>
+                <a:effectLst/>
+                <a:latin typeface="Courier New" panose="02070309020205020404" pitchFamily="49" charset="0"/>
+                <a:cs typeface="Courier New" panose="02070309020205020404" pitchFamily="49" charset="0"/>
+              </a:rPr>
+              <a:t> </a:t>
+            </a:r>
+          </a:p>
+          <a:p>
+            <a:pPr marL="0" marR="0" lvl="0" indent="0" algn="l" defTabSz="914400" rtl="0" eaLnBrk="0" fontAlgn="base" latinLnBrk="0" hangingPunct="0">
+              <a:lnSpc>
+                <a:spcPct val="100000"/>
+              </a:lnSpc>
+              <a:spcBef>
+                <a:spcPct val="0"/>
+              </a:spcBef>
+              <a:spcAft>
+                <a:spcPct val="0"/>
+              </a:spcAft>
+              <a:buClrTx/>
+              <a:buSzTx/>
+              <a:buFontTx/>
+              <a:buNone/>
+              <a:tabLst/>
+            </a:pPr>
+            <a:r>
+              <a:rPr lang="en-GB" altLang="en-US" sz="1400" dirty="0">
+                <a:solidFill>
+                  <a:srgbClr val="FFFFFF"/>
+                </a:solidFill>
+                <a:latin typeface="Courier New" panose="02070309020205020404" pitchFamily="49" charset="0"/>
+                <a:cs typeface="Courier New" panose="02070309020205020404" pitchFamily="49" charset="0"/>
+              </a:rPr>
+              <a:t> </a:t>
+            </a:r>
+            <a:r>
+              <a:rPr lang="en-GB" altLang="en-US" sz="1400" dirty="0" smtClean="0">
+                <a:solidFill>
+                  <a:srgbClr val="FFFFFF"/>
+                </a:solidFill>
+                <a:latin typeface="Courier New" panose="02070309020205020404" pitchFamily="49" charset="0"/>
+                <a:cs typeface="Courier New" panose="02070309020205020404" pitchFamily="49" charset="0"/>
+              </a:rPr>
+              <a:t>     </a:t>
+            </a:r>
+            <a:r>
+              <a:rPr kumimoji="0" lang="en-GB" altLang="en-US" sz="1400" b="0" i="0" u="none" strike="noStrike" cap="none" normalizeH="0" baseline="0" dirty="0" smtClean="0">
+                <a:ln>
+                  <a:noFill/>
+                </a:ln>
+                <a:solidFill>
+                  <a:srgbClr val="00FF00"/>
+                </a:solidFill>
+                <a:effectLst/>
+                <a:latin typeface="Courier New" panose="02070309020205020404" pitchFamily="49" charset="0"/>
+                <a:cs typeface="Courier New" panose="02070309020205020404" pitchFamily="49" charset="0"/>
+              </a:rPr>
+              <a:t>// to the result set.</a:t>
+            </a:r>
+            <a:r>
+              <a:rPr kumimoji="0" lang="en-GB" altLang="en-US" sz="1400" b="0" i="0" u="none" strike="noStrike" cap="none" normalizeH="0" baseline="0" dirty="0" smtClean="0">
+                <a:ln>
+                  <a:noFill/>
+                </a:ln>
+                <a:solidFill>
+                  <a:srgbClr val="FFFFFF"/>
+                </a:solidFill>
+                <a:effectLst/>
+                <a:latin typeface="Courier New" panose="02070309020205020404" pitchFamily="49" charset="0"/>
+                <a:cs typeface="Courier New" panose="02070309020205020404" pitchFamily="49" charset="0"/>
+              </a:rPr>
+              <a:t> </a:t>
+            </a:r>
+          </a:p>
+          <a:p>
+            <a:pPr marL="0" marR="0" lvl="0" indent="0" algn="l" defTabSz="914400" rtl="0" eaLnBrk="0" fontAlgn="base" latinLnBrk="0" hangingPunct="0">
+              <a:lnSpc>
+                <a:spcPct val="100000"/>
+              </a:lnSpc>
+              <a:spcBef>
+                <a:spcPct val="0"/>
+              </a:spcBef>
+              <a:spcAft>
+                <a:spcPct val="0"/>
+              </a:spcAft>
+              <a:buClrTx/>
+              <a:buSzTx/>
+              <a:buFontTx/>
+              <a:buNone/>
+              <a:tabLst/>
+            </a:pPr>
+            <a:r>
+              <a:rPr lang="en-GB" altLang="en-US" sz="1400" dirty="0">
+                <a:solidFill>
+                  <a:srgbClr val="FFFFFF"/>
+                </a:solidFill>
+                <a:latin typeface="Courier New" panose="02070309020205020404" pitchFamily="49" charset="0"/>
+                <a:cs typeface="Courier New" panose="02070309020205020404" pitchFamily="49" charset="0"/>
+              </a:rPr>
+              <a:t> </a:t>
+            </a:r>
+            <a:r>
+              <a:rPr lang="en-GB" altLang="en-US" sz="1400" dirty="0" smtClean="0">
+                <a:solidFill>
+                  <a:srgbClr val="FFFFFF"/>
+                </a:solidFill>
+                <a:latin typeface="Courier New" panose="02070309020205020404" pitchFamily="49" charset="0"/>
+                <a:cs typeface="Courier New" panose="02070309020205020404" pitchFamily="49" charset="0"/>
+              </a:rPr>
+              <a:t>     </a:t>
+            </a:r>
+            <a:r>
+              <a:rPr kumimoji="0" lang="en-GB" altLang="en-US" sz="1400" b="0" i="0" u="none" strike="noStrike" cap="none" normalizeH="0" baseline="0" dirty="0" smtClean="0">
+                <a:ln>
+                  <a:noFill/>
+                </a:ln>
+                <a:solidFill>
+                  <a:srgbClr val="FFFFFF"/>
+                </a:solidFill>
+                <a:effectLst/>
+                <a:latin typeface="Courier New" panose="02070309020205020404" pitchFamily="49" charset="0"/>
+                <a:cs typeface="Courier New" panose="02070309020205020404" pitchFamily="49" charset="0"/>
+              </a:rPr>
+              <a:t>row(</a:t>
+            </a:r>
+            <a:r>
+              <a:rPr kumimoji="0" lang="en-GB" altLang="en-US" sz="1400" b="0" i="0" u="none" strike="noStrike" cap="none" normalizeH="0" baseline="0" dirty="0" err="1" smtClean="0">
+                <a:ln>
+                  <a:noFill/>
+                </a:ln>
+                <a:solidFill>
+                  <a:srgbClr val="FFFFFF"/>
+                </a:solidFill>
+                <a:effectLst/>
+                <a:latin typeface="Courier New" panose="02070309020205020404" pitchFamily="49" charset="0"/>
+                <a:cs typeface="Courier New" panose="02070309020205020404" pitchFamily="49" charset="0"/>
+              </a:rPr>
+              <a:t>query_row</a:t>
+            </a:r>
+            <a:r>
+              <a:rPr kumimoji="0" lang="en-GB" altLang="en-US" sz="1400" b="0" i="0" u="none" strike="noStrike" cap="none" normalizeH="0" baseline="0" dirty="0" smtClean="0">
+                <a:ln>
+                  <a:noFill/>
+                </a:ln>
+                <a:solidFill>
+                  <a:srgbClr val="FFFFFF"/>
+                </a:solidFill>
+                <a:effectLst/>
+                <a:latin typeface="Courier New" panose="02070309020205020404" pitchFamily="49" charset="0"/>
+                <a:cs typeface="Courier New" panose="02070309020205020404" pitchFamily="49" charset="0"/>
+              </a:rPr>
+              <a:t>); </a:t>
+            </a:r>
+          </a:p>
+          <a:p>
+            <a:pPr marL="0" marR="0" lvl="0" indent="0" algn="l" defTabSz="914400" rtl="0" eaLnBrk="0" fontAlgn="base" latinLnBrk="0" hangingPunct="0">
+              <a:lnSpc>
+                <a:spcPct val="100000"/>
+              </a:lnSpc>
+              <a:spcBef>
+                <a:spcPct val="0"/>
+              </a:spcBef>
+              <a:spcAft>
+                <a:spcPct val="0"/>
+              </a:spcAft>
+              <a:buClrTx/>
+              <a:buSzTx/>
+              <a:buFontTx/>
+              <a:buNone/>
+              <a:tabLst/>
+            </a:pPr>
+            <a:r>
+              <a:rPr lang="en-GB" altLang="en-US" sz="1400" dirty="0">
+                <a:solidFill>
+                  <a:srgbClr val="FFFFFF"/>
+                </a:solidFill>
+                <a:latin typeface="Courier New" panose="02070309020205020404" pitchFamily="49" charset="0"/>
+                <a:cs typeface="Courier New" panose="02070309020205020404" pitchFamily="49" charset="0"/>
+              </a:rPr>
+              <a:t> </a:t>
+            </a:r>
+            <a:r>
+              <a:rPr lang="en-GB" altLang="en-US" sz="1400" dirty="0" smtClean="0">
+                <a:solidFill>
+                  <a:srgbClr val="FFFFFF"/>
+                </a:solidFill>
+                <a:latin typeface="Courier New" panose="02070309020205020404" pitchFamily="49" charset="0"/>
+                <a:cs typeface="Courier New" panose="02070309020205020404" pitchFamily="49" charset="0"/>
+              </a:rPr>
+              <a:t>   </a:t>
+            </a:r>
+            <a:r>
+              <a:rPr kumimoji="0" lang="en-GB" altLang="en-US" sz="1400" b="0" i="0" u="none" strike="noStrike" cap="none" normalizeH="0" baseline="0" dirty="0" smtClean="0">
+                <a:ln>
+                  <a:noFill/>
+                </a:ln>
+                <a:solidFill>
+                  <a:srgbClr val="FFFFFF"/>
+                </a:solidFill>
+                <a:effectLst/>
+                <a:latin typeface="Courier New" panose="02070309020205020404" pitchFamily="49" charset="0"/>
+                <a:cs typeface="Courier New" panose="02070309020205020404" pitchFamily="49" charset="0"/>
+              </a:rPr>
+              <a:t>} </a:t>
+            </a:r>
+          </a:p>
+          <a:p>
+            <a:pPr marL="0" marR="0" lvl="0" indent="0" algn="l" defTabSz="914400" rtl="0" eaLnBrk="0" fontAlgn="base" latinLnBrk="0" hangingPunct="0">
+              <a:lnSpc>
+                <a:spcPct val="100000"/>
+              </a:lnSpc>
+              <a:spcBef>
+                <a:spcPct val="0"/>
+              </a:spcBef>
+              <a:spcAft>
+                <a:spcPct val="0"/>
+              </a:spcAft>
+              <a:buClrTx/>
+              <a:buSzTx/>
+              <a:buFontTx/>
+              <a:buNone/>
+              <a:tabLst/>
+            </a:pPr>
+            <a:r>
+              <a:rPr kumimoji="0" lang="en-GB" altLang="en-US" sz="1400" b="0" i="0" u="none" strike="noStrike" cap="none" normalizeH="0" baseline="0" dirty="0" smtClean="0">
+                <a:ln>
+                  <a:noFill/>
+                </a:ln>
+                <a:solidFill>
+                  <a:srgbClr val="FFFFFF"/>
+                </a:solidFill>
+                <a:effectLst/>
+                <a:latin typeface="Courier New" panose="02070309020205020404" pitchFamily="49" charset="0"/>
+                <a:cs typeface="Courier New" panose="02070309020205020404" pitchFamily="49" charset="0"/>
+              </a:rPr>
+              <a:t>} </a:t>
+            </a:r>
           </a:p>
         </p:txBody>
       </p:sp>
@@ -27285,7 +28798,7 @@
       </p:grpSpPr>
       <p:sp>
         <p:nvSpPr>
-          <p:cNvPr id="166" name="CustomShape 1"/>
+          <p:cNvPr id="172" name="CustomShape 1"/>
           <p:cNvSpPr/>
           <p:nvPr/>
         </p:nvSpPr>
@@ -27324,7 +28837,7 @@
               </a:lnSpc>
             </a:pPr>
             <a:r>
-              <a:rPr lang="en-US" sz="4800" b="0" strike="noStrike" spc="-46">
+              <a:rPr lang="en-US" sz="4800" b="0" strike="noStrike" spc="-46" dirty="0" smtClean="0">
                 <a:solidFill>
                   <a:srgbClr val="31489F"/>
                 </a:solidFill>
@@ -27335,9 +28848,9 @@
                 </a:uFill>
                 <a:latin typeface="Calibri Light"/>
               </a:rPr>
-              <a:t>Slide Heading Here</a:t>
-            </a:r>
-            <a:endParaRPr lang="en-US" sz="1800" b="0" strike="noStrike" spc="-1">
+              <a:t>Closure Query Example</a:t>
+            </a:r>
+            <a:endParaRPr lang="en-US" sz="1800" b="0" strike="noStrike" spc="-1" dirty="0">
               <a:solidFill>
                 <a:srgbClr val="000000"/>
               </a:solidFill>
@@ -27353,7 +28866,7 @@
       </p:sp>
       <p:sp>
         <p:nvSpPr>
-          <p:cNvPr id="167" name="CustomShape 2"/>
+          <p:cNvPr id="173" name="CustomShape 2"/>
           <p:cNvSpPr/>
           <p:nvPr/>
         </p:nvSpPr>
@@ -27397,7 +28910,7 @@
               <a:buChar char=""/>
             </a:pPr>
             <a:r>
-              <a:rPr lang="en-US" sz="2000" b="0" strike="noStrike" spc="-1">
+              <a:rPr lang="en-US" sz="2000" spc="-1" dirty="0" smtClean="0">
                 <a:solidFill>
                   <a:srgbClr val="404040"/>
                 </a:solidFill>
@@ -27408,9 +28921,9 @@
                 </a:uFill>
                 <a:latin typeface="Calibri"/>
               </a:rPr>
-              <a:t>Presentation Text</a:t>
-            </a:r>
-            <a:endParaRPr lang="en-US" sz="1800" b="0" strike="noStrike" spc="-1">
+              <a:t>When we run the report, we get a list of invalid SQL queries.</a:t>
+            </a:r>
+            <a:endParaRPr lang="en-US" sz="1800" b="0" strike="noStrike" spc="-1" dirty="0">
               <a:solidFill>
                 <a:srgbClr val="000000"/>
               </a:solidFill>
@@ -27423,32 +28936,12 @@
             </a:endParaRPr>
           </a:p>
           <a:p>
-            <a:pPr marL="377280" lvl="3" indent="-198360">
-              <a:lnSpc>
-                <a:spcPct val="100000"/>
-              </a:lnSpc>
-              <a:buClr>
-                <a:srgbClr val="4E67C8"/>
-              </a:buClr>
-              <a:buSzPct val="80000"/>
-              <a:buFont typeface="Wingdings 2" charset="2"/>
-              <a:buChar char=""/>
-            </a:pPr>
-            <a:r>
-              <a:rPr lang="en-US" sz="1500" b="0" strike="noStrike" spc="-1">
-                <a:solidFill>
-                  <a:srgbClr val="404040"/>
-                </a:solidFill>
-                <a:uFill>
-                  <a:solidFill>
-                    <a:srgbClr val="FFFFFF"/>
-                  </a:solidFill>
-                </a:uFill>
-                <a:latin typeface="Calibri"/>
-              </a:rPr>
-              <a:t>Screen Captures</a:t>
-            </a:r>
-            <a:endParaRPr lang="en-US" sz="1800" b="0" strike="noStrike" spc="-1">
+            <a:pPr>
+              <a:lnSpc>
+                <a:spcPct val="90000"/>
+              </a:lnSpc>
+            </a:pPr>
+            <a:endParaRPr lang="en-US" sz="1800" b="0" strike="noStrike" spc="-1" dirty="0" smtClean="0">
               <a:solidFill>
                 <a:srgbClr val="000000"/>
               </a:solidFill>
@@ -27461,32 +28954,12 @@
             </a:endParaRPr>
           </a:p>
           <a:p>
-            <a:pPr marL="377280" lvl="3" indent="-198360">
-              <a:lnSpc>
-                <a:spcPct val="100000"/>
-              </a:lnSpc>
-              <a:buClr>
-                <a:srgbClr val="4E67C8"/>
-              </a:buClr>
-              <a:buSzPct val="80000"/>
-              <a:buFont typeface="Wingdings 2" charset="2"/>
-              <a:buChar char=""/>
-            </a:pPr>
-            <a:r>
-              <a:rPr lang="en-US" sz="1500" b="0" strike="noStrike" spc="-1">
-                <a:solidFill>
-                  <a:srgbClr val="404040"/>
-                </a:solidFill>
-                <a:uFill>
-                  <a:solidFill>
-                    <a:srgbClr val="FFFFFF"/>
-                  </a:solidFill>
-                </a:uFill>
-                <a:latin typeface="Calibri"/>
-              </a:rPr>
-              <a:t>Etc.</a:t>
-            </a:r>
-            <a:endParaRPr lang="en-US" sz="1800" b="0" strike="noStrike" spc="-1">
+            <a:pPr>
+              <a:lnSpc>
+                <a:spcPct val="90000"/>
+              </a:lnSpc>
+            </a:pPr>
+            <a:endParaRPr lang="en-US" spc="-1" dirty="0">
               <a:solidFill>
                 <a:srgbClr val="000000"/>
               </a:solidFill>
@@ -27499,31 +28972,12 @@
             </a:endParaRPr>
           </a:p>
           <a:p>
-            <a:pPr marL="199080" indent="-198360">
-              <a:lnSpc>
-                <a:spcPct val="100000"/>
-              </a:lnSpc>
-              <a:buClr>
-                <a:srgbClr val="4E67C8"/>
-              </a:buClr>
-              <a:buFont typeface="Wingdings 2" charset="2"/>
-              <a:buChar char=""/>
-            </a:pPr>
-            <a:r>
-              <a:rPr lang="en-US" sz="2000" b="0" strike="noStrike" spc="-1">
-                <a:solidFill>
-                  <a:srgbClr val="404040"/>
-                </a:solidFill>
-                <a:uFill>
-                  <a:solidFill>
-                    <a:srgbClr val="FFFFFF"/>
-                  </a:solidFill>
-                </a:uFill>
-                <a:latin typeface="Calibri"/>
-              </a:rPr>
-              <a:t>Presenters – duplicate this slide as many times as needed</a:t>
-            </a:r>
-            <a:endParaRPr lang="en-US" sz="1800" b="0" strike="noStrike" spc="-1">
+            <a:pPr>
+              <a:lnSpc>
+                <a:spcPct val="90000"/>
+              </a:lnSpc>
+            </a:pPr>
+            <a:endParaRPr lang="en-US" sz="1800" b="0" strike="noStrike" spc="-1" dirty="0" smtClean="0">
               <a:solidFill>
                 <a:srgbClr val="000000"/>
               </a:solidFill>
@@ -27541,7 +28995,111 @@
                 <a:spcPct val="90000"/>
               </a:lnSpc>
             </a:pPr>
-            <a:endParaRPr lang="en-US" sz="1800" b="0" strike="noStrike" spc="-1">
+            <a:endParaRPr lang="en-US" spc="-1" dirty="0">
+              <a:solidFill>
+                <a:srgbClr val="000000"/>
+              </a:solidFill>
+              <a:uFill>
+                <a:solidFill>
+                  <a:srgbClr val="FFFFFF"/>
+                </a:solidFill>
+              </a:uFill>
+              <a:latin typeface="Arial"/>
+            </a:endParaRPr>
+          </a:p>
+          <a:p>
+            <a:pPr>
+              <a:lnSpc>
+                <a:spcPct val="90000"/>
+              </a:lnSpc>
+            </a:pPr>
+            <a:endParaRPr lang="en-US" sz="1800" b="0" strike="noStrike" spc="-1" dirty="0" smtClean="0">
+              <a:solidFill>
+                <a:srgbClr val="000000"/>
+              </a:solidFill>
+              <a:uFill>
+                <a:solidFill>
+                  <a:srgbClr val="FFFFFF"/>
+                </a:solidFill>
+              </a:uFill>
+              <a:latin typeface="Arial"/>
+            </a:endParaRPr>
+          </a:p>
+          <a:p>
+            <a:pPr>
+              <a:lnSpc>
+                <a:spcPct val="90000"/>
+              </a:lnSpc>
+            </a:pPr>
+            <a:endParaRPr lang="en-US" spc="-1" dirty="0">
+              <a:solidFill>
+                <a:srgbClr val="000000"/>
+              </a:solidFill>
+              <a:uFill>
+                <a:solidFill>
+                  <a:srgbClr val="FFFFFF"/>
+                </a:solidFill>
+              </a:uFill>
+              <a:latin typeface="Arial"/>
+            </a:endParaRPr>
+          </a:p>
+          <a:p>
+            <a:pPr>
+              <a:lnSpc>
+                <a:spcPct val="90000"/>
+              </a:lnSpc>
+            </a:pPr>
+            <a:endParaRPr lang="en-US" sz="1800" b="0" strike="noStrike" spc="-1" dirty="0" smtClean="0">
+              <a:solidFill>
+                <a:srgbClr val="000000"/>
+              </a:solidFill>
+              <a:uFill>
+                <a:solidFill>
+                  <a:srgbClr val="FFFFFF"/>
+                </a:solidFill>
+              </a:uFill>
+              <a:latin typeface="Arial"/>
+            </a:endParaRPr>
+          </a:p>
+          <a:p>
+            <a:pPr>
+              <a:lnSpc>
+                <a:spcPct val="90000"/>
+              </a:lnSpc>
+            </a:pPr>
+            <a:endParaRPr lang="en-US" spc="-1" dirty="0">
+              <a:solidFill>
+                <a:srgbClr val="000000"/>
+              </a:solidFill>
+              <a:uFill>
+                <a:solidFill>
+                  <a:srgbClr val="FFFFFF"/>
+                </a:solidFill>
+              </a:uFill>
+              <a:latin typeface="Arial"/>
+            </a:endParaRPr>
+          </a:p>
+          <a:p>
+            <a:pPr>
+              <a:lnSpc>
+                <a:spcPct val="90000"/>
+              </a:lnSpc>
+            </a:pPr>
+            <a:r>
+              <a:rPr lang="en-US" sz="1400" b="0" strike="noStrike" spc="-1" dirty="0" smtClean="0">
+                <a:solidFill>
+                  <a:srgbClr val="000000"/>
+                </a:solidFill>
+                <a:uFill>
+                  <a:solidFill>
+                    <a:srgbClr val="FFFFFF"/>
+                  </a:solidFill>
+                </a:uFill>
+                <a:latin typeface="Arial"/>
+              </a:rPr>
+              <a:t>Note:  This example was inspired by a real-life problem.</a:t>
+            </a:r>
+            <a:endParaRPr lang="en-US" sz="1400" b="0" strike="noStrike" spc="-1" dirty="0">
               <a:solidFill>
                 <a:srgbClr val="000000"/>
               </a:solidFill>
@@ -27557,7 +29115,7 @@
       </p:sp>
       <p:sp>
         <p:nvSpPr>
-          <p:cNvPr id="168" name="CustomShape 3"/>
+          <p:cNvPr id="174" name="CustomShape 3"/>
           <p:cNvSpPr/>
           <p:nvPr/>
         </p:nvSpPr>
@@ -27620,6 +29178,455 @@
                 </a:solidFill>
               </a:uFill>
               <a:latin typeface="Arial"/>
+            </a:endParaRPr>
+          </a:p>
+        </p:txBody>
+      </p:sp>
+      <p:graphicFrame>
+        <p:nvGraphicFramePr>
+          <p:cNvPr id="2" name="Table 1"/>
+          <p:cNvGraphicFramePr>
+            <a:graphicFrameLocks noGrp="1"/>
+          </p:cNvGraphicFramePr>
+          <p:nvPr>
+            <p:extLst>
+              <p:ext uri="{D42A27DB-BD31-4B8C-83A1-F6EECF244321}">
+                <p14:modId xmlns:p14="http://schemas.microsoft.com/office/powerpoint/2010/main" val="973978969"/>
+              </p:ext>
+            </p:extLst>
+          </p:nvPr>
+        </p:nvGraphicFramePr>
+        <p:xfrm>
+          <a:off x="822960" y="2760917"/>
+          <a:ext cx="7523181" cy="768096"/>
+        </p:xfrm>
+        <a:graphic>
+          <a:graphicData uri="http://schemas.openxmlformats.org/drawingml/2006/table">
+            <a:tbl>
+              <a:tblPr/>
+              <a:tblGrid>
+                <a:gridCol w="584499">
+                  <a:extLst>
+                    <a:ext uri="{9D8B030D-6E8A-4147-A177-3AD203B41FA5}">
+                      <a16:colId xmlns:a16="http://schemas.microsoft.com/office/drawing/2014/main" val="467762016"/>
+                    </a:ext>
+                  </a:extLst>
+                </a:gridCol>
+                <a:gridCol w="2689412">
+                  <a:extLst>
+                    <a:ext uri="{9D8B030D-6E8A-4147-A177-3AD203B41FA5}">
+                      <a16:colId xmlns:a16="http://schemas.microsoft.com/office/drawing/2014/main" val="345893813"/>
+                    </a:ext>
+                  </a:extLst>
+                </a:gridCol>
+                <a:gridCol w="4249270">
+                  <a:extLst>
+                    <a:ext uri="{9D8B030D-6E8A-4147-A177-3AD203B41FA5}">
+                      <a16:colId xmlns:a16="http://schemas.microsoft.com/office/drawing/2014/main" val="958642150"/>
+                    </a:ext>
+                  </a:extLst>
+                </a:gridCol>
+              </a:tblGrid>
+              <a:tr h="0">
+                <a:tc>
+                  <a:txBody>
+                    <a:bodyPr/>
+                    <a:lstStyle/>
+                    <a:p>
+                      <a:pPr algn="r" rtl="0">
+                        <a:spcAft>
+                          <a:spcPts val="576"/>
+                        </a:spcAft>
+                      </a:pPr>
+                      <a:r>
+                        <a:rPr lang="en-GB" b="1">
+                          <a:effectLst/>
+                        </a:rPr>
+                        <a:t>id</a:t>
+                      </a:r>
+                    </a:p>
+                  </a:txBody>
+                  <a:tcPr marL="60960" marR="60960" marT="54864" marB="54864">
+                    <a:lnL>
+                      <a:noFill/>
+                    </a:lnL>
+                    <a:lnR>
+                      <a:noFill/>
+                    </a:lnR>
+                    <a:lnT w="7620" cap="flat" cmpd="sng" algn="ctr">
+                      <a:solidFill>
+                        <a:srgbClr val="000000"/>
+                      </a:solidFill>
+                      <a:prstDash val="solid"/>
+                      <a:round/>
+                      <a:headEnd type="none" w="med" len="med"/>
+                      <a:tailEnd type="none" w="med" len="med"/>
+                    </a:lnT>
+                    <a:lnB w="7620" cap="flat" cmpd="sng" algn="ctr">
+                      <a:solidFill>
+                        <a:srgbClr val="000000"/>
+                      </a:solidFill>
+                      <a:prstDash val="solid"/>
+                      <a:round/>
+                      <a:headEnd type="none" w="med" len="med"/>
+                      <a:tailEnd type="none" w="med" len="med"/>
+                    </a:lnB>
+                  </a:tcPr>
+                </a:tc>
+                <a:tc>
+                  <a:txBody>
+                    <a:bodyPr/>
+                    <a:lstStyle/>
+                    <a:p>
+                      <a:pPr algn="l" rtl="0">
+                        <a:spcAft>
+                          <a:spcPts val="576"/>
+                        </a:spcAft>
+                      </a:pPr>
+                      <a:r>
+                        <a:rPr lang="en-GB" b="1">
+                          <a:effectLst/>
+                        </a:rPr>
+                        <a:t>sql_query</a:t>
+                      </a:r>
+                    </a:p>
+                  </a:txBody>
+                  <a:tcPr marL="60960" marR="60960" marT="54864" marB="54864">
+                    <a:lnL>
+                      <a:noFill/>
+                    </a:lnL>
+                    <a:lnR>
+                      <a:noFill/>
+                    </a:lnR>
+                    <a:lnT w="7620" cap="flat" cmpd="sng" algn="ctr">
+                      <a:solidFill>
+                        <a:srgbClr val="000000"/>
+                      </a:solidFill>
+                      <a:prstDash val="solid"/>
+                      <a:round/>
+                      <a:headEnd type="none" w="med" len="med"/>
+                      <a:tailEnd type="none" w="med" len="med"/>
+                    </a:lnT>
+                    <a:lnB w="7620" cap="flat" cmpd="sng" algn="ctr">
+                      <a:solidFill>
+                        <a:srgbClr val="000000"/>
+                      </a:solidFill>
+                      <a:prstDash val="solid"/>
+                      <a:round/>
+                      <a:headEnd type="none" w="med" len="med"/>
+                      <a:tailEnd type="none" w="med" len="med"/>
+                    </a:lnB>
+                  </a:tcPr>
+                </a:tc>
+                <a:tc>
+                  <a:txBody>
+                    <a:bodyPr/>
+                    <a:lstStyle/>
+                    <a:p>
+                      <a:pPr algn="l" rtl="0">
+                        <a:spcAft>
+                          <a:spcPts val="576"/>
+                        </a:spcAft>
+                      </a:pPr>
+                      <a:r>
+                        <a:rPr lang="en-GB" b="1">
+                          <a:effectLst/>
+                        </a:rPr>
+                        <a:t>error</a:t>
+                      </a:r>
+                    </a:p>
+                  </a:txBody>
+                  <a:tcPr marL="60960" marR="60960" marT="54864" marB="54864">
+                    <a:lnL>
+                      <a:noFill/>
+                    </a:lnL>
+                    <a:lnR>
+                      <a:noFill/>
+                    </a:lnR>
+                    <a:lnT w="7620" cap="flat" cmpd="sng" algn="ctr">
+                      <a:solidFill>
+                        <a:srgbClr val="000000"/>
+                      </a:solidFill>
+                      <a:prstDash val="solid"/>
+                      <a:round/>
+                      <a:headEnd type="none" w="med" len="med"/>
+                      <a:tailEnd type="none" w="med" len="med"/>
+                    </a:lnT>
+                    <a:lnB w="7620" cap="flat" cmpd="sng" algn="ctr">
+                      <a:solidFill>
+                        <a:srgbClr val="000000"/>
+                      </a:solidFill>
+                      <a:prstDash val="solid"/>
+                      <a:round/>
+                      <a:headEnd type="none" w="med" len="med"/>
+                      <a:tailEnd type="none" w="med" len="med"/>
+                    </a:lnB>
+                  </a:tcPr>
+                </a:tc>
+                <a:extLst>
+                  <a:ext uri="{0D108BD9-81ED-4DB2-BD59-A6C34878D82A}">
+                    <a16:rowId xmlns:a16="http://schemas.microsoft.com/office/drawing/2014/main" val="3991942859"/>
+                  </a:ext>
+                </a:extLst>
+              </a:tr>
+              <a:tr h="0">
+                <a:tc>
+                  <a:txBody>
+                    <a:bodyPr/>
+                    <a:lstStyle/>
+                    <a:p>
+                      <a:pPr algn="r" rtl="0">
+                        <a:spcAft>
+                          <a:spcPts val="576"/>
+                        </a:spcAft>
+                      </a:pPr>
+                      <a:r>
+                        <a:rPr lang="en-GB">
+                          <a:effectLst/>
+                        </a:rPr>
+                        <a:t>2</a:t>
+                      </a:r>
+                    </a:p>
+                  </a:txBody>
+                  <a:tcPr marL="60960" marR="60960" marT="54864" marB="54864">
+                    <a:lnL>
+                      <a:noFill/>
+                    </a:lnL>
+                    <a:lnR>
+                      <a:noFill/>
+                    </a:lnR>
+                    <a:lnT w="7620" cap="flat" cmpd="sng" algn="ctr">
+                      <a:solidFill>
+                        <a:srgbClr val="000000"/>
+                      </a:solidFill>
+                      <a:prstDash val="solid"/>
+                      <a:round/>
+                      <a:headEnd type="none" w="med" len="med"/>
+                      <a:tailEnd type="none" w="med" len="med"/>
+                    </a:lnT>
+                    <a:lnB w="7620" cap="flat" cmpd="sng" algn="ctr">
+                      <a:solidFill>
+                        <a:srgbClr val="000000"/>
+                      </a:solidFill>
+                      <a:prstDash val="solid"/>
+                      <a:round/>
+                      <a:headEnd type="none" w="med" len="med"/>
+                      <a:tailEnd type="none" w="med" len="med"/>
+                    </a:lnB>
+                  </a:tcPr>
+                </a:tc>
+                <a:tc>
+                  <a:txBody>
+                    <a:bodyPr/>
+                    <a:lstStyle/>
+                    <a:p>
+                      <a:pPr algn="l" rtl="0">
+                        <a:spcAft>
+                          <a:spcPts val="576"/>
+                        </a:spcAft>
+                      </a:pPr>
+                      <a:r>
+                        <a:rPr lang="en-GB">
+                          <a:effectLst/>
+                        </a:rPr>
+                        <a:t>select sloozle from fleem</a:t>
+                      </a:r>
+                    </a:p>
+                  </a:txBody>
+                  <a:tcPr marL="60960" marR="60960" marT="54864" marB="54864">
+                    <a:lnL>
+                      <a:noFill/>
+                    </a:lnL>
+                    <a:lnR>
+                      <a:noFill/>
+                    </a:lnR>
+                    <a:lnT w="7620" cap="flat" cmpd="sng" algn="ctr">
+                      <a:solidFill>
+                        <a:srgbClr val="000000"/>
+                      </a:solidFill>
+                      <a:prstDash val="solid"/>
+                      <a:round/>
+                      <a:headEnd type="none" w="med" len="med"/>
+                      <a:tailEnd type="none" w="med" len="med"/>
+                    </a:lnT>
+                    <a:lnB w="7620" cap="flat" cmpd="sng" algn="ctr">
+                      <a:solidFill>
+                        <a:srgbClr val="000000"/>
+                      </a:solidFill>
+                      <a:prstDash val="solid"/>
+                      <a:round/>
+                      <a:headEnd type="none" w="med" len="med"/>
+                      <a:tailEnd type="none" w="med" len="med"/>
+                    </a:lnB>
+                  </a:tcPr>
+                </a:tc>
+                <a:tc>
+                  <a:txBody>
+                    <a:bodyPr/>
+                    <a:lstStyle/>
+                    <a:p>
+                      <a:pPr algn="l" rtl="0">
+                        <a:spcAft>
+                          <a:spcPts val="576"/>
+                        </a:spcAft>
+                      </a:pPr>
+                      <a:r>
+                        <a:rPr lang="en-GB" dirty="0">
+                          <a:effectLst/>
+                        </a:rPr>
+                        <a:t>ORA-00942: table or view does not exist</a:t>
+                      </a:r>
+                    </a:p>
+                  </a:txBody>
+                  <a:tcPr marL="60960" marR="60960" marT="54864" marB="54864">
+                    <a:lnL>
+                      <a:noFill/>
+                    </a:lnL>
+                    <a:lnR>
+                      <a:noFill/>
+                    </a:lnR>
+                    <a:lnT w="7620" cap="flat" cmpd="sng" algn="ctr">
+                      <a:solidFill>
+                        <a:srgbClr val="000000"/>
+                      </a:solidFill>
+                      <a:prstDash val="solid"/>
+                      <a:round/>
+                      <a:headEnd type="none" w="med" len="med"/>
+                      <a:tailEnd type="none" w="med" len="med"/>
+                    </a:lnT>
+                    <a:lnB w="7620" cap="flat" cmpd="sng" algn="ctr">
+                      <a:solidFill>
+                        <a:srgbClr val="000000"/>
+                      </a:solidFill>
+                      <a:prstDash val="solid"/>
+                      <a:round/>
+                      <a:headEnd type="none" w="med" len="med"/>
+                      <a:tailEnd type="none" w="med" len="med"/>
+                    </a:lnB>
+                  </a:tcPr>
+                </a:tc>
+                <a:extLst>
+                  <a:ext uri="{0D108BD9-81ED-4DB2-BD59-A6C34878D82A}">
+                    <a16:rowId xmlns:a16="http://schemas.microsoft.com/office/drawing/2014/main" val="4150023974"/>
+                  </a:ext>
+                </a:extLst>
+              </a:tr>
+            </a:tbl>
+          </a:graphicData>
+        </a:graphic>
+      </p:graphicFrame>
+      <p:sp>
+        <p:nvSpPr>
+          <p:cNvPr id="3" name="Rectangle 1"/>
+          <p:cNvSpPr>
+            <a:spLocks noChangeArrowheads="1"/>
+          </p:cNvSpPr>
+          <p:nvPr/>
+        </p:nvSpPr>
+        <p:spPr bwMode="auto">
+          <a:xfrm>
+            <a:off x="622300" y="3071813"/>
+            <a:ext cx="9144000" cy="457200"/>
+          </a:xfrm>
+          <a:prstGeom prst="rect">
+            <a:avLst/>
+          </a:prstGeom>
+          <a:noFill/>
+          <a:ln>
+            <a:noFill/>
+          </a:ln>
+          <a:effectLst/>
+          <a:extLst>
+            <a:ext uri="{909E8E84-426E-40DD-AFC4-6F175D3DCCD1}">
+              <a14:hiddenFill xmlns:a14="http://schemas.microsoft.com/office/drawing/2010/main">
+                <a:solidFill>
+                  <a:schemeClr val="accent1"/>
+                </a:solidFill>
+              </a14:hiddenFill>
+            </a:ext>
+            <a:ext uri="{91240B29-F687-4F45-9708-019B960494DF}">
+              <a14:hiddenLine xmlns:a14="http://schemas.microsoft.com/office/drawing/2010/main" w="9525">
+                <a:solidFill>
+                  <a:schemeClr val="tx1"/>
+                </a:solidFill>
+                <a:miter lim="800000"/>
+                <a:headEnd/>
+                <a:tailEnd/>
+              </a14:hiddenLine>
+            </a:ext>
+            <a:ext uri="{AF507438-7753-43E0-B8FC-AC1667EBCBE1}">
+              <a14:hiddenEffects xmlns:a14="http://schemas.microsoft.com/office/drawing/2010/main">
+                <a:effectLst>
+                  <a:outerShdw dist="35921" dir="2700000" algn="ctr" rotWithShape="0">
+                    <a:schemeClr val="bg2"/>
+                  </a:outerShdw>
+                </a:effectLst>
+              </a14:hiddenEffects>
+            </a:ext>
+          </a:extLst>
+        </p:spPr>
+        <p:txBody>
+          <a:bodyPr vert="horz" wrap="none" lIns="91440" tIns="45720" rIns="91440" bIns="45720" numCol="1" anchor="ctr" anchorCtr="0" compatLnSpc="1">
+            <a:prstTxWarp prst="textNoShape">
+              <a:avLst/>
+            </a:prstTxWarp>
+            <a:spAutoFit/>
+          </a:bodyPr>
+          <a:lstStyle/>
+          <a:p>
+            <a:pPr marL="0" marR="0" lvl="0" indent="0" algn="ctr" defTabSz="914400" rtl="0" eaLnBrk="0" fontAlgn="base" latinLnBrk="0" hangingPunct="0">
+              <a:lnSpc>
+                <a:spcPct val="100000"/>
+              </a:lnSpc>
+              <a:spcBef>
+                <a:spcPct val="0"/>
+              </a:spcBef>
+              <a:spcAft>
+                <a:spcPct val="0"/>
+              </a:spcAft>
+              <a:buClrTx/>
+              <a:buSzTx/>
+              <a:buFontTx/>
+              <a:buNone/>
+              <a:tabLst/>
+            </a:pPr>
+            <a:endParaRPr kumimoji="0" lang="en-GB" altLang="en-US" sz="1800" b="0" i="0" u="none" strike="noStrike" cap="none" normalizeH="0" baseline="0" smtClean="0">
+              <a:ln>
+                <a:noFill/>
+              </a:ln>
+              <a:solidFill>
+                <a:schemeClr val="tx1"/>
+              </a:solidFill>
+              <a:effectLst/>
+              <a:latin typeface="Arial" panose="020B0604020202020204" pitchFamily="34" charset="0"/>
+            </a:endParaRPr>
+          </a:p>
+          <a:p>
+            <a:pPr marL="0" marR="0" lvl="0" indent="0" algn="ctr" defTabSz="914400" rtl="0" eaLnBrk="0" fontAlgn="base" latinLnBrk="0" hangingPunct="0">
+              <a:lnSpc>
+                <a:spcPct val="100000"/>
+              </a:lnSpc>
+              <a:spcBef>
+                <a:spcPct val="0"/>
+              </a:spcBef>
+              <a:spcAft>
+                <a:spcPct val="0"/>
+              </a:spcAft>
+              <a:buClrTx/>
+              <a:buSzTx/>
+              <a:buFontTx/>
+              <a:buNone/>
+              <a:tabLst/>
+            </a:pPr>
+            <a:endParaRPr kumimoji="0" lang="en-GB" altLang="en-US" sz="1800" b="0" i="0" u="none" strike="noStrike" cap="none" normalizeH="0" baseline="0" smtClean="0">
+              <a:ln>
+                <a:noFill/>
+              </a:ln>
+              <a:solidFill>
+                <a:schemeClr val="tx1"/>
+              </a:solidFill>
+              <a:effectLst/>
+              <a:latin typeface="Arial" panose="020B0604020202020204" pitchFamily="34" charset="0"/>
             </a:endParaRPr>
           </a:p>
         </p:txBody>
@@ -28415,7 +30422,7 @@
       </p:grpSpPr>
       <p:sp>
         <p:nvSpPr>
-          <p:cNvPr id="172" name="CustomShape 1"/>
+          <p:cNvPr id="166" name="CustomShape 1"/>
           <p:cNvSpPr/>
           <p:nvPr/>
         </p:nvSpPr>
@@ -28454,7 +30461,7 @@
               </a:lnSpc>
             </a:pPr>
             <a:r>
-              <a:rPr lang="en-US" sz="4800" b="0" strike="noStrike" spc="-46">
+              <a:rPr lang="en-US" sz="4800" spc="-46" dirty="0">
                 <a:solidFill>
                   <a:srgbClr val="31489F"/>
                 </a:solidFill>
@@ -28465,25 +30472,24 @@
                 </a:uFill>
                 <a:latin typeface="Calibri Light"/>
               </a:rPr>
-              <a:t>Slide Heading Here</a:t>
-            </a:r>
-            <a:endParaRPr lang="en-US" sz="1800" b="0" strike="noStrike" spc="-1">
-              <a:solidFill>
-                <a:srgbClr val="000000"/>
-              </a:solidFill>
-              <a:uFill>
-                <a:solidFill>
-                  <a:srgbClr val="FFFFFF"/>
-                </a:solidFill>
-              </a:uFill>
-              <a:latin typeface="Arial"/>
+              <a:t>Closure Query Example</a:t>
+            </a:r>
+            <a:endParaRPr lang="en-US" sz="4800" spc="-1" dirty="0">
+              <a:solidFill>
+                <a:srgbClr val="000000"/>
+              </a:solidFill>
+              <a:uFill>
+                <a:solidFill>
+                  <a:srgbClr val="FFFFFF"/>
+                </a:solidFill>
+              </a:uFill>
             </a:endParaRPr>
           </a:p>
         </p:txBody>
       </p:sp>
       <p:sp>
         <p:nvSpPr>
-          <p:cNvPr id="173" name="CustomShape 2"/>
+          <p:cNvPr id="167" name="CustomShape 2"/>
           <p:cNvSpPr/>
           <p:nvPr/>
         </p:nvSpPr>
@@ -28687,7 +30693,7 @@
       </p:sp>
       <p:sp>
         <p:nvSpPr>
-          <p:cNvPr id="174" name="CustomShape 3"/>
+          <p:cNvPr id="168" name="CustomShape 3"/>
           <p:cNvSpPr/>
           <p:nvPr/>
         </p:nvSpPr>

</xml_diff>

<commit_message>
Start writing about SimpleReportBuilder
</commit_message>
<xml_diff>
--- a/docs/SICAS_2017/Cole_Drop-In Reporting with Groovy.pptx
+++ b/docs/SICAS_2017/Cole_Drop-In Reporting with Groovy.pptx
@@ -1,6 +1,6 @@
 
 <file path=ppt/presentation.xml><?xml version="1.0" encoding="utf-8"?>
-<p:presentation xmlns:a="http://schemas.openxmlformats.org/drawingml/2006/main" xmlns:r="http://schemas.openxmlformats.org/officeDocument/2006/relationships" xmlns:p="http://schemas.openxmlformats.org/presentationml/2006/main">
+<p:presentation xmlns:a="http://schemas.openxmlformats.org/drawingml/2006/main" xmlns:r="http://schemas.openxmlformats.org/officeDocument/2006/relationships" xmlns:p="http://schemas.openxmlformats.org/presentationml/2006/main" bookmarkIdSeed="2">
   <p:sldMasterIdLst>
     <p:sldMasterId id="2147483648" r:id="rId1"/>
     <p:sldMasterId id="2147483661" r:id="rId2"/>
@@ -42,8 +42,8 @@
     <p:sldId id="286" r:id="rId33"/>
     <p:sldId id="287" r:id="rId34"/>
     <p:sldId id="288" r:id="rId35"/>
-    <p:sldId id="289" r:id="rId36"/>
-    <p:sldId id="290" r:id="rId37"/>
+    <p:sldId id="290" r:id="rId36"/>
+    <p:sldId id="289" r:id="rId37"/>
     <p:sldId id="291" r:id="rId38"/>
     <p:sldId id="292" r:id="rId39"/>
     <p:sldId id="293" r:id="rId40"/>
@@ -246,7 +246,7 @@
           <a:p>
             <a:fld id="{1B9A2B5C-D194-4995-BCA7-25FFDAD57DDD}" type="datetimeFigureOut">
               <a:rPr lang="en-US" smtClean="0"/>
-              <a:t>9/5/2017</a:t>
+              <a:t>9/6/2017</a:t>
             </a:fld>
             <a:endParaRPr lang="en-US"/>
           </a:p>
@@ -4231,7 +4231,7 @@
             <a:fld id="{03F41C87-7AD9-4845-A077-840E4A0F3F06}" type="datetimeFigureOut">
               <a:rPr lang="en-US" smtClean="0"/>
               <a:pPr/>
-              <a:t>9/5/2017</a:t>
+              <a:t>9/6/2017</a:t>
             </a:fld>
             <a:endParaRPr lang="en-US"/>
           </a:p>
@@ -8179,7 +8179,7 @@
               </a:lnSpc>
             </a:pPr>
             <a:r>
-              <a:rPr lang="en-US" sz="4800" b="0" strike="noStrike" spc="-46">
+              <a:rPr lang="en-US" sz="4800" b="0" strike="noStrike" spc="-46" dirty="0">
                 <a:solidFill>
                   <a:srgbClr val="31489F"/>
                 </a:solidFill>
@@ -8190,9 +8190,23 @@
                 </a:uFill>
                 <a:latin typeface="Calibri Light"/>
               </a:rPr>
-              <a:t>A pure SQL report – continued</a:t>
-            </a:r>
-            <a:endParaRPr lang="en-US" sz="1800" b="0" strike="noStrike" spc="-1">
+              <a:t>A pure SQL </a:t>
+            </a:r>
+            <a:r>
+              <a:rPr lang="en-US" sz="4800" b="0" strike="noStrike" spc="-46" dirty="0" smtClean="0">
+                <a:solidFill>
+                  <a:srgbClr val="31489F"/>
+                </a:solidFill>
+                <a:uFill>
+                  <a:solidFill>
+                    <a:srgbClr val="FFFFFF"/>
+                  </a:solidFill>
+                </a:uFill>
+                <a:latin typeface="Calibri Light"/>
+              </a:rPr>
+              <a:t>report</a:t>
+            </a:r>
+            <a:endParaRPr lang="en-US" sz="1800" b="0" strike="noStrike" spc="-1" dirty="0">
               <a:solidFill>
                 <a:srgbClr val="000000"/>
               </a:solidFill>
@@ -8502,9 +8516,6 @@
             </a:pPr>
             <a:r>
               <a:rPr lang="en-US" sz="1600" b="0" strike="noStrike" spc="-1" dirty="0">
-                <a:solidFill>
-                  <a:srgbClr val="404040"/>
-                </a:solidFill>
                 <a:uFill>
                   <a:solidFill>
                     <a:srgbClr val="FFFFFF"/>
@@ -8513,13 +8524,25 @@
                 <a:latin typeface="Courier New"/>
                 <a:ea typeface="Courier New"/>
               </a:rPr>
-              <a:t>R_OWNER</a:t>
-            </a:r>
+              <a:t>R_OWNER,R_NAME,R_TYPE,OWNER,NAME,TYPE</a:t>
+            </a:r>
+            <a:endParaRPr lang="en-US" sz="1800" b="0" strike="noStrike" spc="-1" dirty="0">
+              <a:uFill>
+                <a:solidFill>
+                  <a:srgbClr val="FFFFFF"/>
+                </a:solidFill>
+              </a:uFill>
+              <a:latin typeface="Arial"/>
+            </a:endParaRPr>
+          </a:p>
+          <a:p>
+            <a:pPr>
+              <a:lnSpc>
+                <a:spcPct val="100000"/>
+              </a:lnSpc>
+            </a:pPr>
             <a:r>
               <a:rPr lang="en-US" sz="1600" b="0" strike="noStrike" spc="-1" dirty="0">
-                <a:solidFill>
-                  <a:srgbClr val="00FFFF"/>
-                </a:solidFill>
                 <a:uFill>
                   <a:solidFill>
                     <a:srgbClr val="FFFFFF"/>
@@ -8528,13 +8551,25 @@
                 <a:latin typeface="Courier New"/>
                 <a:ea typeface="Courier New"/>
               </a:rPr>
-              <a:t>,</a:t>
-            </a:r>
+              <a:t>JCC,JCC_GBR_EMAIL,PACKAGE,JCC,JCC_GBR_EMAIL,PACKAGE BODY</a:t>
+            </a:r>
+            <a:endParaRPr lang="en-US" sz="1800" b="0" strike="noStrike" spc="-1" dirty="0">
+              <a:uFill>
+                <a:solidFill>
+                  <a:srgbClr val="FFFFFF"/>
+                </a:solidFill>
+              </a:uFill>
+              <a:latin typeface="Arial"/>
+            </a:endParaRPr>
+          </a:p>
+          <a:p>
+            <a:pPr>
+              <a:lnSpc>
+                <a:spcPct val="100000"/>
+              </a:lnSpc>
+            </a:pPr>
             <a:r>
               <a:rPr lang="en-US" sz="1600" b="0" strike="noStrike" spc="-1" dirty="0">
-                <a:solidFill>
-                  <a:srgbClr val="404040"/>
-                </a:solidFill>
                 <a:uFill>
                   <a:solidFill>
                     <a:srgbClr val="FFFFFF"/>
@@ -8543,498 +8578,9 @@
                 <a:latin typeface="Courier New"/>
                 <a:ea typeface="Courier New"/>
               </a:rPr>
-              <a:t>R_NAME</a:t>
-            </a:r>
-            <a:r>
-              <a:rPr lang="en-US" sz="1600" b="0" strike="noStrike" spc="-1" dirty="0">
-                <a:solidFill>
-                  <a:srgbClr val="00FFFF"/>
-                </a:solidFill>
-                <a:uFill>
-                  <a:solidFill>
-                    <a:srgbClr val="FFFFFF"/>
-                  </a:solidFill>
-                </a:uFill>
-                <a:latin typeface="Courier New"/>
-                <a:ea typeface="Courier New"/>
-              </a:rPr>
-              <a:t>,</a:t>
-            </a:r>
-            <a:r>
-              <a:rPr lang="en-US" sz="1600" b="0" strike="noStrike" spc="-1" dirty="0">
-                <a:solidFill>
-                  <a:srgbClr val="404040"/>
-                </a:solidFill>
-                <a:uFill>
-                  <a:solidFill>
-                    <a:srgbClr val="FFFFFF"/>
-                  </a:solidFill>
-                </a:uFill>
-                <a:latin typeface="Courier New"/>
-                <a:ea typeface="Courier New"/>
-              </a:rPr>
-              <a:t>R_TYPE</a:t>
-            </a:r>
-            <a:r>
-              <a:rPr lang="en-US" sz="1600" b="0" strike="noStrike" spc="-1" dirty="0">
-                <a:solidFill>
-                  <a:srgbClr val="00FFFF"/>
-                </a:solidFill>
-                <a:uFill>
-                  <a:solidFill>
-                    <a:srgbClr val="FFFFFF"/>
-                  </a:solidFill>
-                </a:uFill>
-                <a:latin typeface="Courier New"/>
-                <a:ea typeface="Courier New"/>
-              </a:rPr>
-              <a:t>,</a:t>
-            </a:r>
-            <a:r>
-              <a:rPr lang="en-US" sz="1600" b="0" strike="noStrike" spc="-1" dirty="0">
-                <a:solidFill>
-                  <a:srgbClr val="404040"/>
-                </a:solidFill>
-                <a:uFill>
-                  <a:solidFill>
-                    <a:srgbClr val="FFFFFF"/>
-                  </a:solidFill>
-                </a:uFill>
-                <a:latin typeface="Courier New"/>
-                <a:ea typeface="Courier New"/>
-              </a:rPr>
-              <a:t>OWNER</a:t>
-            </a:r>
-            <a:r>
-              <a:rPr lang="en-US" sz="1600" b="0" strike="noStrike" spc="-1" dirty="0">
-                <a:solidFill>
-                  <a:srgbClr val="00FFFF"/>
-                </a:solidFill>
-                <a:uFill>
-                  <a:solidFill>
-                    <a:srgbClr val="FFFFFF"/>
-                  </a:solidFill>
-                </a:uFill>
-                <a:latin typeface="Courier New"/>
-                <a:ea typeface="Courier New"/>
-              </a:rPr>
-              <a:t>,</a:t>
-            </a:r>
-            <a:r>
-              <a:rPr lang="en-US" sz="1600" b="0" strike="noStrike" spc="-1" dirty="0">
-                <a:solidFill>
-                  <a:srgbClr val="404040"/>
-                </a:solidFill>
-                <a:uFill>
-                  <a:solidFill>
-                    <a:srgbClr val="FFFFFF"/>
-                  </a:solidFill>
-                </a:uFill>
-                <a:latin typeface="Courier New"/>
-                <a:ea typeface="Courier New"/>
-              </a:rPr>
-              <a:t>NAME</a:t>
-            </a:r>
-            <a:r>
-              <a:rPr lang="en-US" sz="1600" b="0" strike="noStrike" spc="-1" dirty="0">
-                <a:solidFill>
-                  <a:srgbClr val="00FFFF"/>
-                </a:solidFill>
-                <a:uFill>
-                  <a:solidFill>
-                    <a:srgbClr val="FFFFFF"/>
-                  </a:solidFill>
-                </a:uFill>
-                <a:latin typeface="Courier New"/>
-                <a:ea typeface="Courier New"/>
-              </a:rPr>
-              <a:t>,</a:t>
-            </a:r>
-            <a:r>
-              <a:rPr lang="en-US" sz="1600" b="0" strike="noStrike" spc="-1" dirty="0">
-                <a:solidFill>
-                  <a:srgbClr val="404040"/>
-                </a:solidFill>
-                <a:uFill>
-                  <a:solidFill>
-                    <a:srgbClr val="FFFFFF"/>
-                  </a:solidFill>
-                </a:uFill>
-                <a:latin typeface="Courier New"/>
-                <a:ea typeface="Courier New"/>
-              </a:rPr>
-              <a:t>TYPE</a:t>
+              <a:t>JCC,JCC_GBR_EMAIL,PACKAGE,PUBLIC,JCC_GBR_EMAIL,SYNONYM</a:t>
             </a:r>
             <a:endParaRPr lang="en-US" sz="1800" b="0" strike="noStrike" spc="-1" dirty="0">
-              <a:solidFill>
-                <a:srgbClr val="000000"/>
-              </a:solidFill>
-              <a:uFill>
-                <a:solidFill>
-                  <a:srgbClr val="FFFFFF"/>
-                </a:solidFill>
-              </a:uFill>
-              <a:latin typeface="Arial"/>
-            </a:endParaRPr>
-          </a:p>
-          <a:p>
-            <a:pPr>
-              <a:lnSpc>
-                <a:spcPct val="100000"/>
-              </a:lnSpc>
-            </a:pPr>
-            <a:r>
-              <a:rPr lang="en-US" sz="1600" b="0" strike="noStrike" spc="-1" dirty="0">
-                <a:solidFill>
-                  <a:srgbClr val="404040"/>
-                </a:solidFill>
-                <a:uFill>
-                  <a:solidFill>
-                    <a:srgbClr val="FFFFFF"/>
-                  </a:solidFill>
-                </a:uFill>
-                <a:latin typeface="Courier New"/>
-                <a:ea typeface="Courier New"/>
-              </a:rPr>
-              <a:t>JCC</a:t>
-            </a:r>
-            <a:r>
-              <a:rPr lang="en-US" sz="1600" b="0" strike="noStrike" spc="-1" dirty="0">
-                <a:solidFill>
-                  <a:srgbClr val="00FFFF"/>
-                </a:solidFill>
-                <a:uFill>
-                  <a:solidFill>
-                    <a:srgbClr val="FFFFFF"/>
-                  </a:solidFill>
-                </a:uFill>
-                <a:latin typeface="Courier New"/>
-                <a:ea typeface="Courier New"/>
-              </a:rPr>
-              <a:t>,</a:t>
-            </a:r>
-            <a:r>
-              <a:rPr lang="en-US" sz="1600" b="0" strike="noStrike" spc="-1" dirty="0">
-                <a:solidFill>
-                  <a:srgbClr val="404040"/>
-                </a:solidFill>
-                <a:uFill>
-                  <a:solidFill>
-                    <a:srgbClr val="FFFFFF"/>
-                  </a:solidFill>
-                </a:uFill>
-                <a:latin typeface="Courier New"/>
-                <a:ea typeface="Courier New"/>
-              </a:rPr>
-              <a:t>JCC_GBR_EMAIL</a:t>
-            </a:r>
-            <a:r>
-              <a:rPr lang="en-US" sz="1600" b="0" strike="noStrike" spc="-1" dirty="0">
-                <a:solidFill>
-                  <a:srgbClr val="00FFFF"/>
-                </a:solidFill>
-                <a:uFill>
-                  <a:solidFill>
-                    <a:srgbClr val="FFFFFF"/>
-                  </a:solidFill>
-                </a:uFill>
-                <a:latin typeface="Courier New"/>
-                <a:ea typeface="Courier New"/>
-              </a:rPr>
-              <a:t>,</a:t>
-            </a:r>
-            <a:r>
-              <a:rPr lang="en-US" sz="1600" b="0" strike="noStrike" spc="-1" dirty="0">
-                <a:solidFill>
-                  <a:srgbClr val="404040"/>
-                </a:solidFill>
-                <a:uFill>
-                  <a:solidFill>
-                    <a:srgbClr val="FFFFFF"/>
-                  </a:solidFill>
-                </a:uFill>
-                <a:latin typeface="Courier New"/>
-                <a:ea typeface="Courier New"/>
-              </a:rPr>
-              <a:t>PACKAGE</a:t>
-            </a:r>
-            <a:r>
-              <a:rPr lang="en-US" sz="1600" b="0" strike="noStrike" spc="-1" dirty="0">
-                <a:solidFill>
-                  <a:srgbClr val="00FFFF"/>
-                </a:solidFill>
-                <a:uFill>
-                  <a:solidFill>
-                    <a:srgbClr val="FFFFFF"/>
-                  </a:solidFill>
-                </a:uFill>
-                <a:latin typeface="Courier New"/>
-                <a:ea typeface="Courier New"/>
-              </a:rPr>
-              <a:t>,</a:t>
-            </a:r>
-            <a:r>
-              <a:rPr lang="en-US" sz="1600" b="0" strike="noStrike" spc="-1" dirty="0">
-                <a:solidFill>
-                  <a:srgbClr val="404040"/>
-                </a:solidFill>
-                <a:uFill>
-                  <a:solidFill>
-                    <a:srgbClr val="FFFFFF"/>
-                  </a:solidFill>
-                </a:uFill>
-                <a:latin typeface="Courier New"/>
-                <a:ea typeface="Courier New"/>
-              </a:rPr>
-              <a:t>JCC</a:t>
-            </a:r>
-            <a:r>
-              <a:rPr lang="en-US" sz="1600" b="0" strike="noStrike" spc="-1" dirty="0">
-                <a:solidFill>
-                  <a:srgbClr val="00FFFF"/>
-                </a:solidFill>
-                <a:uFill>
-                  <a:solidFill>
-                    <a:srgbClr val="FFFFFF"/>
-                  </a:solidFill>
-                </a:uFill>
-                <a:latin typeface="Courier New"/>
-                <a:ea typeface="Courier New"/>
-              </a:rPr>
-              <a:t>,</a:t>
-            </a:r>
-            <a:r>
-              <a:rPr lang="en-US" sz="1600" b="0" strike="noStrike" spc="-1" dirty="0">
-                <a:solidFill>
-                  <a:srgbClr val="404040"/>
-                </a:solidFill>
-                <a:uFill>
-                  <a:solidFill>
-                    <a:srgbClr val="FFFFFF"/>
-                  </a:solidFill>
-                </a:uFill>
-                <a:latin typeface="Courier New"/>
-                <a:ea typeface="Courier New"/>
-              </a:rPr>
-              <a:t>JCC_GBR_EMAIL</a:t>
-            </a:r>
-            <a:r>
-              <a:rPr lang="en-US" sz="1600" b="0" strike="noStrike" spc="-1" dirty="0">
-                <a:solidFill>
-                  <a:srgbClr val="00FFFF"/>
-                </a:solidFill>
-                <a:uFill>
-                  <a:solidFill>
-                    <a:srgbClr val="FFFFFF"/>
-                  </a:solidFill>
-                </a:uFill>
-                <a:latin typeface="Courier New"/>
-                <a:ea typeface="Courier New"/>
-              </a:rPr>
-              <a:t>,</a:t>
-            </a:r>
-            <a:r>
-              <a:rPr lang="en-US" sz="1600" b="0" strike="noStrike" spc="-1" dirty="0">
-                <a:solidFill>
-                  <a:srgbClr val="404040"/>
-                </a:solidFill>
-                <a:uFill>
-                  <a:solidFill>
-                    <a:srgbClr val="FFFFFF"/>
-                  </a:solidFill>
-                </a:uFill>
-                <a:latin typeface="Courier New"/>
-                <a:ea typeface="Courier New"/>
-              </a:rPr>
-              <a:t>PACKAGE BODY</a:t>
-            </a:r>
-            <a:endParaRPr lang="en-US" sz="1800" b="0" strike="noStrike" spc="-1" dirty="0">
-              <a:solidFill>
-                <a:srgbClr val="000000"/>
-              </a:solidFill>
-              <a:uFill>
-                <a:solidFill>
-                  <a:srgbClr val="FFFFFF"/>
-                </a:solidFill>
-              </a:uFill>
-              <a:latin typeface="Arial"/>
-            </a:endParaRPr>
-          </a:p>
-          <a:p>
-            <a:pPr>
-              <a:lnSpc>
-                <a:spcPct val="100000"/>
-              </a:lnSpc>
-            </a:pPr>
-            <a:r>
-              <a:rPr lang="en-US" sz="1600" b="0" strike="noStrike" spc="-1" dirty="0">
-                <a:solidFill>
-                  <a:srgbClr val="404040"/>
-                </a:solidFill>
-                <a:uFill>
-                  <a:solidFill>
-                    <a:srgbClr val="FFFFFF"/>
-                  </a:solidFill>
-                </a:uFill>
-                <a:latin typeface="Courier New"/>
-                <a:ea typeface="Courier New"/>
-              </a:rPr>
-              <a:t>JCC</a:t>
-            </a:r>
-            <a:r>
-              <a:rPr lang="en-US" sz="1600" b="0" strike="noStrike" spc="-1" dirty="0">
-                <a:solidFill>
-                  <a:srgbClr val="00FFFF"/>
-                </a:solidFill>
-                <a:uFill>
-                  <a:solidFill>
-                    <a:srgbClr val="FFFFFF"/>
-                  </a:solidFill>
-                </a:uFill>
-                <a:latin typeface="Courier New"/>
-                <a:ea typeface="Courier New"/>
-              </a:rPr>
-              <a:t>,</a:t>
-            </a:r>
-            <a:r>
-              <a:rPr lang="en-US" sz="1600" b="0" strike="noStrike" spc="-1" dirty="0">
-                <a:solidFill>
-                  <a:srgbClr val="404040"/>
-                </a:solidFill>
-                <a:uFill>
-                  <a:solidFill>
-                    <a:srgbClr val="FFFFFF"/>
-                  </a:solidFill>
-                </a:uFill>
-                <a:latin typeface="Courier New"/>
-                <a:ea typeface="Courier New"/>
-              </a:rPr>
-              <a:t>JCC_GBR_EMAIL</a:t>
-            </a:r>
-            <a:r>
-              <a:rPr lang="en-US" sz="1600" b="0" strike="noStrike" spc="-1" dirty="0">
-                <a:solidFill>
-                  <a:srgbClr val="00FFFF"/>
-                </a:solidFill>
-                <a:uFill>
-                  <a:solidFill>
-                    <a:srgbClr val="FFFFFF"/>
-                  </a:solidFill>
-                </a:uFill>
-                <a:latin typeface="Courier New"/>
-                <a:ea typeface="Courier New"/>
-              </a:rPr>
-              <a:t>,</a:t>
-            </a:r>
-            <a:r>
-              <a:rPr lang="en-US" sz="1600" b="0" strike="noStrike" spc="-1" dirty="0">
-                <a:solidFill>
-                  <a:srgbClr val="404040"/>
-                </a:solidFill>
-                <a:uFill>
-                  <a:solidFill>
-                    <a:srgbClr val="FFFFFF"/>
-                  </a:solidFill>
-                </a:uFill>
-                <a:latin typeface="Courier New"/>
-                <a:ea typeface="Courier New"/>
-              </a:rPr>
-              <a:t>PACKAGE</a:t>
-            </a:r>
-            <a:r>
-              <a:rPr lang="en-US" sz="1600" b="0" strike="noStrike" spc="-1" dirty="0">
-                <a:solidFill>
-                  <a:srgbClr val="00FFFF"/>
-                </a:solidFill>
-                <a:uFill>
-                  <a:solidFill>
-                    <a:srgbClr val="FFFFFF"/>
-                  </a:solidFill>
-                </a:uFill>
-                <a:latin typeface="Courier New"/>
-                <a:ea typeface="Courier New"/>
-              </a:rPr>
-              <a:t>,</a:t>
-            </a:r>
-            <a:r>
-              <a:rPr lang="en-US" sz="1600" b="0" strike="noStrike" spc="-1" dirty="0">
-                <a:solidFill>
-                  <a:srgbClr val="404040"/>
-                </a:solidFill>
-                <a:uFill>
-                  <a:solidFill>
-                    <a:srgbClr val="FFFFFF"/>
-                  </a:solidFill>
-                </a:uFill>
-                <a:latin typeface="Courier New"/>
-                <a:ea typeface="Courier New"/>
-              </a:rPr>
-              <a:t>PUBLIC</a:t>
-            </a:r>
-            <a:r>
-              <a:rPr lang="en-US" sz="1600" b="0" strike="noStrike" spc="-1" dirty="0">
-                <a:solidFill>
-                  <a:srgbClr val="00FFFF"/>
-                </a:solidFill>
-                <a:uFill>
-                  <a:solidFill>
-                    <a:srgbClr val="FFFFFF"/>
-                  </a:solidFill>
-                </a:uFill>
-                <a:latin typeface="Courier New"/>
-                <a:ea typeface="Courier New"/>
-              </a:rPr>
-              <a:t>,</a:t>
-            </a:r>
-            <a:r>
-              <a:rPr lang="en-US" sz="1600" b="0" strike="noStrike" spc="-1" dirty="0">
-                <a:solidFill>
-                  <a:srgbClr val="404040"/>
-                </a:solidFill>
-                <a:uFill>
-                  <a:solidFill>
-                    <a:srgbClr val="FFFFFF"/>
-                  </a:solidFill>
-                </a:uFill>
-                <a:latin typeface="Courier New"/>
-                <a:ea typeface="Courier New"/>
-              </a:rPr>
-              <a:t>JCC_GBR_EMAIL</a:t>
-            </a:r>
-            <a:r>
-              <a:rPr lang="en-US" sz="1600" b="0" strike="noStrike" spc="-1" dirty="0">
-                <a:solidFill>
-                  <a:srgbClr val="00FFFF"/>
-                </a:solidFill>
-                <a:uFill>
-                  <a:solidFill>
-                    <a:srgbClr val="FFFFFF"/>
-                  </a:solidFill>
-                </a:uFill>
-                <a:latin typeface="Courier New"/>
-                <a:ea typeface="Courier New"/>
-              </a:rPr>
-              <a:t>,</a:t>
-            </a:r>
-            <a:r>
-              <a:rPr lang="en-US" sz="1600" b="0" strike="noStrike" spc="-1" dirty="0">
-                <a:solidFill>
-                  <a:srgbClr val="404040"/>
-                </a:solidFill>
-                <a:uFill>
-                  <a:solidFill>
-                    <a:srgbClr val="FFFFFF"/>
-                  </a:solidFill>
-                </a:uFill>
-                <a:latin typeface="Courier New"/>
-                <a:ea typeface="Courier New"/>
-              </a:rPr>
-              <a:t>SYNONYM</a:t>
-            </a:r>
-            <a:endParaRPr lang="en-US" sz="1800" b="0" strike="noStrike" spc="-1" dirty="0">
-              <a:solidFill>
-                <a:srgbClr val="000000"/>
-              </a:solidFill>
               <a:uFill>
                 <a:solidFill>
                   <a:srgbClr val="FFFFFF"/>
@@ -9944,8 +9490,33 @@
                 </a:uFill>
                 <a:latin typeface="Calibri Light"/>
               </a:rPr>
-              <a:t> Groovy Example – cont.</a:t>
-            </a:r>
+              <a:t> Groovy </a:t>
+            </a:r>
+            <a:r>
+              <a:rPr lang="en-US" sz="4800" b="0" strike="noStrike" spc="-46" dirty="0" smtClean="0">
+                <a:solidFill>
+                  <a:srgbClr val="31489F"/>
+                </a:solidFill>
+                <a:uFill>
+                  <a:solidFill>
+                    <a:srgbClr val="FFFFFF"/>
+                  </a:solidFill>
+                </a:uFill>
+                <a:latin typeface="Calibri Light"/>
+              </a:rPr>
+              <a:t>Example</a:t>
+            </a:r>
+            <a:endParaRPr lang="en-US" sz="4800" b="0" strike="noStrike" spc="-46" dirty="0" smtClean="0">
+              <a:solidFill>
+                <a:srgbClr val="31489F"/>
+              </a:solidFill>
+              <a:uFill>
+                <a:solidFill>
+                  <a:srgbClr val="FFFFFF"/>
+                </a:solidFill>
+              </a:uFill>
+              <a:latin typeface="Calibri Light"/>
+            </a:endParaRPr>
           </a:p>
         </p:txBody>
       </p:sp>
@@ -11103,8 +10674,33 @@
                 </a:uFill>
                 <a:latin typeface="Calibri Light"/>
               </a:rPr>
-              <a:t> Groovy Example – cont.</a:t>
-            </a:r>
+              <a:t> Groovy </a:t>
+            </a:r>
+            <a:r>
+              <a:rPr lang="en-US" sz="4800" b="0" strike="noStrike" spc="-46" dirty="0" smtClean="0">
+                <a:solidFill>
+                  <a:srgbClr val="31489F"/>
+                </a:solidFill>
+                <a:uFill>
+                  <a:solidFill>
+                    <a:srgbClr val="FFFFFF"/>
+                  </a:solidFill>
+                </a:uFill>
+                <a:latin typeface="Calibri Light"/>
+              </a:rPr>
+              <a:t>Example</a:t>
+            </a:r>
+            <a:endParaRPr lang="en-US" sz="4800" b="0" strike="noStrike" spc="-46" dirty="0" smtClean="0">
+              <a:solidFill>
+                <a:srgbClr val="31489F"/>
+              </a:solidFill>
+              <a:uFill>
+                <a:solidFill>
+                  <a:srgbClr val="FFFFFF"/>
+                </a:solidFill>
+              </a:uFill>
+              <a:latin typeface="Calibri Light"/>
+            </a:endParaRPr>
           </a:p>
         </p:txBody>
       </p:sp>
@@ -11852,8 +11448,33 @@
                 </a:uFill>
                 <a:latin typeface="Calibri Light"/>
               </a:rPr>
-              <a:t> Groovy Example – cont.</a:t>
-            </a:r>
+              <a:t> Groovy </a:t>
+            </a:r>
+            <a:r>
+              <a:rPr lang="en-US" sz="4800" b="0" strike="noStrike" spc="-46" dirty="0" smtClean="0">
+                <a:solidFill>
+                  <a:srgbClr val="31489F"/>
+                </a:solidFill>
+                <a:uFill>
+                  <a:solidFill>
+                    <a:srgbClr val="FFFFFF"/>
+                  </a:solidFill>
+                </a:uFill>
+                <a:latin typeface="Calibri Light"/>
+              </a:rPr>
+              <a:t>Example</a:t>
+            </a:r>
+            <a:endParaRPr lang="en-US" sz="4800" b="0" strike="noStrike" spc="-46" dirty="0" smtClean="0">
+              <a:solidFill>
+                <a:srgbClr val="31489F"/>
+              </a:solidFill>
+              <a:uFill>
+                <a:solidFill>
+                  <a:srgbClr val="FFFFFF"/>
+                </a:solidFill>
+              </a:uFill>
+              <a:latin typeface="Calibri Light"/>
+            </a:endParaRPr>
           </a:p>
         </p:txBody>
       </p:sp>
@@ -12912,10 +12533,10 @@
                 </a:uFill>
                 <a:latin typeface="Calibri Light"/>
               </a:rPr>
-              <a:t>First Groovy Example – </a:t>
-            </a:r>
-            <a:r>
-              <a:rPr lang="en-US" sz="4800" spc="-46" dirty="0" smtClean="0">
+              <a:t>First Groovy </a:t>
+            </a:r>
+            <a:r>
+              <a:rPr lang="en-US" sz="4800" b="0" strike="noStrike" spc="-46" dirty="0" smtClean="0">
                 <a:solidFill>
                   <a:srgbClr val="31489F"/>
                 </a:solidFill>
@@ -12926,7 +12547,7 @@
                 </a:uFill>
                 <a:latin typeface="Calibri Light"/>
               </a:rPr>
-              <a:t>cont.</a:t>
+              <a:t>Example</a:t>
             </a:r>
             <a:endParaRPr lang="en-US" sz="1800" b="0" strike="noStrike" spc="-1" dirty="0">
               <a:solidFill>
@@ -15316,7 +14937,7 @@
                 </a:uFill>
                 <a:latin typeface="Calibri Light"/>
               </a:rPr>
-              <a:t>First Groovy Example – cont</a:t>
+              <a:t>First Groovy </a:t>
             </a:r>
             <a:r>
               <a:rPr lang="en-US" sz="4800" spc="-46" dirty="0" smtClean="0">
@@ -15330,7 +14951,7 @@
                 </a:uFill>
                 <a:latin typeface="Calibri Light"/>
               </a:rPr>
-              <a:t>.	</a:t>
+              <a:t>Example</a:t>
             </a:r>
             <a:endParaRPr lang="en-US" spc="-1" dirty="0">
               <a:solidFill>
@@ -16291,7 +15912,21 @@
                 </a:uFill>
                 <a:latin typeface="Calibri Light"/>
               </a:rPr>
-              <a:t>First Groovy Example – cont.</a:t>
+              <a:t>First Groovy </a:t>
+            </a:r>
+            <a:r>
+              <a:rPr lang="en-US" sz="4800" spc="-46" dirty="0" smtClean="0">
+                <a:solidFill>
+                  <a:srgbClr val="31489F"/>
+                </a:solidFill>
+                <a:uFill>
+                  <a:solidFill>
+                    <a:srgbClr val="FFFFFF"/>
+                  </a:solidFill>
+                </a:uFill>
+                <a:latin typeface="Calibri Light"/>
+              </a:rPr>
+              <a:t>Example</a:t>
             </a:r>
             <a:endParaRPr lang="en-US" sz="1800" b="0" strike="noStrike" spc="-1" dirty="0">
               <a:solidFill>
@@ -18604,7 +18239,21 @@
                 </a:uFill>
                 <a:latin typeface="Calibri Light"/>
               </a:rPr>
-              <a:t>Dynamic SQL Example – cont.</a:t>
+              <a:t>Dynamic SQL </a:t>
+            </a:r>
+            <a:r>
+              <a:rPr lang="en-US" sz="4800" spc="-46" dirty="0" smtClean="0">
+                <a:solidFill>
+                  <a:srgbClr val="31489F"/>
+                </a:solidFill>
+                <a:uFill>
+                  <a:solidFill>
+                    <a:srgbClr val="FFFFFF"/>
+                  </a:solidFill>
+                </a:uFill>
+                <a:latin typeface="Calibri Light"/>
+              </a:rPr>
+              <a:t>Example</a:t>
             </a:r>
             <a:endParaRPr lang="en-US" sz="4800" spc="-1" dirty="0">
               <a:solidFill>
@@ -20380,7 +20029,21 @@
                 </a:uFill>
                 <a:latin typeface="Calibri Light"/>
               </a:rPr>
-              <a:t>Dynamic SQL Example – cont.</a:t>
+              <a:t>Dynamic SQL </a:t>
+            </a:r>
+            <a:r>
+              <a:rPr lang="en-US" sz="4800" spc="-46" dirty="0" smtClean="0">
+                <a:solidFill>
+                  <a:srgbClr val="31489F"/>
+                </a:solidFill>
+                <a:uFill>
+                  <a:solidFill>
+                    <a:srgbClr val="FFFFFF"/>
+                  </a:solidFill>
+                </a:uFill>
+                <a:latin typeface="Calibri Light"/>
+              </a:rPr>
+              <a:t>Example</a:t>
             </a:r>
             <a:endParaRPr lang="en-US" sz="4800" spc="-1" dirty="0">
               <a:solidFill>
@@ -22558,7 +22221,21 @@
                 </a:uFill>
                 <a:latin typeface="Calibri Light"/>
               </a:rPr>
-              <a:t>Dynamic SQL Example – cont.</a:t>
+              <a:t>Dynamic SQL </a:t>
+            </a:r>
+            <a:r>
+              <a:rPr lang="en-US" sz="4800" spc="-46" dirty="0" smtClean="0">
+                <a:solidFill>
+                  <a:srgbClr val="31489F"/>
+                </a:solidFill>
+                <a:uFill>
+                  <a:solidFill>
+                    <a:srgbClr val="FFFFFF"/>
+                  </a:solidFill>
+                </a:uFill>
+                <a:latin typeface="Calibri Light"/>
+              </a:rPr>
+              <a:t>Example</a:t>
             </a:r>
             <a:endParaRPr lang="en-US" sz="4800" spc="-1" dirty="0">
               <a:solidFill>
@@ -29727,7 +29404,7 @@
               </a:lnSpc>
             </a:pPr>
             <a:r>
-              <a:rPr lang="en-US" sz="4800" b="0" strike="noStrike" spc="-46">
+              <a:rPr lang="en-US" sz="4800" b="0" strike="noStrike" spc="-46" dirty="0" smtClean="0">
                 <a:solidFill>
                   <a:srgbClr val="31489F"/>
                 </a:solidFill>
@@ -29738,9 +29415,9 @@
                 </a:uFill>
                 <a:latin typeface="Calibri Light"/>
               </a:rPr>
-              <a:t>Slide Heading Here</a:t>
-            </a:r>
-            <a:endParaRPr lang="en-US" sz="1800" b="0" strike="noStrike" spc="-1">
+              <a:t>Implementation</a:t>
+            </a:r>
+            <a:endParaRPr lang="en-US" sz="1800" b="0" strike="noStrike" spc="-1" dirty="0">
               <a:solidFill>
                 <a:srgbClr val="000000"/>
               </a:solidFill>
@@ -29789,162 +29466,12 @@
           <a:bodyPr lIns="0" tIns="45000" rIns="0" bIns="45000"/>
           <a:lstStyle/>
           <a:p>
-            <a:pPr marL="199080" indent="-198360">
-              <a:lnSpc>
-                <a:spcPct val="100000"/>
-              </a:lnSpc>
-              <a:buClr>
-                <a:srgbClr val="4E67C8"/>
-              </a:buClr>
-              <a:buFont typeface="Wingdings 2" charset="2"/>
-              <a:buChar char=""/>
-            </a:pPr>
-            <a:r>
-              <a:rPr lang="en-US" sz="2000" b="0" strike="noStrike" spc="-1">
-                <a:solidFill>
-                  <a:srgbClr val="404040"/>
-                </a:solidFill>
-                <a:uFill>
-                  <a:solidFill>
-                    <a:srgbClr val="FFFFFF"/>
-                  </a:solidFill>
-                </a:uFill>
-                <a:latin typeface="Calibri"/>
-              </a:rPr>
-              <a:t>Presentation Text</a:t>
-            </a:r>
-            <a:endParaRPr lang="en-US" sz="1800" b="0" strike="noStrike" spc="-1">
-              <a:solidFill>
-                <a:srgbClr val="000000"/>
-              </a:solidFill>
-              <a:uFill>
-                <a:solidFill>
-                  <a:srgbClr val="FFFFFF"/>
-                </a:solidFill>
-              </a:uFill>
-              <a:latin typeface="Arial"/>
-            </a:endParaRPr>
-          </a:p>
-          <a:p>
-            <a:pPr marL="377280" lvl="3" indent="-198360">
-              <a:lnSpc>
-                <a:spcPct val="100000"/>
-              </a:lnSpc>
-              <a:buClr>
-                <a:srgbClr val="4E67C8"/>
-              </a:buClr>
-              <a:buSzPct val="80000"/>
-              <a:buFont typeface="Wingdings 2" charset="2"/>
-              <a:buChar char=""/>
-            </a:pPr>
-            <a:r>
-              <a:rPr lang="en-US" sz="1500" b="0" strike="noStrike" spc="-1">
-                <a:solidFill>
-                  <a:srgbClr val="404040"/>
-                </a:solidFill>
-                <a:uFill>
-                  <a:solidFill>
-                    <a:srgbClr val="FFFFFF"/>
-                  </a:solidFill>
-                </a:uFill>
-                <a:latin typeface="Calibri"/>
-              </a:rPr>
-              <a:t>Screen Captures</a:t>
-            </a:r>
-            <a:endParaRPr lang="en-US" sz="1800" b="0" strike="noStrike" spc="-1">
-              <a:solidFill>
-                <a:srgbClr val="000000"/>
-              </a:solidFill>
-              <a:uFill>
-                <a:solidFill>
-                  <a:srgbClr val="FFFFFF"/>
-                </a:solidFill>
-              </a:uFill>
-              <a:latin typeface="Arial"/>
-            </a:endParaRPr>
-          </a:p>
-          <a:p>
-            <a:pPr marL="377280" lvl="3" indent="-198360">
-              <a:lnSpc>
-                <a:spcPct val="100000"/>
-              </a:lnSpc>
-              <a:buClr>
-                <a:srgbClr val="4E67C8"/>
-              </a:buClr>
-              <a:buSzPct val="80000"/>
-              <a:buFont typeface="Wingdings 2" charset="2"/>
-              <a:buChar char=""/>
-            </a:pPr>
-            <a:r>
-              <a:rPr lang="en-US" sz="1500" b="0" strike="noStrike" spc="-1">
-                <a:solidFill>
-                  <a:srgbClr val="404040"/>
-                </a:solidFill>
-                <a:uFill>
-                  <a:solidFill>
-                    <a:srgbClr val="FFFFFF"/>
-                  </a:solidFill>
-                </a:uFill>
-                <a:latin typeface="Calibri"/>
-              </a:rPr>
-              <a:t>Etc.</a:t>
-            </a:r>
-            <a:endParaRPr lang="en-US" sz="1800" b="0" strike="noStrike" spc="-1">
-              <a:solidFill>
-                <a:srgbClr val="000000"/>
-              </a:solidFill>
-              <a:uFill>
-                <a:solidFill>
-                  <a:srgbClr val="FFFFFF"/>
-                </a:solidFill>
-              </a:uFill>
-              <a:latin typeface="Arial"/>
-            </a:endParaRPr>
-          </a:p>
-          <a:p>
-            <a:pPr marL="199080" indent="-198360">
-              <a:lnSpc>
-                <a:spcPct val="100000"/>
-              </a:lnSpc>
-              <a:buClr>
-                <a:srgbClr val="4E67C8"/>
-              </a:buClr>
-              <a:buFont typeface="Wingdings 2" charset="2"/>
-              <a:buChar char=""/>
-            </a:pPr>
-            <a:r>
-              <a:rPr lang="en-US" sz="2000" b="0" strike="noStrike" spc="-1">
-                <a:solidFill>
-                  <a:srgbClr val="404040"/>
-                </a:solidFill>
-                <a:uFill>
-                  <a:solidFill>
-                    <a:srgbClr val="FFFFFF"/>
-                  </a:solidFill>
-                </a:uFill>
-                <a:latin typeface="Calibri"/>
-              </a:rPr>
-              <a:t>Presenters – duplicate this slide as many times as needed</a:t>
-            </a:r>
-            <a:endParaRPr lang="en-US" sz="1800" b="0" strike="noStrike" spc="-1">
-              <a:solidFill>
-                <a:srgbClr val="000000"/>
-              </a:solidFill>
-              <a:uFill>
-                <a:solidFill>
-                  <a:srgbClr val="FFFFFF"/>
-                </a:solidFill>
-              </a:uFill>
-              <a:latin typeface="Arial"/>
-            </a:endParaRPr>
-          </a:p>
-          <a:p>
             <a:pPr>
               <a:lnSpc>
                 <a:spcPct val="90000"/>
               </a:lnSpc>
             </a:pPr>
-            <a:endParaRPr lang="en-US" sz="1800" b="0" strike="noStrike" spc="-1">
+            <a:endParaRPr lang="en-US" sz="1800" b="0" strike="noStrike" spc="-1" dirty="0">
               <a:solidFill>
                 <a:srgbClr val="000000"/>
               </a:solidFill>
@@ -30461,7 +29988,7 @@
               </a:lnSpc>
             </a:pPr>
             <a:r>
-              <a:rPr lang="en-US" sz="4800" spc="-46" dirty="0">
+              <a:rPr lang="en-US" sz="4800" spc="-46" dirty="0" smtClean="0">
                 <a:solidFill>
                   <a:srgbClr val="31489F"/>
                 </a:solidFill>
@@ -30472,7 +29999,7 @@
                 </a:uFill>
                 <a:latin typeface="Calibri Light"/>
               </a:rPr>
-              <a:t>Closure Query Example</a:t>
+              <a:t>Groovy Closures and Delegation</a:t>
             </a:r>
             <a:endParaRPr lang="en-US" sz="4800" spc="-1" dirty="0">
               <a:solidFill>
@@ -30532,8 +30059,54 @@
               <a:buFont typeface="Wingdings 2" charset="2"/>
               <a:buChar char=""/>
             </a:pPr>
-            <a:r>
-              <a:rPr lang="en-US" sz="2000" b="0" strike="noStrike" spc="-1">
+            <a:endParaRPr lang="en-US" sz="2000" b="0" strike="noStrike" spc="-1" dirty="0" smtClean="0">
+              <a:solidFill>
+                <a:srgbClr val="404040"/>
+              </a:solidFill>
+              <a:uFill>
+                <a:solidFill>
+                  <a:srgbClr val="FFFFFF"/>
+                </a:solidFill>
+              </a:uFill>
+              <a:latin typeface="Calibri"/>
+            </a:endParaRPr>
+          </a:p>
+          <a:p>
+            <a:pPr marL="199080" indent="-198360">
+              <a:lnSpc>
+                <a:spcPct val="100000"/>
+              </a:lnSpc>
+              <a:buClr>
+                <a:srgbClr val="4E67C8"/>
+              </a:buClr>
+              <a:buFont typeface="Wingdings 2" charset="2"/>
+              <a:buChar char=""/>
+            </a:pPr>
+            <a:endParaRPr lang="en-US" sz="2000" spc="-1" dirty="0">
+              <a:solidFill>
+                <a:srgbClr val="404040"/>
+              </a:solidFill>
+              <a:uFill>
+                <a:solidFill>
+                  <a:srgbClr val="FFFFFF"/>
+                </a:solidFill>
+              </a:uFill>
+              <a:latin typeface="Calibri"/>
+            </a:endParaRPr>
+          </a:p>
+          <a:p>
+            <a:pPr marL="199080" indent="-198360">
+              <a:lnSpc>
+                <a:spcPct val="100000"/>
+              </a:lnSpc>
+              <a:buClr>
+                <a:srgbClr val="4E67C8"/>
+              </a:buClr>
+              <a:buFont typeface="Wingdings 2" charset="2"/>
+              <a:buChar char=""/>
+            </a:pPr>
+            <a:r>
+              <a:rPr lang="en-US" sz="2000" b="0" strike="noStrike" spc="-1" dirty="0" smtClean="0">
                 <a:solidFill>
                   <a:srgbClr val="404040"/>
                 </a:solidFill>
@@ -30544,34 +30117,19 @@
                 </a:uFill>
                 <a:latin typeface="Calibri"/>
               </a:rPr>
-              <a:t>Presentation Text</a:t>
-            </a:r>
-            <a:endParaRPr lang="en-US" sz="1800" b="0" strike="noStrike" spc="-1">
-              <a:solidFill>
-                <a:srgbClr val="000000"/>
-              </a:solidFill>
-              <a:uFill>
-                <a:solidFill>
-                  <a:srgbClr val="FFFFFF"/>
-                </a:solidFill>
-              </a:uFill>
-              <a:latin typeface="Arial"/>
-            </a:endParaRPr>
-          </a:p>
-          <a:p>
-            <a:pPr marL="377280" lvl="3" indent="-198360">
-              <a:lnSpc>
-                <a:spcPct val="100000"/>
-              </a:lnSpc>
+              <a:t>Closures</a:t>
+            </a:r>
+          </a:p>
+          <a:p>
+            <a:pPr marL="656280" lvl="1" indent="-198360">
               <a:buClr>
                 <a:srgbClr val="4E67C8"/>
               </a:buClr>
-              <a:buSzPct val="80000"/>
               <a:buFont typeface="Wingdings 2" charset="2"/>
               <a:buChar char=""/>
             </a:pPr>
             <a:r>
-              <a:rPr lang="en-US" sz="1500" b="0" strike="noStrike" spc="-1">
+              <a:rPr lang="en-US" sz="2000" b="0" strike="noStrike" spc="-1" dirty="0" smtClean="0">
                 <a:solidFill>
                   <a:srgbClr val="404040"/>
                 </a:solidFill>
@@ -30582,63 +30140,77 @@
                 </a:uFill>
                 <a:latin typeface="Calibri"/>
               </a:rPr>
-              <a:t>Screen Captures</a:t>
-            </a:r>
-            <a:endParaRPr lang="en-US" sz="1800" b="0" strike="noStrike" spc="-1">
-              <a:solidFill>
-                <a:srgbClr val="000000"/>
-              </a:solidFill>
-              <a:uFill>
-                <a:solidFill>
-                  <a:srgbClr val="FFFFFF"/>
-                </a:solidFill>
-              </a:uFill>
-              <a:latin typeface="Arial"/>
-            </a:endParaRPr>
-          </a:p>
-          <a:p>
-            <a:pPr marL="377280" lvl="3" indent="-198360">
-              <a:lnSpc>
-                <a:spcPct val="100000"/>
-              </a:lnSpc>
+              <a:t>They are functions that can be used like all other variables</a:t>
+            </a:r>
+          </a:p>
+          <a:p>
+            <a:pPr marL="656280" lvl="1" indent="-198360">
               <a:buClr>
                 <a:srgbClr val="4E67C8"/>
               </a:buClr>
-              <a:buSzPct val="80000"/>
               <a:buFont typeface="Wingdings 2" charset="2"/>
               <a:buChar char=""/>
             </a:pPr>
-            <a:r>
-              <a:rPr lang="en-US" sz="1500" b="0" strike="noStrike" spc="-1">
-                <a:solidFill>
-                  <a:srgbClr val="404040"/>
+            <a:endParaRPr lang="en-US" sz="2000" spc="-1" dirty="0">
+              <a:solidFill>
+                <a:srgbClr val="404040"/>
+              </a:solidFill>
+              <a:uFill>
+                <a:solidFill>
+                  <a:srgbClr val="FFFFFF"/>
+                </a:solidFill>
+              </a:uFill>
+              <a:latin typeface="Calibri"/>
+            </a:endParaRPr>
+          </a:p>
+          <a:p>
+            <a:pPr marL="656280" lvl="1" indent="-198360">
+              <a:buClr>
+                <a:srgbClr val="4E67C8"/>
+              </a:buClr>
+              <a:buFont typeface="Wingdings 2" charset="2"/>
+              <a:buChar char=""/>
+            </a:pPr>
+            <a:endParaRPr lang="en-US" b="0" strike="noStrike" spc="-1" dirty="0" smtClean="0">
+              <a:solidFill>
+                <a:srgbClr val="000000"/>
+              </a:solidFill>
+              <a:uFill>
+                <a:solidFill>
+                  <a:srgbClr val="FFFFFF"/>
+                </a:solidFill>
+              </a:uFill>
+              <a:latin typeface="Arial"/>
+            </a:endParaRPr>
+          </a:p>
+          <a:p>
+            <a:pPr marL="199080" indent="-198360">
+              <a:lnSpc>
+                <a:spcPct val="100000"/>
+              </a:lnSpc>
+              <a:buClr>
+                <a:srgbClr val="4E67C8"/>
+              </a:buClr>
+              <a:buFont typeface="Wingdings 2" charset="2"/>
+              <a:buChar char=""/>
+            </a:pPr>
+            <a:r>
+              <a:rPr lang="en-US" sz="1800" b="0" strike="noStrike" spc="-1" dirty="0" smtClean="0">
+                <a:solidFill>
+                  <a:srgbClr val="000000"/>
                 </a:solidFill>
                 <a:uFill>
                   <a:solidFill>
                     <a:srgbClr val="FFFFFF"/>
                   </a:solidFill>
                 </a:uFill>
-                <a:latin typeface="Calibri"/>
-              </a:rPr>
-              <a:t>Etc.</a:t>
-            </a:r>
-            <a:endParaRPr lang="en-US" sz="1800" b="0" strike="noStrike" spc="-1">
-              <a:solidFill>
-                <a:srgbClr val="000000"/>
-              </a:solidFill>
-              <a:uFill>
-                <a:solidFill>
-                  <a:srgbClr val="FFFFFF"/>
-                </a:solidFill>
-              </a:uFill>
-              <a:latin typeface="Arial"/>
-            </a:endParaRPr>
-          </a:p>
-          <a:p>
-            <a:pPr marL="199080" indent="-198360">
-              <a:lnSpc>
-                <a:spcPct val="100000"/>
-              </a:lnSpc>
+                <a:latin typeface="Arial"/>
+              </a:rPr>
+              <a:t>Delegates</a:t>
+            </a:r>
+          </a:p>
+          <a:p>
+            <a:pPr marL="656280" lvl="1" indent="-198360">
               <a:buClr>
                 <a:srgbClr val="4E67C8"/>
               </a:buClr>
@@ -30646,20 +30218,52 @@
               <a:buChar char=""/>
             </a:pPr>
             <a:r>
-              <a:rPr lang="en-US" sz="2000" b="0" strike="noStrike" spc="-1">
-                <a:solidFill>
-                  <a:srgbClr val="404040"/>
+              <a:rPr lang="en-US" spc="-1" dirty="0" smtClean="0">
+                <a:solidFill>
+                  <a:srgbClr val="000000"/>
                 </a:solidFill>
                 <a:uFill>
                   <a:solidFill>
                     <a:srgbClr val="FFFFFF"/>
                   </a:solidFill>
                 </a:uFill>
-                <a:latin typeface="Calibri"/>
-              </a:rPr>
-              <a:t>Presenters – duplicate this slide as many times as needed</a:t>
-            </a:r>
-            <a:endParaRPr lang="en-US" sz="1800" b="0" strike="noStrike" spc="-1">
+                <a:latin typeface="Arial"/>
+              </a:rPr>
+              <a:t>A Groovy method (i.e. a block of Groovy Code) can reference things that don’t exist at the time the code was compiled.</a:t>
+            </a:r>
+          </a:p>
+          <a:p>
+            <a:pPr marL="656280" lvl="1" indent="-198360">
+              <a:buClr>
+                <a:srgbClr val="4E67C8"/>
+              </a:buClr>
+              <a:buFont typeface="Wingdings 2" charset="2"/>
+              <a:buChar char=""/>
+            </a:pPr>
+            <a:r>
+              <a:rPr lang="en-US" spc="-1" dirty="0" smtClean="0">
+                <a:solidFill>
+                  <a:srgbClr val="000000"/>
+                </a:solidFill>
+                <a:uFill>
+                  <a:solidFill>
+                    <a:srgbClr val="FFFFFF"/>
+                  </a:solidFill>
+                </a:uFill>
+                <a:latin typeface="Arial"/>
+              </a:rPr>
+              <a:t>You can specify that it look for the missing methods and properties in another object, called the delegate.</a:t>
+            </a:r>
+          </a:p>
+          <a:p>
+            <a:pPr marL="656280" lvl="1" indent="-198360">
+              <a:buClr>
+                <a:srgbClr val="4E67C8"/>
+              </a:buClr>
+              <a:buFont typeface="Wingdings 2" charset="2"/>
+              <a:buChar char=""/>
+            </a:pPr>
+            <a:endParaRPr lang="en-US" b="0" strike="noStrike" spc="-1" dirty="0" smtClean="0">
               <a:solidFill>
                 <a:srgbClr val="000000"/>
               </a:solidFill>
@@ -30677,7 +30281,7 @@
                 <a:spcPct val="90000"/>
               </a:lnSpc>
             </a:pPr>
-            <a:endParaRPr lang="en-US" sz="1800" b="0" strike="noStrike" spc="-1">
+            <a:endParaRPr lang="en-US" sz="1800" b="0" strike="noStrike" spc="-1" dirty="0">
               <a:solidFill>
                 <a:srgbClr val="000000"/>
               </a:solidFill>
@@ -30856,7 +30460,7 @@
               </a:lnSpc>
             </a:pPr>
             <a:r>
-              <a:rPr lang="en-US" sz="4800" b="0" strike="noStrike" spc="-46">
+              <a:rPr lang="en-US" sz="4800" b="0" strike="noStrike" spc="-46" dirty="0" smtClean="0">
                 <a:solidFill>
                   <a:srgbClr val="31489F"/>
                 </a:solidFill>
@@ -30867,9 +30471,9 @@
                 </a:uFill>
                 <a:latin typeface="Calibri Light"/>
               </a:rPr>
-              <a:t>Slide Heading Here</a:t>
-            </a:r>
-            <a:endParaRPr lang="en-US" sz="1800" b="0" strike="noStrike" spc="-1">
+              <a:t>Builders</a:t>
+            </a:r>
+            <a:endParaRPr lang="en-US" sz="1800" b="0" strike="noStrike" spc="-1" dirty="0">
               <a:solidFill>
                 <a:srgbClr val="000000"/>
               </a:solidFill>
@@ -30892,7 +30496,7 @@
         <p:spPr>
           <a:xfrm>
             <a:off x="822960" y="1845720"/>
-            <a:ext cx="7543080" cy="4022640"/>
+            <a:ext cx="7543080" cy="768171"/>
           </a:xfrm>
           <a:prstGeom prst="rect">
             <a:avLst/>
@@ -30929,7 +30533,7 @@
               <a:buChar char=""/>
             </a:pPr>
             <a:r>
-              <a:rPr lang="en-US" sz="2000" b="0" strike="noStrike" spc="-1">
+              <a:rPr lang="en-US" sz="2000" b="0" strike="noStrike" spc="-1" dirty="0" smtClean="0">
                 <a:solidFill>
                   <a:srgbClr val="404040"/>
                 </a:solidFill>
@@ -30940,34 +30544,10 @@
                 </a:uFill>
                 <a:latin typeface="Calibri"/>
               </a:rPr>
-              <a:t>Presentation Text</a:t>
-            </a:r>
-            <a:endParaRPr lang="en-US" sz="1800" b="0" strike="noStrike" spc="-1">
-              <a:solidFill>
-                <a:srgbClr val="000000"/>
-              </a:solidFill>
-              <a:uFill>
-                <a:solidFill>
-                  <a:srgbClr val="FFFFFF"/>
-                </a:solidFill>
-              </a:uFill>
-              <a:latin typeface="Arial"/>
-            </a:endParaRPr>
-          </a:p>
-          <a:p>
-            <a:pPr marL="377280" lvl="3" indent="-198360">
-              <a:lnSpc>
-                <a:spcPct val="100000"/>
-              </a:lnSpc>
-              <a:buClr>
-                <a:srgbClr val="4E67C8"/>
-              </a:buClr>
-              <a:buSzPct val="80000"/>
-              <a:buFont typeface="Wingdings 2" charset="2"/>
-              <a:buChar char=""/>
-            </a:pPr>
-            <a:r>
-              <a:rPr lang="en-US" sz="1500" b="0" strike="noStrike" spc="-1">
+              <a:t>Instance of </a:t>
+            </a:r>
+            <a:r>
+              <a:rPr lang="en-US" sz="2000" b="0" strike="noStrike" spc="-1" dirty="0" err="1" smtClean="0">
                 <a:solidFill>
                   <a:srgbClr val="404040"/>
                 </a:solidFill>
@@ -30978,9 +30558,9 @@
                 </a:uFill>
                 <a:latin typeface="Calibri"/>
               </a:rPr>
-              <a:t>Screen Captures</a:t>
-            </a:r>
-            <a:endParaRPr lang="en-US" sz="1800" b="0" strike="noStrike" spc="-1">
+              <a:t>groovy.util.BuilderSupport</a:t>
+            </a:r>
+            <a:endParaRPr lang="en-US" sz="1800" b="0" strike="noStrike" spc="-1" dirty="0">
               <a:solidFill>
                 <a:srgbClr val="000000"/>
               </a:solidFill>
@@ -30993,42 +30573,30 @@
             </a:endParaRPr>
           </a:p>
           <a:p>
-            <a:pPr marL="377280" lvl="3" indent="-198360">
+            <a:pPr marL="199080" indent="-198360">
               <a:lnSpc>
                 <a:spcPct val="100000"/>
               </a:lnSpc>
               <a:buClr>
                 <a:srgbClr val="4E67C8"/>
               </a:buClr>
-              <a:buSzPct val="80000"/>
               <a:buFont typeface="Wingdings 2" charset="2"/>
               <a:buChar char=""/>
             </a:pPr>
             <a:r>
-              <a:rPr lang="en-US" sz="1500" b="0" strike="noStrike" spc="-1">
-                <a:solidFill>
-                  <a:srgbClr val="404040"/>
+              <a:rPr lang="en-US" sz="1800" b="0" strike="noStrike" spc="-1" dirty="0" smtClean="0">
+                <a:solidFill>
+                  <a:srgbClr val="000000"/>
                 </a:solidFill>
                 <a:uFill>
                   <a:solidFill>
                     <a:srgbClr val="FFFFFF"/>
                   </a:solidFill>
                 </a:uFill>
-                <a:latin typeface="Calibri"/>
-              </a:rPr>
-              <a:t>Etc.</a:t>
-            </a:r>
-            <a:endParaRPr lang="en-US" sz="1800" b="0" strike="noStrike" spc="-1">
-              <a:solidFill>
-                <a:srgbClr val="000000"/>
-              </a:solidFill>
-              <a:uFill>
-                <a:solidFill>
-                  <a:srgbClr val="FFFFFF"/>
-                </a:solidFill>
-              </a:uFill>
-              <a:latin typeface="Arial"/>
-            </a:endParaRPr>
+                <a:latin typeface="Arial"/>
+              </a:rPr>
+              <a:t>Keep track of the tree structure implicit within Groovy code</a:t>
+            </a:r>
           </a:p>
           <a:p>
             <a:pPr marL="199080" indent="-198360">
@@ -31041,21 +30609,7 @@
               <a:buFont typeface="Wingdings 2" charset="2"/>
               <a:buChar char=""/>
             </a:pPr>
-            <a:r>
-              <a:rPr lang="en-US" sz="2000" b="0" strike="noStrike" spc="-1">
-                <a:solidFill>
-                  <a:srgbClr val="404040"/>
-                </a:solidFill>
-                <a:uFill>
-                  <a:solidFill>
-                    <a:srgbClr val="FFFFFF"/>
-                  </a:solidFill>
-                </a:uFill>
-                <a:latin typeface="Calibri"/>
-              </a:rPr>
-              <a:t>Presenters – duplicate this slide as many times as needed</a:t>
-            </a:r>
-            <a:endParaRPr lang="en-US" sz="1800" b="0" strike="noStrike" spc="-1">
+            <a:endParaRPr lang="en-US" spc="-1" dirty="0">
               <a:solidFill>
                 <a:srgbClr val="000000"/>
               </a:solidFill>
@@ -31068,12 +30622,33 @@
             </a:endParaRPr>
           </a:p>
           <a:p>
+            <a:pPr marL="720">
+              <a:lnSpc>
+                <a:spcPct val="100000"/>
+              </a:lnSpc>
+              <a:buClr>
+                <a:srgbClr val="4E67C8"/>
+              </a:buClr>
+            </a:pPr>
+            <a:endParaRPr lang="en-US" sz="1800" b="0" strike="noStrike" spc="-1" dirty="0">
+              <a:solidFill>
+                <a:srgbClr val="000000"/>
+              </a:solidFill>
+              <a:uFill>
+                <a:solidFill>
+                  <a:srgbClr val="FFFFFF"/>
+                </a:solidFill>
+              </a:uFill>
+              <a:latin typeface="Arial"/>
+            </a:endParaRPr>
+          </a:p>
+          <a:p>
             <a:pPr>
               <a:lnSpc>
                 <a:spcPct val="90000"/>
               </a:lnSpc>
             </a:pPr>
-            <a:endParaRPr lang="en-US" sz="1800" b="0" strike="noStrike" spc="-1">
+            <a:endParaRPr lang="en-US" sz="1800" b="0" strike="noStrike" spc="-1" dirty="0">
               <a:solidFill>
                 <a:srgbClr val="000000"/>
               </a:solidFill>
@@ -31143,6 +30718,834 @@
               <a:t>SICAS Summit 2017, Villa Roma</a:t>
             </a:r>
             <a:endParaRPr lang="en-US" sz="1800" b="0" strike="noStrike" spc="-1">
+              <a:solidFill>
+                <a:srgbClr val="000000"/>
+              </a:solidFill>
+              <a:uFill>
+                <a:solidFill>
+                  <a:srgbClr val="FFFFFF"/>
+                </a:solidFill>
+              </a:uFill>
+              <a:latin typeface="Arial"/>
+            </a:endParaRPr>
+          </a:p>
+        </p:txBody>
+      </p:sp>
+      <p:sp>
+        <p:nvSpPr>
+          <p:cNvPr id="2" name="Rectangle 1"/>
+          <p:cNvSpPr>
+            <a:spLocks noChangeArrowheads="1"/>
+          </p:cNvSpPr>
+          <p:nvPr/>
+        </p:nvSpPr>
+        <p:spPr bwMode="auto">
+          <a:xfrm>
+            <a:off x="822960" y="2689974"/>
+            <a:ext cx="7250703" cy="1680539"/>
+          </a:xfrm>
+          <a:prstGeom prst="rect">
+            <a:avLst/>
+          </a:prstGeom>
+          <a:solidFill>
+            <a:schemeClr val="tx1"/>
+          </a:solidFill>
+          <a:ln>
+            <a:noFill/>
+          </a:ln>
+          <a:effectLst/>
+        </p:spPr>
+        <p:txBody>
+          <a:bodyPr vert="horz" wrap="none" lIns="91440" tIns="155526" rIns="91440" bIns="45720" numCol="1" anchor="ctr" anchorCtr="0" compatLnSpc="1">
+            <a:prstTxWarp prst="textNoShape">
+              <a:avLst/>
+            </a:prstTxWarp>
+            <a:spAutoFit/>
+          </a:bodyPr>
+          <a:lstStyle/>
+          <a:p>
+            <a:pPr marL="0" marR="0" lvl="0" indent="0" algn="l" defTabSz="914400" rtl="0" eaLnBrk="0" fontAlgn="base" latinLnBrk="0" hangingPunct="0">
+              <a:lnSpc>
+                <a:spcPct val="100000"/>
+              </a:lnSpc>
+              <a:spcBef>
+                <a:spcPct val="0"/>
+              </a:spcBef>
+              <a:spcAft>
+                <a:spcPct val="0"/>
+              </a:spcAft>
+              <a:buClrTx/>
+              <a:buSzTx/>
+              <a:buFontTx/>
+              <a:buNone/>
+              <a:tabLst/>
+            </a:pPr>
+            <a:r>
+              <a:rPr kumimoji="0" lang="en-GB" altLang="en-US" sz="1200" b="0" i="0" u="none" strike="noStrike" cap="none" normalizeH="0" baseline="0" dirty="0" smtClean="0">
+                <a:ln>
+                  <a:noFill/>
+                </a:ln>
+                <a:solidFill>
+                  <a:srgbClr val="FFFFFF"/>
+                </a:solidFill>
+                <a:effectLst/>
+                <a:latin typeface="Courier New" panose="02070309020205020404" pitchFamily="49" charset="0"/>
+                <a:cs typeface="Courier New" panose="02070309020205020404" pitchFamily="49" charset="0"/>
+              </a:rPr>
+              <a:t>report(title: </a:t>
+            </a:r>
+            <a:r>
+              <a:rPr kumimoji="0" lang="en-GB" altLang="en-US" sz="1200" b="0" i="0" u="none" strike="noStrike" cap="none" normalizeH="0" baseline="0" dirty="0" smtClean="0">
+                <a:ln>
+                  <a:noFill/>
+                </a:ln>
+                <a:solidFill>
+                  <a:srgbClr val="FFA07A"/>
+                </a:solidFill>
+                <a:effectLst/>
+                <a:latin typeface="Courier New" panose="02070309020205020404" pitchFamily="49" charset="0"/>
+                <a:cs typeface="Courier New" panose="02070309020205020404" pitchFamily="49" charset="0"/>
+              </a:rPr>
+              <a:t>"Sample report"</a:t>
+            </a:r>
+            <a:r>
+              <a:rPr kumimoji="0" lang="en-GB" altLang="en-US" sz="1200" b="0" i="0" u="none" strike="noStrike" cap="none" normalizeH="0" baseline="0" dirty="0" smtClean="0">
+                <a:ln>
+                  <a:noFill/>
+                </a:ln>
+                <a:solidFill>
+                  <a:srgbClr val="FFFFFF"/>
+                </a:solidFill>
+                <a:effectLst/>
+                <a:latin typeface="Courier New" panose="02070309020205020404" pitchFamily="49" charset="0"/>
+                <a:cs typeface="Courier New" panose="02070309020205020404" pitchFamily="49" charset="0"/>
+              </a:rPr>
+              <a:t>) { </a:t>
+            </a:r>
+          </a:p>
+          <a:p>
+            <a:pPr marL="0" marR="0" lvl="0" indent="0" algn="l" defTabSz="914400" rtl="0" eaLnBrk="0" fontAlgn="base" latinLnBrk="0" hangingPunct="0">
+              <a:lnSpc>
+                <a:spcPct val="100000"/>
+              </a:lnSpc>
+              <a:spcBef>
+                <a:spcPct val="0"/>
+              </a:spcBef>
+              <a:spcAft>
+                <a:spcPct val="0"/>
+              </a:spcAft>
+              <a:buClrTx/>
+              <a:buSzTx/>
+              <a:buFontTx/>
+              <a:buNone/>
+              <a:tabLst/>
+            </a:pPr>
+            <a:r>
+              <a:rPr lang="en-GB" altLang="en-US" sz="1200" dirty="0">
+                <a:solidFill>
+                  <a:srgbClr val="FFFFFF"/>
+                </a:solidFill>
+                <a:latin typeface="Courier New" panose="02070309020205020404" pitchFamily="49" charset="0"/>
+                <a:cs typeface="Courier New" panose="02070309020205020404" pitchFamily="49" charset="0"/>
+              </a:rPr>
+              <a:t> </a:t>
+            </a:r>
+            <a:r>
+              <a:rPr lang="en-GB" altLang="en-US" sz="1200" dirty="0" smtClean="0">
+                <a:solidFill>
+                  <a:srgbClr val="FFFFFF"/>
+                </a:solidFill>
+                <a:latin typeface="Courier New" panose="02070309020205020404" pitchFamily="49" charset="0"/>
+                <a:cs typeface="Courier New" panose="02070309020205020404" pitchFamily="49" charset="0"/>
+              </a:rPr>
+              <a:t> </a:t>
+            </a:r>
+            <a:r>
+              <a:rPr kumimoji="0" lang="en-GB" altLang="en-US" sz="1200" b="0" i="0" u="none" strike="noStrike" cap="none" normalizeH="0" baseline="0" dirty="0" smtClean="0">
+                <a:ln>
+                  <a:noFill/>
+                </a:ln>
+                <a:solidFill>
+                  <a:srgbClr val="00FF00"/>
+                </a:solidFill>
+                <a:effectLst/>
+                <a:latin typeface="Courier New" panose="02070309020205020404" pitchFamily="49" charset="0"/>
+                <a:cs typeface="Courier New" panose="02070309020205020404" pitchFamily="49" charset="0"/>
+              </a:rPr>
+              <a:t>// When this closure executes, the parent node will be the object created</a:t>
+            </a:r>
+            <a:r>
+              <a:rPr kumimoji="0" lang="en-GB" altLang="en-US" sz="1200" b="0" i="0" u="none" strike="noStrike" cap="none" normalizeH="0" baseline="0" dirty="0" smtClean="0">
+                <a:ln>
+                  <a:noFill/>
+                </a:ln>
+                <a:solidFill>
+                  <a:srgbClr val="FFFFFF"/>
+                </a:solidFill>
+                <a:effectLst/>
+                <a:latin typeface="Courier New" panose="02070309020205020404" pitchFamily="49" charset="0"/>
+                <a:cs typeface="Courier New" panose="02070309020205020404" pitchFamily="49" charset="0"/>
+              </a:rPr>
+              <a:t> </a:t>
+            </a:r>
+          </a:p>
+          <a:p>
+            <a:pPr marL="0" marR="0" lvl="0" indent="0" algn="l" defTabSz="914400" rtl="0" eaLnBrk="0" fontAlgn="base" latinLnBrk="0" hangingPunct="0">
+              <a:lnSpc>
+                <a:spcPct val="100000"/>
+              </a:lnSpc>
+              <a:spcBef>
+                <a:spcPct val="0"/>
+              </a:spcBef>
+              <a:spcAft>
+                <a:spcPct val="0"/>
+              </a:spcAft>
+              <a:buClrTx/>
+              <a:buSzTx/>
+              <a:buFontTx/>
+              <a:buNone/>
+              <a:tabLst/>
+            </a:pPr>
+            <a:r>
+              <a:rPr lang="en-GB" altLang="en-US" sz="1200" dirty="0">
+                <a:solidFill>
+                  <a:srgbClr val="FFFFFF"/>
+                </a:solidFill>
+                <a:latin typeface="Courier New" panose="02070309020205020404" pitchFamily="49" charset="0"/>
+                <a:cs typeface="Courier New" panose="02070309020205020404" pitchFamily="49" charset="0"/>
+              </a:rPr>
+              <a:t> </a:t>
+            </a:r>
+            <a:r>
+              <a:rPr lang="en-GB" altLang="en-US" sz="1200" dirty="0" smtClean="0">
+                <a:solidFill>
+                  <a:srgbClr val="FFFFFF"/>
+                </a:solidFill>
+                <a:latin typeface="Courier New" panose="02070309020205020404" pitchFamily="49" charset="0"/>
+                <a:cs typeface="Courier New" panose="02070309020205020404" pitchFamily="49" charset="0"/>
+              </a:rPr>
+              <a:t> </a:t>
+            </a:r>
+            <a:r>
+              <a:rPr kumimoji="0" lang="en-GB" altLang="en-US" sz="1200" b="0" i="0" u="none" strike="noStrike" cap="none" normalizeH="0" baseline="0" dirty="0" smtClean="0">
+                <a:ln>
+                  <a:noFill/>
+                </a:ln>
+                <a:solidFill>
+                  <a:srgbClr val="00FF00"/>
+                </a:solidFill>
+                <a:effectLst/>
+                <a:latin typeface="Courier New" panose="02070309020205020404" pitchFamily="49" charset="0"/>
+                <a:cs typeface="Courier New" panose="02070309020205020404" pitchFamily="49" charset="0"/>
+              </a:rPr>
+              <a:t>// by the report method.</a:t>
+            </a:r>
+            <a:r>
+              <a:rPr kumimoji="0" lang="en-GB" altLang="en-US" sz="1200" b="0" i="0" u="none" strike="noStrike" cap="none" normalizeH="0" baseline="0" dirty="0" smtClean="0">
+                <a:ln>
+                  <a:noFill/>
+                </a:ln>
+                <a:solidFill>
+                  <a:srgbClr val="FFFFFF"/>
+                </a:solidFill>
+                <a:effectLst/>
+                <a:latin typeface="Courier New" panose="02070309020205020404" pitchFamily="49" charset="0"/>
+                <a:cs typeface="Courier New" panose="02070309020205020404" pitchFamily="49" charset="0"/>
+              </a:rPr>
+              <a:t> </a:t>
+            </a:r>
+          </a:p>
+          <a:p>
+            <a:pPr marL="0" marR="0" lvl="0" indent="0" algn="l" defTabSz="914400" rtl="0" eaLnBrk="0" fontAlgn="base" latinLnBrk="0" hangingPunct="0">
+              <a:lnSpc>
+                <a:spcPct val="100000"/>
+              </a:lnSpc>
+              <a:spcBef>
+                <a:spcPct val="0"/>
+              </a:spcBef>
+              <a:spcAft>
+                <a:spcPct val="0"/>
+              </a:spcAft>
+              <a:buClrTx/>
+              <a:buSzTx/>
+              <a:buFontTx/>
+              <a:buNone/>
+              <a:tabLst/>
+            </a:pPr>
+            <a:r>
+              <a:rPr lang="en-GB" altLang="en-US" sz="1200" dirty="0">
+                <a:solidFill>
+                  <a:srgbClr val="FFFFFF"/>
+                </a:solidFill>
+                <a:latin typeface="Courier New" panose="02070309020205020404" pitchFamily="49" charset="0"/>
+                <a:cs typeface="Courier New" panose="02070309020205020404" pitchFamily="49" charset="0"/>
+              </a:rPr>
+              <a:t> </a:t>
+            </a:r>
+            <a:r>
+              <a:rPr lang="en-GB" altLang="en-US" sz="1200" dirty="0" smtClean="0">
+                <a:solidFill>
+                  <a:srgbClr val="FFFFFF"/>
+                </a:solidFill>
+                <a:latin typeface="Courier New" panose="02070309020205020404" pitchFamily="49" charset="0"/>
+                <a:cs typeface="Courier New" panose="02070309020205020404" pitchFamily="49" charset="0"/>
+              </a:rPr>
+              <a:t> </a:t>
+            </a:r>
+            <a:r>
+              <a:rPr kumimoji="0" lang="en-GB" altLang="en-US" sz="1200" b="0" i="0" u="none" strike="noStrike" cap="none" normalizeH="0" baseline="0" dirty="0" err="1" smtClean="0">
+                <a:ln>
+                  <a:noFill/>
+                </a:ln>
+                <a:solidFill>
+                  <a:srgbClr val="FFFFFF"/>
+                </a:solidFill>
+                <a:effectLst/>
+                <a:latin typeface="Courier New" panose="02070309020205020404" pitchFamily="49" charset="0"/>
+                <a:cs typeface="Courier New" panose="02070309020205020404" pitchFamily="49" charset="0"/>
+              </a:rPr>
+              <a:t>param</a:t>
+            </a:r>
+            <a:r>
+              <a:rPr kumimoji="0" lang="en-GB" altLang="en-US" sz="1200" b="0" i="0" u="none" strike="noStrike" cap="none" normalizeH="0" baseline="0" dirty="0" smtClean="0">
+                <a:ln>
+                  <a:noFill/>
+                </a:ln>
+                <a:solidFill>
+                  <a:srgbClr val="FFFFFF"/>
+                </a:solidFill>
+                <a:effectLst/>
+                <a:latin typeface="Courier New" panose="02070309020205020404" pitchFamily="49" charset="0"/>
+                <a:cs typeface="Courier New" panose="02070309020205020404" pitchFamily="49" charset="0"/>
+              </a:rPr>
+              <a:t>(name: </a:t>
+            </a:r>
+            <a:r>
+              <a:rPr kumimoji="0" lang="en-GB" altLang="en-US" sz="1200" b="0" i="0" u="none" strike="noStrike" cap="none" normalizeH="0" baseline="0" dirty="0" smtClean="0">
+                <a:ln>
+                  <a:noFill/>
+                </a:ln>
+                <a:solidFill>
+                  <a:srgbClr val="FFA07A"/>
+                </a:solidFill>
+                <a:effectLst/>
+                <a:latin typeface="Courier New" panose="02070309020205020404" pitchFamily="49" charset="0"/>
+                <a:cs typeface="Courier New" panose="02070309020205020404" pitchFamily="49" charset="0"/>
+              </a:rPr>
+              <a:t>"</a:t>
+            </a:r>
+            <a:r>
+              <a:rPr kumimoji="0" lang="en-GB" altLang="en-US" sz="1200" b="0" i="0" u="none" strike="noStrike" cap="none" normalizeH="0" baseline="0" dirty="0" err="1" smtClean="0">
+                <a:ln>
+                  <a:noFill/>
+                </a:ln>
+                <a:solidFill>
+                  <a:srgbClr val="FFA07A"/>
+                </a:solidFill>
+                <a:effectLst/>
+                <a:latin typeface="Courier New" panose="02070309020205020404" pitchFamily="49" charset="0"/>
+                <a:cs typeface="Courier New" panose="02070309020205020404" pitchFamily="49" charset="0"/>
+              </a:rPr>
+              <a:t>sample_parameter</a:t>
+            </a:r>
+            <a:r>
+              <a:rPr kumimoji="0" lang="en-GB" altLang="en-US" sz="1200" b="0" i="0" u="none" strike="noStrike" cap="none" normalizeH="0" baseline="0" dirty="0" smtClean="0">
+                <a:ln>
+                  <a:noFill/>
+                </a:ln>
+                <a:solidFill>
+                  <a:srgbClr val="FFA07A"/>
+                </a:solidFill>
+                <a:effectLst/>
+                <a:latin typeface="Courier New" panose="02070309020205020404" pitchFamily="49" charset="0"/>
+                <a:cs typeface="Courier New" panose="02070309020205020404" pitchFamily="49" charset="0"/>
+              </a:rPr>
+              <a:t>"</a:t>
+            </a:r>
+            <a:r>
+              <a:rPr kumimoji="0" lang="en-GB" altLang="en-US" sz="1200" b="0" i="0" u="none" strike="noStrike" cap="none" normalizeH="0" baseline="0" dirty="0" smtClean="0">
+                <a:ln>
+                  <a:noFill/>
+                </a:ln>
+                <a:solidFill>
+                  <a:srgbClr val="FFFFFF"/>
+                </a:solidFill>
+                <a:effectLst/>
+                <a:latin typeface="Courier New" panose="02070309020205020404" pitchFamily="49" charset="0"/>
+                <a:cs typeface="Courier New" panose="02070309020205020404" pitchFamily="49" charset="0"/>
+              </a:rPr>
+              <a:t>) { </a:t>
+            </a:r>
+          </a:p>
+          <a:p>
+            <a:pPr marL="0" marR="0" lvl="0" indent="0" algn="l" defTabSz="914400" rtl="0" eaLnBrk="0" fontAlgn="base" latinLnBrk="0" hangingPunct="0">
+              <a:lnSpc>
+                <a:spcPct val="100000"/>
+              </a:lnSpc>
+              <a:spcBef>
+                <a:spcPct val="0"/>
+              </a:spcBef>
+              <a:spcAft>
+                <a:spcPct val="0"/>
+              </a:spcAft>
+              <a:buClrTx/>
+              <a:buSzTx/>
+              <a:buFontTx/>
+              <a:buNone/>
+              <a:tabLst/>
+            </a:pPr>
+            <a:r>
+              <a:rPr lang="en-GB" altLang="en-US" sz="1200" dirty="0">
+                <a:solidFill>
+                  <a:srgbClr val="FFFFFF"/>
+                </a:solidFill>
+                <a:latin typeface="Courier New" panose="02070309020205020404" pitchFamily="49" charset="0"/>
+                <a:cs typeface="Courier New" panose="02070309020205020404" pitchFamily="49" charset="0"/>
+              </a:rPr>
+              <a:t> </a:t>
+            </a:r>
+            <a:r>
+              <a:rPr lang="en-GB" altLang="en-US" sz="1200" dirty="0" smtClean="0">
+                <a:solidFill>
+                  <a:srgbClr val="FFFFFF"/>
+                </a:solidFill>
+                <a:latin typeface="Courier New" panose="02070309020205020404" pitchFamily="49" charset="0"/>
+                <a:cs typeface="Courier New" panose="02070309020205020404" pitchFamily="49" charset="0"/>
+              </a:rPr>
+              <a:t>   </a:t>
+            </a:r>
+            <a:r>
+              <a:rPr kumimoji="0" lang="en-GB" altLang="en-US" sz="1200" b="0" i="0" u="none" strike="noStrike" cap="none" normalizeH="0" baseline="0" dirty="0" smtClean="0">
+                <a:ln>
+                  <a:noFill/>
+                </a:ln>
+                <a:solidFill>
+                  <a:srgbClr val="00FF00"/>
+                </a:solidFill>
+                <a:effectLst/>
+                <a:latin typeface="Courier New" panose="02070309020205020404" pitchFamily="49" charset="0"/>
+                <a:cs typeface="Courier New" panose="02070309020205020404" pitchFamily="49" charset="0"/>
+              </a:rPr>
+              <a:t>// When this closure is executed, the parent node will be the parameter</a:t>
+            </a:r>
+            <a:r>
+              <a:rPr kumimoji="0" lang="en-GB" altLang="en-US" sz="1200" b="0" i="0" u="none" strike="noStrike" cap="none" normalizeH="0" baseline="0" dirty="0" smtClean="0">
+                <a:ln>
+                  <a:noFill/>
+                </a:ln>
+                <a:solidFill>
+                  <a:srgbClr val="FFFFFF"/>
+                </a:solidFill>
+                <a:effectLst/>
+                <a:latin typeface="Courier New" panose="02070309020205020404" pitchFamily="49" charset="0"/>
+                <a:cs typeface="Courier New" panose="02070309020205020404" pitchFamily="49" charset="0"/>
+              </a:rPr>
+              <a:t> </a:t>
+            </a:r>
+          </a:p>
+          <a:p>
+            <a:pPr marL="0" marR="0" lvl="0" indent="0" algn="l" defTabSz="914400" rtl="0" eaLnBrk="0" fontAlgn="base" latinLnBrk="0" hangingPunct="0">
+              <a:lnSpc>
+                <a:spcPct val="100000"/>
+              </a:lnSpc>
+              <a:spcBef>
+                <a:spcPct val="0"/>
+              </a:spcBef>
+              <a:spcAft>
+                <a:spcPct val="0"/>
+              </a:spcAft>
+              <a:buClrTx/>
+              <a:buSzTx/>
+              <a:buFontTx/>
+              <a:buNone/>
+              <a:tabLst/>
+            </a:pPr>
+            <a:r>
+              <a:rPr lang="en-GB" altLang="en-US" sz="1200" dirty="0">
+                <a:solidFill>
+                  <a:srgbClr val="FFFFFF"/>
+                </a:solidFill>
+                <a:latin typeface="Courier New" panose="02070309020205020404" pitchFamily="49" charset="0"/>
+                <a:cs typeface="Courier New" panose="02070309020205020404" pitchFamily="49" charset="0"/>
+              </a:rPr>
+              <a:t> </a:t>
+            </a:r>
+            <a:r>
+              <a:rPr lang="en-GB" altLang="en-US" sz="1200" dirty="0" smtClean="0">
+                <a:solidFill>
+                  <a:srgbClr val="FFFFFF"/>
+                </a:solidFill>
+                <a:latin typeface="Courier New" panose="02070309020205020404" pitchFamily="49" charset="0"/>
+                <a:cs typeface="Courier New" panose="02070309020205020404" pitchFamily="49" charset="0"/>
+              </a:rPr>
+              <a:t>   </a:t>
+            </a:r>
+            <a:r>
+              <a:rPr kumimoji="0" lang="en-GB" altLang="en-US" sz="1200" b="0" i="0" u="none" strike="noStrike" cap="none" normalizeH="0" baseline="0" dirty="0" smtClean="0">
+                <a:ln>
+                  <a:noFill/>
+                </a:ln>
+                <a:solidFill>
+                  <a:srgbClr val="00FF00"/>
+                </a:solidFill>
+                <a:effectLst/>
+                <a:latin typeface="Courier New" panose="02070309020205020404" pitchFamily="49" charset="0"/>
+                <a:cs typeface="Courier New" panose="02070309020205020404" pitchFamily="49" charset="0"/>
+              </a:rPr>
+              <a:t>// created by the </a:t>
+            </a:r>
+            <a:r>
+              <a:rPr kumimoji="0" lang="en-GB" altLang="en-US" sz="1200" b="0" i="0" u="none" strike="noStrike" cap="none" normalizeH="0" baseline="0" dirty="0" err="1" smtClean="0">
+                <a:ln>
+                  <a:noFill/>
+                </a:ln>
+                <a:solidFill>
+                  <a:srgbClr val="00FF00"/>
+                </a:solidFill>
+                <a:effectLst/>
+                <a:latin typeface="Courier New" panose="02070309020205020404" pitchFamily="49" charset="0"/>
+                <a:cs typeface="Courier New" panose="02070309020205020404" pitchFamily="49" charset="0"/>
+              </a:rPr>
+              <a:t>param</a:t>
+            </a:r>
+            <a:r>
+              <a:rPr kumimoji="0" lang="en-GB" altLang="en-US" sz="1200" b="0" i="0" u="none" strike="noStrike" cap="none" normalizeH="0" baseline="0" dirty="0" smtClean="0">
+                <a:ln>
+                  <a:noFill/>
+                </a:ln>
+                <a:solidFill>
+                  <a:srgbClr val="00FF00"/>
+                </a:solidFill>
+                <a:effectLst/>
+                <a:latin typeface="Courier New" panose="02070309020205020404" pitchFamily="49" charset="0"/>
+                <a:cs typeface="Courier New" panose="02070309020205020404" pitchFamily="49" charset="0"/>
+              </a:rPr>
+              <a:t> method.</a:t>
+            </a:r>
+            <a:r>
+              <a:rPr kumimoji="0" lang="en-GB" altLang="en-US" sz="1200" b="0" i="0" u="none" strike="noStrike" cap="none" normalizeH="0" baseline="0" dirty="0" smtClean="0">
+                <a:ln>
+                  <a:noFill/>
+                </a:ln>
+                <a:solidFill>
+                  <a:srgbClr val="FFFFFF"/>
+                </a:solidFill>
+                <a:effectLst/>
+                <a:latin typeface="Courier New" panose="02070309020205020404" pitchFamily="49" charset="0"/>
+                <a:cs typeface="Courier New" panose="02070309020205020404" pitchFamily="49" charset="0"/>
+              </a:rPr>
+              <a:t> </a:t>
+            </a:r>
+          </a:p>
+          <a:p>
+            <a:pPr marL="0" marR="0" lvl="0" indent="0" algn="l" defTabSz="914400" rtl="0" eaLnBrk="0" fontAlgn="base" latinLnBrk="0" hangingPunct="0">
+              <a:lnSpc>
+                <a:spcPct val="100000"/>
+              </a:lnSpc>
+              <a:spcBef>
+                <a:spcPct val="0"/>
+              </a:spcBef>
+              <a:spcAft>
+                <a:spcPct val="0"/>
+              </a:spcAft>
+              <a:buClrTx/>
+              <a:buSzTx/>
+              <a:buFontTx/>
+              <a:buNone/>
+              <a:tabLst/>
+            </a:pPr>
+            <a:r>
+              <a:rPr lang="en-GB" altLang="en-US" sz="1200" dirty="0">
+                <a:solidFill>
+                  <a:srgbClr val="FFFFFF"/>
+                </a:solidFill>
+                <a:latin typeface="Courier New" panose="02070309020205020404" pitchFamily="49" charset="0"/>
+                <a:cs typeface="Courier New" panose="02070309020205020404" pitchFamily="49" charset="0"/>
+              </a:rPr>
+              <a:t> </a:t>
+            </a:r>
+            <a:r>
+              <a:rPr lang="en-GB" altLang="en-US" sz="1200" dirty="0" smtClean="0">
+                <a:solidFill>
+                  <a:srgbClr val="FFFFFF"/>
+                </a:solidFill>
+                <a:latin typeface="Courier New" panose="02070309020205020404" pitchFamily="49" charset="0"/>
+                <a:cs typeface="Courier New" panose="02070309020205020404" pitchFamily="49" charset="0"/>
+              </a:rPr>
+              <a:t> </a:t>
+            </a:r>
+            <a:r>
+              <a:rPr kumimoji="0" lang="en-GB" altLang="en-US" sz="1200" b="0" i="0" u="none" strike="noStrike" cap="none" normalizeH="0" baseline="0" dirty="0" smtClean="0">
+                <a:ln>
+                  <a:noFill/>
+                </a:ln>
+                <a:solidFill>
+                  <a:srgbClr val="FFFFFF"/>
+                </a:solidFill>
+                <a:effectLst/>
+                <a:latin typeface="Courier New" panose="02070309020205020404" pitchFamily="49" charset="0"/>
+                <a:cs typeface="Courier New" panose="02070309020205020404" pitchFamily="49" charset="0"/>
+              </a:rPr>
+              <a:t>} </a:t>
+            </a:r>
+          </a:p>
+          <a:p>
+            <a:pPr marL="0" marR="0" lvl="0" indent="0" algn="l" defTabSz="914400" rtl="0" eaLnBrk="0" fontAlgn="base" latinLnBrk="0" hangingPunct="0">
+              <a:lnSpc>
+                <a:spcPct val="100000"/>
+              </a:lnSpc>
+              <a:spcBef>
+                <a:spcPct val="0"/>
+              </a:spcBef>
+              <a:spcAft>
+                <a:spcPct val="0"/>
+              </a:spcAft>
+              <a:buClrTx/>
+              <a:buSzTx/>
+              <a:buFontTx/>
+              <a:buNone/>
+              <a:tabLst/>
+            </a:pPr>
+            <a:r>
+              <a:rPr kumimoji="0" lang="en-GB" altLang="en-US" sz="1200" b="0" i="0" u="none" strike="noStrike" cap="none" normalizeH="0" baseline="0" dirty="0" smtClean="0">
+                <a:ln>
+                  <a:noFill/>
+                </a:ln>
+                <a:solidFill>
+                  <a:srgbClr val="FFFFFF"/>
+                </a:solidFill>
+                <a:effectLst/>
+                <a:latin typeface="Courier New" panose="02070309020205020404" pitchFamily="49" charset="0"/>
+                <a:cs typeface="Courier New" panose="02070309020205020404" pitchFamily="49" charset="0"/>
+              </a:rPr>
+              <a:t>}</a:t>
+            </a:r>
+            <a:endParaRPr kumimoji="0" lang="en-GB" altLang="en-US" sz="1200" b="0" i="0" u="none" strike="noStrike" cap="none" normalizeH="0" baseline="0" dirty="0" smtClean="0">
+              <a:ln>
+                <a:noFill/>
+              </a:ln>
+              <a:solidFill>
+                <a:schemeClr val="tx1"/>
+              </a:solidFill>
+              <a:effectLst/>
+              <a:latin typeface="Arial" panose="020B0604020202020204" pitchFamily="34" charset="0"/>
+            </a:endParaRPr>
+          </a:p>
+        </p:txBody>
+      </p:sp>
+      <p:sp>
+        <p:nvSpPr>
+          <p:cNvPr id="6" name="CustomShape 2"/>
+          <p:cNvSpPr/>
+          <p:nvPr/>
+        </p:nvSpPr>
+        <p:spPr>
+          <a:xfrm>
+            <a:off x="822960" y="4553062"/>
+            <a:ext cx="7543080" cy="1211244"/>
+          </a:xfrm>
+          <a:prstGeom prst="rect">
+            <a:avLst/>
+          </a:prstGeom>
+          <a:noFill/>
+          <a:ln>
+            <a:noFill/>
+          </a:ln>
+        </p:spPr>
+        <p:style>
+          <a:lnRef idx="0">
+            <a:scrgbClr r="0" g="0" b="0"/>
+          </a:lnRef>
+          <a:fillRef idx="0">
+            <a:scrgbClr r="0" g="0" b="0"/>
+          </a:fillRef>
+          <a:effectRef idx="0">
+            <a:scrgbClr r="0" g="0" b="0"/>
+          </a:effectRef>
+          <a:fontRef idx="minor"/>
+        </p:style>
+        <p:txBody>
+          <a:bodyPr lIns="0" tIns="45000" rIns="0" bIns="45000"/>
+          <a:lstStyle/>
+          <a:p>
+            <a:pPr marL="199080" indent="-198360">
+              <a:lnSpc>
+                <a:spcPct val="100000"/>
+              </a:lnSpc>
+              <a:buClr>
+                <a:srgbClr val="4E67C8"/>
+              </a:buClr>
+              <a:buFont typeface="Wingdings 2" charset="2"/>
+              <a:buChar char=""/>
+            </a:pPr>
+            <a:r>
+              <a:rPr lang="en-US" sz="1800" b="0" strike="noStrike" spc="-1" dirty="0" smtClean="0">
+                <a:solidFill>
+                  <a:srgbClr val="000000"/>
+                </a:solidFill>
+                <a:uFill>
+                  <a:solidFill>
+                    <a:srgbClr val="FFFFFF"/>
+                  </a:solidFill>
+                </a:uFill>
+                <a:latin typeface="Arial"/>
+              </a:rPr>
+              <a:t>Requires you to implement three methods</a:t>
+            </a:r>
+          </a:p>
+          <a:p>
+            <a:pPr marL="656280" lvl="1" indent="-198360">
+              <a:buClr>
+                <a:srgbClr val="4E67C8"/>
+              </a:buClr>
+              <a:buFont typeface="Wingdings 2" charset="2"/>
+              <a:buChar char=""/>
+            </a:pPr>
+            <a:r>
+              <a:rPr lang="en-US" spc="-1" dirty="0" err="1" smtClean="0">
+                <a:solidFill>
+                  <a:srgbClr val="000000"/>
+                </a:solidFill>
+                <a:uFill>
+                  <a:solidFill>
+                    <a:srgbClr val="FFFFFF"/>
+                  </a:solidFill>
+                </a:uFill>
+                <a:latin typeface="Arial"/>
+              </a:rPr>
+              <a:t>createNode</a:t>
+            </a:r>
+            <a:endParaRPr lang="en-US" spc="-1" dirty="0" smtClean="0">
+              <a:solidFill>
+                <a:srgbClr val="000000"/>
+              </a:solidFill>
+              <a:uFill>
+                <a:solidFill>
+                  <a:srgbClr val="FFFFFF"/>
+                </a:solidFill>
+              </a:uFill>
+              <a:latin typeface="Arial"/>
+            </a:endParaRPr>
+          </a:p>
+          <a:p>
+            <a:pPr marL="656280" lvl="1" indent="-198360">
+              <a:buClr>
+                <a:srgbClr val="4E67C8"/>
+              </a:buClr>
+              <a:buFont typeface="Wingdings 2" charset="2"/>
+              <a:buChar char=""/>
+            </a:pPr>
+            <a:r>
+              <a:rPr lang="en-US" b="0" strike="noStrike" spc="-1" dirty="0" err="1" smtClean="0">
+                <a:solidFill>
+                  <a:srgbClr val="000000"/>
+                </a:solidFill>
+                <a:uFill>
+                  <a:solidFill>
+                    <a:srgbClr val="FFFFFF"/>
+                  </a:solidFill>
+                </a:uFill>
+                <a:latin typeface="Arial"/>
+              </a:rPr>
+              <a:t>addParent</a:t>
+            </a:r>
+            <a:endParaRPr lang="en-US" b="0" strike="noStrike" spc="-1" dirty="0" smtClean="0">
+              <a:solidFill>
+                <a:srgbClr val="000000"/>
+              </a:solidFill>
+              <a:uFill>
+                <a:solidFill>
+                  <a:srgbClr val="FFFFFF"/>
+                </a:solidFill>
+              </a:uFill>
+              <a:latin typeface="Arial"/>
+            </a:endParaRPr>
+          </a:p>
+          <a:p>
+            <a:pPr marL="656280" lvl="1" indent="-198360">
+              <a:buClr>
+                <a:srgbClr val="4E67C8"/>
+              </a:buClr>
+              <a:buFont typeface="Wingdings 2" charset="2"/>
+              <a:buChar char=""/>
+            </a:pPr>
+            <a:r>
+              <a:rPr lang="en-US" spc="-1" dirty="0" err="1" smtClean="0">
+                <a:solidFill>
+                  <a:srgbClr val="000000"/>
+                </a:solidFill>
+                <a:uFill>
+                  <a:solidFill>
+                    <a:srgbClr val="FFFFFF"/>
+                  </a:solidFill>
+                </a:uFill>
+                <a:latin typeface="Arial"/>
+              </a:rPr>
+              <a:t>nodeCompleted</a:t>
+            </a:r>
+            <a:endParaRPr lang="en-US" b="0" strike="noStrike" spc="-1" dirty="0" smtClean="0">
+              <a:solidFill>
+                <a:srgbClr val="000000"/>
+              </a:solidFill>
+              <a:uFill>
+                <a:solidFill>
+                  <a:srgbClr val="FFFFFF"/>
+                </a:solidFill>
+              </a:uFill>
+              <a:latin typeface="Arial"/>
+            </a:endParaRPr>
+          </a:p>
+          <a:p>
+            <a:pPr marL="199080" indent="-198360">
+              <a:lnSpc>
+                <a:spcPct val="100000"/>
+              </a:lnSpc>
+              <a:buClr>
+                <a:srgbClr val="4E67C8"/>
+              </a:buClr>
+              <a:buFont typeface="Wingdings 2" charset="2"/>
+              <a:buChar char=""/>
+            </a:pPr>
+            <a:endParaRPr lang="en-US" spc="-1" dirty="0">
+              <a:solidFill>
+                <a:srgbClr val="000000"/>
+              </a:solidFill>
+              <a:uFill>
+                <a:solidFill>
+                  <a:srgbClr val="FFFFFF"/>
+                </a:solidFill>
+              </a:uFill>
+              <a:latin typeface="Arial"/>
+            </a:endParaRPr>
+          </a:p>
+          <a:p>
+            <a:pPr marL="720">
+              <a:lnSpc>
+                <a:spcPct val="100000"/>
+              </a:lnSpc>
+              <a:buClr>
+                <a:srgbClr val="4E67C8"/>
+              </a:buClr>
+            </a:pPr>
+            <a:endParaRPr lang="en-US" sz="1800" b="0" strike="noStrike" spc="-1" dirty="0">
+              <a:solidFill>
+                <a:srgbClr val="000000"/>
+              </a:solidFill>
+              <a:uFill>
+                <a:solidFill>
+                  <a:srgbClr val="FFFFFF"/>
+                </a:solidFill>
+              </a:uFill>
+              <a:latin typeface="Arial"/>
+            </a:endParaRPr>
+          </a:p>
+          <a:p>
+            <a:pPr>
+              <a:lnSpc>
+                <a:spcPct val="90000"/>
+              </a:lnSpc>
+            </a:pPr>
+            <a:endParaRPr lang="en-US" sz="1800" b="0" strike="noStrike" spc="-1" dirty="0">
               <a:solidFill>
                 <a:srgbClr val="000000"/>
               </a:solidFill>
@@ -31252,7 +31655,7 @@
               </a:lnSpc>
             </a:pPr>
             <a:r>
-              <a:rPr lang="en-US" sz="4800" b="0" strike="noStrike" spc="-46">
+              <a:rPr lang="en-US" sz="4800" b="0" strike="noStrike" spc="-46" dirty="0" smtClean="0">
                 <a:solidFill>
                   <a:srgbClr val="31489F"/>
                 </a:solidFill>
@@ -31263,9 +31666,9 @@
                 </a:uFill>
                 <a:latin typeface="Calibri Light"/>
               </a:rPr>
-              <a:t>Slide Heading Here</a:t>
-            </a:r>
-            <a:endParaRPr lang="en-US" sz="1800" b="0" strike="noStrike" spc="-1">
+              <a:t>Jasper Reports</a:t>
+            </a:r>
+            <a:endParaRPr lang="en-US" sz="1800" b="0" strike="noStrike" spc="-1" dirty="0">
               <a:solidFill>
                 <a:srgbClr val="000000"/>
               </a:solidFill>
@@ -31325,112 +31728,64 @@
               <a:buChar char=""/>
             </a:pPr>
             <a:r>
-              <a:rPr lang="en-US" sz="2000" b="0" strike="noStrike" spc="-1">
-                <a:solidFill>
-                  <a:srgbClr val="404040"/>
+              <a:rPr lang="en-US" spc="-1" dirty="0" smtClean="0">
+                <a:solidFill>
+                  <a:srgbClr val="000000"/>
                 </a:solidFill>
                 <a:uFill>
                   <a:solidFill>
                     <a:srgbClr val="FFFFFF"/>
                   </a:solidFill>
                 </a:uFill>
-                <a:latin typeface="Calibri"/>
-              </a:rPr>
-              <a:t>Presentation Text</a:t>
-            </a:r>
-            <a:endParaRPr lang="en-US" sz="1800" b="0" strike="noStrike" spc="-1">
-              <a:solidFill>
-                <a:srgbClr val="000000"/>
-              </a:solidFill>
-              <a:uFill>
-                <a:solidFill>
-                  <a:srgbClr val="FFFFFF"/>
-                </a:solidFill>
-              </a:uFill>
-              <a:latin typeface="Arial"/>
-            </a:endParaRPr>
-          </a:p>
-          <a:p>
-            <a:pPr marL="377280" lvl="3" indent="-198360">
-              <a:lnSpc>
-                <a:spcPct val="100000"/>
-              </a:lnSpc>
-              <a:buClr>
-                <a:srgbClr val="4E67C8"/>
-              </a:buClr>
-              <a:buSzPct val="80000"/>
-              <a:buFont typeface="Wingdings 2" charset="2"/>
-              <a:buChar char=""/>
-            </a:pPr>
-            <a:r>
-              <a:rPr lang="en-US" sz="1500" b="0" strike="noStrike" spc="-1">
-                <a:solidFill>
-                  <a:srgbClr val="404040"/>
+                <a:latin typeface="Arial"/>
+              </a:rPr>
+              <a:t>Design reports in the GUI developer environment and save them as </a:t>
+            </a:r>
+            <a:r>
+              <a:rPr lang="en-US" spc="-1" dirty="0" smtClean="0">
+                <a:solidFill>
+                  <a:srgbClr val="000000"/>
                 </a:solidFill>
                 <a:uFill>
                   <a:solidFill>
                     <a:srgbClr val="FFFFFF"/>
                   </a:solidFill>
                 </a:uFill>
-                <a:latin typeface="Calibri"/>
-              </a:rPr>
-              <a:t>Screen Captures</a:t>
-            </a:r>
-            <a:endParaRPr lang="en-US" sz="1800" b="0" strike="noStrike" spc="-1">
-              <a:solidFill>
-                <a:srgbClr val="000000"/>
-              </a:solidFill>
-              <a:uFill>
-                <a:solidFill>
-                  <a:srgbClr val="FFFFFF"/>
-                </a:solidFill>
-              </a:uFill>
-              <a:latin typeface="Arial"/>
-            </a:endParaRPr>
-          </a:p>
-          <a:p>
-            <a:pPr marL="377280" lvl="3" indent="-198360">
-              <a:lnSpc>
-                <a:spcPct val="100000"/>
-              </a:lnSpc>
-              <a:buClr>
-                <a:srgbClr val="4E67C8"/>
-              </a:buClr>
-              <a:buSzPct val="80000"/>
-              <a:buFont typeface="Wingdings 2" charset="2"/>
-              <a:buChar char=""/>
-            </a:pPr>
-            <a:r>
-              <a:rPr lang="en-US" sz="1500" b="0" strike="noStrike" spc="-1">
-                <a:solidFill>
-                  <a:srgbClr val="404040"/>
+                <a:latin typeface="Courier New" panose="02070309020205020404" pitchFamily="49" charset="0"/>
+              </a:rPr>
+              <a:t>.</a:t>
+            </a:r>
+            <a:r>
+              <a:rPr lang="en-US" spc="-1" dirty="0" err="1" smtClean="0">
+                <a:solidFill>
+                  <a:srgbClr val="000000"/>
                 </a:solidFill>
                 <a:uFill>
                   <a:solidFill>
                     <a:srgbClr val="FFFFFF"/>
                   </a:solidFill>
                 </a:uFill>
-                <a:latin typeface="Calibri"/>
-              </a:rPr>
-              <a:t>Etc.</a:t>
-            </a:r>
-            <a:endParaRPr lang="en-US" sz="1800" b="0" strike="noStrike" spc="-1">
-              <a:solidFill>
-                <a:srgbClr val="000000"/>
-              </a:solidFill>
-              <a:uFill>
-                <a:solidFill>
-                  <a:srgbClr val="FFFFFF"/>
-                </a:solidFill>
-              </a:uFill>
-              <a:latin typeface="Arial"/>
-            </a:endParaRPr>
-          </a:p>
-          <a:p>
-            <a:pPr marL="199080" indent="-198360">
-              <a:lnSpc>
-                <a:spcPct val="100000"/>
-              </a:lnSpc>
+                <a:latin typeface="Courier New" panose="02070309020205020404" pitchFamily="49" charset="0"/>
+              </a:rPr>
+              <a:t>jrxml</a:t>
+            </a:r>
+            <a:r>
+              <a:rPr lang="en-US" spc="-1" dirty="0" smtClean="0">
+                <a:solidFill>
+                  <a:srgbClr val="000000"/>
+                </a:solidFill>
+                <a:uFill>
+                  <a:solidFill>
+                    <a:srgbClr val="FFFFFF"/>
+                  </a:solidFill>
+                </a:uFill>
+                <a:latin typeface="+mj-lt"/>
+              </a:rPr>
+              <a:t> (a schema of XML)</a:t>
+            </a:r>
+          </a:p>
+          <a:p>
+            <a:pPr marL="656280" lvl="1" indent="-198360">
               <a:buClr>
                 <a:srgbClr val="4E67C8"/>
               </a:buClr>
@@ -31438,20 +31793,177 @@
               <a:buChar char=""/>
             </a:pPr>
             <a:r>
-              <a:rPr lang="en-US" sz="2000" b="0" strike="noStrike" spc="-1">
-                <a:solidFill>
-                  <a:srgbClr val="404040"/>
+              <a:rPr lang="en-US" spc="-1" dirty="0" smtClean="0">
+                <a:solidFill>
+                  <a:srgbClr val="000000"/>
                 </a:solidFill>
                 <a:uFill>
                   <a:solidFill>
                     <a:srgbClr val="FFFFFF"/>
                   </a:solidFill>
                 </a:uFill>
-                <a:latin typeface="Calibri"/>
-              </a:rPr>
-              <a:t>Presenters – duplicate this slide as many times as needed</a:t>
-            </a:r>
-            <a:endParaRPr lang="en-US" sz="1800" b="0" strike="noStrike" spc="-1">
+                <a:latin typeface="Arial"/>
+              </a:rPr>
+              <a:t>Text-based</a:t>
+            </a:r>
+          </a:p>
+          <a:p>
+            <a:pPr marL="656280" lvl="1" indent="-198360">
+              <a:buClr>
+                <a:srgbClr val="4E67C8"/>
+              </a:buClr>
+              <a:buFont typeface="Wingdings 2" charset="2"/>
+              <a:buChar char=""/>
+            </a:pPr>
+            <a:r>
+              <a:rPr lang="en-US" spc="-1" dirty="0" smtClean="0">
+                <a:solidFill>
+                  <a:srgbClr val="000000"/>
+                </a:solidFill>
+                <a:uFill>
+                  <a:solidFill>
+                    <a:srgbClr val="FFFFFF"/>
+                  </a:solidFill>
+                </a:uFill>
+                <a:latin typeface="Arial"/>
+              </a:rPr>
+              <a:t>We extract parameters, </a:t>
+            </a:r>
+            <a:r>
+              <a:rPr lang="en-US" spc="-1" dirty="0" err="1" smtClean="0">
+                <a:solidFill>
+                  <a:srgbClr val="000000"/>
+                </a:solidFill>
+                <a:uFill>
+                  <a:solidFill>
+                    <a:srgbClr val="FFFFFF"/>
+                  </a:solidFill>
+                </a:uFill>
+                <a:latin typeface="Arial"/>
+              </a:rPr>
+              <a:t>subreports</a:t>
+            </a:r>
+            <a:r>
+              <a:rPr lang="en-US" spc="-1" dirty="0" smtClean="0">
+                <a:solidFill>
+                  <a:srgbClr val="000000"/>
+                </a:solidFill>
+                <a:uFill>
+                  <a:solidFill>
+                    <a:srgbClr val="FFFFFF"/>
+                  </a:solidFill>
+                </a:uFill>
+                <a:latin typeface="Arial"/>
+              </a:rPr>
+              <a:t>, and images using standard XML tools.</a:t>
+            </a:r>
+          </a:p>
+          <a:p>
+            <a:pPr marL="199080" indent="-198360">
+              <a:lnSpc>
+                <a:spcPct val="100000"/>
+              </a:lnSpc>
+              <a:buClr>
+                <a:srgbClr val="4E67C8"/>
+              </a:buClr>
+              <a:buFont typeface="Wingdings 2" charset="2"/>
+              <a:buChar char=""/>
+            </a:pPr>
+            <a:r>
+              <a:rPr lang="en-US" sz="1800" b="0" strike="noStrike" spc="-1" dirty="0" smtClean="0">
+                <a:solidFill>
+                  <a:srgbClr val="000000"/>
+                </a:solidFill>
+                <a:uFill>
+                  <a:solidFill>
+                    <a:srgbClr val="FFFFFF"/>
+                  </a:solidFill>
+                </a:uFill>
+                <a:latin typeface="Arial"/>
+              </a:rPr>
+              <a:t>Look for existing parameter forms with same name</a:t>
+            </a:r>
+          </a:p>
+          <a:p>
+            <a:pPr marL="199080" indent="-198360">
+              <a:lnSpc>
+                <a:spcPct val="100000"/>
+              </a:lnSpc>
+              <a:buClr>
+                <a:srgbClr val="4E67C8"/>
+              </a:buClr>
+              <a:buFont typeface="Wingdings 2" charset="2"/>
+              <a:buChar char=""/>
+            </a:pPr>
+            <a:r>
+              <a:rPr lang="en-US" spc="-1" dirty="0" smtClean="0">
+                <a:solidFill>
+                  <a:srgbClr val="000000"/>
+                </a:solidFill>
+                <a:uFill>
+                  <a:solidFill>
+                    <a:srgbClr val="FFFFFF"/>
+                  </a:solidFill>
+                </a:uFill>
+                <a:latin typeface="Arial"/>
+              </a:rPr>
+              <a:t>Compile reports before running them</a:t>
+            </a:r>
+          </a:p>
+          <a:p>
+            <a:pPr marL="199080" indent="-198360">
+              <a:lnSpc>
+                <a:spcPct val="100000"/>
+              </a:lnSpc>
+              <a:buClr>
+                <a:srgbClr val="4E67C8"/>
+              </a:buClr>
+              <a:buFont typeface="Wingdings 2" charset="2"/>
+              <a:buChar char=""/>
+            </a:pPr>
+            <a:r>
+              <a:rPr lang="en-US" sz="1800" b="0" strike="noStrike" spc="-1" dirty="0" smtClean="0">
+                <a:solidFill>
+                  <a:srgbClr val="000000"/>
+                </a:solidFill>
+                <a:uFill>
+                  <a:solidFill>
+                    <a:srgbClr val="FFFFFF"/>
+                  </a:solidFill>
+                </a:uFill>
+                <a:latin typeface="Arial"/>
+              </a:rPr>
+              <a:t>Use Jasper Reports to run the report and format the </a:t>
+            </a:r>
+            <a:r>
+              <a:rPr lang="en-US" sz="1800" b="0" strike="noStrike" spc="-1" dirty="0" err="1" smtClean="0">
+                <a:solidFill>
+                  <a:srgbClr val="000000"/>
+                </a:solidFill>
+                <a:uFill>
+                  <a:solidFill>
+                    <a:srgbClr val="FFFFFF"/>
+                  </a:solidFill>
+                </a:uFill>
+                <a:latin typeface="Arial"/>
+              </a:rPr>
+              <a:t>outptu</a:t>
+            </a:r>
+            <a:r>
+              <a:rPr lang="en-US" sz="1800" b="0" strike="noStrike" spc="-1" dirty="0" smtClean="0">
+                <a:solidFill>
+                  <a:srgbClr val="000000"/>
+                </a:solidFill>
+                <a:uFill>
+                  <a:solidFill>
+                    <a:srgbClr val="FFFFFF"/>
+                  </a:solidFill>
+                </a:uFill>
+                <a:latin typeface="Arial"/>
+              </a:rPr>
+              <a:t>.</a:t>
+            </a:r>
+            <a:endParaRPr lang="en-US" sz="1800" b="0" strike="noStrike" spc="-1" dirty="0">
               <a:solidFill>
                 <a:srgbClr val="000000"/>
               </a:solidFill>
@@ -31469,7 +31981,7 @@
                 <a:spcPct val="90000"/>
               </a:lnSpc>
             </a:pPr>
-            <a:endParaRPr lang="en-US" sz="1800" b="0" strike="noStrike" spc="-1">
+            <a:endParaRPr lang="en-US" sz="1800" b="0" strike="noStrike" spc="-1" dirty="0">
               <a:solidFill>
                 <a:srgbClr val="000000"/>
               </a:solidFill>
@@ -31648,7 +32160,7 @@
               </a:lnSpc>
             </a:pPr>
             <a:r>
-              <a:rPr lang="en-US" sz="4800" b="0" strike="noStrike" spc="-46">
+              <a:rPr lang="en-US" sz="4800" b="0" strike="noStrike" spc="-46" dirty="0" smtClean="0">
                 <a:solidFill>
                   <a:srgbClr val="31489F"/>
                 </a:solidFill>
@@ -31659,9 +32171,9 @@
                 </a:uFill>
                 <a:latin typeface="Calibri Light"/>
               </a:rPr>
-              <a:t>Slide Heading Here</a:t>
-            </a:r>
-            <a:endParaRPr lang="en-US" sz="1800" b="0" strike="noStrike" spc="-1">
+              <a:t>Into the code</a:t>
+            </a:r>
+            <a:endParaRPr lang="en-US" sz="1800" b="0" strike="noStrike" spc="-1" dirty="0">
               <a:solidFill>
                 <a:srgbClr val="000000"/>
               </a:solidFill>
@@ -31710,18 +32222,16 @@
           <a:bodyPr lIns="0" tIns="45000" rIns="0" bIns="45000"/>
           <a:lstStyle/>
           <a:p>
-            <a:pPr marL="199080" indent="-198360">
+            <a:pPr marL="720">
               <a:lnSpc>
                 <a:spcPct val="100000"/>
               </a:lnSpc>
               <a:buClr>
                 <a:srgbClr val="4E67C8"/>
               </a:buClr>
-              <a:buFont typeface="Wingdings 2" charset="2"/>
-              <a:buChar char=""/>
-            </a:pPr>
-            <a:r>
-              <a:rPr lang="en-US" sz="2000" b="0" strike="noStrike" spc="-1">
+            </a:pPr>
+            <a:r>
+              <a:rPr lang="en-US" sz="2000" b="0" strike="noStrike" spc="-1" dirty="0" smtClean="0">
                 <a:solidFill>
                   <a:srgbClr val="404040"/>
                 </a:solidFill>
@@ -31732,18 +32242,28 @@
                 </a:uFill>
                 <a:latin typeface="Calibri"/>
               </a:rPr>
-              <a:t>Presentation Text</a:t>
-            </a:r>
-            <a:endParaRPr lang="en-US" sz="1800" b="0" strike="noStrike" spc="-1">
-              <a:solidFill>
-                <a:srgbClr val="000000"/>
+              <a:t>Here are a few of the key classes in the package</a:t>
+            </a:r>
+          </a:p>
+          <a:p>
+            <a:pPr marL="720">
+              <a:lnSpc>
+                <a:spcPct val="100000"/>
+              </a:lnSpc>
+              <a:buClr>
+                <a:srgbClr val="4E67C8"/>
+              </a:buClr>
+            </a:pPr>
+            <a:endParaRPr lang="en-US" sz="2000" b="0" strike="noStrike" spc="-1" dirty="0" smtClean="0">
+              <a:solidFill>
+                <a:srgbClr val="404040"/>
               </a:solidFill>
               <a:uFill>
                 <a:solidFill>
                   <a:srgbClr val="FFFFFF"/>
                 </a:solidFill>
               </a:uFill>
-              <a:latin typeface="Arial"/>
+              <a:latin typeface="Calibri"/>
             </a:endParaRPr>
           </a:p>
           <a:p>
@@ -31759,7 +32279,42 @@
               <a:buChar char=""/>
             </a:pPr>
             <a:r>
-              <a:rPr lang="en-US" sz="1500" b="0" strike="noStrike" spc="-1">
+              <a:rPr lang="en-US" spc="-1" dirty="0" err="1" smtClean="0">
+                <a:solidFill>
+                  <a:srgbClr val="404040"/>
+                </a:solidFill>
+                <a:uFill>
+                  <a:solidFill>
+                    <a:srgbClr val="FFFFFF"/>
+                  </a:solidFill>
+                </a:uFill>
+                <a:latin typeface="Courier New" panose="02070309020205020404" pitchFamily="49" charset="0"/>
+                <a:cs typeface="Courier New" panose="02070309020205020404" pitchFamily="49" charset="0"/>
+              </a:rPr>
+              <a:t>SourceFactory</a:t>
+            </a:r>
+            <a:endParaRPr lang="en-US" spc="-1" dirty="0" smtClean="0">
+              <a:solidFill>
+                <a:srgbClr val="404040"/>
+              </a:solidFill>
+              <a:uFill>
+                <a:solidFill>
+                  <a:srgbClr val="FFFFFF"/>
+                </a:solidFill>
+              </a:uFill>
+              <a:latin typeface="Courier New" panose="02070309020205020404" pitchFamily="49" charset="0"/>
+              <a:cs typeface="Courier New" panose="02070309020205020404" pitchFamily="49" charset="0"/>
+            </a:endParaRPr>
+          </a:p>
+          <a:p>
+            <a:pPr marL="636120" lvl="4">
+              <a:buClr>
+                <a:srgbClr val="4E67C8"/>
+              </a:buClr>
+              <a:buSzPct val="80000"/>
+            </a:pPr>
+            <a:r>
+              <a:rPr lang="en-US" b="0" strike="noStrike" spc="-1" dirty="0" smtClean="0">
                 <a:solidFill>
                   <a:srgbClr val="404040"/>
                 </a:solidFill>
@@ -31770,9 +32325,17 @@
                 </a:uFill>
                 <a:latin typeface="Calibri"/>
               </a:rPr>
-              <a:t>Screen Captures</a:t>
-            </a:r>
-            <a:endParaRPr lang="en-US" sz="1800" b="0" strike="noStrike" spc="-1">
+              <a:t>This fetches the source code for reports (returned as a String)</a:t>
+            </a:r>
+          </a:p>
+          <a:p>
+            <a:pPr marL="636120" lvl="4">
+              <a:buClr>
+                <a:srgbClr val="4E67C8"/>
+              </a:buClr>
+              <a:buSzPct val="80000"/>
+            </a:pPr>
+            <a:endParaRPr lang="en-US" b="0" strike="noStrike" spc="-1" dirty="0">
               <a:solidFill>
                 <a:srgbClr val="000000"/>
               </a:solidFill>
@@ -31797,7 +32360,42 @@
               <a:buChar char=""/>
             </a:pPr>
             <a:r>
-              <a:rPr lang="en-US" sz="1500" b="0" strike="noStrike" spc="-1">
+              <a:rPr lang="en-US" b="0" strike="noStrike" spc="-1" dirty="0" err="1" smtClean="0">
+                <a:solidFill>
+                  <a:srgbClr val="404040"/>
+                </a:solidFill>
+                <a:uFill>
+                  <a:solidFill>
+                    <a:srgbClr val="FFFFFF"/>
+                  </a:solidFill>
+                </a:uFill>
+                <a:latin typeface="Courier New" panose="02070309020205020404" pitchFamily="49" charset="0"/>
+                <a:cs typeface="Courier New" panose="02070309020205020404" pitchFamily="49" charset="0"/>
+              </a:rPr>
+              <a:t>ReportObjectFactory</a:t>
+            </a:r>
+            <a:endParaRPr lang="en-US" b="0" strike="noStrike" spc="-1" dirty="0" smtClean="0">
+              <a:solidFill>
+                <a:srgbClr val="404040"/>
+              </a:solidFill>
+              <a:uFill>
+                <a:solidFill>
+                  <a:srgbClr val="FFFFFF"/>
+                </a:solidFill>
+              </a:uFill>
+              <a:latin typeface="Courier New" panose="02070309020205020404" pitchFamily="49" charset="0"/>
+              <a:cs typeface="Courier New" panose="02070309020205020404" pitchFamily="49" charset="0"/>
+            </a:endParaRPr>
+          </a:p>
+          <a:p>
+            <a:pPr marL="636120" lvl="4">
+              <a:buClr>
+                <a:srgbClr val="4E67C8"/>
+              </a:buClr>
+              <a:buSzPct val="80000"/>
+            </a:pPr>
+            <a:r>
+              <a:rPr lang="en-US" sz="1500" spc="-1" dirty="0" smtClean="0">
                 <a:solidFill>
                   <a:srgbClr val="404040"/>
                 </a:solidFill>
@@ -31808,33 +32406,10 @@
                 </a:uFill>
                 <a:latin typeface="Calibri"/>
               </a:rPr>
-              <a:t>Etc.</a:t>
-            </a:r>
-            <a:endParaRPr lang="en-US" sz="1800" b="0" strike="noStrike" spc="-1">
-              <a:solidFill>
-                <a:srgbClr val="000000"/>
-              </a:solidFill>
-              <a:uFill>
-                <a:solidFill>
-                  <a:srgbClr val="FFFFFF"/>
-                </a:solidFill>
-              </a:uFill>
-              <a:latin typeface="Arial"/>
-            </a:endParaRPr>
-          </a:p>
-          <a:p>
-            <a:pPr marL="199080" indent="-198360">
-              <a:lnSpc>
-                <a:spcPct val="100000"/>
-              </a:lnSpc>
-              <a:buClr>
-                <a:srgbClr val="4E67C8"/>
-              </a:buClr>
-              <a:buFont typeface="Wingdings 2" charset="2"/>
-              <a:buChar char=""/>
-            </a:pPr>
-            <a:r>
-              <a:rPr lang="en-US" sz="2000" b="0" strike="noStrike" spc="-1">
+              <a:t>This gets the source code from a </a:t>
+            </a:r>
+            <a:r>
+              <a:rPr lang="en-US" sz="1500" spc="-1" dirty="0" err="1" smtClean="0">
                 <a:solidFill>
                   <a:srgbClr val="404040"/>
                 </a:solidFill>
@@ -31845,9 +32420,175 @@
                 </a:uFill>
                 <a:latin typeface="Calibri"/>
               </a:rPr>
-              <a:t>Presenters – duplicate this slide as many times as needed</a:t>
-            </a:r>
-            <a:endParaRPr lang="en-US" sz="1800" b="0" strike="noStrike" spc="-1">
+              <a:t>SourceFactory</a:t>
+            </a:r>
+            <a:r>
+              <a:rPr lang="en-US" sz="1500" spc="-1" dirty="0" smtClean="0">
+                <a:solidFill>
+                  <a:srgbClr val="404040"/>
+                </a:solidFill>
+                <a:uFill>
+                  <a:solidFill>
+                    <a:srgbClr val="FFFFFF"/>
+                  </a:solidFill>
+                </a:uFill>
+                <a:latin typeface="Calibri"/>
+              </a:rPr>
+              <a:t> and calls the </a:t>
+            </a:r>
+            <a:r>
+              <a:rPr lang="en-US" sz="1500" spc="-1" dirty="0" err="1" smtClean="0">
+                <a:solidFill>
+                  <a:srgbClr val="404040"/>
+                </a:solidFill>
+                <a:uFill>
+                  <a:solidFill>
+                    <a:srgbClr val="FFFFFF"/>
+                  </a:solidFill>
+                </a:uFill>
+                <a:latin typeface="Courier New" panose="02070309020205020404" pitchFamily="49" charset="0"/>
+                <a:cs typeface="Courier New" panose="02070309020205020404" pitchFamily="49" charset="0"/>
+              </a:rPr>
+              <a:t>eval</a:t>
+            </a:r>
+            <a:r>
+              <a:rPr lang="en-US" sz="1500" spc="-1" dirty="0" smtClean="0">
+                <a:solidFill>
+                  <a:srgbClr val="404040"/>
+                </a:solidFill>
+                <a:uFill>
+                  <a:solidFill>
+                    <a:srgbClr val="FFFFFF"/>
+                  </a:solidFill>
+                </a:uFill>
+                <a:latin typeface="Calibri"/>
+              </a:rPr>
+              <a:t> method on a </a:t>
+            </a:r>
+            <a:r>
+              <a:rPr lang="en-US" sz="1500" spc="-1" dirty="0" err="1" smtClean="0">
+                <a:solidFill>
+                  <a:srgbClr val="404040"/>
+                </a:solidFill>
+                <a:uFill>
+                  <a:solidFill>
+                    <a:srgbClr val="FFFFFF"/>
+                  </a:solidFill>
+                </a:uFill>
+                <a:latin typeface="Calibri"/>
+              </a:rPr>
+              <a:t>SimpleReportBuilder</a:t>
+            </a:r>
+            <a:r>
+              <a:rPr lang="en-US" sz="1500" spc="-1" dirty="0">
+                <a:solidFill>
+                  <a:srgbClr val="404040"/>
+                </a:solidFill>
+                <a:uFill>
+                  <a:solidFill>
+                    <a:srgbClr val="FFFFFF"/>
+                  </a:solidFill>
+                </a:uFill>
+                <a:latin typeface="Calibri"/>
+              </a:rPr>
+              <a:t> </a:t>
+            </a:r>
+            <a:r>
+              <a:rPr lang="en-US" sz="1500" spc="-1" dirty="0" smtClean="0">
+                <a:solidFill>
+                  <a:srgbClr val="404040"/>
+                </a:solidFill>
+                <a:uFill>
+                  <a:solidFill>
+                    <a:srgbClr val="FFFFFF"/>
+                  </a:solidFill>
+                </a:uFill>
+                <a:latin typeface="Calibri"/>
+              </a:rPr>
+              <a:t>to </a:t>
+            </a:r>
+          </a:p>
+          <a:p>
+            <a:pPr marL="636120" lvl="4">
+              <a:buClr>
+                <a:srgbClr val="4E67C8"/>
+              </a:buClr>
+              <a:buSzPct val="80000"/>
+            </a:pPr>
+            <a:endParaRPr lang="en-US" sz="1500" b="0" strike="noStrike" spc="-1" dirty="0" smtClean="0">
+              <a:solidFill>
+                <a:srgbClr val="404040"/>
+              </a:solidFill>
+              <a:uFill>
+                <a:solidFill>
+                  <a:srgbClr val="FFFFFF"/>
+                </a:solidFill>
+              </a:uFill>
+              <a:latin typeface="Calibri"/>
+            </a:endParaRPr>
+          </a:p>
+          <a:p>
+            <a:pPr marL="377280" lvl="3" indent="-198360">
+              <a:lnSpc>
+                <a:spcPct val="100000"/>
+              </a:lnSpc>
+              <a:buClr>
+                <a:srgbClr val="4E67C8"/>
+              </a:buClr>
+              <a:buSzPct val="80000"/>
+              <a:buFont typeface="Wingdings 2" charset="2"/>
+              <a:buChar char=""/>
+            </a:pPr>
+            <a:r>
+              <a:rPr lang="en-US" spc="-1" dirty="0" err="1" smtClean="0">
+                <a:solidFill>
+                  <a:srgbClr val="404040"/>
+                </a:solidFill>
+                <a:uFill>
+                  <a:solidFill>
+                    <a:srgbClr val="FFFFFF"/>
+                  </a:solidFill>
+                </a:uFill>
+                <a:latin typeface="Courier New" panose="02070309020205020404" pitchFamily="49" charset="0"/>
+                <a:cs typeface="Courier New" panose="02070309020205020404" pitchFamily="49" charset="0"/>
+              </a:rPr>
+              <a:t>SimpleReportBuilder</a:t>
+            </a:r>
+            <a:endParaRPr lang="en-US" spc="-1" dirty="0" smtClean="0">
+              <a:solidFill>
+                <a:srgbClr val="404040"/>
+              </a:solidFill>
+              <a:uFill>
+                <a:solidFill>
+                  <a:srgbClr val="FFFFFF"/>
+                </a:solidFill>
+              </a:uFill>
+              <a:latin typeface="Courier New" panose="02070309020205020404" pitchFamily="49" charset="0"/>
+              <a:cs typeface="Courier New" panose="02070309020205020404" pitchFamily="49" charset="0"/>
+            </a:endParaRPr>
+          </a:p>
+          <a:p>
+            <a:pPr marL="636120" lvl="4">
+              <a:buClr>
+                <a:srgbClr val="4E67C8"/>
+              </a:buClr>
+              <a:buSzPct val="80000"/>
+            </a:pPr>
+            <a:r>
+              <a:rPr lang="en-US" sz="1500" spc="-1" dirty="0" smtClean="0">
+                <a:solidFill>
+                  <a:srgbClr val="404040"/>
+                </a:solidFill>
+                <a:uFill>
+                  <a:solidFill>
+                    <a:srgbClr val="FFFFFF"/>
+                  </a:solidFill>
+                </a:uFill>
+                <a:latin typeface="Calibri"/>
+              </a:rPr>
+              <a:t>Executes a build script and returns the object that is created.</a:t>
+            </a:r>
+            <a:endParaRPr lang="en-US" b="0" strike="noStrike" spc="-1" dirty="0">
               <a:solidFill>
                 <a:srgbClr val="000000"/>
               </a:solidFill>
@@ -31865,7 +32606,7 @@
                 <a:spcPct val="90000"/>
               </a:lnSpc>
             </a:pPr>
-            <a:endParaRPr lang="en-US" sz="1800" b="0" strike="noStrike" spc="-1">
+            <a:endParaRPr lang="en-US" sz="1800" b="0" strike="noStrike" spc="-1" dirty="0">
               <a:solidFill>
                 <a:srgbClr val="000000"/>
               </a:solidFill>
@@ -32005,7 +32746,7 @@
       </p:grpSpPr>
       <p:sp>
         <p:nvSpPr>
-          <p:cNvPr id="184" name="CustomShape 1"/>
+          <p:cNvPr id="187" name="CustomShape 1"/>
           <p:cNvSpPr/>
           <p:nvPr/>
         </p:nvSpPr>
@@ -32044,7 +32785,7 @@
               </a:lnSpc>
             </a:pPr>
             <a:r>
-              <a:rPr lang="en-US" sz="4800" b="0" strike="noStrike" spc="-46">
+              <a:rPr lang="en-US" sz="4800" b="0" strike="noStrike" spc="-46" dirty="0" err="1" smtClean="0">
                 <a:solidFill>
                   <a:srgbClr val="31489F"/>
                 </a:solidFill>
@@ -32055,120 +32796,38 @@
                 </a:uFill>
                 <a:latin typeface="Calibri Light"/>
               </a:rPr>
-              <a:t>Slide Heading Here</a:t>
-            </a:r>
-            <a:endParaRPr lang="en-US" sz="1800" b="0" strike="noStrike" spc="-1">
-              <a:solidFill>
-                <a:srgbClr val="000000"/>
-              </a:solidFill>
-              <a:uFill>
-                <a:solidFill>
-                  <a:srgbClr val="FFFFFF"/>
-                </a:solidFill>
-              </a:uFill>
-              <a:latin typeface="Arial"/>
-            </a:endParaRPr>
-          </a:p>
-        </p:txBody>
-      </p:sp>
-      <p:sp>
-        <p:nvSpPr>
-          <p:cNvPr id="185" name="CustomShape 2"/>
-          <p:cNvSpPr/>
-          <p:nvPr/>
-        </p:nvSpPr>
-        <p:spPr>
-          <a:xfrm>
-            <a:off x="822960" y="1845720"/>
-            <a:ext cx="7543080" cy="4022640"/>
-          </a:xfrm>
-          <a:prstGeom prst="rect">
-            <a:avLst/>
-          </a:prstGeom>
-          <a:noFill/>
-          <a:ln>
-            <a:noFill/>
-          </a:ln>
-        </p:spPr>
-        <p:style>
-          <a:lnRef idx="0">
-            <a:scrgbClr r="0" g="0" b="0"/>
-          </a:lnRef>
-          <a:fillRef idx="0">
-            <a:scrgbClr r="0" g="0" b="0"/>
-          </a:fillRef>
-          <a:effectRef idx="0">
-            <a:scrgbClr r="0" g="0" b="0"/>
-          </a:effectRef>
-          <a:fontRef idx="minor"/>
-        </p:style>
-        <p:txBody>
-          <a:bodyPr lIns="0" tIns="45000" rIns="0" bIns="45000"/>
-          <a:lstStyle/>
-          <a:p>
-            <a:pPr marL="199080" indent="-198360">
-              <a:lnSpc>
-                <a:spcPct val="100000"/>
-              </a:lnSpc>
-              <a:buClr>
-                <a:srgbClr val="4E67C8"/>
-              </a:buClr>
-              <a:buFont typeface="Wingdings 2" charset="2"/>
-              <a:buChar char=""/>
-            </a:pPr>
-            <a:r>
-              <a:rPr lang="en-US" sz="2000" b="0" strike="noStrike" spc="-1">
-                <a:solidFill>
-                  <a:srgbClr val="404040"/>
+              <a:t>SimpleReportBuilder</a:t>
+            </a:r>
+            <a:r>
+              <a:rPr lang="en-US" sz="4800" b="0" strike="noStrike" spc="-46" dirty="0" smtClean="0">
+                <a:solidFill>
+                  <a:srgbClr val="31489F"/>
                 </a:solidFill>
                 <a:uFill>
                   <a:solidFill>
                     <a:srgbClr val="FFFFFF"/>
                   </a:solidFill>
                 </a:uFill>
-                <a:latin typeface="Calibri"/>
-              </a:rPr>
-              <a:t>Presentation Text</a:t>
-            </a:r>
-            <a:endParaRPr lang="en-US" sz="1800" b="0" strike="noStrike" spc="-1">
-              <a:solidFill>
-                <a:srgbClr val="000000"/>
-              </a:solidFill>
-              <a:uFill>
-                <a:solidFill>
-                  <a:srgbClr val="FFFFFF"/>
-                </a:solidFill>
-              </a:uFill>
-              <a:latin typeface="Arial"/>
-            </a:endParaRPr>
-          </a:p>
-          <a:p>
-            <a:pPr marL="377280" lvl="3" indent="-198360">
-              <a:lnSpc>
-                <a:spcPct val="100000"/>
-              </a:lnSpc>
-              <a:buClr>
-                <a:srgbClr val="4E67C8"/>
-              </a:buClr>
-              <a:buSzPct val="80000"/>
-              <a:buFont typeface="Wingdings 2" charset="2"/>
-              <a:buChar char=""/>
-            </a:pPr>
-            <a:r>
-              <a:rPr lang="en-US" sz="1500" b="0" strike="noStrike" spc="-1">
-                <a:solidFill>
-                  <a:srgbClr val="404040"/>
+                <a:latin typeface="Calibri Light"/>
+              </a:rPr>
+              <a:t> – </a:t>
+            </a:r>
+            <a:r>
+              <a:rPr lang="en-US" sz="4800" b="0" strike="noStrike" spc="-46" dirty="0" err="1" smtClean="0">
+                <a:solidFill>
+                  <a:srgbClr val="31489F"/>
                 </a:solidFill>
                 <a:uFill>
                   <a:solidFill>
                     <a:srgbClr val="FFFFFF"/>
                   </a:solidFill>
                 </a:uFill>
-                <a:latin typeface="Calibri"/>
-              </a:rPr>
-              <a:t>Screen Captures</a:t>
-            </a:r>
-            <a:endParaRPr lang="en-US" sz="1800" b="0" strike="noStrike" spc="-1">
+                <a:latin typeface="Courier New" panose="02070309020205020404" pitchFamily="49" charset="0"/>
+                <a:cs typeface="Courier New" panose="02070309020205020404" pitchFamily="49" charset="0"/>
+              </a:rPr>
+              <a:t>eval</a:t>
+            </a:r>
+            <a:endParaRPr lang="en-US" sz="1800" b="0" strike="noStrike" spc="-1" dirty="0">
               <a:solidFill>
                 <a:srgbClr val="000000"/>
               </a:solidFill>
@@ -32177,107 +32836,15 @@
                   <a:srgbClr val="FFFFFF"/>
                 </a:solidFill>
               </a:uFill>
-              <a:latin typeface="Arial"/>
-            </a:endParaRPr>
-          </a:p>
-          <a:p>
-            <a:pPr marL="377280" lvl="3" indent="-198360">
-              <a:lnSpc>
-                <a:spcPct val="100000"/>
-              </a:lnSpc>
-              <a:buClr>
-                <a:srgbClr val="4E67C8"/>
-              </a:buClr>
-              <a:buSzPct val="80000"/>
-              <a:buFont typeface="Wingdings 2" charset="2"/>
-              <a:buChar char=""/>
-            </a:pPr>
-            <a:r>
-              <a:rPr lang="en-US" sz="1500" b="0" strike="noStrike" spc="-1">
-                <a:solidFill>
-                  <a:srgbClr val="404040"/>
-                </a:solidFill>
-                <a:uFill>
-                  <a:solidFill>
-                    <a:srgbClr val="FFFFFF"/>
-                  </a:solidFill>
-                </a:uFill>
-                <a:latin typeface="Calibri"/>
-              </a:rPr>
-              <a:t>Etc.</a:t>
-            </a:r>
-            <a:endParaRPr lang="en-US" sz="1800" b="0" strike="noStrike" spc="-1">
-              <a:solidFill>
-                <a:srgbClr val="000000"/>
-              </a:solidFill>
-              <a:uFill>
-                <a:solidFill>
-                  <a:srgbClr val="FFFFFF"/>
-                </a:solidFill>
-              </a:uFill>
-              <a:latin typeface="Arial"/>
-            </a:endParaRPr>
-          </a:p>
-          <a:p>
-            <a:pPr marL="199080" indent="-198360">
-              <a:lnSpc>
-                <a:spcPct val="100000"/>
-              </a:lnSpc>
-              <a:buClr>
-                <a:srgbClr val="4E67C8"/>
-              </a:buClr>
-              <a:buFont typeface="Wingdings 2" charset="2"/>
-              <a:buChar char=""/>
-            </a:pPr>
-            <a:r>
-              <a:rPr lang="en-US" sz="2000" b="0" strike="noStrike" spc="-1">
-                <a:solidFill>
-                  <a:srgbClr val="404040"/>
-                </a:solidFill>
-                <a:uFill>
-                  <a:solidFill>
-                    <a:srgbClr val="FFFFFF"/>
-                  </a:solidFill>
-                </a:uFill>
-                <a:latin typeface="Calibri"/>
-              </a:rPr>
-              <a:t>Presenters – duplicate this slide as many times as needed</a:t>
-            </a:r>
-            <a:endParaRPr lang="en-US" sz="1800" b="0" strike="noStrike" spc="-1">
-              <a:solidFill>
-                <a:srgbClr val="000000"/>
-              </a:solidFill>
-              <a:uFill>
-                <a:solidFill>
-                  <a:srgbClr val="FFFFFF"/>
-                </a:solidFill>
-              </a:uFill>
-              <a:latin typeface="Arial"/>
-            </a:endParaRPr>
-          </a:p>
-          <a:p>
-            <a:pPr>
-              <a:lnSpc>
-                <a:spcPct val="90000"/>
-              </a:lnSpc>
-            </a:pPr>
-            <a:endParaRPr lang="en-US" sz="1800" b="0" strike="noStrike" spc="-1">
-              <a:solidFill>
-                <a:srgbClr val="000000"/>
-              </a:solidFill>
-              <a:uFill>
-                <a:solidFill>
-                  <a:srgbClr val="FFFFFF"/>
-                </a:solidFill>
-              </a:uFill>
-              <a:latin typeface="Arial"/>
+              <a:latin typeface="Courier New" panose="02070309020205020404" pitchFamily="49" charset="0"/>
+              <a:cs typeface="Courier New" panose="02070309020205020404" pitchFamily="49" charset="0"/>
             </a:endParaRPr>
           </a:p>
         </p:txBody>
       </p:sp>
       <p:sp>
         <p:nvSpPr>
-          <p:cNvPr id="186" name="CustomShape 3"/>
+          <p:cNvPr id="189" name="CustomShape 3"/>
           <p:cNvSpPr/>
           <p:nvPr/>
         </p:nvSpPr>
@@ -32340,6 +32907,934 @@
                 </a:solidFill>
               </a:uFill>
               <a:latin typeface="Arial"/>
+            </a:endParaRPr>
+          </a:p>
+        </p:txBody>
+      </p:sp>
+      <p:sp>
+        <p:nvSpPr>
+          <p:cNvPr id="2" name="Rectangle 1"/>
+          <p:cNvSpPr/>
+          <p:nvPr/>
+        </p:nvSpPr>
+        <p:spPr>
+          <a:xfrm>
+            <a:off x="457200" y="1819155"/>
+            <a:ext cx="8373035" cy="4401205"/>
+          </a:xfrm>
+          <a:prstGeom prst="rect">
+            <a:avLst/>
+          </a:prstGeom>
+          <a:solidFill>
+            <a:schemeClr val="tx1"/>
+          </a:solidFill>
+        </p:spPr>
+        <p:txBody>
+          <a:bodyPr wrap="square">
+            <a:spAutoFit/>
+          </a:bodyPr>
+          <a:lstStyle/>
+          <a:p>
+            <a:r>
+              <a:rPr lang="en-GB" sz="1400" kern="150" dirty="0">
+                <a:solidFill>
+                  <a:srgbClr val="00FF00"/>
+                </a:solidFill>
+                <a:latin typeface="Courier New" panose="02070309020205020404" pitchFamily="49" charset="0"/>
+                <a:ea typeface="NSimSun" panose="02010609030101010101" pitchFamily="49" charset="-122"/>
+              </a:rPr>
+              <a:t>/** Evaluate a report builder script and return the results */</a:t>
+            </a:r>
+            <a:endParaRPr lang="en-US" sz="1400" kern="150" dirty="0">
+              <a:solidFill>
+                <a:srgbClr val="FFFFFF"/>
+              </a:solidFill>
+              <a:latin typeface="Courier New" panose="02070309020205020404" pitchFamily="49" charset="0"/>
+              <a:ea typeface="NSimSun" panose="02010609030101010101" pitchFamily="49" charset="-122"/>
+            </a:endParaRPr>
+          </a:p>
+          <a:p>
+            <a:r>
+              <a:rPr lang="en-GB" sz="1400" kern="150" dirty="0" err="1">
+                <a:solidFill>
+                  <a:srgbClr val="00FFFF"/>
+                </a:solidFill>
+                <a:latin typeface="Courier New" panose="02070309020205020404" pitchFamily="49" charset="0"/>
+                <a:ea typeface="NSimSun" panose="02010609030101010101" pitchFamily="49" charset="-122"/>
+              </a:rPr>
+              <a:t>def</a:t>
+            </a:r>
+            <a:r>
+              <a:rPr lang="en-GB" sz="1400" kern="150" dirty="0">
+                <a:solidFill>
+                  <a:srgbClr val="FFFFFF"/>
+                </a:solidFill>
+                <a:latin typeface="Courier New" panose="02070309020205020404" pitchFamily="49" charset="0"/>
+                <a:ea typeface="NSimSun" panose="02010609030101010101" pitchFamily="49" charset="-122"/>
+              </a:rPr>
+              <a:t> </a:t>
+            </a:r>
+            <a:r>
+              <a:rPr lang="en-GB" sz="1400" kern="150" dirty="0" err="1">
+                <a:solidFill>
+                  <a:srgbClr val="87CEFA"/>
+                </a:solidFill>
+                <a:latin typeface="Courier New" panose="02070309020205020404" pitchFamily="49" charset="0"/>
+                <a:ea typeface="NSimSun" panose="02010609030101010101" pitchFamily="49" charset="-122"/>
+              </a:rPr>
+              <a:t>eval</a:t>
+            </a:r>
+            <a:r>
+              <a:rPr lang="en-GB" sz="1400" kern="150" dirty="0">
+                <a:solidFill>
+                  <a:srgbClr val="FFFFFF"/>
+                </a:solidFill>
+                <a:latin typeface="Courier New" panose="02070309020205020404" pitchFamily="49" charset="0"/>
+                <a:ea typeface="NSimSun" panose="02010609030101010101" pitchFamily="49" charset="-122"/>
+              </a:rPr>
+              <a:t>(</a:t>
+            </a:r>
+            <a:r>
+              <a:rPr lang="en-GB" sz="1400" kern="150" dirty="0">
+                <a:solidFill>
+                  <a:srgbClr val="98FB98"/>
+                </a:solidFill>
+                <a:latin typeface="Courier New" panose="02070309020205020404" pitchFamily="49" charset="0"/>
+                <a:ea typeface="NSimSun" panose="02010609030101010101" pitchFamily="49" charset="-122"/>
+              </a:rPr>
+              <a:t>String</a:t>
+            </a:r>
+            <a:r>
+              <a:rPr lang="en-GB" sz="1400" kern="150" dirty="0">
+                <a:solidFill>
+                  <a:srgbClr val="FFFFFF"/>
+                </a:solidFill>
+                <a:latin typeface="Courier New" panose="02070309020205020404" pitchFamily="49" charset="0"/>
+                <a:ea typeface="NSimSun" panose="02010609030101010101" pitchFamily="49" charset="-122"/>
+              </a:rPr>
+              <a:t> </a:t>
+            </a:r>
+            <a:r>
+              <a:rPr lang="en-GB" sz="1400" kern="150" dirty="0">
+                <a:solidFill>
+                  <a:srgbClr val="EEDD82"/>
+                </a:solidFill>
+                <a:latin typeface="Courier New" panose="02070309020205020404" pitchFamily="49" charset="0"/>
+                <a:ea typeface="NSimSun" panose="02010609030101010101" pitchFamily="49" charset="-122"/>
+              </a:rPr>
+              <a:t>text</a:t>
+            </a:r>
+            <a:r>
+              <a:rPr lang="en-GB" sz="1400" kern="150" dirty="0">
+                <a:solidFill>
+                  <a:srgbClr val="FFFFFF"/>
+                </a:solidFill>
+                <a:latin typeface="Courier New" panose="02070309020205020404" pitchFamily="49" charset="0"/>
+                <a:ea typeface="NSimSun" panose="02010609030101010101" pitchFamily="49" charset="-122"/>
+              </a:rPr>
+              <a:t>) {</a:t>
+            </a:r>
+            <a:endParaRPr lang="en-US" sz="1400" kern="150" dirty="0">
+              <a:solidFill>
+                <a:srgbClr val="FFFFFF"/>
+              </a:solidFill>
+              <a:latin typeface="Courier New" panose="02070309020205020404" pitchFamily="49" charset="0"/>
+              <a:ea typeface="NSimSun" panose="02010609030101010101" pitchFamily="49" charset="-122"/>
+            </a:endParaRPr>
+          </a:p>
+          <a:p>
+            <a:r>
+              <a:rPr lang="en-GB" sz="1400" kern="150" dirty="0">
+                <a:solidFill>
+                  <a:srgbClr val="FFFFFF"/>
+                </a:solidFill>
+                <a:latin typeface="Courier New" panose="02070309020205020404" pitchFamily="49" charset="0"/>
+                <a:ea typeface="NSimSun" panose="02010609030101010101" pitchFamily="49" charset="-122"/>
+              </a:rPr>
+              <a:t>  </a:t>
+            </a:r>
+            <a:r>
+              <a:rPr lang="en-GB" sz="1400" kern="150" dirty="0" err="1">
+                <a:solidFill>
+                  <a:srgbClr val="00FFFF"/>
+                </a:solidFill>
+                <a:latin typeface="Courier New" panose="02070309020205020404" pitchFamily="49" charset="0"/>
+                <a:ea typeface="NSimSun" panose="02010609030101010101" pitchFamily="49" charset="-122"/>
+              </a:rPr>
+              <a:t>def</a:t>
+            </a:r>
+            <a:r>
+              <a:rPr lang="en-GB" sz="1400" kern="150" dirty="0">
+                <a:solidFill>
+                  <a:srgbClr val="FFFFFF"/>
+                </a:solidFill>
+                <a:latin typeface="Courier New" panose="02070309020205020404" pitchFamily="49" charset="0"/>
+                <a:ea typeface="NSimSun" panose="02010609030101010101" pitchFamily="49" charset="-122"/>
+              </a:rPr>
+              <a:t> </a:t>
+            </a:r>
+            <a:r>
+              <a:rPr lang="en-GB" sz="1400" kern="150" dirty="0">
+                <a:solidFill>
+                  <a:srgbClr val="EEDD82"/>
+                </a:solidFill>
+                <a:latin typeface="Courier New" panose="02070309020205020404" pitchFamily="49" charset="0"/>
+                <a:ea typeface="NSimSun" panose="02010609030101010101" pitchFamily="49" charset="-122"/>
+              </a:rPr>
+              <a:t>shell</a:t>
+            </a:r>
+            <a:r>
+              <a:rPr lang="en-GB" sz="1400" kern="150" dirty="0">
+                <a:solidFill>
+                  <a:srgbClr val="FFFFFF"/>
+                </a:solidFill>
+                <a:latin typeface="Courier New" panose="02070309020205020404" pitchFamily="49" charset="0"/>
+                <a:ea typeface="NSimSun" panose="02010609030101010101" pitchFamily="49" charset="-122"/>
+              </a:rPr>
+              <a:t> = </a:t>
+            </a:r>
+            <a:r>
+              <a:rPr lang="en-GB" sz="1400" kern="150" dirty="0">
+                <a:solidFill>
+                  <a:srgbClr val="00FFFF"/>
+                </a:solidFill>
+                <a:latin typeface="Courier New" panose="02070309020205020404" pitchFamily="49" charset="0"/>
+                <a:ea typeface="NSimSun" panose="02010609030101010101" pitchFamily="49" charset="-122"/>
+              </a:rPr>
+              <a:t>new</a:t>
+            </a:r>
+            <a:r>
+              <a:rPr lang="en-GB" sz="1400" kern="150" dirty="0">
+                <a:solidFill>
+                  <a:srgbClr val="FFFFFF"/>
+                </a:solidFill>
+                <a:latin typeface="Courier New" panose="02070309020205020404" pitchFamily="49" charset="0"/>
+                <a:ea typeface="NSimSun" panose="02010609030101010101" pitchFamily="49" charset="-122"/>
+              </a:rPr>
+              <a:t> </a:t>
+            </a:r>
+            <a:r>
+              <a:rPr lang="en-GB" sz="1400" kern="150" dirty="0" err="1">
+                <a:solidFill>
+                  <a:srgbClr val="98FB98"/>
+                </a:solidFill>
+                <a:latin typeface="Courier New" panose="02070309020205020404" pitchFamily="49" charset="0"/>
+                <a:ea typeface="NSimSun" panose="02010609030101010101" pitchFamily="49" charset="-122"/>
+              </a:rPr>
+              <a:t>GroovyShell</a:t>
+            </a:r>
+            <a:r>
+              <a:rPr lang="en-GB" sz="1400" kern="150" dirty="0" smtClean="0">
+                <a:solidFill>
+                  <a:srgbClr val="FFFFFF"/>
+                </a:solidFill>
+                <a:latin typeface="Courier New" panose="02070309020205020404" pitchFamily="49" charset="0"/>
+                <a:ea typeface="NSimSun" panose="02010609030101010101" pitchFamily="49" charset="-122"/>
+              </a:rPr>
+              <a:t>()</a:t>
+            </a:r>
+          </a:p>
+          <a:p>
+            <a:r>
+              <a:rPr lang="en-GB" sz="1400" kern="150" dirty="0" smtClean="0">
+                <a:solidFill>
+                  <a:srgbClr val="00FFFF"/>
+                </a:solidFill>
+                <a:latin typeface="Courier New" panose="02070309020205020404" pitchFamily="49" charset="0"/>
+                <a:ea typeface="NSimSun" panose="02010609030101010101" pitchFamily="49" charset="-122"/>
+              </a:rPr>
+              <a:t>  try</a:t>
+            </a:r>
+            <a:r>
+              <a:rPr lang="en-GB" sz="1400" kern="150" dirty="0" smtClean="0">
+                <a:solidFill>
+                  <a:srgbClr val="FFFFFF"/>
+                </a:solidFill>
+                <a:latin typeface="Courier New" panose="02070309020205020404" pitchFamily="49" charset="0"/>
+                <a:ea typeface="NSimSun" panose="02010609030101010101" pitchFamily="49" charset="-122"/>
+              </a:rPr>
+              <a:t> {</a:t>
+            </a:r>
+            <a:endParaRPr lang="en-US" sz="1400" kern="150" dirty="0" smtClean="0">
+              <a:solidFill>
+                <a:srgbClr val="FFFFFF"/>
+              </a:solidFill>
+              <a:latin typeface="Courier New" panose="02070309020205020404" pitchFamily="49" charset="0"/>
+              <a:ea typeface="NSimSun" panose="02010609030101010101" pitchFamily="49" charset="-122"/>
+            </a:endParaRPr>
+          </a:p>
+          <a:p>
+            <a:r>
+              <a:rPr lang="en-GB" sz="1400" kern="150" dirty="0" smtClean="0">
+                <a:solidFill>
+                  <a:srgbClr val="FFFFFF"/>
+                </a:solidFill>
+                <a:latin typeface="Courier New" panose="02070309020205020404" pitchFamily="49" charset="0"/>
+                <a:ea typeface="NSimSun" panose="02010609030101010101" pitchFamily="49" charset="-122"/>
+              </a:rPr>
+              <a:t>    </a:t>
+            </a:r>
+            <a:r>
+              <a:rPr lang="en-GB" sz="1400" kern="150" dirty="0" smtClean="0">
+                <a:solidFill>
+                  <a:srgbClr val="00FF00"/>
+                </a:solidFill>
+                <a:latin typeface="Courier New" panose="02070309020205020404" pitchFamily="49" charset="0"/>
+                <a:ea typeface="NSimSun" panose="02010609030101010101" pitchFamily="49" charset="-122"/>
+              </a:rPr>
+              <a:t>// Wrap the text in a closure so that it doesn't execute</a:t>
+            </a:r>
+            <a:endParaRPr lang="en-US" sz="1400" kern="150" dirty="0" smtClean="0">
+              <a:solidFill>
+                <a:srgbClr val="FFFFFF"/>
+              </a:solidFill>
+              <a:latin typeface="Courier New" panose="02070309020205020404" pitchFamily="49" charset="0"/>
+              <a:ea typeface="NSimSun" panose="02010609030101010101" pitchFamily="49" charset="-122"/>
+            </a:endParaRPr>
+          </a:p>
+          <a:p>
+            <a:r>
+              <a:rPr lang="en-GB" sz="1400" kern="150" dirty="0" smtClean="0">
+                <a:solidFill>
+                  <a:srgbClr val="FFFFFF"/>
+                </a:solidFill>
+                <a:latin typeface="Courier New" panose="02070309020205020404" pitchFamily="49" charset="0"/>
+                <a:ea typeface="NSimSun" panose="02010609030101010101" pitchFamily="49" charset="-122"/>
+              </a:rPr>
+              <a:t>    </a:t>
+            </a:r>
+            <a:r>
+              <a:rPr lang="en-GB" sz="1400" kern="150" dirty="0" smtClean="0">
+                <a:solidFill>
+                  <a:srgbClr val="00FF00"/>
+                </a:solidFill>
+                <a:latin typeface="Courier New" panose="02070309020205020404" pitchFamily="49" charset="0"/>
+                <a:ea typeface="NSimSun" panose="02010609030101010101" pitchFamily="49" charset="-122"/>
+              </a:rPr>
+              <a:t>//   immediately.  This gives us the chance to change</a:t>
+            </a:r>
+            <a:endParaRPr lang="en-US" sz="1400" kern="150" dirty="0" smtClean="0">
+              <a:solidFill>
+                <a:srgbClr val="FFFFFF"/>
+              </a:solidFill>
+              <a:latin typeface="Courier New" panose="02070309020205020404" pitchFamily="49" charset="0"/>
+              <a:ea typeface="NSimSun" panose="02010609030101010101" pitchFamily="49" charset="-122"/>
+            </a:endParaRPr>
+          </a:p>
+          <a:p>
+            <a:r>
+              <a:rPr lang="en-GB" sz="1400" kern="150" dirty="0" smtClean="0">
+                <a:solidFill>
+                  <a:srgbClr val="FFFFFF"/>
+                </a:solidFill>
+                <a:latin typeface="Courier New" panose="02070309020205020404" pitchFamily="49" charset="0"/>
+                <a:ea typeface="NSimSun" panose="02010609030101010101" pitchFamily="49" charset="-122"/>
+              </a:rPr>
+              <a:t>    </a:t>
+            </a:r>
+            <a:r>
+              <a:rPr lang="en-GB" sz="1400" kern="150" dirty="0" smtClean="0">
+                <a:solidFill>
+                  <a:srgbClr val="00FF00"/>
+                </a:solidFill>
+                <a:latin typeface="Courier New" panose="02070309020205020404" pitchFamily="49" charset="0"/>
+                <a:ea typeface="NSimSun" panose="02010609030101010101" pitchFamily="49" charset="-122"/>
+              </a:rPr>
+              <a:t>//   its delegate.</a:t>
+            </a:r>
+            <a:endParaRPr lang="en-US" sz="1400" kern="150" dirty="0" smtClean="0">
+              <a:solidFill>
+                <a:srgbClr val="FFFFFF"/>
+              </a:solidFill>
+              <a:latin typeface="Courier New" panose="02070309020205020404" pitchFamily="49" charset="0"/>
+              <a:ea typeface="NSimSun" panose="02010609030101010101" pitchFamily="49" charset="-122"/>
+            </a:endParaRPr>
+          </a:p>
+          <a:p>
+            <a:r>
+              <a:rPr lang="en-GB" sz="1400" kern="150" dirty="0" smtClean="0">
+                <a:solidFill>
+                  <a:srgbClr val="FFFFFF"/>
+                </a:solidFill>
+                <a:latin typeface="Courier New" panose="02070309020205020404" pitchFamily="49" charset="0"/>
+                <a:ea typeface="NSimSun" panose="02010609030101010101" pitchFamily="49" charset="-122"/>
+              </a:rPr>
+              <a:t>    </a:t>
+            </a:r>
+            <a:r>
+              <a:rPr lang="en-GB" sz="1400" kern="150" dirty="0" smtClean="0">
+                <a:solidFill>
+                  <a:srgbClr val="98FB98"/>
+                </a:solidFill>
+                <a:latin typeface="Courier New" panose="02070309020205020404" pitchFamily="49" charset="0"/>
+                <a:ea typeface="NSimSun" panose="02010609030101010101" pitchFamily="49" charset="-122"/>
+              </a:rPr>
+              <a:t>Closure</a:t>
+            </a:r>
+            <a:r>
+              <a:rPr lang="en-GB" sz="1400" kern="150" dirty="0" smtClean="0">
+                <a:solidFill>
+                  <a:srgbClr val="FFFFFF"/>
+                </a:solidFill>
+                <a:latin typeface="Courier New" panose="02070309020205020404" pitchFamily="49" charset="0"/>
+                <a:ea typeface="NSimSun" panose="02010609030101010101" pitchFamily="49" charset="-122"/>
+              </a:rPr>
+              <a:t> </a:t>
+            </a:r>
+            <a:r>
+              <a:rPr lang="en-GB" sz="1400" kern="150" dirty="0" smtClean="0">
+                <a:solidFill>
+                  <a:srgbClr val="EEDD82"/>
+                </a:solidFill>
+                <a:latin typeface="Courier New" panose="02070309020205020404" pitchFamily="49" charset="0"/>
+                <a:ea typeface="NSimSun" panose="02010609030101010101" pitchFamily="49" charset="-122"/>
+              </a:rPr>
+              <a:t>c</a:t>
+            </a:r>
+            <a:r>
+              <a:rPr lang="en-GB" sz="1400" kern="150" dirty="0" smtClean="0">
+                <a:solidFill>
+                  <a:srgbClr val="FFFFFF"/>
+                </a:solidFill>
+                <a:latin typeface="Courier New" panose="02070309020205020404" pitchFamily="49" charset="0"/>
+                <a:ea typeface="NSimSun" panose="02010609030101010101" pitchFamily="49" charset="-122"/>
+              </a:rPr>
+              <a:t> = </a:t>
+            </a:r>
+            <a:r>
+              <a:rPr lang="en-GB" sz="1400" kern="150" dirty="0" err="1" smtClean="0">
+                <a:solidFill>
+                  <a:srgbClr val="FFFFFF"/>
+                </a:solidFill>
+                <a:latin typeface="Courier New" panose="02070309020205020404" pitchFamily="49" charset="0"/>
+                <a:ea typeface="NSimSun" panose="02010609030101010101" pitchFamily="49" charset="-122"/>
+              </a:rPr>
+              <a:t>shell.evaluate</a:t>
+            </a:r>
+            <a:r>
+              <a:rPr lang="en-GB" sz="1400" kern="150" dirty="0" smtClean="0">
+                <a:solidFill>
+                  <a:srgbClr val="FFFFFF"/>
+                </a:solidFill>
+                <a:latin typeface="Courier New" panose="02070309020205020404" pitchFamily="49" charset="0"/>
+                <a:ea typeface="NSimSun" panose="02010609030101010101" pitchFamily="49" charset="-122"/>
+              </a:rPr>
+              <a:t>(</a:t>
+            </a:r>
+            <a:r>
+              <a:rPr lang="en-GB" sz="1400" kern="150" dirty="0" smtClean="0">
+                <a:solidFill>
+                  <a:srgbClr val="FFA07A"/>
+                </a:solidFill>
+                <a:latin typeface="Courier New" panose="02070309020205020404" pitchFamily="49" charset="0"/>
+                <a:ea typeface="NSimSun" panose="02010609030101010101" pitchFamily="49" charset="-122"/>
+              </a:rPr>
+              <a:t>"{-&gt;$text}"</a:t>
+            </a:r>
+            <a:r>
+              <a:rPr lang="en-GB" sz="1400" kern="150" dirty="0" smtClean="0">
+                <a:solidFill>
+                  <a:srgbClr val="FFFFFF"/>
+                </a:solidFill>
+                <a:latin typeface="Courier New" panose="02070309020205020404" pitchFamily="49" charset="0"/>
+                <a:ea typeface="NSimSun" panose="02010609030101010101" pitchFamily="49" charset="-122"/>
+              </a:rPr>
+              <a:t>)</a:t>
+            </a:r>
+            <a:endParaRPr lang="en-US" sz="1400" kern="150" dirty="0" smtClean="0">
+              <a:solidFill>
+                <a:srgbClr val="FFFFFF"/>
+              </a:solidFill>
+              <a:latin typeface="Courier New" panose="02070309020205020404" pitchFamily="49" charset="0"/>
+              <a:ea typeface="NSimSun" panose="02010609030101010101" pitchFamily="49" charset="-122"/>
+            </a:endParaRPr>
+          </a:p>
+          <a:p>
+            <a:r>
+              <a:rPr lang="en-GB" sz="1400" kern="150" dirty="0" smtClean="0">
+                <a:solidFill>
+                  <a:srgbClr val="FFFFFF"/>
+                </a:solidFill>
+                <a:latin typeface="Courier New" panose="02070309020205020404" pitchFamily="49" charset="0"/>
+                <a:ea typeface="NSimSun" panose="02010609030101010101" pitchFamily="49" charset="-122"/>
+              </a:rPr>
+              <a:t>    </a:t>
+            </a:r>
+            <a:r>
+              <a:rPr lang="en-GB" sz="1400" kern="150" dirty="0" err="1" smtClean="0">
+                <a:solidFill>
+                  <a:srgbClr val="FFFFFF"/>
+                </a:solidFill>
+                <a:latin typeface="Courier New" panose="02070309020205020404" pitchFamily="49" charset="0"/>
+                <a:ea typeface="NSimSun" panose="02010609030101010101" pitchFamily="49" charset="-122"/>
+              </a:rPr>
+              <a:t>c.setDelegate</a:t>
+            </a:r>
+            <a:r>
+              <a:rPr lang="en-GB" sz="1400" kern="150" dirty="0" smtClean="0">
+                <a:solidFill>
+                  <a:srgbClr val="FFFFFF"/>
+                </a:solidFill>
+                <a:latin typeface="Courier New" panose="02070309020205020404" pitchFamily="49" charset="0"/>
+                <a:ea typeface="NSimSun" panose="02010609030101010101" pitchFamily="49" charset="-122"/>
+              </a:rPr>
+              <a:t>(</a:t>
+            </a:r>
+            <a:r>
+              <a:rPr lang="en-GB" sz="1400" kern="150" dirty="0" smtClean="0">
+                <a:solidFill>
+                  <a:srgbClr val="00FFFF"/>
+                </a:solidFill>
+                <a:latin typeface="Courier New" panose="02070309020205020404" pitchFamily="49" charset="0"/>
+                <a:ea typeface="NSimSun" panose="02010609030101010101" pitchFamily="49" charset="-122"/>
+              </a:rPr>
+              <a:t>this</a:t>
+            </a:r>
+            <a:r>
+              <a:rPr lang="en-GB" sz="1400" kern="150" dirty="0" smtClean="0">
+                <a:solidFill>
+                  <a:srgbClr val="FFFFFF"/>
+                </a:solidFill>
+                <a:latin typeface="Courier New" panose="02070309020205020404" pitchFamily="49" charset="0"/>
+                <a:ea typeface="NSimSun" panose="02010609030101010101" pitchFamily="49" charset="-122"/>
+              </a:rPr>
+              <a:t>)</a:t>
+            </a:r>
+            <a:endParaRPr lang="en-US" sz="1400" kern="150" dirty="0" smtClean="0">
+              <a:solidFill>
+                <a:srgbClr val="FFFFFF"/>
+              </a:solidFill>
+              <a:latin typeface="Courier New" panose="02070309020205020404" pitchFamily="49" charset="0"/>
+              <a:ea typeface="NSimSun" panose="02010609030101010101" pitchFamily="49" charset="-122"/>
+            </a:endParaRPr>
+          </a:p>
+          <a:p>
+            <a:r>
+              <a:rPr lang="en-GB" sz="1400" kern="150" dirty="0" smtClean="0">
+                <a:solidFill>
+                  <a:srgbClr val="FFFFFF"/>
+                </a:solidFill>
+                <a:latin typeface="Courier New" panose="02070309020205020404" pitchFamily="49" charset="0"/>
+                <a:ea typeface="NSimSun" panose="02010609030101010101" pitchFamily="49" charset="-122"/>
+              </a:rPr>
+              <a:t>    </a:t>
+            </a:r>
+            <a:r>
+              <a:rPr lang="en-GB" sz="1400" kern="150" dirty="0" smtClean="0">
+                <a:solidFill>
+                  <a:srgbClr val="00FF00"/>
+                </a:solidFill>
+                <a:latin typeface="Courier New" panose="02070309020205020404" pitchFamily="49" charset="0"/>
+                <a:ea typeface="NSimSun" panose="02010609030101010101" pitchFamily="49" charset="-122"/>
+              </a:rPr>
+              <a:t>// Execute the build script and add the</a:t>
+            </a:r>
+            <a:endParaRPr lang="en-US" sz="1400" kern="150" dirty="0" smtClean="0">
+              <a:solidFill>
+                <a:srgbClr val="FFFFFF"/>
+              </a:solidFill>
+              <a:latin typeface="Courier New" panose="02070309020205020404" pitchFamily="49" charset="0"/>
+              <a:ea typeface="NSimSun" panose="02010609030101010101" pitchFamily="49" charset="-122"/>
+            </a:endParaRPr>
+          </a:p>
+          <a:p>
+            <a:r>
+              <a:rPr lang="en-GB" sz="1400" kern="150" dirty="0" smtClean="0">
+                <a:solidFill>
+                  <a:srgbClr val="FFFFFF"/>
+                </a:solidFill>
+                <a:latin typeface="Courier New" panose="02070309020205020404" pitchFamily="49" charset="0"/>
+                <a:ea typeface="NSimSun" panose="02010609030101010101" pitchFamily="49" charset="-122"/>
+              </a:rPr>
+              <a:t>    </a:t>
+            </a:r>
+            <a:r>
+              <a:rPr lang="en-GB" sz="1400" kern="150" dirty="0" smtClean="0">
+                <a:solidFill>
+                  <a:srgbClr val="00FF00"/>
+                </a:solidFill>
+                <a:latin typeface="Courier New" panose="02070309020205020404" pitchFamily="49" charset="0"/>
+                <a:ea typeface="NSimSun" panose="02010609030101010101" pitchFamily="49" charset="-122"/>
+              </a:rPr>
+              <a:t>// source code to the object created.</a:t>
+            </a:r>
+            <a:endParaRPr lang="en-US" sz="1400" kern="150" dirty="0" smtClean="0">
+              <a:solidFill>
+                <a:srgbClr val="FFFFFF"/>
+              </a:solidFill>
+              <a:latin typeface="Courier New" panose="02070309020205020404" pitchFamily="49" charset="0"/>
+              <a:ea typeface="NSimSun" panose="02010609030101010101" pitchFamily="49" charset="-122"/>
+            </a:endParaRPr>
+          </a:p>
+          <a:p>
+            <a:r>
+              <a:rPr lang="en-GB" sz="1400" kern="150" dirty="0" smtClean="0">
+                <a:solidFill>
+                  <a:srgbClr val="FFFFFF"/>
+                </a:solidFill>
+                <a:latin typeface="Courier New" panose="02070309020205020404" pitchFamily="49" charset="0"/>
+                <a:ea typeface="NSimSun" panose="02010609030101010101" pitchFamily="49" charset="-122"/>
+              </a:rPr>
+              <a:t>    </a:t>
+            </a:r>
+            <a:r>
+              <a:rPr lang="en-GB" sz="1400" kern="150" dirty="0" err="1" smtClean="0">
+                <a:solidFill>
+                  <a:srgbClr val="00FFFF"/>
+                </a:solidFill>
+                <a:latin typeface="Courier New" panose="02070309020205020404" pitchFamily="49" charset="0"/>
+                <a:ea typeface="NSimSun" panose="02010609030101010101" pitchFamily="49" charset="-122"/>
+              </a:rPr>
+              <a:t>def</a:t>
+            </a:r>
+            <a:r>
+              <a:rPr lang="en-GB" sz="1400" kern="150" dirty="0" smtClean="0">
+                <a:solidFill>
+                  <a:srgbClr val="FFFFFF"/>
+                </a:solidFill>
+                <a:latin typeface="Courier New" panose="02070309020205020404" pitchFamily="49" charset="0"/>
+                <a:ea typeface="NSimSun" panose="02010609030101010101" pitchFamily="49" charset="-122"/>
+              </a:rPr>
+              <a:t> b = c()</a:t>
+            </a:r>
+            <a:endParaRPr lang="en-US" sz="1400" kern="150" dirty="0" smtClean="0">
+              <a:solidFill>
+                <a:srgbClr val="FFFFFF"/>
+              </a:solidFill>
+              <a:latin typeface="Courier New" panose="02070309020205020404" pitchFamily="49" charset="0"/>
+              <a:ea typeface="NSimSun" panose="02010609030101010101" pitchFamily="49" charset="-122"/>
+            </a:endParaRPr>
+          </a:p>
+          <a:p>
+            <a:r>
+              <a:rPr lang="en-GB" sz="1400" kern="150" dirty="0" smtClean="0">
+                <a:solidFill>
+                  <a:srgbClr val="FFFFFF"/>
+                </a:solidFill>
+                <a:latin typeface="Courier New" panose="02070309020205020404" pitchFamily="49" charset="0"/>
+                <a:ea typeface="NSimSun" panose="02010609030101010101" pitchFamily="49" charset="-122"/>
+              </a:rPr>
+              <a:t>    </a:t>
+            </a:r>
+            <a:r>
+              <a:rPr lang="en-GB" sz="1400" kern="150" dirty="0" smtClean="0">
+                <a:solidFill>
+                  <a:srgbClr val="00FFFF"/>
+                </a:solidFill>
+                <a:latin typeface="Courier New" panose="02070309020205020404" pitchFamily="49" charset="0"/>
+                <a:ea typeface="NSimSun" panose="02010609030101010101" pitchFamily="49" charset="-122"/>
+              </a:rPr>
+              <a:t>if</a:t>
+            </a:r>
+            <a:r>
+              <a:rPr lang="en-GB" sz="1400" kern="150" dirty="0" smtClean="0">
+                <a:solidFill>
+                  <a:srgbClr val="FFFFFF"/>
+                </a:solidFill>
+                <a:latin typeface="Courier New" panose="02070309020205020404" pitchFamily="49" charset="0"/>
+                <a:ea typeface="NSimSun" panose="02010609030101010101" pitchFamily="49" charset="-122"/>
+              </a:rPr>
+              <a:t> (b </a:t>
+            </a:r>
+            <a:r>
+              <a:rPr lang="en-GB" sz="1400" kern="150" dirty="0" err="1" smtClean="0">
+                <a:solidFill>
+                  <a:srgbClr val="00FFFF"/>
+                </a:solidFill>
+                <a:latin typeface="Courier New" panose="02070309020205020404" pitchFamily="49" charset="0"/>
+                <a:ea typeface="NSimSun" panose="02010609030101010101" pitchFamily="49" charset="-122"/>
+              </a:rPr>
+              <a:t>instanceof</a:t>
+            </a:r>
+            <a:r>
+              <a:rPr lang="en-GB" sz="1400" kern="150" dirty="0" smtClean="0">
+                <a:solidFill>
+                  <a:srgbClr val="FFFFFF"/>
+                </a:solidFill>
+                <a:latin typeface="Courier New" panose="02070309020205020404" pitchFamily="49" charset="0"/>
+                <a:ea typeface="NSimSun" panose="02010609030101010101" pitchFamily="49" charset="-122"/>
+              </a:rPr>
+              <a:t> Buildable) {</a:t>
+            </a:r>
+            <a:endParaRPr lang="en-US" sz="1400" kern="150" dirty="0" smtClean="0">
+              <a:solidFill>
+                <a:srgbClr val="FFFFFF"/>
+              </a:solidFill>
+              <a:latin typeface="Courier New" panose="02070309020205020404" pitchFamily="49" charset="0"/>
+              <a:ea typeface="NSimSun" panose="02010609030101010101" pitchFamily="49" charset="-122"/>
+            </a:endParaRPr>
+          </a:p>
+          <a:p>
+            <a:r>
+              <a:rPr lang="en-GB" sz="1400" kern="150" dirty="0" smtClean="0">
+                <a:solidFill>
+                  <a:srgbClr val="FFFFFF"/>
+                </a:solidFill>
+                <a:latin typeface="Courier New" panose="02070309020205020404" pitchFamily="49" charset="0"/>
+                <a:ea typeface="NSimSun" panose="02010609030101010101" pitchFamily="49" charset="-122"/>
+              </a:rPr>
+              <a:t>      </a:t>
+            </a:r>
+            <a:r>
+              <a:rPr lang="en-GB" sz="1400" kern="150" dirty="0" err="1" smtClean="0">
+                <a:solidFill>
+                  <a:srgbClr val="FFFFFF"/>
+                </a:solidFill>
+                <a:latin typeface="Courier New" panose="02070309020205020404" pitchFamily="49" charset="0"/>
+                <a:ea typeface="NSimSun" panose="02010609030101010101" pitchFamily="49" charset="-122"/>
+              </a:rPr>
+              <a:t>b.source</a:t>
+            </a:r>
+            <a:r>
+              <a:rPr lang="en-GB" sz="1400" kern="150" dirty="0" smtClean="0">
+                <a:solidFill>
+                  <a:srgbClr val="FFFFFF"/>
+                </a:solidFill>
+                <a:latin typeface="Courier New" panose="02070309020205020404" pitchFamily="49" charset="0"/>
+                <a:ea typeface="NSimSun" panose="02010609030101010101" pitchFamily="49" charset="-122"/>
+              </a:rPr>
+              <a:t> = text</a:t>
+            </a:r>
+            <a:endParaRPr lang="en-US" sz="1400" kern="150" dirty="0" smtClean="0">
+              <a:solidFill>
+                <a:srgbClr val="FFFFFF"/>
+              </a:solidFill>
+              <a:latin typeface="Courier New" panose="02070309020205020404" pitchFamily="49" charset="0"/>
+              <a:ea typeface="NSimSun" panose="02010609030101010101" pitchFamily="49" charset="-122"/>
+            </a:endParaRPr>
+          </a:p>
+          <a:p>
+            <a:r>
+              <a:rPr lang="en-GB" sz="1400" kern="150" dirty="0" smtClean="0">
+                <a:solidFill>
+                  <a:srgbClr val="FFFFFF"/>
+                </a:solidFill>
+                <a:latin typeface="Courier New" panose="02070309020205020404" pitchFamily="49" charset="0"/>
+                <a:ea typeface="NSimSun" panose="02010609030101010101" pitchFamily="49" charset="-122"/>
+              </a:rPr>
+              <a:t>    }</a:t>
+            </a:r>
+            <a:endParaRPr lang="en-US" sz="1400" kern="150" dirty="0" smtClean="0">
+              <a:solidFill>
+                <a:srgbClr val="FFFFFF"/>
+              </a:solidFill>
+              <a:latin typeface="Courier New" panose="02070309020205020404" pitchFamily="49" charset="0"/>
+              <a:ea typeface="NSimSun" panose="02010609030101010101" pitchFamily="49" charset="-122"/>
+            </a:endParaRPr>
+          </a:p>
+          <a:p>
+            <a:r>
+              <a:rPr lang="en-GB" sz="1400" kern="150" dirty="0" smtClean="0">
+                <a:solidFill>
+                  <a:srgbClr val="FFFFFF"/>
+                </a:solidFill>
+                <a:latin typeface="Courier New" panose="02070309020205020404" pitchFamily="49" charset="0"/>
+                <a:ea typeface="NSimSun" panose="02010609030101010101" pitchFamily="49" charset="-122"/>
+              </a:rPr>
+              <a:t>    </a:t>
+            </a:r>
+            <a:r>
+              <a:rPr lang="en-GB" sz="1400" kern="150" dirty="0" smtClean="0">
+                <a:solidFill>
+                  <a:srgbClr val="00FFFF"/>
+                </a:solidFill>
+                <a:latin typeface="Courier New" panose="02070309020205020404" pitchFamily="49" charset="0"/>
+                <a:ea typeface="NSimSun" panose="02010609030101010101" pitchFamily="49" charset="-122"/>
+              </a:rPr>
+              <a:t>return</a:t>
+            </a:r>
+            <a:r>
+              <a:rPr lang="en-GB" sz="1400" kern="150" dirty="0" smtClean="0">
+                <a:solidFill>
+                  <a:srgbClr val="FFFFFF"/>
+                </a:solidFill>
+                <a:latin typeface="Courier New" panose="02070309020205020404" pitchFamily="49" charset="0"/>
+                <a:ea typeface="NSimSun" panose="02010609030101010101" pitchFamily="49" charset="-122"/>
+              </a:rPr>
+              <a:t> b;</a:t>
+            </a:r>
+            <a:endParaRPr lang="en-US" sz="1400" kern="150" dirty="0" smtClean="0">
+              <a:solidFill>
+                <a:srgbClr val="FFFFFF"/>
+              </a:solidFill>
+              <a:latin typeface="Courier New" panose="02070309020205020404" pitchFamily="49" charset="0"/>
+              <a:ea typeface="NSimSun" panose="02010609030101010101" pitchFamily="49" charset="-122"/>
+            </a:endParaRPr>
+          </a:p>
+          <a:p>
+            <a:r>
+              <a:rPr lang="en-GB" sz="1400" kern="150" dirty="0" smtClean="0">
+                <a:solidFill>
+                  <a:srgbClr val="FFFFFF"/>
+                </a:solidFill>
+                <a:latin typeface="Courier New" panose="02070309020205020404" pitchFamily="49" charset="0"/>
+                <a:ea typeface="NSimSun" panose="02010609030101010101" pitchFamily="49" charset="-122"/>
+              </a:rPr>
+              <a:t>  } </a:t>
+            </a:r>
+            <a:r>
+              <a:rPr lang="en-GB" sz="1400" kern="150" dirty="0" smtClean="0">
+                <a:solidFill>
+                  <a:srgbClr val="00FFFF"/>
+                </a:solidFill>
+                <a:latin typeface="Courier New" panose="02070309020205020404" pitchFamily="49" charset="0"/>
+                <a:ea typeface="NSimSun" panose="02010609030101010101" pitchFamily="49" charset="-122"/>
+              </a:rPr>
+              <a:t>catch</a:t>
+            </a:r>
+            <a:r>
+              <a:rPr lang="en-GB" sz="1400" kern="150" dirty="0" smtClean="0">
+                <a:solidFill>
+                  <a:srgbClr val="FFFFFF"/>
+                </a:solidFill>
+                <a:latin typeface="Courier New" panose="02070309020205020404" pitchFamily="49" charset="0"/>
+                <a:ea typeface="NSimSun" panose="02010609030101010101" pitchFamily="49" charset="-122"/>
+              </a:rPr>
+              <a:t> (</a:t>
+            </a:r>
+            <a:r>
+              <a:rPr lang="en-GB" sz="1400" kern="150" dirty="0" err="1" smtClean="0">
+                <a:solidFill>
+                  <a:srgbClr val="98FB98"/>
+                </a:solidFill>
+                <a:latin typeface="Courier New" panose="02070309020205020404" pitchFamily="49" charset="0"/>
+                <a:ea typeface="NSimSun" panose="02010609030101010101" pitchFamily="49" charset="-122"/>
+              </a:rPr>
+              <a:t>BuildException</a:t>
+            </a:r>
+            <a:r>
+              <a:rPr lang="en-GB" sz="1400" kern="150" dirty="0" smtClean="0">
+                <a:solidFill>
+                  <a:srgbClr val="FFFFFF"/>
+                </a:solidFill>
+                <a:latin typeface="Courier New" panose="02070309020205020404" pitchFamily="49" charset="0"/>
+                <a:ea typeface="NSimSun" panose="02010609030101010101" pitchFamily="49" charset="-122"/>
+              </a:rPr>
+              <a:t> </a:t>
+            </a:r>
+            <a:r>
+              <a:rPr lang="en-GB" sz="1400" kern="150" dirty="0" smtClean="0">
+                <a:solidFill>
+                  <a:srgbClr val="EEDD82"/>
+                </a:solidFill>
+                <a:latin typeface="Courier New" panose="02070309020205020404" pitchFamily="49" charset="0"/>
+                <a:ea typeface="NSimSun" panose="02010609030101010101" pitchFamily="49" charset="-122"/>
+              </a:rPr>
+              <a:t>e</a:t>
+            </a:r>
+            <a:r>
+              <a:rPr lang="en-GB" sz="1400" kern="150" dirty="0" smtClean="0">
+                <a:solidFill>
+                  <a:srgbClr val="FFFFFF"/>
+                </a:solidFill>
+                <a:latin typeface="Courier New" panose="02070309020205020404" pitchFamily="49" charset="0"/>
+                <a:ea typeface="NSimSun" panose="02010609030101010101" pitchFamily="49" charset="-122"/>
+              </a:rPr>
+              <a:t>) {</a:t>
+            </a:r>
+            <a:endParaRPr lang="en-US" sz="1400" kern="150" dirty="0" smtClean="0">
+              <a:solidFill>
+                <a:srgbClr val="FFFFFF"/>
+              </a:solidFill>
+              <a:latin typeface="Courier New" panose="02070309020205020404" pitchFamily="49" charset="0"/>
+              <a:ea typeface="NSimSun" panose="02010609030101010101" pitchFamily="49" charset="-122"/>
+            </a:endParaRPr>
+          </a:p>
+          <a:p>
+            <a:r>
+              <a:rPr lang="en-GB" sz="1400" kern="150" dirty="0" smtClean="0">
+                <a:solidFill>
+                  <a:srgbClr val="FFFFFF"/>
+                </a:solidFill>
+                <a:latin typeface="Courier New" panose="02070309020205020404" pitchFamily="49" charset="0"/>
+                <a:ea typeface="NSimSun" panose="02010609030101010101" pitchFamily="49" charset="-122"/>
+              </a:rPr>
+              <a:t>    </a:t>
+            </a:r>
+            <a:r>
+              <a:rPr lang="en-GB" sz="1400" kern="150" dirty="0" err="1" smtClean="0">
+                <a:solidFill>
+                  <a:srgbClr val="FFFFFF"/>
+                </a:solidFill>
+                <a:latin typeface="Courier New" panose="02070309020205020404" pitchFamily="49" charset="0"/>
+                <a:ea typeface="NSimSun" panose="02010609030101010101" pitchFamily="49" charset="-122"/>
+              </a:rPr>
+              <a:t>e.source</a:t>
+            </a:r>
+            <a:r>
+              <a:rPr lang="en-GB" sz="1400" kern="150" dirty="0" smtClean="0">
+                <a:solidFill>
+                  <a:srgbClr val="FFFFFF"/>
+                </a:solidFill>
+                <a:latin typeface="Courier New" panose="02070309020205020404" pitchFamily="49" charset="0"/>
+                <a:ea typeface="NSimSun" panose="02010609030101010101" pitchFamily="49" charset="-122"/>
+              </a:rPr>
+              <a:t> = text;</a:t>
+            </a:r>
+            <a:endParaRPr lang="en-US" sz="1400" kern="150" dirty="0" smtClean="0">
+              <a:solidFill>
+                <a:srgbClr val="FFFFFF"/>
+              </a:solidFill>
+              <a:latin typeface="Courier New" panose="02070309020205020404" pitchFamily="49" charset="0"/>
+              <a:ea typeface="NSimSun" panose="02010609030101010101" pitchFamily="49" charset="-122"/>
+            </a:endParaRPr>
+          </a:p>
+          <a:p>
+            <a:r>
+              <a:rPr lang="en-GB" sz="1400" kern="150" dirty="0" smtClean="0">
+                <a:solidFill>
+                  <a:srgbClr val="FFFFFF"/>
+                </a:solidFill>
+                <a:latin typeface="Courier New" panose="02070309020205020404" pitchFamily="49" charset="0"/>
+                <a:ea typeface="NSimSun" panose="02010609030101010101" pitchFamily="49" charset="-122"/>
+              </a:rPr>
+              <a:t>    </a:t>
+            </a:r>
+            <a:r>
+              <a:rPr lang="en-GB" sz="1400" kern="150" dirty="0" smtClean="0">
+                <a:solidFill>
+                  <a:srgbClr val="00FFFF"/>
+                </a:solidFill>
+                <a:latin typeface="Courier New" panose="02070309020205020404" pitchFamily="49" charset="0"/>
+                <a:ea typeface="NSimSun" panose="02010609030101010101" pitchFamily="49" charset="-122"/>
+              </a:rPr>
+              <a:t>throw</a:t>
+            </a:r>
+            <a:r>
+              <a:rPr lang="en-GB" sz="1400" kern="150" dirty="0" smtClean="0">
+                <a:solidFill>
+                  <a:srgbClr val="FFFFFF"/>
+                </a:solidFill>
+                <a:latin typeface="Courier New" panose="02070309020205020404" pitchFamily="49" charset="0"/>
+                <a:ea typeface="NSimSun" panose="02010609030101010101" pitchFamily="49" charset="-122"/>
+              </a:rPr>
+              <a:t> e</a:t>
+            </a:r>
+            <a:endParaRPr lang="en-US" sz="1400" kern="150" dirty="0" smtClean="0">
+              <a:solidFill>
+                <a:srgbClr val="FFFFFF"/>
+              </a:solidFill>
+              <a:latin typeface="Courier New" panose="02070309020205020404" pitchFamily="49" charset="0"/>
+              <a:ea typeface="NSimSun" panose="02010609030101010101" pitchFamily="49" charset="-122"/>
+            </a:endParaRPr>
+          </a:p>
+          <a:p>
+            <a:r>
+              <a:rPr lang="en-GB" sz="1400" kern="150" dirty="0" smtClean="0">
+                <a:solidFill>
+                  <a:srgbClr val="FFFFFF"/>
+                </a:solidFill>
+                <a:latin typeface="Courier New" panose="02070309020205020404" pitchFamily="49" charset="0"/>
+                <a:ea typeface="NSimSun" panose="02010609030101010101" pitchFamily="49" charset="-122"/>
+              </a:rPr>
+              <a:t>  }}</a:t>
+            </a:r>
+            <a:endParaRPr lang="en-US" sz="1400" kern="150" dirty="0">
+              <a:solidFill>
+                <a:srgbClr val="FFFFFF"/>
+              </a:solidFill>
+              <a:latin typeface="Courier New" panose="02070309020205020404" pitchFamily="49" charset="0"/>
+              <a:ea typeface="NSimSun" panose="02010609030101010101" pitchFamily="49" charset="-122"/>
             </a:endParaRPr>
           </a:p>
         </p:txBody>
@@ -32401,7 +33896,7 @@
       </p:grpSpPr>
       <p:sp>
         <p:nvSpPr>
-          <p:cNvPr id="187" name="CustomShape 1"/>
+          <p:cNvPr id="184" name="CustomShape 1"/>
           <p:cNvSpPr/>
           <p:nvPr/>
         </p:nvSpPr>
@@ -32469,7 +33964,7 @@
       </p:sp>
       <p:sp>
         <p:nvSpPr>
-          <p:cNvPr id="188" name="CustomShape 2"/>
+          <p:cNvPr id="185" name="CustomShape 2"/>
           <p:cNvSpPr/>
           <p:nvPr/>
         </p:nvSpPr>
@@ -32673,7 +34168,7 @@
       </p:sp>
       <p:sp>
         <p:nvSpPr>
-          <p:cNvPr id="189" name="CustomShape 3"/>
+          <p:cNvPr id="186" name="CustomShape 3"/>
           <p:cNvSpPr/>
           <p:nvPr/>
         </p:nvSpPr>

</xml_diff>

<commit_message>
Finished slides for dry run.
</commit_message>
<xml_diff>
--- a/docs/SICAS_2017/Cole_Drop-In Reporting with Groovy.pptx
+++ b/docs/SICAS_2017/Cole_Drop-In Reporting with Groovy.pptx
@@ -33935,7 +33935,7 @@
               </a:lnSpc>
             </a:pPr>
             <a:r>
-              <a:rPr lang="en-US" sz="4800" b="0" strike="noStrike" spc="-46">
+              <a:rPr lang="en-US" sz="4800" spc="-46" dirty="0" err="1" smtClean="0">
                 <a:solidFill>
                   <a:srgbClr val="31489F"/>
                 </a:solidFill>
@@ -33946,9 +33946,9 @@
                 </a:uFill>
                 <a:latin typeface="Calibri Light"/>
               </a:rPr>
-              <a:t>Slide Heading Here</a:t>
-            </a:r>
-            <a:endParaRPr lang="en-US" sz="1800" b="0" strike="noStrike" spc="-1">
+              <a:t>SimpleReportBuilder</a:t>
+            </a:r>
+            <a:endParaRPr lang="en-US" sz="1800" b="0" strike="noStrike" spc="-1" dirty="0">
               <a:solidFill>
                 <a:srgbClr val="000000"/>
               </a:solidFill>
@@ -33957,7 +33957,8 @@
                   <a:srgbClr val="FFFFFF"/>
                 </a:solidFill>
               </a:uFill>
-              <a:latin typeface="Arial"/>
+              <a:latin typeface="Courier New" panose="02070309020205020404" pitchFamily="49" charset="0"/>
+              <a:cs typeface="Courier New" panose="02070309020205020404" pitchFamily="49" charset="0"/>
             </a:endParaRPr>
           </a:p>
         </p:txBody>
@@ -33971,7 +33972,7 @@
         <p:spPr>
           <a:xfrm>
             <a:off x="822960" y="1845720"/>
-            <a:ext cx="7543080" cy="4022640"/>
+            <a:ext cx="7543080" cy="718186"/>
           </a:xfrm>
           <a:prstGeom prst="rect">
             <a:avLst/>
@@ -34008,7 +34009,7 @@
               <a:buChar char=""/>
             </a:pPr>
             <a:r>
-              <a:rPr lang="en-US" sz="2000" b="0" strike="noStrike" spc="-1">
+              <a:rPr lang="en-US" sz="2000" b="0" strike="noStrike" spc="-1" dirty="0" smtClean="0">
                 <a:solidFill>
                   <a:srgbClr val="404040"/>
                 </a:solidFill>
@@ -34019,34 +34020,25 @@
                 </a:uFill>
                 <a:latin typeface="Calibri"/>
               </a:rPr>
-              <a:t>Presentation Text</a:t>
-            </a:r>
-            <a:endParaRPr lang="en-US" sz="1800" b="0" strike="noStrike" spc="-1">
-              <a:solidFill>
-                <a:srgbClr val="000000"/>
-              </a:solidFill>
-              <a:uFill>
-                <a:solidFill>
-                  <a:srgbClr val="FFFFFF"/>
-                </a:solidFill>
-              </a:uFill>
-              <a:latin typeface="Arial"/>
-            </a:endParaRPr>
-          </a:p>
-          <a:p>
-            <a:pPr marL="377280" lvl="3" indent="-198360">
-              <a:lnSpc>
-                <a:spcPct val="100000"/>
-              </a:lnSpc>
-              <a:buClr>
-                <a:srgbClr val="4E67C8"/>
-              </a:buClr>
-              <a:buSzPct val="80000"/>
-              <a:buFont typeface="Wingdings 2" charset="2"/>
-              <a:buChar char=""/>
-            </a:pPr>
-            <a:r>
-              <a:rPr lang="en-US" sz="1500" b="0" strike="noStrike" spc="-1">
+              <a:t>The </a:t>
+            </a:r>
+            <a:r>
+              <a:rPr lang="en-US" sz="2000" b="0" strike="noStrike" spc="-1" dirty="0" err="1" smtClean="0">
+                <a:solidFill>
+                  <a:srgbClr val="404040"/>
+                </a:solidFill>
+                <a:uFill>
+                  <a:solidFill>
+                    <a:srgbClr val="FFFFFF"/>
+                  </a:solidFill>
+                </a:uFill>
+                <a:latin typeface="Courier New" panose="02070309020205020404" pitchFamily="49" charset="0"/>
+                <a:cs typeface="Courier New" panose="02070309020205020404" pitchFamily="49" charset="0"/>
+              </a:rPr>
+              <a:t>createNode</a:t>
+            </a:r>
+            <a:r>
+              <a:rPr lang="en-US" sz="2000" b="0" strike="noStrike" spc="-1" dirty="0" smtClean="0">
                 <a:solidFill>
                   <a:srgbClr val="404040"/>
                 </a:solidFill>
@@ -34057,57 +34049,8 @@
                 </a:uFill>
                 <a:latin typeface="Calibri"/>
               </a:rPr>
-              <a:t>Screen Captures</a:t>
-            </a:r>
-            <a:endParaRPr lang="en-US" sz="1800" b="0" strike="noStrike" spc="-1">
-              <a:solidFill>
-                <a:srgbClr val="000000"/>
-              </a:solidFill>
-              <a:uFill>
-                <a:solidFill>
-                  <a:srgbClr val="FFFFFF"/>
-                </a:solidFill>
-              </a:uFill>
-              <a:latin typeface="Arial"/>
-            </a:endParaRPr>
-          </a:p>
-          <a:p>
-            <a:pPr marL="377280" lvl="3" indent="-198360">
-              <a:lnSpc>
-                <a:spcPct val="100000"/>
-              </a:lnSpc>
-              <a:buClr>
-                <a:srgbClr val="4E67C8"/>
-              </a:buClr>
-              <a:buSzPct val="80000"/>
-              <a:buFont typeface="Wingdings 2" charset="2"/>
-              <a:buChar char=""/>
-            </a:pPr>
-            <a:r>
-              <a:rPr lang="en-US" sz="1500" b="0" strike="noStrike" spc="-1">
-                <a:solidFill>
-                  <a:srgbClr val="404040"/>
-                </a:solidFill>
-                <a:uFill>
-                  <a:solidFill>
-                    <a:srgbClr val="FFFFFF"/>
-                  </a:solidFill>
-                </a:uFill>
-                <a:latin typeface="Calibri"/>
-              </a:rPr>
-              <a:t>Etc.</a:t>
-            </a:r>
-            <a:endParaRPr lang="en-US" sz="1800" b="0" strike="noStrike" spc="-1">
-              <a:solidFill>
-                <a:srgbClr val="000000"/>
-              </a:solidFill>
-              <a:uFill>
-                <a:solidFill>
-                  <a:srgbClr val="FFFFFF"/>
-                </a:solidFill>
-              </a:uFill>
-              <a:latin typeface="Arial"/>
-            </a:endParaRPr>
+              <a:t> method uses an associative array (hash map) of functions to create  a new object.</a:t>
+            </a:r>
           </a:p>
           <a:p>
             <a:pPr marL="199080" indent="-198360">
@@ -34120,39 +34063,7 @@
               <a:buFont typeface="Wingdings 2" charset="2"/>
               <a:buChar char=""/>
             </a:pPr>
-            <a:r>
-              <a:rPr lang="en-US" sz="2000" b="0" strike="noStrike" spc="-1">
-                <a:solidFill>
-                  <a:srgbClr val="404040"/>
-                </a:solidFill>
-                <a:uFill>
-                  <a:solidFill>
-                    <a:srgbClr val="FFFFFF"/>
-                  </a:solidFill>
-                </a:uFill>
-                <a:latin typeface="Calibri"/>
-              </a:rPr>
-              <a:t>Presenters – duplicate this slide as many times as needed</a:t>
-            </a:r>
-            <a:endParaRPr lang="en-US" sz="1800" b="0" strike="noStrike" spc="-1">
-              <a:solidFill>
-                <a:srgbClr val="000000"/>
-              </a:solidFill>
-              <a:uFill>
-                <a:solidFill>
-                  <a:srgbClr val="FFFFFF"/>
-                </a:solidFill>
-              </a:uFill>
-              <a:latin typeface="Arial"/>
-            </a:endParaRPr>
-          </a:p>
-          <a:p>
-            <a:pPr>
-              <a:lnSpc>
-                <a:spcPct val="90000"/>
-              </a:lnSpc>
-            </a:pPr>
-            <a:endParaRPr lang="en-US" sz="1800" b="0" strike="noStrike" spc="-1">
+            <a:endParaRPr lang="en-US" sz="1800" b="0" strike="noStrike" spc="-1" dirty="0">
               <a:solidFill>
                 <a:srgbClr val="000000"/>
               </a:solidFill>
@@ -34231,6 +34142,775 @@
                 </a:solidFill>
               </a:uFill>
               <a:latin typeface="Arial"/>
+            </a:endParaRPr>
+          </a:p>
+        </p:txBody>
+      </p:sp>
+      <p:sp>
+        <p:nvSpPr>
+          <p:cNvPr id="2" name="Rectangle 1"/>
+          <p:cNvSpPr/>
+          <p:nvPr/>
+        </p:nvSpPr>
+        <p:spPr>
+          <a:xfrm>
+            <a:off x="581898" y="2672986"/>
+            <a:ext cx="8025204" cy="2677656"/>
+          </a:xfrm>
+          <a:prstGeom prst="rect">
+            <a:avLst/>
+          </a:prstGeom>
+          <a:solidFill>
+            <a:schemeClr val="tx1"/>
+          </a:solidFill>
+        </p:spPr>
+        <p:txBody>
+          <a:bodyPr wrap="square">
+            <a:spAutoFit/>
+          </a:bodyPr>
+          <a:lstStyle/>
+          <a:p>
+            <a:r>
+              <a:rPr lang="en-GB" sz="1400" kern="150" dirty="0">
+                <a:solidFill>
+                  <a:srgbClr val="98FB98"/>
+                </a:solidFill>
+                <a:latin typeface="Courier New" panose="02070309020205020404" pitchFamily="49" charset="0"/>
+                <a:ea typeface="NSimSun" panose="02010609030101010101" pitchFamily="49" charset="-122"/>
+              </a:rPr>
+              <a:t>Object</a:t>
+            </a:r>
+            <a:r>
+              <a:rPr lang="en-GB" sz="1400" kern="150" dirty="0">
+                <a:solidFill>
+                  <a:srgbClr val="FFFFFF"/>
+                </a:solidFill>
+                <a:latin typeface="Courier New" panose="02070309020205020404" pitchFamily="49" charset="0"/>
+                <a:ea typeface="NSimSun" panose="02010609030101010101" pitchFamily="49" charset="-122"/>
+              </a:rPr>
+              <a:t> </a:t>
+            </a:r>
+            <a:r>
+              <a:rPr lang="en-GB" sz="1400" kern="150" dirty="0" err="1">
+                <a:solidFill>
+                  <a:srgbClr val="87CEFA"/>
+                </a:solidFill>
+                <a:latin typeface="Courier New" panose="02070309020205020404" pitchFamily="49" charset="0"/>
+                <a:ea typeface="NSimSun" panose="02010609030101010101" pitchFamily="49" charset="-122"/>
+              </a:rPr>
+              <a:t>createNode</a:t>
+            </a:r>
+            <a:r>
+              <a:rPr lang="en-GB" sz="1400" kern="150" dirty="0">
+                <a:solidFill>
+                  <a:srgbClr val="FFFFFF"/>
+                </a:solidFill>
+                <a:latin typeface="Courier New" panose="02070309020205020404" pitchFamily="49" charset="0"/>
+                <a:ea typeface="NSimSun" panose="02010609030101010101" pitchFamily="49" charset="-122"/>
+              </a:rPr>
+              <a:t>(</a:t>
+            </a:r>
+            <a:r>
+              <a:rPr lang="en-GB" sz="1400" kern="150" dirty="0">
+                <a:solidFill>
+                  <a:srgbClr val="98FB98"/>
+                </a:solidFill>
+                <a:latin typeface="Courier New" panose="02070309020205020404" pitchFamily="49" charset="0"/>
+                <a:ea typeface="NSimSun" panose="02010609030101010101" pitchFamily="49" charset="-122"/>
+              </a:rPr>
+              <a:t>Object</a:t>
+            </a:r>
+            <a:r>
+              <a:rPr lang="en-GB" sz="1400" kern="150" dirty="0">
+                <a:solidFill>
+                  <a:srgbClr val="FFFFFF"/>
+                </a:solidFill>
+                <a:latin typeface="Courier New" panose="02070309020205020404" pitchFamily="49" charset="0"/>
+                <a:ea typeface="NSimSun" panose="02010609030101010101" pitchFamily="49" charset="-122"/>
+              </a:rPr>
+              <a:t> </a:t>
+            </a:r>
+            <a:r>
+              <a:rPr lang="en-GB" sz="1400" kern="150" dirty="0">
+                <a:solidFill>
+                  <a:srgbClr val="EEDD82"/>
+                </a:solidFill>
+                <a:latin typeface="Courier New" panose="02070309020205020404" pitchFamily="49" charset="0"/>
+                <a:ea typeface="NSimSun" panose="02010609030101010101" pitchFamily="49" charset="-122"/>
+              </a:rPr>
+              <a:t>name</a:t>
+            </a:r>
+            <a:r>
+              <a:rPr lang="en-GB" sz="1400" kern="150" dirty="0">
+                <a:solidFill>
+                  <a:srgbClr val="FFFFFF"/>
+                </a:solidFill>
+                <a:latin typeface="Courier New" panose="02070309020205020404" pitchFamily="49" charset="0"/>
+                <a:ea typeface="NSimSun" panose="02010609030101010101" pitchFamily="49" charset="-122"/>
+              </a:rPr>
+              <a:t>, </a:t>
+            </a:r>
+            <a:r>
+              <a:rPr lang="en-GB" sz="1400" kern="150" dirty="0">
+                <a:solidFill>
+                  <a:srgbClr val="98FB98"/>
+                </a:solidFill>
+                <a:latin typeface="Courier New" panose="02070309020205020404" pitchFamily="49" charset="0"/>
+                <a:ea typeface="NSimSun" panose="02010609030101010101" pitchFamily="49" charset="-122"/>
+              </a:rPr>
+              <a:t>Map</a:t>
+            </a:r>
+            <a:r>
+              <a:rPr lang="en-GB" sz="1400" kern="150" dirty="0">
+                <a:solidFill>
+                  <a:srgbClr val="FFFFFF"/>
+                </a:solidFill>
+                <a:latin typeface="Courier New" panose="02070309020205020404" pitchFamily="49" charset="0"/>
+                <a:ea typeface="NSimSun" panose="02010609030101010101" pitchFamily="49" charset="-122"/>
+              </a:rPr>
+              <a:t> </a:t>
+            </a:r>
+            <a:r>
+              <a:rPr lang="en-GB" sz="1400" kern="150" dirty="0">
+                <a:solidFill>
+                  <a:srgbClr val="EEDD82"/>
+                </a:solidFill>
+                <a:latin typeface="Courier New" panose="02070309020205020404" pitchFamily="49" charset="0"/>
+                <a:ea typeface="NSimSun" panose="02010609030101010101" pitchFamily="49" charset="-122"/>
+              </a:rPr>
+              <a:t>attributes</a:t>
+            </a:r>
+            <a:r>
+              <a:rPr lang="en-GB" sz="1400" kern="150" dirty="0">
+                <a:solidFill>
+                  <a:srgbClr val="FFFFFF"/>
+                </a:solidFill>
+                <a:latin typeface="Courier New" panose="02070309020205020404" pitchFamily="49" charset="0"/>
+                <a:ea typeface="NSimSun" panose="02010609030101010101" pitchFamily="49" charset="-122"/>
+              </a:rPr>
+              <a:t>, </a:t>
+            </a:r>
+            <a:r>
+              <a:rPr lang="en-GB" sz="1400" kern="150" dirty="0">
+                <a:solidFill>
+                  <a:srgbClr val="98FB98"/>
+                </a:solidFill>
+                <a:latin typeface="Courier New" panose="02070309020205020404" pitchFamily="49" charset="0"/>
+                <a:ea typeface="NSimSun" panose="02010609030101010101" pitchFamily="49" charset="-122"/>
+              </a:rPr>
+              <a:t>Object</a:t>
+            </a:r>
+            <a:r>
+              <a:rPr lang="en-GB" sz="1400" kern="150" dirty="0">
+                <a:solidFill>
+                  <a:srgbClr val="FFFFFF"/>
+                </a:solidFill>
+                <a:latin typeface="Courier New" panose="02070309020205020404" pitchFamily="49" charset="0"/>
+                <a:ea typeface="NSimSun" panose="02010609030101010101" pitchFamily="49" charset="-122"/>
+              </a:rPr>
+              <a:t> </a:t>
+            </a:r>
+            <a:r>
+              <a:rPr lang="en-GB" sz="1400" kern="150" dirty="0">
+                <a:solidFill>
+                  <a:srgbClr val="EEDD82"/>
+                </a:solidFill>
+                <a:latin typeface="Courier New" panose="02070309020205020404" pitchFamily="49" charset="0"/>
+                <a:ea typeface="NSimSun" panose="02010609030101010101" pitchFamily="49" charset="-122"/>
+              </a:rPr>
+              <a:t>value</a:t>
+            </a:r>
+            <a:r>
+              <a:rPr lang="en-GB" sz="1400" kern="150" dirty="0">
+                <a:solidFill>
+                  <a:srgbClr val="FFFFFF"/>
+                </a:solidFill>
+                <a:latin typeface="Courier New" panose="02070309020205020404" pitchFamily="49" charset="0"/>
+                <a:ea typeface="NSimSun" panose="02010609030101010101" pitchFamily="49" charset="-122"/>
+              </a:rPr>
+              <a:t>) {</a:t>
+            </a:r>
+            <a:endParaRPr lang="en-US" sz="1400" kern="150" dirty="0">
+              <a:solidFill>
+                <a:srgbClr val="FFFFFF"/>
+              </a:solidFill>
+              <a:latin typeface="Courier New" panose="02070309020205020404" pitchFamily="49" charset="0"/>
+              <a:ea typeface="NSimSun" panose="02010609030101010101" pitchFamily="49" charset="-122"/>
+            </a:endParaRPr>
+          </a:p>
+          <a:p>
+            <a:r>
+              <a:rPr lang="en-GB" sz="1400" kern="150" dirty="0">
+                <a:solidFill>
+                  <a:srgbClr val="FFFFFF"/>
+                </a:solidFill>
+                <a:latin typeface="Courier New" panose="02070309020205020404" pitchFamily="49" charset="0"/>
+                <a:ea typeface="NSimSun" panose="02010609030101010101" pitchFamily="49" charset="-122"/>
+              </a:rPr>
+              <a:t>  debug </a:t>
+            </a:r>
+            <a:r>
+              <a:rPr lang="en-GB" sz="1400" kern="150" dirty="0">
+                <a:solidFill>
+                  <a:srgbClr val="FFA07A"/>
+                </a:solidFill>
+                <a:latin typeface="Courier New" panose="02070309020205020404" pitchFamily="49" charset="0"/>
+                <a:ea typeface="NSimSun" panose="02010609030101010101" pitchFamily="49" charset="-122"/>
+              </a:rPr>
+              <a:t>"</a:t>
+            </a:r>
+            <a:r>
+              <a:rPr lang="en-GB" sz="1400" kern="150" dirty="0" err="1">
+                <a:solidFill>
+                  <a:srgbClr val="FFA07A"/>
+                </a:solidFill>
+                <a:latin typeface="Courier New" panose="02070309020205020404" pitchFamily="49" charset="0"/>
+                <a:ea typeface="NSimSun" panose="02010609030101010101" pitchFamily="49" charset="-122"/>
+              </a:rPr>
+              <a:t>createNode</a:t>
+            </a:r>
+            <a:r>
+              <a:rPr lang="en-GB" sz="1400" kern="150" dirty="0">
+                <a:solidFill>
+                  <a:srgbClr val="FFA07A"/>
+                </a:solidFill>
+                <a:latin typeface="Courier New" panose="02070309020205020404" pitchFamily="49" charset="0"/>
+                <a:ea typeface="NSimSun" panose="02010609030101010101" pitchFamily="49" charset="-122"/>
+              </a:rPr>
+              <a:t>($name)"</a:t>
+            </a:r>
+            <a:endParaRPr lang="en-US" sz="1400" kern="150" dirty="0">
+              <a:solidFill>
+                <a:srgbClr val="FFFFFF"/>
+              </a:solidFill>
+              <a:latin typeface="Courier New" panose="02070309020205020404" pitchFamily="49" charset="0"/>
+              <a:ea typeface="NSimSun" panose="02010609030101010101" pitchFamily="49" charset="-122"/>
+            </a:endParaRPr>
+          </a:p>
+          <a:p>
+            <a:r>
+              <a:rPr lang="en-GB" sz="1400" kern="150" dirty="0">
+                <a:solidFill>
+                  <a:srgbClr val="FFFFFF"/>
+                </a:solidFill>
+                <a:latin typeface="Courier New" panose="02070309020205020404" pitchFamily="49" charset="0"/>
+                <a:ea typeface="NSimSun" panose="02010609030101010101" pitchFamily="49" charset="-122"/>
+              </a:rPr>
+              <a:t>  </a:t>
+            </a:r>
+            <a:r>
+              <a:rPr lang="en-GB" sz="1400" kern="150" dirty="0">
+                <a:solidFill>
+                  <a:srgbClr val="00FFFF"/>
+                </a:solidFill>
+                <a:latin typeface="Courier New" panose="02070309020205020404" pitchFamily="49" charset="0"/>
+                <a:ea typeface="NSimSun" panose="02010609030101010101" pitchFamily="49" charset="-122"/>
+              </a:rPr>
+              <a:t>if</a:t>
+            </a:r>
+            <a:r>
+              <a:rPr lang="en-GB" sz="1400" kern="150" dirty="0">
+                <a:solidFill>
+                  <a:srgbClr val="FFFFFF"/>
+                </a:solidFill>
+                <a:latin typeface="Courier New" panose="02070309020205020404" pitchFamily="49" charset="0"/>
+                <a:ea typeface="NSimSun" panose="02010609030101010101" pitchFamily="49" charset="-122"/>
+              </a:rPr>
+              <a:t> (!</a:t>
+            </a:r>
+            <a:r>
+              <a:rPr lang="en-GB" sz="1400" kern="150" dirty="0" err="1">
+                <a:solidFill>
+                  <a:srgbClr val="FFFFFF"/>
+                </a:solidFill>
+                <a:latin typeface="Courier New" panose="02070309020205020404" pitchFamily="49" charset="0"/>
+                <a:ea typeface="NSimSun" panose="02010609030101010101" pitchFamily="49" charset="-122"/>
+              </a:rPr>
+              <a:t>nodeFactory</a:t>
+            </a:r>
+            <a:r>
+              <a:rPr lang="en-GB" sz="1400" kern="150" dirty="0">
+                <a:solidFill>
+                  <a:srgbClr val="FFFFFF"/>
+                </a:solidFill>
+                <a:latin typeface="Courier New" panose="02070309020205020404" pitchFamily="49" charset="0"/>
+                <a:ea typeface="NSimSun" panose="02010609030101010101" pitchFamily="49" charset="-122"/>
+              </a:rPr>
+              <a:t>[name]) {</a:t>
+            </a:r>
+            <a:endParaRPr lang="en-US" sz="1400" kern="150" dirty="0">
+              <a:solidFill>
+                <a:srgbClr val="FFFFFF"/>
+              </a:solidFill>
+              <a:latin typeface="Courier New" panose="02070309020205020404" pitchFamily="49" charset="0"/>
+              <a:ea typeface="NSimSun" panose="02010609030101010101" pitchFamily="49" charset="-122"/>
+            </a:endParaRPr>
+          </a:p>
+          <a:p>
+            <a:r>
+              <a:rPr lang="en-GB" sz="1400" kern="150" dirty="0">
+                <a:solidFill>
+                  <a:srgbClr val="FFFFFF"/>
+                </a:solidFill>
+                <a:latin typeface="Courier New" panose="02070309020205020404" pitchFamily="49" charset="0"/>
+                <a:ea typeface="NSimSun" panose="02010609030101010101" pitchFamily="49" charset="-122"/>
+              </a:rPr>
+              <a:t>    </a:t>
+            </a:r>
+            <a:r>
+              <a:rPr lang="en-GB" sz="1400" kern="150" dirty="0">
+                <a:solidFill>
+                  <a:srgbClr val="00FFFF"/>
+                </a:solidFill>
+                <a:latin typeface="Courier New" panose="02070309020205020404" pitchFamily="49" charset="0"/>
+                <a:ea typeface="NSimSun" panose="02010609030101010101" pitchFamily="49" charset="-122"/>
+              </a:rPr>
+              <a:t>throw</a:t>
+            </a:r>
+            <a:r>
+              <a:rPr lang="en-GB" sz="1400" kern="150" dirty="0">
+                <a:solidFill>
+                  <a:srgbClr val="FFFFFF"/>
+                </a:solidFill>
+                <a:latin typeface="Courier New" panose="02070309020205020404" pitchFamily="49" charset="0"/>
+                <a:ea typeface="NSimSun" panose="02010609030101010101" pitchFamily="49" charset="-122"/>
+              </a:rPr>
+              <a:t> </a:t>
+            </a:r>
+            <a:r>
+              <a:rPr lang="en-GB" sz="1400" kern="150" dirty="0">
+                <a:solidFill>
+                  <a:srgbClr val="00FFFF"/>
+                </a:solidFill>
+                <a:latin typeface="Courier New" panose="02070309020205020404" pitchFamily="49" charset="0"/>
+                <a:ea typeface="NSimSun" panose="02010609030101010101" pitchFamily="49" charset="-122"/>
+              </a:rPr>
+              <a:t>new</a:t>
+            </a:r>
+            <a:r>
+              <a:rPr lang="en-GB" sz="1400" kern="150" dirty="0">
+                <a:solidFill>
+                  <a:srgbClr val="FFFFFF"/>
+                </a:solidFill>
+                <a:latin typeface="Courier New" panose="02070309020205020404" pitchFamily="49" charset="0"/>
+                <a:ea typeface="NSimSun" panose="02010609030101010101" pitchFamily="49" charset="-122"/>
+              </a:rPr>
+              <a:t> </a:t>
+            </a:r>
+            <a:r>
+              <a:rPr lang="en-GB" sz="1400" kern="150" dirty="0" err="1">
+                <a:solidFill>
+                  <a:srgbClr val="98FB98"/>
+                </a:solidFill>
+                <a:latin typeface="Courier New" panose="02070309020205020404" pitchFamily="49" charset="0"/>
+                <a:ea typeface="NSimSun" panose="02010609030101010101" pitchFamily="49" charset="-122"/>
+              </a:rPr>
+              <a:t>BuildException</a:t>
+            </a:r>
+            <a:r>
+              <a:rPr lang="en-GB" sz="1400" kern="150" dirty="0">
+                <a:solidFill>
+                  <a:srgbClr val="FFFFFF"/>
+                </a:solidFill>
+                <a:latin typeface="Courier New" panose="02070309020205020404" pitchFamily="49" charset="0"/>
+                <a:ea typeface="NSimSun" panose="02010609030101010101" pitchFamily="49" charset="-122"/>
+              </a:rPr>
+              <a:t>(</a:t>
+            </a:r>
+            <a:r>
+              <a:rPr lang="en-GB" sz="1400" kern="150" dirty="0">
+                <a:solidFill>
+                  <a:srgbClr val="FFA07A"/>
+                </a:solidFill>
+                <a:latin typeface="Courier New" panose="02070309020205020404" pitchFamily="49" charset="0"/>
+                <a:ea typeface="NSimSun" panose="02010609030101010101" pitchFamily="49" charset="-122"/>
+              </a:rPr>
+              <a:t>"'$name' is not a valid build method.  Valid values are ["</a:t>
+            </a:r>
+            <a:endParaRPr lang="en-US" sz="1400" kern="150" dirty="0">
+              <a:solidFill>
+                <a:srgbClr val="FFFFFF"/>
+              </a:solidFill>
+              <a:latin typeface="Courier New" panose="02070309020205020404" pitchFamily="49" charset="0"/>
+              <a:ea typeface="NSimSun" panose="02010609030101010101" pitchFamily="49" charset="-122"/>
+            </a:endParaRPr>
+          </a:p>
+          <a:p>
+            <a:r>
+              <a:rPr lang="en-GB" sz="1400" kern="150" dirty="0">
+                <a:solidFill>
+                  <a:srgbClr val="FFFFFF"/>
+                </a:solidFill>
+                <a:latin typeface="Courier New" panose="02070309020205020404" pitchFamily="49" charset="0"/>
+                <a:ea typeface="NSimSun" panose="02010609030101010101" pitchFamily="49" charset="-122"/>
+              </a:rPr>
+              <a:t>                             + </a:t>
+            </a:r>
+            <a:r>
+              <a:rPr lang="en-GB" sz="1400" kern="150" dirty="0" err="1">
+                <a:solidFill>
+                  <a:srgbClr val="FFFFFF"/>
+                </a:solidFill>
+                <a:latin typeface="Courier New" panose="02070309020205020404" pitchFamily="49" charset="0"/>
+                <a:ea typeface="NSimSun" panose="02010609030101010101" pitchFamily="49" charset="-122"/>
+              </a:rPr>
+              <a:t>nodeFactory.keySet</a:t>
+            </a:r>
+            <a:r>
+              <a:rPr lang="en-GB" sz="1400" kern="150" dirty="0">
+                <a:solidFill>
+                  <a:srgbClr val="FFFFFF"/>
+                </a:solidFill>
+                <a:latin typeface="Courier New" panose="02070309020205020404" pitchFamily="49" charset="0"/>
+                <a:ea typeface="NSimSun" panose="02010609030101010101" pitchFamily="49" charset="-122"/>
+              </a:rPr>
+              <a:t>().join(</a:t>
+            </a:r>
+            <a:r>
+              <a:rPr lang="en-GB" sz="1400" kern="150" dirty="0">
+                <a:solidFill>
+                  <a:srgbClr val="FFA07A"/>
+                </a:solidFill>
+                <a:latin typeface="Courier New" panose="02070309020205020404" pitchFamily="49" charset="0"/>
+                <a:ea typeface="NSimSun" panose="02010609030101010101" pitchFamily="49" charset="-122"/>
+              </a:rPr>
+              <a:t>', '</a:t>
+            </a:r>
+            <a:r>
+              <a:rPr lang="en-GB" sz="1400" kern="150" dirty="0">
+                <a:solidFill>
+                  <a:srgbClr val="FFFFFF"/>
+                </a:solidFill>
+                <a:latin typeface="Courier New" panose="02070309020205020404" pitchFamily="49" charset="0"/>
+                <a:ea typeface="NSimSun" panose="02010609030101010101" pitchFamily="49" charset="-122"/>
+              </a:rPr>
+              <a:t>) + </a:t>
+            </a:r>
+            <a:r>
+              <a:rPr lang="en-GB" sz="1400" kern="150" dirty="0">
+                <a:solidFill>
+                  <a:srgbClr val="FFA07A"/>
+                </a:solidFill>
+                <a:latin typeface="Courier New" panose="02070309020205020404" pitchFamily="49" charset="0"/>
+                <a:ea typeface="NSimSun" panose="02010609030101010101" pitchFamily="49" charset="-122"/>
+              </a:rPr>
+              <a:t>"]"</a:t>
+            </a:r>
+            <a:r>
+              <a:rPr lang="en-GB" sz="1400" kern="150" dirty="0">
+                <a:solidFill>
+                  <a:srgbClr val="FFFFFF"/>
+                </a:solidFill>
+                <a:latin typeface="Courier New" panose="02070309020205020404" pitchFamily="49" charset="0"/>
+                <a:ea typeface="NSimSun" panose="02010609030101010101" pitchFamily="49" charset="-122"/>
+              </a:rPr>
+              <a:t>);</a:t>
+            </a:r>
+            <a:endParaRPr lang="en-US" sz="1400" kern="150" dirty="0">
+              <a:solidFill>
+                <a:srgbClr val="FFFFFF"/>
+              </a:solidFill>
+              <a:latin typeface="Courier New" panose="02070309020205020404" pitchFamily="49" charset="0"/>
+              <a:ea typeface="NSimSun" panose="02010609030101010101" pitchFamily="49" charset="-122"/>
+            </a:endParaRPr>
+          </a:p>
+          <a:p>
+            <a:r>
+              <a:rPr lang="en-GB" sz="1400" kern="150" dirty="0">
+                <a:solidFill>
+                  <a:srgbClr val="FFFFFF"/>
+                </a:solidFill>
+                <a:latin typeface="Courier New" panose="02070309020205020404" pitchFamily="49" charset="0"/>
+                <a:ea typeface="NSimSun" panose="02010609030101010101" pitchFamily="49" charset="-122"/>
+              </a:rPr>
+              <a:t>  }</a:t>
+            </a:r>
+            <a:endParaRPr lang="en-US" sz="1400" kern="150" dirty="0">
+              <a:solidFill>
+                <a:srgbClr val="FFFFFF"/>
+              </a:solidFill>
+              <a:latin typeface="Courier New" panose="02070309020205020404" pitchFamily="49" charset="0"/>
+              <a:ea typeface="NSimSun" panose="02010609030101010101" pitchFamily="49" charset="-122"/>
+            </a:endParaRPr>
+          </a:p>
+          <a:p>
+            <a:r>
+              <a:rPr lang="en-GB" sz="1400" kern="150" dirty="0">
+                <a:solidFill>
+                  <a:srgbClr val="FFFFFF"/>
+                </a:solidFill>
+                <a:latin typeface="Courier New" panose="02070309020205020404" pitchFamily="49" charset="0"/>
+                <a:ea typeface="NSimSun" panose="02010609030101010101" pitchFamily="49" charset="-122"/>
+              </a:rPr>
+              <a:t>  </a:t>
+            </a:r>
+            <a:r>
+              <a:rPr lang="en-GB" sz="1400" kern="150" dirty="0">
+                <a:solidFill>
+                  <a:srgbClr val="98FB98"/>
+                </a:solidFill>
+                <a:latin typeface="Courier New" panose="02070309020205020404" pitchFamily="49" charset="0"/>
+                <a:ea typeface="NSimSun" panose="02010609030101010101" pitchFamily="49" charset="-122"/>
+              </a:rPr>
+              <a:t>assert</a:t>
+            </a:r>
+            <a:r>
+              <a:rPr lang="en-GB" sz="1400" kern="150" dirty="0">
+                <a:solidFill>
+                  <a:srgbClr val="FFFFFF"/>
+                </a:solidFill>
+                <a:latin typeface="Courier New" panose="02070309020205020404" pitchFamily="49" charset="0"/>
+                <a:ea typeface="NSimSun" panose="02010609030101010101" pitchFamily="49" charset="-122"/>
+              </a:rPr>
+              <a:t> </a:t>
+            </a:r>
+            <a:r>
+              <a:rPr lang="en-GB" sz="1400" kern="150" dirty="0">
+                <a:solidFill>
+                  <a:srgbClr val="EEDD82"/>
+                </a:solidFill>
+                <a:latin typeface="Courier New" panose="02070309020205020404" pitchFamily="49" charset="0"/>
+                <a:ea typeface="NSimSun" panose="02010609030101010101" pitchFamily="49" charset="-122"/>
+              </a:rPr>
+              <a:t>name</a:t>
+            </a:r>
+            <a:r>
+              <a:rPr lang="en-GB" sz="1400" kern="150" dirty="0">
+                <a:solidFill>
+                  <a:srgbClr val="FFFFFF"/>
+                </a:solidFill>
+                <a:latin typeface="Courier New" panose="02070309020205020404" pitchFamily="49" charset="0"/>
+                <a:ea typeface="NSimSun" panose="02010609030101010101" pitchFamily="49" charset="-122"/>
+              </a:rPr>
+              <a:t> </a:t>
+            </a:r>
+            <a:r>
+              <a:rPr lang="en-GB" sz="1400" kern="150" dirty="0">
+                <a:solidFill>
+                  <a:srgbClr val="00FFFF"/>
+                </a:solidFill>
+                <a:latin typeface="Courier New" panose="02070309020205020404" pitchFamily="49" charset="0"/>
+                <a:ea typeface="NSimSun" panose="02010609030101010101" pitchFamily="49" charset="-122"/>
+              </a:rPr>
+              <a:t>in</a:t>
+            </a:r>
+            <a:r>
+              <a:rPr lang="en-GB" sz="1400" kern="150" dirty="0">
+                <a:solidFill>
+                  <a:srgbClr val="FFFFFF"/>
+                </a:solidFill>
+                <a:latin typeface="Courier New" panose="02070309020205020404" pitchFamily="49" charset="0"/>
+                <a:ea typeface="NSimSun" panose="02010609030101010101" pitchFamily="49" charset="-122"/>
+              </a:rPr>
+              <a:t> </a:t>
+            </a:r>
+            <a:r>
+              <a:rPr lang="en-GB" sz="1400" kern="150" dirty="0" err="1">
+                <a:solidFill>
+                  <a:srgbClr val="FFFFFF"/>
+                </a:solidFill>
+                <a:latin typeface="Courier New" panose="02070309020205020404" pitchFamily="49" charset="0"/>
+                <a:ea typeface="NSimSun" panose="02010609030101010101" pitchFamily="49" charset="-122"/>
+              </a:rPr>
+              <a:t>nodeFactory.keySet</a:t>
+            </a:r>
+            <a:r>
+              <a:rPr lang="en-GB" sz="1400" kern="150" dirty="0" smtClean="0">
+                <a:solidFill>
+                  <a:srgbClr val="FFFFFF"/>
+                </a:solidFill>
+                <a:latin typeface="Courier New" panose="02070309020205020404" pitchFamily="49" charset="0"/>
+                <a:ea typeface="NSimSun" panose="02010609030101010101" pitchFamily="49" charset="-122"/>
+              </a:rPr>
+              <a:t>()</a:t>
+            </a:r>
+            <a:endParaRPr lang="en-US" sz="1400" kern="150" dirty="0" smtClean="0">
+              <a:solidFill>
+                <a:srgbClr val="FFFFFF"/>
+              </a:solidFill>
+              <a:latin typeface="Courier New" panose="02070309020205020404" pitchFamily="49" charset="0"/>
+              <a:ea typeface="NSimSun" panose="02010609030101010101" pitchFamily="49" charset="-122"/>
+            </a:endParaRPr>
+          </a:p>
+          <a:p>
+            <a:r>
+              <a:rPr lang="en-GB" sz="1400" kern="150" dirty="0" smtClean="0">
+                <a:solidFill>
+                  <a:srgbClr val="00FFFF"/>
+                </a:solidFill>
+                <a:latin typeface="Courier New" panose="02070309020205020404" pitchFamily="49" charset="0"/>
+                <a:ea typeface="NSimSun" panose="02010609030101010101" pitchFamily="49" charset="-122"/>
+              </a:rPr>
+              <a:t>  </a:t>
+            </a:r>
+            <a:r>
+              <a:rPr lang="en-GB" sz="1400" kern="150" dirty="0" err="1" smtClean="0">
+                <a:solidFill>
+                  <a:srgbClr val="00FFFF"/>
+                </a:solidFill>
+                <a:latin typeface="Courier New" panose="02070309020205020404" pitchFamily="49" charset="0"/>
+                <a:ea typeface="NSimSun" panose="02010609030101010101" pitchFamily="49" charset="-122"/>
+              </a:rPr>
+              <a:t>def</a:t>
+            </a:r>
+            <a:r>
+              <a:rPr lang="en-GB" sz="1400" kern="150" dirty="0" smtClean="0">
+                <a:solidFill>
+                  <a:srgbClr val="FFFFFF"/>
+                </a:solidFill>
+                <a:latin typeface="Courier New" panose="02070309020205020404" pitchFamily="49" charset="0"/>
+                <a:ea typeface="NSimSun" panose="02010609030101010101" pitchFamily="49" charset="-122"/>
+              </a:rPr>
+              <a:t> n = </a:t>
+            </a:r>
+            <a:r>
+              <a:rPr lang="en-GB" sz="1400" kern="150" dirty="0" err="1" smtClean="0">
+                <a:solidFill>
+                  <a:srgbClr val="FFFFFF"/>
+                </a:solidFill>
+                <a:latin typeface="Courier New" panose="02070309020205020404" pitchFamily="49" charset="0"/>
+                <a:ea typeface="NSimSun" panose="02010609030101010101" pitchFamily="49" charset="-122"/>
+              </a:rPr>
+              <a:t>nodeFactory</a:t>
+            </a:r>
+            <a:r>
+              <a:rPr lang="en-GB" sz="1400" kern="150" dirty="0" smtClean="0">
+                <a:solidFill>
+                  <a:srgbClr val="FFFFFF"/>
+                </a:solidFill>
+                <a:latin typeface="Courier New" panose="02070309020205020404" pitchFamily="49" charset="0"/>
+                <a:ea typeface="NSimSun" panose="02010609030101010101" pitchFamily="49" charset="-122"/>
+              </a:rPr>
+              <a:t>[name].create(name, attributes, value)</a:t>
+            </a:r>
+            <a:endParaRPr lang="en-US" sz="1400" kern="150" dirty="0" smtClean="0">
+              <a:solidFill>
+                <a:srgbClr val="FFFFFF"/>
+              </a:solidFill>
+              <a:latin typeface="Courier New" panose="02070309020205020404" pitchFamily="49" charset="0"/>
+              <a:ea typeface="NSimSun" panose="02010609030101010101" pitchFamily="49" charset="-122"/>
+            </a:endParaRPr>
+          </a:p>
+          <a:p>
+            <a:r>
+              <a:rPr lang="en-GB" sz="1400" kern="150" dirty="0" smtClean="0">
+                <a:solidFill>
+                  <a:srgbClr val="FFFFFF"/>
+                </a:solidFill>
+                <a:latin typeface="Courier New" panose="02070309020205020404" pitchFamily="49" charset="0"/>
+                <a:ea typeface="NSimSun" panose="02010609030101010101" pitchFamily="49" charset="-122"/>
+              </a:rPr>
+              <a:t>  </a:t>
+            </a:r>
+            <a:r>
+              <a:rPr lang="en-GB" sz="1400" kern="150" dirty="0">
+                <a:solidFill>
+                  <a:srgbClr val="FFFFFF"/>
+                </a:solidFill>
+                <a:latin typeface="Courier New" panose="02070309020205020404" pitchFamily="49" charset="0"/>
+                <a:ea typeface="NSimSun" panose="02010609030101010101" pitchFamily="49" charset="-122"/>
+              </a:rPr>
+              <a:t>debug </a:t>
+            </a:r>
+            <a:r>
+              <a:rPr lang="en-GB" sz="1400" kern="150" dirty="0">
+                <a:solidFill>
+                  <a:srgbClr val="FFA07A"/>
+                </a:solidFill>
+                <a:latin typeface="Courier New" panose="02070309020205020404" pitchFamily="49" charset="0"/>
+                <a:ea typeface="NSimSun" panose="02010609030101010101" pitchFamily="49" charset="-122"/>
+              </a:rPr>
+              <a:t>"</a:t>
+            </a:r>
+            <a:r>
+              <a:rPr lang="en-GB" sz="1400" kern="150" dirty="0" err="1">
+                <a:solidFill>
+                  <a:srgbClr val="FFA07A"/>
+                </a:solidFill>
+                <a:latin typeface="Courier New" panose="02070309020205020404" pitchFamily="49" charset="0"/>
+                <a:ea typeface="NSimSun" panose="02010609030101010101" pitchFamily="49" charset="-122"/>
+              </a:rPr>
+              <a:t>createNode</a:t>
+            </a:r>
+            <a:r>
+              <a:rPr lang="en-GB" sz="1400" kern="150" dirty="0">
+                <a:solidFill>
+                  <a:srgbClr val="FFA07A"/>
+                </a:solidFill>
+                <a:latin typeface="Courier New" panose="02070309020205020404" pitchFamily="49" charset="0"/>
+                <a:ea typeface="NSimSun" panose="02010609030101010101" pitchFamily="49" charset="-122"/>
+              </a:rPr>
+              <a:t> =&gt; $n"</a:t>
+            </a:r>
+            <a:endParaRPr lang="en-US" sz="1400" kern="150" dirty="0">
+              <a:solidFill>
+                <a:srgbClr val="FFFFFF"/>
+              </a:solidFill>
+              <a:latin typeface="Courier New" panose="02070309020205020404" pitchFamily="49" charset="0"/>
+              <a:ea typeface="NSimSun" panose="02010609030101010101" pitchFamily="49" charset="-122"/>
+            </a:endParaRPr>
+          </a:p>
+          <a:p>
+            <a:r>
+              <a:rPr lang="en-GB" sz="1400" kern="150" dirty="0">
+                <a:solidFill>
+                  <a:srgbClr val="FFFFFF"/>
+                </a:solidFill>
+                <a:latin typeface="Courier New" panose="02070309020205020404" pitchFamily="49" charset="0"/>
+                <a:ea typeface="NSimSun" panose="02010609030101010101" pitchFamily="49" charset="-122"/>
+              </a:rPr>
+              <a:t>  </a:t>
+            </a:r>
+            <a:r>
+              <a:rPr lang="en-GB" sz="1400" kern="150" dirty="0">
+                <a:solidFill>
+                  <a:srgbClr val="00FFFF"/>
+                </a:solidFill>
+                <a:latin typeface="Courier New" panose="02070309020205020404" pitchFamily="49" charset="0"/>
+                <a:ea typeface="NSimSun" panose="02010609030101010101" pitchFamily="49" charset="-122"/>
+              </a:rPr>
+              <a:t>return</a:t>
+            </a:r>
+            <a:r>
+              <a:rPr lang="en-GB" sz="1400" kern="150" dirty="0">
+                <a:solidFill>
+                  <a:srgbClr val="FFFFFF"/>
+                </a:solidFill>
+                <a:latin typeface="Courier New" panose="02070309020205020404" pitchFamily="49" charset="0"/>
+                <a:ea typeface="NSimSun" panose="02010609030101010101" pitchFamily="49" charset="-122"/>
+              </a:rPr>
+              <a:t> n</a:t>
+            </a:r>
+            <a:endParaRPr lang="en-US" sz="1400" kern="150" dirty="0">
+              <a:solidFill>
+                <a:srgbClr val="FFFFFF"/>
+              </a:solidFill>
+              <a:latin typeface="Courier New" panose="02070309020205020404" pitchFamily="49" charset="0"/>
+              <a:ea typeface="NSimSun" panose="02010609030101010101" pitchFamily="49" charset="-122"/>
+            </a:endParaRPr>
+          </a:p>
+          <a:p>
+            <a:pPr>
+              <a:spcAft>
+                <a:spcPts val="595"/>
+              </a:spcAft>
+            </a:pPr>
+            <a:r>
+              <a:rPr lang="en-GB" sz="1400" kern="150" dirty="0">
+                <a:solidFill>
+                  <a:srgbClr val="FFFFFF"/>
+                </a:solidFill>
+                <a:latin typeface="Courier New" panose="02070309020205020404" pitchFamily="49" charset="0"/>
+                <a:ea typeface="NSimSun" panose="02010609030101010101" pitchFamily="49" charset="-122"/>
+              </a:rPr>
+              <a:t>}</a:t>
+            </a:r>
+            <a:endParaRPr lang="en-US" sz="1400" kern="150" dirty="0">
+              <a:solidFill>
+                <a:srgbClr val="FFFFFF"/>
+              </a:solidFill>
+              <a:latin typeface="Courier New" panose="02070309020205020404" pitchFamily="49" charset="0"/>
+              <a:ea typeface="NSimSun" panose="02010609030101010101" pitchFamily="49" charset="-122"/>
             </a:endParaRPr>
           </a:p>
         </p:txBody>
@@ -34331,7 +35011,7 @@
               </a:lnSpc>
             </a:pPr>
             <a:r>
-              <a:rPr lang="en-US" sz="4800" b="0" strike="noStrike" spc="-46">
+              <a:rPr lang="en-US" sz="4800" b="0" strike="noStrike" spc="-46" dirty="0" err="1" smtClean="0">
                 <a:solidFill>
                   <a:srgbClr val="31489F"/>
                 </a:solidFill>
@@ -34342,9 +35022,9 @@
                 </a:uFill>
                 <a:latin typeface="Calibri Light"/>
               </a:rPr>
-              <a:t>Slide Heading Here</a:t>
-            </a:r>
-            <a:endParaRPr lang="en-US" sz="1800" b="0" strike="noStrike" spc="-1">
+              <a:t>SimpleReportBuilder</a:t>
+            </a:r>
+            <a:endParaRPr lang="en-US" sz="1800" b="0" strike="noStrike" spc="-1" dirty="0">
               <a:solidFill>
                 <a:srgbClr val="000000"/>
               </a:solidFill>
@@ -34367,7 +35047,7 @@
         <p:spPr>
           <a:xfrm>
             <a:off x="822960" y="1845720"/>
-            <a:ext cx="7543080" cy="4022640"/>
+            <a:ext cx="7543080" cy="368562"/>
           </a:xfrm>
           <a:prstGeom prst="rect">
             <a:avLst/>
@@ -34393,162 +35073,55 @@
           <a:bodyPr lIns="0" tIns="45000" rIns="0" bIns="45000"/>
           <a:lstStyle/>
           <a:p>
-            <a:pPr marL="199080" indent="-198360">
-              <a:lnSpc>
-                <a:spcPct val="100000"/>
-              </a:lnSpc>
-              <a:buClr>
-                <a:srgbClr val="4E67C8"/>
-              </a:buClr>
-              <a:buFont typeface="Wingdings 2" charset="2"/>
-              <a:buChar char=""/>
-            </a:pPr>
-            <a:r>
-              <a:rPr lang="en-US" sz="2000" b="0" strike="noStrike" spc="-1">
-                <a:solidFill>
-                  <a:srgbClr val="404040"/>
+            <a:pPr>
+              <a:lnSpc>
+                <a:spcPct val="90000"/>
+              </a:lnSpc>
+            </a:pPr>
+            <a:r>
+              <a:rPr lang="en-US" spc="-1" dirty="0" smtClean="0">
+                <a:solidFill>
+                  <a:srgbClr val="000000"/>
                 </a:solidFill>
                 <a:uFill>
                   <a:solidFill>
                     <a:srgbClr val="FFFFFF"/>
                   </a:solidFill>
                 </a:uFill>
-                <a:latin typeface="Calibri"/>
-              </a:rPr>
-              <a:t>Presentation Text</a:t>
-            </a:r>
-            <a:endParaRPr lang="en-US" sz="1800" b="0" strike="noStrike" spc="-1">
-              <a:solidFill>
-                <a:srgbClr val="000000"/>
-              </a:solidFill>
-              <a:uFill>
-                <a:solidFill>
-                  <a:srgbClr val="FFFFFF"/>
-                </a:solidFill>
-              </a:uFill>
-              <a:latin typeface="Arial"/>
-            </a:endParaRPr>
-          </a:p>
-          <a:p>
-            <a:pPr marL="377280" lvl="3" indent="-198360">
-              <a:lnSpc>
-                <a:spcPct val="100000"/>
-              </a:lnSpc>
-              <a:buClr>
-                <a:srgbClr val="4E67C8"/>
-              </a:buClr>
-              <a:buSzPct val="80000"/>
-              <a:buFont typeface="Wingdings 2" charset="2"/>
-              <a:buChar char=""/>
-            </a:pPr>
-            <a:r>
-              <a:rPr lang="en-US" sz="1500" b="0" strike="noStrike" spc="-1">
-                <a:solidFill>
-                  <a:srgbClr val="404040"/>
+                <a:latin typeface="Arial"/>
+              </a:rPr>
+              <a:t>This is a sample of the functions called by </a:t>
+            </a:r>
+            <a:r>
+              <a:rPr lang="en-US" spc="-1" dirty="0" err="1" smtClean="0">
+                <a:solidFill>
+                  <a:srgbClr val="000000"/>
                 </a:solidFill>
                 <a:uFill>
                   <a:solidFill>
                     <a:srgbClr val="FFFFFF"/>
                   </a:solidFill>
                 </a:uFill>
-                <a:latin typeface="Calibri"/>
-              </a:rPr>
-              <a:t>Screen Captures</a:t>
-            </a:r>
-            <a:endParaRPr lang="en-US" sz="1800" b="0" strike="noStrike" spc="-1">
-              <a:solidFill>
-                <a:srgbClr val="000000"/>
-              </a:solidFill>
-              <a:uFill>
-                <a:solidFill>
-                  <a:srgbClr val="FFFFFF"/>
-                </a:solidFill>
-              </a:uFill>
-              <a:latin typeface="Arial"/>
-            </a:endParaRPr>
-          </a:p>
-          <a:p>
-            <a:pPr marL="377280" lvl="3" indent="-198360">
-              <a:lnSpc>
-                <a:spcPct val="100000"/>
-              </a:lnSpc>
-              <a:buClr>
-                <a:srgbClr val="4E67C8"/>
-              </a:buClr>
-              <a:buSzPct val="80000"/>
-              <a:buFont typeface="Wingdings 2" charset="2"/>
-              <a:buChar char=""/>
-            </a:pPr>
-            <a:r>
-              <a:rPr lang="en-US" sz="1500" b="0" strike="noStrike" spc="-1">
-                <a:solidFill>
-                  <a:srgbClr val="404040"/>
+                <a:latin typeface="Courier New" panose="02070309020205020404" pitchFamily="49" charset="0"/>
+                <a:cs typeface="Courier New" panose="02070309020205020404" pitchFamily="49" charset="0"/>
+              </a:rPr>
+              <a:t>createNode</a:t>
+            </a:r>
+            <a:r>
+              <a:rPr lang="en-US" spc="-1" dirty="0" smtClean="0">
+                <a:solidFill>
+                  <a:srgbClr val="000000"/>
                 </a:solidFill>
                 <a:uFill>
                   <a:solidFill>
                     <a:srgbClr val="FFFFFF"/>
                   </a:solidFill>
                 </a:uFill>
-                <a:latin typeface="Calibri"/>
-              </a:rPr>
-              <a:t>Etc.</a:t>
-            </a:r>
-            <a:endParaRPr lang="en-US" sz="1800" b="0" strike="noStrike" spc="-1">
-              <a:solidFill>
-                <a:srgbClr val="000000"/>
-              </a:solidFill>
-              <a:uFill>
-                <a:solidFill>
-                  <a:srgbClr val="FFFFFF"/>
-                </a:solidFill>
-              </a:uFill>
-              <a:latin typeface="Arial"/>
-            </a:endParaRPr>
-          </a:p>
-          <a:p>
-            <a:pPr marL="199080" indent="-198360">
-              <a:lnSpc>
-                <a:spcPct val="100000"/>
-              </a:lnSpc>
-              <a:buClr>
-                <a:srgbClr val="4E67C8"/>
-              </a:buClr>
-              <a:buFont typeface="Wingdings 2" charset="2"/>
-              <a:buChar char=""/>
-            </a:pPr>
-            <a:r>
-              <a:rPr lang="en-US" sz="2000" b="0" strike="noStrike" spc="-1">
-                <a:solidFill>
-                  <a:srgbClr val="404040"/>
-                </a:solidFill>
-                <a:uFill>
-                  <a:solidFill>
-                    <a:srgbClr val="FFFFFF"/>
-                  </a:solidFill>
-                </a:uFill>
-                <a:latin typeface="Calibri"/>
-              </a:rPr>
-              <a:t>Presenters – duplicate this slide as many times as needed</a:t>
-            </a:r>
-            <a:endParaRPr lang="en-US" sz="1800" b="0" strike="noStrike" spc="-1">
-              <a:solidFill>
-                <a:srgbClr val="000000"/>
-              </a:solidFill>
-              <a:uFill>
-                <a:solidFill>
-                  <a:srgbClr val="FFFFFF"/>
-                </a:solidFill>
-              </a:uFill>
-              <a:latin typeface="Arial"/>
-            </a:endParaRPr>
-          </a:p>
-          <a:p>
-            <a:pPr>
-              <a:lnSpc>
-                <a:spcPct val="90000"/>
-              </a:lnSpc>
-            </a:pPr>
-            <a:endParaRPr lang="en-US" sz="1800" b="0" strike="noStrike" spc="-1">
+                <a:latin typeface="Arial"/>
+              </a:rPr>
+              <a:t>. </a:t>
+            </a:r>
+            <a:endParaRPr lang="en-US" sz="1800" b="0" strike="noStrike" spc="-1" dirty="0">
               <a:solidFill>
                 <a:srgbClr val="000000"/>
               </a:solidFill>
@@ -34627,6 +35200,573 @@
                 </a:solidFill>
               </a:uFill>
               <a:latin typeface="Arial"/>
+            </a:endParaRPr>
+          </a:p>
+        </p:txBody>
+      </p:sp>
+      <p:sp>
+        <p:nvSpPr>
+          <p:cNvPr id="2" name="Rectangle 1"/>
+          <p:cNvSpPr/>
+          <p:nvPr/>
+        </p:nvSpPr>
+        <p:spPr>
+          <a:xfrm>
+            <a:off x="753035" y="2323362"/>
+            <a:ext cx="7613005" cy="3693319"/>
+          </a:xfrm>
+          <a:prstGeom prst="rect">
+            <a:avLst/>
+          </a:prstGeom>
+          <a:solidFill>
+            <a:schemeClr val="tx1"/>
+          </a:solidFill>
+        </p:spPr>
+        <p:txBody>
+          <a:bodyPr wrap="square">
+            <a:spAutoFit/>
+          </a:bodyPr>
+          <a:lstStyle/>
+          <a:p>
+            <a:r>
+              <a:rPr lang="en-GB" kern="150" dirty="0">
+                <a:solidFill>
+                  <a:srgbClr val="00FFFF"/>
+                </a:solidFill>
+                <a:latin typeface="Courier New" panose="02070309020205020404" pitchFamily="49" charset="0"/>
+                <a:ea typeface="NSimSun" panose="02010609030101010101" pitchFamily="49" charset="-122"/>
+              </a:rPr>
+              <a:t>private</a:t>
+            </a:r>
+            <a:r>
+              <a:rPr lang="en-GB" kern="150" dirty="0">
+                <a:solidFill>
+                  <a:srgbClr val="FFFFFF"/>
+                </a:solidFill>
+                <a:latin typeface="Courier New" panose="02070309020205020404" pitchFamily="49" charset="0"/>
+                <a:ea typeface="NSimSun" panose="02010609030101010101" pitchFamily="49" charset="-122"/>
+              </a:rPr>
+              <a:t> </a:t>
+            </a:r>
+            <a:r>
+              <a:rPr lang="en-GB" kern="150" dirty="0" err="1">
+                <a:solidFill>
+                  <a:srgbClr val="98FB98"/>
+                </a:solidFill>
+                <a:latin typeface="Courier New" panose="02070309020205020404" pitchFamily="49" charset="0"/>
+                <a:ea typeface="NSimSun" panose="02010609030101010101" pitchFamily="49" charset="-122"/>
+              </a:rPr>
+              <a:t>nodeFactory</a:t>
+            </a:r>
+            <a:r>
+              <a:rPr lang="en-GB" kern="150" dirty="0">
+                <a:solidFill>
+                  <a:srgbClr val="FFFFFF"/>
+                </a:solidFill>
+                <a:latin typeface="Courier New" panose="02070309020205020404" pitchFamily="49" charset="0"/>
+                <a:ea typeface="NSimSun" panose="02010609030101010101" pitchFamily="49" charset="-122"/>
+              </a:rPr>
+              <a:t> = [</a:t>
+            </a:r>
+            <a:endParaRPr lang="en-US" kern="150" dirty="0">
+              <a:solidFill>
+                <a:srgbClr val="FFFFFF"/>
+              </a:solidFill>
+              <a:latin typeface="Courier New" panose="02070309020205020404" pitchFamily="49" charset="0"/>
+              <a:ea typeface="NSimSun" panose="02010609030101010101" pitchFamily="49" charset="-122"/>
+            </a:endParaRPr>
+          </a:p>
+          <a:p>
+            <a:r>
+              <a:rPr lang="en-GB" kern="150" dirty="0">
+                <a:solidFill>
+                  <a:srgbClr val="FFFFFF"/>
+                </a:solidFill>
+                <a:latin typeface="Courier New" panose="02070309020205020404" pitchFamily="49" charset="0"/>
+                <a:ea typeface="NSimSun" panose="02010609030101010101" pitchFamily="49" charset="-122"/>
+              </a:rPr>
+              <a:t>  report: [</a:t>
+            </a:r>
+            <a:endParaRPr lang="en-US" kern="150" dirty="0">
+              <a:solidFill>
+                <a:srgbClr val="FFFFFF"/>
+              </a:solidFill>
+              <a:latin typeface="Courier New" panose="02070309020205020404" pitchFamily="49" charset="0"/>
+              <a:ea typeface="NSimSun" panose="02010609030101010101" pitchFamily="49" charset="-122"/>
+            </a:endParaRPr>
+          </a:p>
+          <a:p>
+            <a:r>
+              <a:rPr lang="en-GB" kern="150" dirty="0">
+                <a:solidFill>
+                  <a:srgbClr val="FFFFFF"/>
+                </a:solidFill>
+                <a:latin typeface="Courier New" panose="02070309020205020404" pitchFamily="49" charset="0"/>
+                <a:ea typeface="NSimSun" panose="02010609030101010101" pitchFamily="49" charset="-122"/>
+              </a:rPr>
+              <a:t>    create: {</a:t>
+            </a:r>
+            <a:endParaRPr lang="en-US" kern="150" dirty="0">
+              <a:solidFill>
+                <a:srgbClr val="FFFFFF"/>
+              </a:solidFill>
+              <a:latin typeface="Courier New" panose="02070309020205020404" pitchFamily="49" charset="0"/>
+              <a:ea typeface="NSimSun" panose="02010609030101010101" pitchFamily="49" charset="-122"/>
+            </a:endParaRPr>
+          </a:p>
+          <a:p>
+            <a:r>
+              <a:rPr lang="en-GB" kern="150" dirty="0">
+                <a:solidFill>
+                  <a:srgbClr val="FFFFFF"/>
+                </a:solidFill>
+                <a:latin typeface="Courier New" panose="02070309020205020404" pitchFamily="49" charset="0"/>
+                <a:ea typeface="NSimSun" panose="02010609030101010101" pitchFamily="49" charset="-122"/>
+              </a:rPr>
+              <a:t>      </a:t>
+            </a:r>
+            <a:r>
+              <a:rPr lang="en-GB" kern="150" dirty="0">
+                <a:solidFill>
+                  <a:srgbClr val="98FB98"/>
+                </a:solidFill>
+                <a:latin typeface="Courier New" panose="02070309020205020404" pitchFamily="49" charset="0"/>
+                <a:ea typeface="NSimSun" panose="02010609030101010101" pitchFamily="49" charset="-122"/>
+              </a:rPr>
+              <a:t>String</a:t>
+            </a:r>
+            <a:r>
+              <a:rPr lang="en-GB" kern="150" dirty="0">
+                <a:solidFill>
+                  <a:srgbClr val="FFFFFF"/>
+                </a:solidFill>
+                <a:latin typeface="Courier New" panose="02070309020205020404" pitchFamily="49" charset="0"/>
+                <a:ea typeface="NSimSun" panose="02010609030101010101" pitchFamily="49" charset="-122"/>
+              </a:rPr>
+              <a:t> </a:t>
+            </a:r>
+            <a:r>
+              <a:rPr lang="en-GB" kern="150" dirty="0">
+                <a:solidFill>
+                  <a:srgbClr val="EEDD82"/>
+                </a:solidFill>
+                <a:latin typeface="Courier New" panose="02070309020205020404" pitchFamily="49" charset="0"/>
+                <a:ea typeface="NSimSun" panose="02010609030101010101" pitchFamily="49" charset="-122"/>
+              </a:rPr>
+              <a:t>name</a:t>
+            </a:r>
+            <a:r>
+              <a:rPr lang="en-GB" kern="150" dirty="0">
+                <a:solidFill>
+                  <a:srgbClr val="FFFFFF"/>
+                </a:solidFill>
+                <a:latin typeface="Courier New" panose="02070309020205020404" pitchFamily="49" charset="0"/>
+                <a:ea typeface="NSimSun" panose="02010609030101010101" pitchFamily="49" charset="-122"/>
+              </a:rPr>
+              <a:t>, </a:t>
+            </a:r>
+            <a:r>
+              <a:rPr lang="en-GB" kern="150" dirty="0">
+                <a:solidFill>
+                  <a:srgbClr val="EEDD82"/>
+                </a:solidFill>
+                <a:latin typeface="Courier New" panose="02070309020205020404" pitchFamily="49" charset="0"/>
+                <a:ea typeface="NSimSun" panose="02010609030101010101" pitchFamily="49" charset="-122"/>
+              </a:rPr>
+              <a:t>Map</a:t>
+            </a:r>
+            <a:r>
+              <a:rPr lang="en-GB" kern="150" dirty="0">
+                <a:solidFill>
+                  <a:srgbClr val="FFFFFF"/>
+                </a:solidFill>
+                <a:latin typeface="Courier New" panose="02070309020205020404" pitchFamily="49" charset="0"/>
+                <a:ea typeface="NSimSun" panose="02010609030101010101" pitchFamily="49" charset="-122"/>
+              </a:rPr>
+              <a:t> attributes, </a:t>
+            </a:r>
+            <a:r>
+              <a:rPr lang="en-GB" kern="150" dirty="0" err="1">
+                <a:solidFill>
+                  <a:srgbClr val="00FFFF"/>
+                </a:solidFill>
+                <a:latin typeface="Courier New" panose="02070309020205020404" pitchFamily="49" charset="0"/>
+                <a:ea typeface="NSimSun" panose="02010609030101010101" pitchFamily="49" charset="-122"/>
+              </a:rPr>
+              <a:t>def</a:t>
+            </a:r>
+            <a:r>
+              <a:rPr lang="en-GB" kern="150" dirty="0">
+                <a:solidFill>
+                  <a:srgbClr val="FFFFFF"/>
+                </a:solidFill>
+                <a:latin typeface="Courier New" panose="02070309020205020404" pitchFamily="49" charset="0"/>
+                <a:ea typeface="NSimSun" panose="02010609030101010101" pitchFamily="49" charset="-122"/>
+              </a:rPr>
+              <a:t> </a:t>
+            </a:r>
+            <a:r>
+              <a:rPr lang="en-GB" kern="150" dirty="0">
+                <a:solidFill>
+                  <a:srgbClr val="EEDD82"/>
+                </a:solidFill>
+                <a:latin typeface="Courier New" panose="02070309020205020404" pitchFamily="49" charset="0"/>
+                <a:ea typeface="NSimSun" panose="02010609030101010101" pitchFamily="49" charset="-122"/>
+              </a:rPr>
+              <a:t>value</a:t>
+            </a:r>
+            <a:r>
+              <a:rPr lang="en-GB" kern="150" dirty="0">
+                <a:solidFill>
+                  <a:srgbClr val="FFFFFF"/>
+                </a:solidFill>
+                <a:latin typeface="Courier New" panose="02070309020205020404" pitchFamily="49" charset="0"/>
+                <a:ea typeface="NSimSun" panose="02010609030101010101" pitchFamily="49" charset="-122"/>
+              </a:rPr>
+              <a:t> -&gt;</a:t>
+            </a:r>
+            <a:endParaRPr lang="en-US" kern="150" dirty="0">
+              <a:solidFill>
+                <a:srgbClr val="FFFFFF"/>
+              </a:solidFill>
+              <a:latin typeface="Courier New" panose="02070309020205020404" pitchFamily="49" charset="0"/>
+              <a:ea typeface="NSimSun" panose="02010609030101010101" pitchFamily="49" charset="-122"/>
+            </a:endParaRPr>
+          </a:p>
+          <a:p>
+            <a:r>
+              <a:rPr lang="en-GB" kern="150" dirty="0">
+                <a:solidFill>
+                  <a:srgbClr val="FFFFFF"/>
+                </a:solidFill>
+                <a:latin typeface="Courier New" panose="02070309020205020404" pitchFamily="49" charset="0"/>
+                <a:ea typeface="NSimSun" panose="02010609030101010101" pitchFamily="49" charset="-122"/>
+              </a:rPr>
+              <a:t>        </a:t>
+            </a:r>
+            <a:r>
+              <a:rPr lang="en-GB" kern="150" dirty="0" err="1">
+                <a:solidFill>
+                  <a:srgbClr val="00FFFF"/>
+                </a:solidFill>
+                <a:latin typeface="Courier New" panose="02070309020205020404" pitchFamily="49" charset="0"/>
+                <a:ea typeface="NSimSun" panose="02010609030101010101" pitchFamily="49" charset="-122"/>
+              </a:rPr>
+              <a:t>def</a:t>
+            </a:r>
+            <a:r>
+              <a:rPr lang="en-GB" kern="150" dirty="0">
+                <a:solidFill>
+                  <a:srgbClr val="FFFFFF"/>
+                </a:solidFill>
+                <a:latin typeface="Courier New" panose="02070309020205020404" pitchFamily="49" charset="0"/>
+                <a:ea typeface="NSimSun" panose="02010609030101010101" pitchFamily="49" charset="-122"/>
+              </a:rPr>
+              <a:t> report = </a:t>
+            </a:r>
+            <a:r>
+              <a:rPr lang="en-GB" kern="150" dirty="0">
+                <a:solidFill>
+                  <a:srgbClr val="00FFFF"/>
+                </a:solidFill>
+                <a:latin typeface="Courier New" panose="02070309020205020404" pitchFamily="49" charset="0"/>
+                <a:ea typeface="NSimSun" panose="02010609030101010101" pitchFamily="49" charset="-122"/>
+              </a:rPr>
+              <a:t>new</a:t>
+            </a:r>
+            <a:r>
+              <a:rPr lang="en-GB" kern="150" dirty="0">
+                <a:solidFill>
+                  <a:srgbClr val="FFFFFF"/>
+                </a:solidFill>
+                <a:latin typeface="Courier New" panose="02070309020205020404" pitchFamily="49" charset="0"/>
+                <a:ea typeface="NSimSun" panose="02010609030101010101" pitchFamily="49" charset="-122"/>
+              </a:rPr>
+              <a:t> </a:t>
+            </a:r>
+            <a:r>
+              <a:rPr lang="en-GB" kern="150" dirty="0" err="1">
+                <a:solidFill>
+                  <a:srgbClr val="98FB98"/>
+                </a:solidFill>
+                <a:latin typeface="Courier New" panose="02070309020205020404" pitchFamily="49" charset="0"/>
+                <a:ea typeface="NSimSun" panose="02010609030101010101" pitchFamily="49" charset="-122"/>
+              </a:rPr>
+              <a:t>SimpleReport</a:t>
+            </a:r>
+            <a:r>
+              <a:rPr lang="en-GB" kern="150" dirty="0">
+                <a:solidFill>
+                  <a:srgbClr val="FFFFFF"/>
+                </a:solidFill>
+                <a:latin typeface="Courier New" panose="02070309020205020404" pitchFamily="49" charset="0"/>
+                <a:ea typeface="NSimSun" panose="02010609030101010101" pitchFamily="49" charset="-122"/>
+              </a:rPr>
+              <a:t>(attributes)</a:t>
+            </a:r>
+            <a:endParaRPr lang="en-US" kern="150" dirty="0">
+              <a:solidFill>
+                <a:srgbClr val="FFFFFF"/>
+              </a:solidFill>
+              <a:latin typeface="Courier New" panose="02070309020205020404" pitchFamily="49" charset="0"/>
+              <a:ea typeface="NSimSun" panose="02010609030101010101" pitchFamily="49" charset="-122"/>
+            </a:endParaRPr>
+          </a:p>
+          <a:p>
+            <a:r>
+              <a:rPr lang="en-GB" kern="150" dirty="0">
+                <a:solidFill>
+                  <a:srgbClr val="FFFFFF"/>
+                </a:solidFill>
+                <a:latin typeface="Courier New" panose="02070309020205020404" pitchFamily="49" charset="0"/>
+                <a:ea typeface="NSimSun" panose="02010609030101010101" pitchFamily="49" charset="-122"/>
+              </a:rPr>
+              <a:t>        assert report</a:t>
+            </a:r>
+            <a:endParaRPr lang="en-US" kern="150" dirty="0">
+              <a:solidFill>
+                <a:srgbClr val="FFFFFF"/>
+              </a:solidFill>
+              <a:latin typeface="Courier New" panose="02070309020205020404" pitchFamily="49" charset="0"/>
+              <a:ea typeface="NSimSun" panose="02010609030101010101" pitchFamily="49" charset="-122"/>
+            </a:endParaRPr>
+          </a:p>
+          <a:p>
+            <a:r>
+              <a:rPr lang="en-GB" kern="150" dirty="0">
+                <a:solidFill>
+                  <a:srgbClr val="FFFFFF"/>
+                </a:solidFill>
+                <a:latin typeface="Courier New" panose="02070309020205020404" pitchFamily="49" charset="0"/>
+                <a:ea typeface="NSimSun" panose="02010609030101010101" pitchFamily="49" charset="-122"/>
+              </a:rPr>
+              <a:t>        </a:t>
+            </a:r>
+            <a:r>
+              <a:rPr lang="en-GB" kern="150" dirty="0">
+                <a:solidFill>
+                  <a:srgbClr val="00FFFF"/>
+                </a:solidFill>
+                <a:latin typeface="Courier New" panose="02070309020205020404" pitchFamily="49" charset="0"/>
+                <a:ea typeface="NSimSun" panose="02010609030101010101" pitchFamily="49" charset="-122"/>
+              </a:rPr>
+              <a:t>if</a:t>
+            </a:r>
+            <a:r>
+              <a:rPr lang="en-GB" kern="150" dirty="0">
+                <a:solidFill>
+                  <a:srgbClr val="FFFFFF"/>
+                </a:solidFill>
+                <a:latin typeface="Courier New" panose="02070309020205020404" pitchFamily="49" charset="0"/>
+                <a:ea typeface="NSimSun" panose="02010609030101010101" pitchFamily="49" charset="-122"/>
+              </a:rPr>
+              <a:t> (value) {</a:t>
+            </a:r>
+            <a:endParaRPr lang="en-US" kern="150" dirty="0">
+              <a:solidFill>
+                <a:srgbClr val="FFFFFF"/>
+              </a:solidFill>
+              <a:latin typeface="Courier New" panose="02070309020205020404" pitchFamily="49" charset="0"/>
+              <a:ea typeface="NSimSun" panose="02010609030101010101" pitchFamily="49" charset="-122"/>
+            </a:endParaRPr>
+          </a:p>
+          <a:p>
+            <a:r>
+              <a:rPr lang="en-GB" kern="150" dirty="0">
+                <a:solidFill>
+                  <a:srgbClr val="FFFFFF"/>
+                </a:solidFill>
+                <a:latin typeface="Courier New" panose="02070309020205020404" pitchFamily="49" charset="0"/>
+                <a:ea typeface="NSimSun" panose="02010609030101010101" pitchFamily="49" charset="-122"/>
+              </a:rPr>
+              <a:t>          </a:t>
+            </a:r>
+            <a:r>
+              <a:rPr lang="en-GB" kern="150" dirty="0" err="1">
+                <a:solidFill>
+                  <a:srgbClr val="FFFFFF"/>
+                </a:solidFill>
+                <a:latin typeface="Courier New" panose="02070309020205020404" pitchFamily="49" charset="0"/>
+                <a:ea typeface="NSimSun" panose="02010609030101010101" pitchFamily="49" charset="-122"/>
+              </a:rPr>
+              <a:t>report.description</a:t>
+            </a:r>
+            <a:r>
+              <a:rPr lang="en-GB" kern="150" dirty="0">
+                <a:solidFill>
+                  <a:srgbClr val="FFFFFF"/>
+                </a:solidFill>
+                <a:latin typeface="Courier New" panose="02070309020205020404" pitchFamily="49" charset="0"/>
+                <a:ea typeface="NSimSun" panose="02010609030101010101" pitchFamily="49" charset="-122"/>
+              </a:rPr>
+              <a:t> = value</a:t>
+            </a:r>
+            <a:endParaRPr lang="en-US" kern="150" dirty="0">
+              <a:solidFill>
+                <a:srgbClr val="FFFFFF"/>
+              </a:solidFill>
+              <a:latin typeface="Courier New" panose="02070309020205020404" pitchFamily="49" charset="0"/>
+              <a:ea typeface="NSimSun" panose="02010609030101010101" pitchFamily="49" charset="-122"/>
+            </a:endParaRPr>
+          </a:p>
+          <a:p>
+            <a:r>
+              <a:rPr lang="en-GB" kern="150" dirty="0">
+                <a:solidFill>
+                  <a:srgbClr val="FFFFFF"/>
+                </a:solidFill>
+                <a:latin typeface="Courier New" panose="02070309020205020404" pitchFamily="49" charset="0"/>
+                <a:ea typeface="NSimSun" panose="02010609030101010101" pitchFamily="49" charset="-122"/>
+              </a:rPr>
+              <a:t>        }</a:t>
+            </a:r>
+            <a:endParaRPr lang="en-US" kern="150" dirty="0">
+              <a:solidFill>
+                <a:srgbClr val="FFFFFF"/>
+              </a:solidFill>
+              <a:latin typeface="Courier New" panose="02070309020205020404" pitchFamily="49" charset="0"/>
+              <a:ea typeface="NSimSun" panose="02010609030101010101" pitchFamily="49" charset="-122"/>
+            </a:endParaRPr>
+          </a:p>
+          <a:p>
+            <a:r>
+              <a:rPr lang="en-GB" kern="150" dirty="0">
+                <a:solidFill>
+                  <a:srgbClr val="FFFFFF"/>
+                </a:solidFill>
+                <a:latin typeface="Courier New" panose="02070309020205020404" pitchFamily="49" charset="0"/>
+                <a:ea typeface="NSimSun" panose="02010609030101010101" pitchFamily="49" charset="-122"/>
+              </a:rPr>
+              <a:t>        </a:t>
+            </a:r>
+            <a:r>
+              <a:rPr lang="en-GB" kern="150" dirty="0">
+                <a:solidFill>
+                  <a:srgbClr val="00FFFF"/>
+                </a:solidFill>
+                <a:latin typeface="Courier New" panose="02070309020205020404" pitchFamily="49" charset="0"/>
+                <a:ea typeface="NSimSun" panose="02010609030101010101" pitchFamily="49" charset="-122"/>
+              </a:rPr>
+              <a:t>return</a:t>
+            </a:r>
+            <a:r>
+              <a:rPr lang="en-GB" kern="150" dirty="0">
+                <a:solidFill>
+                  <a:srgbClr val="FFFFFF"/>
+                </a:solidFill>
+                <a:latin typeface="Courier New" panose="02070309020205020404" pitchFamily="49" charset="0"/>
+                <a:ea typeface="NSimSun" panose="02010609030101010101" pitchFamily="49" charset="-122"/>
+              </a:rPr>
+              <a:t> report</a:t>
+            </a:r>
+            <a:endParaRPr lang="en-US" kern="150" dirty="0">
+              <a:solidFill>
+                <a:srgbClr val="FFFFFF"/>
+              </a:solidFill>
+              <a:latin typeface="Courier New" panose="02070309020205020404" pitchFamily="49" charset="0"/>
+              <a:ea typeface="NSimSun" panose="02010609030101010101" pitchFamily="49" charset="-122"/>
+            </a:endParaRPr>
+          </a:p>
+          <a:p>
+            <a:r>
+              <a:rPr lang="en-GB" kern="150" dirty="0">
+                <a:solidFill>
+                  <a:srgbClr val="FFFFFF"/>
+                </a:solidFill>
+                <a:latin typeface="Courier New" panose="02070309020205020404" pitchFamily="49" charset="0"/>
+                <a:ea typeface="NSimSun" panose="02010609030101010101" pitchFamily="49" charset="-122"/>
+              </a:rPr>
+              <a:t>    },</a:t>
+            </a:r>
+            <a:endParaRPr lang="en-US" kern="150" dirty="0">
+              <a:solidFill>
+                <a:srgbClr val="FFFFFF"/>
+              </a:solidFill>
+              <a:latin typeface="Courier New" panose="02070309020205020404" pitchFamily="49" charset="0"/>
+              <a:ea typeface="NSimSun" panose="02010609030101010101" pitchFamily="49" charset="-122"/>
+            </a:endParaRPr>
+          </a:p>
+          <a:p>
+            <a:r>
+              <a:rPr lang="en-GB" kern="150" dirty="0">
+                <a:solidFill>
+                  <a:srgbClr val="FFFFFF"/>
+                </a:solidFill>
+                <a:latin typeface="Courier New" panose="02070309020205020404" pitchFamily="49" charset="0"/>
+                <a:ea typeface="NSimSun" panose="02010609030101010101" pitchFamily="49" charset="-122"/>
+              </a:rPr>
+              <a:t>    </a:t>
+            </a:r>
+            <a:r>
+              <a:rPr lang="en-GB" kern="150" dirty="0" err="1">
+                <a:solidFill>
+                  <a:srgbClr val="FFFFFF"/>
+                </a:solidFill>
+                <a:latin typeface="Courier New" panose="02070309020205020404" pitchFamily="49" charset="0"/>
+                <a:ea typeface="NSimSun" panose="02010609030101010101" pitchFamily="49" charset="-122"/>
+              </a:rPr>
+              <a:t>implClass</a:t>
+            </a:r>
+            <a:r>
+              <a:rPr lang="en-GB" kern="150" dirty="0">
+                <a:solidFill>
+                  <a:srgbClr val="FFFFFF"/>
+                </a:solidFill>
+                <a:latin typeface="Courier New" panose="02070309020205020404" pitchFamily="49" charset="0"/>
+                <a:ea typeface="NSimSun" panose="02010609030101010101" pitchFamily="49" charset="-122"/>
+              </a:rPr>
+              <a:t>: </a:t>
+            </a:r>
+            <a:r>
+              <a:rPr lang="en-GB" kern="150" dirty="0" err="1">
+                <a:solidFill>
+                  <a:srgbClr val="FFFFFF"/>
+                </a:solidFill>
+                <a:latin typeface="Courier New" panose="02070309020205020404" pitchFamily="49" charset="0"/>
+                <a:ea typeface="NSimSun" panose="02010609030101010101" pitchFamily="49" charset="-122"/>
+              </a:rPr>
+              <a:t>SimpleReport</a:t>
+            </a:r>
+            <a:r>
+              <a:rPr lang="en-GB" kern="150" dirty="0">
+                <a:solidFill>
+                  <a:srgbClr val="FFFFFF"/>
+                </a:solidFill>
+                <a:latin typeface="Courier New" panose="02070309020205020404" pitchFamily="49" charset="0"/>
+                <a:ea typeface="NSimSun" panose="02010609030101010101" pitchFamily="49" charset="-122"/>
+              </a:rPr>
+              <a:t>,</a:t>
+            </a:r>
+            <a:endParaRPr lang="en-US" kern="150" dirty="0">
+              <a:solidFill>
+                <a:srgbClr val="FFFFFF"/>
+              </a:solidFill>
+              <a:latin typeface="Courier New" panose="02070309020205020404" pitchFamily="49" charset="0"/>
+              <a:ea typeface="NSimSun" panose="02010609030101010101" pitchFamily="49" charset="-122"/>
+            </a:endParaRPr>
+          </a:p>
+          <a:p>
+            <a:pPr>
+              <a:spcAft>
+                <a:spcPts val="595"/>
+              </a:spcAft>
+            </a:pPr>
+            <a:r>
+              <a:rPr lang="en-GB" kern="150" dirty="0">
+                <a:solidFill>
+                  <a:srgbClr val="FFFFFF"/>
+                </a:solidFill>
+                <a:latin typeface="Courier New" panose="02070309020205020404" pitchFamily="49" charset="0"/>
+                <a:ea typeface="NSimSun" panose="02010609030101010101" pitchFamily="49" charset="-122"/>
+              </a:rPr>
+              <a:t>  ],</a:t>
+            </a:r>
+            <a:endParaRPr lang="en-US" kern="150" dirty="0">
+              <a:solidFill>
+                <a:srgbClr val="FFFFFF"/>
+              </a:solidFill>
+              <a:latin typeface="Courier New" panose="02070309020205020404" pitchFamily="49" charset="0"/>
+              <a:ea typeface="NSimSun" panose="02010609030101010101" pitchFamily="49" charset="-122"/>
             </a:endParaRPr>
           </a:p>
         </p:txBody>
@@ -34727,7 +35867,7 @@
               </a:lnSpc>
             </a:pPr>
             <a:r>
-              <a:rPr lang="en-US" sz="4800" b="0" strike="noStrike" spc="-46">
+              <a:rPr lang="en-US" sz="4800" b="0" strike="noStrike" spc="-46" dirty="0" err="1" smtClean="0">
                 <a:solidFill>
                   <a:srgbClr val="31489F"/>
                 </a:solidFill>
@@ -34738,18 +35878,18 @@
                 </a:uFill>
                 <a:latin typeface="Calibri Light"/>
               </a:rPr>
-              <a:t>Slide Heading Here</a:t>
-            </a:r>
-            <a:endParaRPr lang="en-US" sz="1800" b="0" strike="noStrike" spc="-1">
-              <a:solidFill>
-                <a:srgbClr val="000000"/>
+              <a:t>SimpleReportBuilder</a:t>
+            </a:r>
+            <a:endParaRPr lang="en-US" sz="4800" b="0" strike="noStrike" spc="-46" dirty="0" smtClean="0">
+              <a:solidFill>
+                <a:srgbClr val="31489F"/>
               </a:solidFill>
               <a:uFill>
                 <a:solidFill>
                   <a:srgbClr val="FFFFFF"/>
                 </a:solidFill>
               </a:uFill>
-              <a:latin typeface="Arial"/>
+              <a:latin typeface="Calibri Light"/>
             </a:endParaRPr>
           </a:p>
         </p:txBody>
@@ -34762,8 +35902,8 @@
         </p:nvSpPr>
         <p:spPr>
           <a:xfrm>
-            <a:off x="822960" y="1845720"/>
-            <a:ext cx="7543080" cy="4022640"/>
+            <a:off x="822960" y="1845721"/>
+            <a:ext cx="7543080" cy="845748"/>
           </a:xfrm>
           <a:prstGeom prst="rect">
             <a:avLst/>
@@ -34800,7 +35940,7 @@
               <a:buChar char=""/>
             </a:pPr>
             <a:r>
-              <a:rPr lang="en-US" sz="2000" b="0" strike="noStrike" spc="-1">
+              <a:rPr lang="en-US" sz="2000" b="0" strike="noStrike" spc="-1" dirty="0" smtClean="0">
                 <a:solidFill>
                   <a:srgbClr val="404040"/>
                 </a:solidFill>
@@ -34811,34 +35951,25 @@
                 </a:uFill>
                 <a:latin typeface="Calibri"/>
               </a:rPr>
-              <a:t>Presentation Text</a:t>
-            </a:r>
-            <a:endParaRPr lang="en-US" sz="1800" b="0" strike="noStrike" spc="-1">
-              <a:solidFill>
-                <a:srgbClr val="000000"/>
-              </a:solidFill>
-              <a:uFill>
-                <a:solidFill>
-                  <a:srgbClr val="FFFFFF"/>
-                </a:solidFill>
-              </a:uFill>
-              <a:latin typeface="Arial"/>
-            </a:endParaRPr>
-          </a:p>
-          <a:p>
-            <a:pPr marL="377280" lvl="3" indent="-198360">
-              <a:lnSpc>
-                <a:spcPct val="100000"/>
-              </a:lnSpc>
-              <a:buClr>
-                <a:srgbClr val="4E67C8"/>
-              </a:buClr>
-              <a:buSzPct val="80000"/>
-              <a:buFont typeface="Wingdings 2" charset="2"/>
-              <a:buChar char=""/>
-            </a:pPr>
-            <a:r>
-              <a:rPr lang="en-US" sz="1500" b="0" strike="noStrike" spc="-1">
+              <a:t>The </a:t>
+            </a:r>
+            <a:r>
+              <a:rPr lang="en-US" sz="2000" b="0" strike="noStrike" spc="-1" dirty="0" err="1" smtClean="0">
+                <a:solidFill>
+                  <a:srgbClr val="404040"/>
+                </a:solidFill>
+                <a:uFill>
+                  <a:solidFill>
+                    <a:srgbClr val="FFFFFF"/>
+                  </a:solidFill>
+                </a:uFill>
+                <a:latin typeface="Courier New" panose="02070309020205020404" pitchFamily="49" charset="0"/>
+                <a:cs typeface="Courier New" panose="02070309020205020404" pitchFamily="49" charset="0"/>
+              </a:rPr>
+              <a:t>setParent</a:t>
+            </a:r>
+            <a:r>
+              <a:rPr lang="en-US" sz="2000" b="0" strike="noStrike" spc="-1" dirty="0" smtClean="0">
                 <a:solidFill>
                   <a:srgbClr val="404040"/>
                 </a:solidFill>
@@ -34849,9 +35980,9 @@
                 </a:uFill>
                 <a:latin typeface="Calibri"/>
               </a:rPr>
-              <a:t>Screen Captures</a:t>
-            </a:r>
-            <a:endParaRPr lang="en-US" sz="1800" b="0" strike="noStrike" spc="-1">
+              <a:t> method uses a two-dimensional array keyed by parent and child class.</a:t>
+            </a:r>
+            <a:endParaRPr lang="en-US" sz="1800" b="0" strike="noStrike" spc="-1" dirty="0">
               <a:solidFill>
                 <a:srgbClr val="000000"/>
               </a:solidFill>
@@ -34864,87 +35995,12 @@
             </a:endParaRPr>
           </a:p>
           <a:p>
-            <a:pPr marL="377280" lvl="3" indent="-198360">
-              <a:lnSpc>
-                <a:spcPct val="100000"/>
-              </a:lnSpc>
-              <a:buClr>
-                <a:srgbClr val="4E67C8"/>
-              </a:buClr>
-              <a:buSzPct val="80000"/>
-              <a:buFont typeface="Wingdings 2" charset="2"/>
-              <a:buChar char=""/>
-            </a:pPr>
-            <a:r>
-              <a:rPr lang="en-US" sz="1500" b="0" strike="noStrike" spc="-1">
-                <a:solidFill>
-                  <a:srgbClr val="404040"/>
-                </a:solidFill>
-                <a:uFill>
-                  <a:solidFill>
-                    <a:srgbClr val="FFFFFF"/>
-                  </a:solidFill>
-                </a:uFill>
-                <a:latin typeface="Calibri"/>
-              </a:rPr>
-              <a:t>Etc.</a:t>
-            </a:r>
-            <a:endParaRPr lang="en-US" sz="1800" b="0" strike="noStrike" spc="-1">
-              <a:solidFill>
-                <a:srgbClr val="000000"/>
-              </a:solidFill>
-              <a:uFill>
-                <a:solidFill>
-                  <a:srgbClr val="FFFFFF"/>
-                </a:solidFill>
-              </a:uFill>
-              <a:latin typeface="Arial"/>
-            </a:endParaRPr>
-          </a:p>
-          <a:p>
-            <a:pPr marL="199080" indent="-198360">
-              <a:lnSpc>
-                <a:spcPct val="100000"/>
-              </a:lnSpc>
-              <a:buClr>
-                <a:srgbClr val="4E67C8"/>
-              </a:buClr>
-              <a:buFont typeface="Wingdings 2" charset="2"/>
-              <a:buChar char=""/>
-            </a:pPr>
-            <a:r>
-              <a:rPr lang="en-US" sz="2000" b="0" strike="noStrike" spc="-1">
-                <a:solidFill>
-                  <a:srgbClr val="404040"/>
-                </a:solidFill>
-                <a:uFill>
-                  <a:solidFill>
-                    <a:srgbClr val="FFFFFF"/>
-                  </a:solidFill>
-                </a:uFill>
-                <a:latin typeface="Calibri"/>
-              </a:rPr>
-              <a:t>Presenters – duplicate this slide as many times as needed</a:t>
-            </a:r>
-            <a:endParaRPr lang="en-US" sz="1800" b="0" strike="noStrike" spc="-1">
-              <a:solidFill>
-                <a:srgbClr val="000000"/>
-              </a:solidFill>
-              <a:uFill>
-                <a:solidFill>
-                  <a:srgbClr val="FFFFFF"/>
-                </a:solidFill>
-              </a:uFill>
-              <a:latin typeface="Arial"/>
-            </a:endParaRPr>
-          </a:p>
-          <a:p>
             <a:pPr>
               <a:lnSpc>
                 <a:spcPct val="90000"/>
               </a:lnSpc>
             </a:pPr>
-            <a:endParaRPr lang="en-US" sz="1800" b="0" strike="noStrike" spc="-1">
+            <a:endParaRPr lang="en-US" sz="1800" b="0" strike="noStrike" spc="-1" dirty="0">
               <a:solidFill>
                 <a:srgbClr val="000000"/>
               </a:solidFill>
@@ -35014,6 +36070,1174 @@
               <a:t>SICAS Summit 2017, Villa Roma</a:t>
             </a:r>
             <a:endParaRPr lang="en-US" sz="1800" b="0" strike="noStrike" spc="-1">
+              <a:solidFill>
+                <a:srgbClr val="000000"/>
+              </a:solidFill>
+              <a:uFill>
+                <a:solidFill>
+                  <a:srgbClr val="FFFFFF"/>
+                </a:solidFill>
+              </a:uFill>
+              <a:latin typeface="Arial"/>
+            </a:endParaRPr>
+          </a:p>
+        </p:txBody>
+      </p:sp>
+      <p:sp>
+        <p:nvSpPr>
+          <p:cNvPr id="2" name="Rectangle 1"/>
+          <p:cNvSpPr/>
+          <p:nvPr/>
+        </p:nvSpPr>
+        <p:spPr>
+          <a:xfrm>
+            <a:off x="822960" y="2691468"/>
+            <a:ext cx="7666616" cy="2092881"/>
+          </a:xfrm>
+          <a:prstGeom prst="rect">
+            <a:avLst/>
+          </a:prstGeom>
+          <a:solidFill>
+            <a:schemeClr val="tx1"/>
+          </a:solidFill>
+        </p:spPr>
+        <p:txBody>
+          <a:bodyPr wrap="square">
+            <a:spAutoFit/>
+          </a:bodyPr>
+          <a:lstStyle/>
+          <a:p>
+            <a:r>
+              <a:rPr lang="en-GB" sz="1000" kern="150" dirty="0">
+                <a:solidFill>
+                  <a:srgbClr val="98FB98"/>
+                </a:solidFill>
+                <a:latin typeface="Courier New" panose="02070309020205020404" pitchFamily="49" charset="0"/>
+                <a:ea typeface="NSimSun" panose="02010609030101010101" pitchFamily="49" charset="-122"/>
+              </a:rPr>
+              <a:t>void</a:t>
+            </a:r>
+            <a:r>
+              <a:rPr lang="en-GB" sz="1000" kern="150" dirty="0">
+                <a:solidFill>
+                  <a:srgbClr val="FFFFFF"/>
+                </a:solidFill>
+                <a:latin typeface="Courier New" panose="02070309020205020404" pitchFamily="49" charset="0"/>
+                <a:ea typeface="NSimSun" panose="02010609030101010101" pitchFamily="49" charset="-122"/>
+              </a:rPr>
+              <a:t> </a:t>
+            </a:r>
+            <a:r>
+              <a:rPr lang="en-GB" sz="1000" kern="150" dirty="0" err="1">
+                <a:solidFill>
+                  <a:srgbClr val="87CEFA"/>
+                </a:solidFill>
+                <a:latin typeface="Courier New" panose="02070309020205020404" pitchFamily="49" charset="0"/>
+                <a:ea typeface="NSimSun" panose="02010609030101010101" pitchFamily="49" charset="-122"/>
+              </a:rPr>
+              <a:t>setParent</a:t>
+            </a:r>
+            <a:r>
+              <a:rPr lang="en-GB" sz="1000" kern="150" dirty="0">
+                <a:solidFill>
+                  <a:srgbClr val="FFFFFF"/>
+                </a:solidFill>
+                <a:latin typeface="Courier New" panose="02070309020205020404" pitchFamily="49" charset="0"/>
+                <a:ea typeface="NSimSun" panose="02010609030101010101" pitchFamily="49" charset="-122"/>
+              </a:rPr>
+              <a:t>(</a:t>
+            </a:r>
+            <a:r>
+              <a:rPr lang="en-GB" sz="1000" kern="150" dirty="0">
+                <a:solidFill>
+                  <a:srgbClr val="98FB98"/>
+                </a:solidFill>
+                <a:latin typeface="Courier New" panose="02070309020205020404" pitchFamily="49" charset="0"/>
+                <a:ea typeface="NSimSun" panose="02010609030101010101" pitchFamily="49" charset="-122"/>
+              </a:rPr>
+              <a:t>Object</a:t>
+            </a:r>
+            <a:r>
+              <a:rPr lang="en-GB" sz="1000" kern="150" dirty="0">
+                <a:solidFill>
+                  <a:srgbClr val="FFFFFF"/>
+                </a:solidFill>
+                <a:latin typeface="Courier New" panose="02070309020205020404" pitchFamily="49" charset="0"/>
+                <a:ea typeface="NSimSun" panose="02010609030101010101" pitchFamily="49" charset="-122"/>
+              </a:rPr>
+              <a:t> </a:t>
+            </a:r>
+            <a:r>
+              <a:rPr lang="en-GB" sz="1000" kern="150" dirty="0">
+                <a:solidFill>
+                  <a:srgbClr val="EEDD82"/>
+                </a:solidFill>
+                <a:latin typeface="Courier New" panose="02070309020205020404" pitchFamily="49" charset="0"/>
+                <a:ea typeface="NSimSun" panose="02010609030101010101" pitchFamily="49" charset="-122"/>
+              </a:rPr>
+              <a:t>parent</a:t>
+            </a:r>
+            <a:r>
+              <a:rPr lang="en-GB" sz="1000" kern="150" dirty="0">
+                <a:solidFill>
+                  <a:srgbClr val="FFFFFF"/>
+                </a:solidFill>
+                <a:latin typeface="Courier New" panose="02070309020205020404" pitchFamily="49" charset="0"/>
+                <a:ea typeface="NSimSun" panose="02010609030101010101" pitchFamily="49" charset="-122"/>
+              </a:rPr>
+              <a:t>, </a:t>
+            </a:r>
+            <a:r>
+              <a:rPr lang="en-GB" sz="1000" kern="150" dirty="0">
+                <a:solidFill>
+                  <a:srgbClr val="98FB98"/>
+                </a:solidFill>
+                <a:latin typeface="Courier New" panose="02070309020205020404" pitchFamily="49" charset="0"/>
+                <a:ea typeface="NSimSun" panose="02010609030101010101" pitchFamily="49" charset="-122"/>
+              </a:rPr>
+              <a:t>Object</a:t>
+            </a:r>
+            <a:r>
+              <a:rPr lang="en-GB" sz="1000" kern="150" dirty="0">
+                <a:solidFill>
+                  <a:srgbClr val="FFFFFF"/>
+                </a:solidFill>
+                <a:latin typeface="Courier New" panose="02070309020205020404" pitchFamily="49" charset="0"/>
+                <a:ea typeface="NSimSun" panose="02010609030101010101" pitchFamily="49" charset="-122"/>
+              </a:rPr>
+              <a:t> </a:t>
+            </a:r>
+            <a:r>
+              <a:rPr lang="en-GB" sz="1000" kern="150" dirty="0">
+                <a:solidFill>
+                  <a:srgbClr val="EEDD82"/>
+                </a:solidFill>
+                <a:latin typeface="Courier New" panose="02070309020205020404" pitchFamily="49" charset="0"/>
+                <a:ea typeface="NSimSun" panose="02010609030101010101" pitchFamily="49" charset="-122"/>
+              </a:rPr>
+              <a:t>child</a:t>
+            </a:r>
+            <a:r>
+              <a:rPr lang="en-GB" sz="1000" kern="150" dirty="0">
+                <a:solidFill>
+                  <a:srgbClr val="FFFFFF"/>
+                </a:solidFill>
+                <a:latin typeface="Courier New" panose="02070309020205020404" pitchFamily="49" charset="0"/>
+                <a:ea typeface="NSimSun" panose="02010609030101010101" pitchFamily="49" charset="-122"/>
+              </a:rPr>
+              <a:t>) {</a:t>
+            </a:r>
+            <a:endParaRPr lang="en-US" sz="1000" kern="150" dirty="0">
+              <a:solidFill>
+                <a:srgbClr val="FFFFFF"/>
+              </a:solidFill>
+              <a:latin typeface="Courier New" panose="02070309020205020404" pitchFamily="49" charset="0"/>
+              <a:ea typeface="NSimSun" panose="02010609030101010101" pitchFamily="49" charset="-122"/>
+            </a:endParaRPr>
+          </a:p>
+          <a:p>
+            <a:r>
+              <a:rPr lang="en-GB" sz="1000" kern="150" dirty="0" smtClean="0">
+                <a:solidFill>
+                  <a:srgbClr val="00FFFF"/>
+                </a:solidFill>
+                <a:latin typeface="Courier New" panose="02070309020205020404" pitchFamily="49" charset="0"/>
+                <a:ea typeface="NSimSun" panose="02010609030101010101" pitchFamily="49" charset="-122"/>
+              </a:rPr>
+              <a:t>  </a:t>
+            </a:r>
+            <a:r>
+              <a:rPr lang="en-GB" sz="1000" kern="150" dirty="0" err="1" smtClean="0">
+                <a:solidFill>
+                  <a:srgbClr val="00FFFF"/>
+                </a:solidFill>
+                <a:latin typeface="Courier New" panose="02070309020205020404" pitchFamily="49" charset="0"/>
+                <a:ea typeface="NSimSun" panose="02010609030101010101" pitchFamily="49" charset="-122"/>
+              </a:rPr>
+              <a:t>def</a:t>
+            </a:r>
+            <a:r>
+              <a:rPr lang="en-GB" sz="1000" kern="150" dirty="0" smtClean="0">
+                <a:solidFill>
+                  <a:srgbClr val="FFFFFF"/>
+                </a:solidFill>
+                <a:latin typeface="Courier New" panose="02070309020205020404" pitchFamily="49" charset="0"/>
+                <a:ea typeface="NSimSun" panose="02010609030101010101" pitchFamily="49" charset="-122"/>
+              </a:rPr>
+              <a:t> </a:t>
+            </a:r>
+            <a:r>
+              <a:rPr lang="en-GB" sz="1000" kern="150" dirty="0" err="1">
+                <a:solidFill>
+                  <a:srgbClr val="FFFFFF"/>
+                </a:solidFill>
+                <a:latin typeface="Courier New" panose="02070309020205020404" pitchFamily="49" charset="0"/>
+                <a:ea typeface="NSimSun" panose="02010609030101010101" pitchFamily="49" charset="-122"/>
+              </a:rPr>
+              <a:t>parentClass</a:t>
+            </a:r>
+            <a:r>
+              <a:rPr lang="en-GB" sz="1000" kern="150" dirty="0">
+                <a:solidFill>
+                  <a:srgbClr val="FFFFFF"/>
+                </a:solidFill>
+                <a:latin typeface="Courier New" panose="02070309020205020404" pitchFamily="49" charset="0"/>
+                <a:ea typeface="NSimSun" panose="02010609030101010101" pitchFamily="49" charset="-122"/>
+              </a:rPr>
+              <a:t> = </a:t>
+            </a:r>
+            <a:r>
+              <a:rPr lang="en-GB" sz="1000" kern="150" dirty="0" err="1">
+                <a:solidFill>
+                  <a:srgbClr val="FFFFFF"/>
+                </a:solidFill>
+                <a:latin typeface="Courier New" panose="02070309020205020404" pitchFamily="49" charset="0"/>
+                <a:ea typeface="NSimSun" panose="02010609030101010101" pitchFamily="49" charset="-122"/>
+              </a:rPr>
+              <a:t>parent.getClass</a:t>
+            </a:r>
+            <a:r>
+              <a:rPr lang="en-GB" sz="1000" kern="150" dirty="0">
+                <a:solidFill>
+                  <a:srgbClr val="FFFFFF"/>
+                </a:solidFill>
+                <a:latin typeface="Courier New" panose="02070309020205020404" pitchFamily="49" charset="0"/>
+                <a:ea typeface="NSimSun" panose="02010609030101010101" pitchFamily="49" charset="-122"/>
+              </a:rPr>
+              <a:t>()</a:t>
+            </a:r>
+            <a:endParaRPr lang="en-US" sz="1000" kern="150" dirty="0">
+              <a:solidFill>
+                <a:srgbClr val="FFFFFF"/>
+              </a:solidFill>
+              <a:latin typeface="Courier New" panose="02070309020205020404" pitchFamily="49" charset="0"/>
+              <a:ea typeface="NSimSun" panose="02010609030101010101" pitchFamily="49" charset="-122"/>
+            </a:endParaRPr>
+          </a:p>
+          <a:p>
+            <a:r>
+              <a:rPr lang="en-GB" sz="1000" kern="150" dirty="0" smtClean="0">
+                <a:solidFill>
+                  <a:srgbClr val="FFFFFF"/>
+                </a:solidFill>
+                <a:latin typeface="Courier New" panose="02070309020205020404" pitchFamily="49" charset="0"/>
+                <a:ea typeface="NSimSun" panose="02010609030101010101" pitchFamily="49" charset="-122"/>
+              </a:rPr>
+              <a:t>  </a:t>
+            </a:r>
+            <a:r>
+              <a:rPr lang="en-GB" sz="1000" kern="150" dirty="0" err="1" smtClean="0">
+                <a:solidFill>
+                  <a:srgbClr val="00FFFF"/>
+                </a:solidFill>
+                <a:latin typeface="Courier New" panose="02070309020205020404" pitchFamily="49" charset="0"/>
+                <a:ea typeface="NSimSun" panose="02010609030101010101" pitchFamily="49" charset="-122"/>
+              </a:rPr>
+              <a:t>def</a:t>
+            </a:r>
+            <a:r>
+              <a:rPr lang="en-GB" sz="1000" kern="150" dirty="0" smtClean="0">
+                <a:solidFill>
+                  <a:srgbClr val="FFFFFF"/>
+                </a:solidFill>
+                <a:latin typeface="Courier New" panose="02070309020205020404" pitchFamily="49" charset="0"/>
+                <a:ea typeface="NSimSun" panose="02010609030101010101" pitchFamily="49" charset="-122"/>
+              </a:rPr>
+              <a:t> farm = </a:t>
+            </a:r>
+            <a:r>
+              <a:rPr lang="en-GB" sz="1000" kern="150" dirty="0" err="1" smtClean="0">
+                <a:solidFill>
+                  <a:srgbClr val="FFFFFF"/>
+                </a:solidFill>
+                <a:latin typeface="Courier New" panose="02070309020205020404" pitchFamily="49" charset="0"/>
+                <a:ea typeface="NSimSun" panose="02010609030101010101" pitchFamily="49" charset="-122"/>
+              </a:rPr>
+              <a:t>addChildFarm</a:t>
+            </a:r>
+            <a:r>
+              <a:rPr lang="en-GB" sz="1000" kern="150" dirty="0" smtClean="0">
+                <a:solidFill>
+                  <a:srgbClr val="FFFFFF"/>
+                </a:solidFill>
+                <a:latin typeface="Courier New" panose="02070309020205020404" pitchFamily="49" charset="0"/>
+                <a:ea typeface="NSimSun" panose="02010609030101010101" pitchFamily="49" charset="-122"/>
+              </a:rPr>
+              <a:t>[</a:t>
+            </a:r>
+            <a:r>
+              <a:rPr lang="en-GB" sz="1000" kern="150" dirty="0" err="1" smtClean="0">
+                <a:solidFill>
+                  <a:srgbClr val="FFFFFF"/>
+                </a:solidFill>
+                <a:latin typeface="Courier New" panose="02070309020205020404" pitchFamily="49" charset="0"/>
+                <a:ea typeface="NSimSun" panose="02010609030101010101" pitchFamily="49" charset="-122"/>
+              </a:rPr>
+              <a:t>parent.getClass</a:t>
+            </a:r>
+            <a:r>
+              <a:rPr lang="en-GB" sz="1000" kern="150" dirty="0" smtClean="0">
+                <a:solidFill>
+                  <a:srgbClr val="FFFFFF"/>
+                </a:solidFill>
+                <a:latin typeface="Courier New" panose="02070309020205020404" pitchFamily="49" charset="0"/>
+                <a:ea typeface="NSimSun" panose="02010609030101010101" pitchFamily="49" charset="-122"/>
+              </a:rPr>
+              <a:t>()]</a:t>
+            </a:r>
+            <a:endParaRPr lang="en-US" sz="1000" kern="150" dirty="0" smtClean="0">
+              <a:solidFill>
+                <a:srgbClr val="FFFFFF"/>
+              </a:solidFill>
+              <a:latin typeface="Courier New" panose="02070309020205020404" pitchFamily="49" charset="0"/>
+              <a:ea typeface="NSimSun" panose="02010609030101010101" pitchFamily="49" charset="-122"/>
+            </a:endParaRPr>
+          </a:p>
+          <a:p>
+            <a:r>
+              <a:rPr lang="en-GB" sz="1000" kern="150" dirty="0" smtClean="0">
+                <a:solidFill>
+                  <a:srgbClr val="00FFFF"/>
+                </a:solidFill>
+                <a:latin typeface="Courier New" panose="02070309020205020404" pitchFamily="49" charset="0"/>
+                <a:ea typeface="NSimSun" panose="02010609030101010101" pitchFamily="49" charset="-122"/>
+              </a:rPr>
+              <a:t>  if</a:t>
+            </a:r>
+            <a:r>
+              <a:rPr lang="en-GB" sz="1000" kern="150" dirty="0" smtClean="0">
+                <a:solidFill>
+                  <a:srgbClr val="FFFFFF"/>
+                </a:solidFill>
+                <a:latin typeface="Courier New" panose="02070309020205020404" pitchFamily="49" charset="0"/>
+                <a:ea typeface="NSimSun" panose="02010609030101010101" pitchFamily="49" charset="-122"/>
+              </a:rPr>
+              <a:t> (! farm[</a:t>
+            </a:r>
+            <a:r>
+              <a:rPr lang="en-GB" sz="1000" kern="150" dirty="0" err="1" smtClean="0">
+                <a:solidFill>
+                  <a:srgbClr val="FFFFFF"/>
+                </a:solidFill>
+                <a:latin typeface="Courier New" panose="02070309020205020404" pitchFamily="49" charset="0"/>
+                <a:ea typeface="NSimSun" panose="02010609030101010101" pitchFamily="49" charset="-122"/>
+              </a:rPr>
+              <a:t>child.getClass</a:t>
+            </a:r>
+            <a:r>
+              <a:rPr lang="en-GB" sz="1000" kern="150" dirty="0" smtClean="0">
+                <a:solidFill>
+                  <a:srgbClr val="FFFFFF"/>
+                </a:solidFill>
+                <a:latin typeface="Courier New" panose="02070309020205020404" pitchFamily="49" charset="0"/>
+                <a:ea typeface="NSimSun" panose="02010609030101010101" pitchFamily="49" charset="-122"/>
+              </a:rPr>
+              <a:t>()]) {</a:t>
+            </a:r>
+            <a:endParaRPr lang="en-US" sz="1000" kern="150" dirty="0" smtClean="0">
+              <a:solidFill>
+                <a:srgbClr val="FFFFFF"/>
+              </a:solidFill>
+              <a:latin typeface="Courier New" panose="02070309020205020404" pitchFamily="49" charset="0"/>
+              <a:ea typeface="NSimSun" panose="02010609030101010101" pitchFamily="49" charset="-122"/>
+            </a:endParaRPr>
+          </a:p>
+          <a:p>
+            <a:r>
+              <a:rPr lang="en-GB" sz="1000" kern="150" dirty="0" smtClean="0">
+                <a:solidFill>
+                  <a:srgbClr val="FFFFFF"/>
+                </a:solidFill>
+                <a:latin typeface="Courier New" panose="02070309020205020404" pitchFamily="49" charset="0"/>
+                <a:ea typeface="NSimSun" panose="02010609030101010101" pitchFamily="49" charset="-122"/>
+              </a:rPr>
+              <a:t>    </a:t>
+            </a:r>
+            <a:r>
+              <a:rPr lang="en-GB" sz="1000" kern="150" dirty="0" err="1">
+                <a:solidFill>
+                  <a:srgbClr val="00FFFF"/>
+                </a:solidFill>
+                <a:latin typeface="Courier New" panose="02070309020205020404" pitchFamily="49" charset="0"/>
+                <a:ea typeface="NSimSun" panose="02010609030101010101" pitchFamily="49" charset="-122"/>
+              </a:rPr>
+              <a:t>def</a:t>
+            </a:r>
+            <a:r>
+              <a:rPr lang="en-GB" sz="1000" kern="150" dirty="0">
+                <a:solidFill>
+                  <a:srgbClr val="FFFFFF"/>
+                </a:solidFill>
+                <a:latin typeface="Courier New" panose="02070309020205020404" pitchFamily="49" charset="0"/>
+                <a:ea typeface="NSimSun" panose="02010609030101010101" pitchFamily="49" charset="-122"/>
+              </a:rPr>
+              <a:t> </a:t>
+            </a:r>
+            <a:r>
+              <a:rPr lang="en-GB" sz="1000" kern="150" dirty="0" err="1">
+                <a:solidFill>
+                  <a:srgbClr val="EEDD82"/>
+                </a:solidFill>
+                <a:latin typeface="Courier New" panose="02070309020205020404" pitchFamily="49" charset="0"/>
+                <a:ea typeface="NSimSun" panose="02010609030101010101" pitchFamily="49" charset="-122"/>
+              </a:rPr>
+              <a:t>parentMethod</a:t>
+            </a:r>
+            <a:r>
+              <a:rPr lang="en-GB" sz="1000" kern="150" dirty="0">
+                <a:solidFill>
+                  <a:srgbClr val="FFFFFF"/>
+                </a:solidFill>
+                <a:latin typeface="Courier New" panose="02070309020205020404" pitchFamily="49" charset="0"/>
+                <a:ea typeface="NSimSun" panose="02010609030101010101" pitchFamily="49" charset="-122"/>
+              </a:rPr>
+              <a:t> = </a:t>
+            </a:r>
+            <a:r>
+              <a:rPr lang="en-GB" sz="1000" kern="150" dirty="0" err="1">
+                <a:solidFill>
+                  <a:srgbClr val="FFFFFF"/>
+                </a:solidFill>
+                <a:latin typeface="Courier New" panose="02070309020205020404" pitchFamily="49" charset="0"/>
+                <a:ea typeface="NSimSun" panose="02010609030101010101" pitchFamily="49" charset="-122"/>
+              </a:rPr>
+              <a:t>classMethodNames</a:t>
+            </a:r>
+            <a:r>
+              <a:rPr lang="en-GB" sz="1000" kern="150" dirty="0">
+                <a:solidFill>
+                  <a:srgbClr val="FFFFFF"/>
+                </a:solidFill>
+                <a:latin typeface="Courier New" panose="02070309020205020404" pitchFamily="49" charset="0"/>
+                <a:ea typeface="NSimSun" panose="02010609030101010101" pitchFamily="49" charset="-122"/>
+              </a:rPr>
+              <a:t>[</a:t>
+            </a:r>
+            <a:r>
+              <a:rPr lang="en-GB" sz="1000" kern="150" dirty="0" err="1">
+                <a:solidFill>
+                  <a:srgbClr val="FFFFFF"/>
+                </a:solidFill>
+                <a:latin typeface="Courier New" panose="02070309020205020404" pitchFamily="49" charset="0"/>
+                <a:ea typeface="NSimSun" panose="02010609030101010101" pitchFamily="49" charset="-122"/>
+              </a:rPr>
+              <a:t>parentClass</a:t>
+            </a:r>
+            <a:r>
+              <a:rPr lang="en-GB" sz="1000" kern="150" dirty="0">
+                <a:solidFill>
+                  <a:srgbClr val="FFFFFF"/>
+                </a:solidFill>
+                <a:latin typeface="Courier New" panose="02070309020205020404" pitchFamily="49" charset="0"/>
+                <a:ea typeface="NSimSun" panose="02010609030101010101" pitchFamily="49" charset="-122"/>
+              </a:rPr>
+              <a:t>]</a:t>
+            </a:r>
+            <a:endParaRPr lang="en-US" sz="1000" kern="150" dirty="0">
+              <a:solidFill>
+                <a:srgbClr val="FFFFFF"/>
+              </a:solidFill>
+              <a:latin typeface="Courier New" panose="02070309020205020404" pitchFamily="49" charset="0"/>
+              <a:ea typeface="NSimSun" panose="02010609030101010101" pitchFamily="49" charset="-122"/>
+            </a:endParaRPr>
+          </a:p>
+          <a:p>
+            <a:r>
+              <a:rPr lang="en-GB" sz="1000" kern="150" dirty="0">
+                <a:solidFill>
+                  <a:srgbClr val="FFFFFF"/>
+                </a:solidFill>
+                <a:latin typeface="Courier New" panose="02070309020205020404" pitchFamily="49" charset="0"/>
+                <a:ea typeface="NSimSun" panose="02010609030101010101" pitchFamily="49" charset="-122"/>
+              </a:rPr>
+              <a:t>    </a:t>
+            </a:r>
+            <a:r>
+              <a:rPr lang="en-GB" sz="1000" kern="150" dirty="0" err="1">
+                <a:solidFill>
+                  <a:srgbClr val="00FFFF"/>
+                </a:solidFill>
+                <a:latin typeface="Courier New" panose="02070309020205020404" pitchFamily="49" charset="0"/>
+                <a:ea typeface="NSimSun" panose="02010609030101010101" pitchFamily="49" charset="-122"/>
+              </a:rPr>
+              <a:t>def</a:t>
+            </a:r>
+            <a:r>
+              <a:rPr lang="en-GB" sz="1000" kern="150" dirty="0">
+                <a:solidFill>
+                  <a:srgbClr val="FFFFFF"/>
+                </a:solidFill>
+                <a:latin typeface="Courier New" panose="02070309020205020404" pitchFamily="49" charset="0"/>
+                <a:ea typeface="NSimSun" panose="02010609030101010101" pitchFamily="49" charset="-122"/>
+              </a:rPr>
+              <a:t> </a:t>
+            </a:r>
+            <a:r>
+              <a:rPr lang="en-GB" sz="1000" kern="150" dirty="0" err="1">
+                <a:solidFill>
+                  <a:srgbClr val="FFFFFF"/>
+                </a:solidFill>
+                <a:latin typeface="Courier New" panose="02070309020205020404" pitchFamily="49" charset="0"/>
+                <a:ea typeface="NSimSun" panose="02010609030101010101" pitchFamily="49" charset="-122"/>
+              </a:rPr>
+              <a:t>childMethod</a:t>
+            </a:r>
+            <a:r>
+              <a:rPr lang="en-GB" sz="1000" kern="150" dirty="0">
+                <a:solidFill>
+                  <a:srgbClr val="FFFFFF"/>
+                </a:solidFill>
+                <a:latin typeface="Courier New" panose="02070309020205020404" pitchFamily="49" charset="0"/>
+                <a:ea typeface="NSimSun" panose="02010609030101010101" pitchFamily="49" charset="-122"/>
+              </a:rPr>
+              <a:t> = </a:t>
+            </a:r>
+            <a:r>
+              <a:rPr lang="en-GB" sz="1000" kern="150" dirty="0" err="1">
+                <a:solidFill>
+                  <a:srgbClr val="FFFFFF"/>
+                </a:solidFill>
+                <a:latin typeface="Courier New" panose="02070309020205020404" pitchFamily="49" charset="0"/>
+                <a:ea typeface="NSimSun" panose="02010609030101010101" pitchFamily="49" charset="-122"/>
+              </a:rPr>
+              <a:t>classMethodNames</a:t>
+            </a:r>
+            <a:r>
+              <a:rPr lang="en-GB" sz="1000" kern="150" dirty="0">
+                <a:solidFill>
+                  <a:srgbClr val="FFFFFF"/>
+                </a:solidFill>
+                <a:latin typeface="Courier New" panose="02070309020205020404" pitchFamily="49" charset="0"/>
+                <a:ea typeface="NSimSun" panose="02010609030101010101" pitchFamily="49" charset="-122"/>
+              </a:rPr>
+              <a:t>[</a:t>
+            </a:r>
+            <a:r>
+              <a:rPr lang="en-GB" sz="1000" kern="150" dirty="0" err="1">
+                <a:solidFill>
+                  <a:srgbClr val="FFFFFF"/>
+                </a:solidFill>
+                <a:latin typeface="Courier New" panose="02070309020205020404" pitchFamily="49" charset="0"/>
+                <a:ea typeface="NSimSun" panose="02010609030101010101" pitchFamily="49" charset="-122"/>
+              </a:rPr>
+              <a:t>child.getClass</a:t>
+            </a:r>
+            <a:r>
+              <a:rPr lang="en-GB" sz="1000" kern="150" dirty="0">
+                <a:solidFill>
+                  <a:srgbClr val="FFFFFF"/>
+                </a:solidFill>
+                <a:latin typeface="Courier New" panose="02070309020205020404" pitchFamily="49" charset="0"/>
+                <a:ea typeface="NSimSun" panose="02010609030101010101" pitchFamily="49" charset="-122"/>
+              </a:rPr>
+              <a:t>()]</a:t>
+            </a:r>
+            <a:endParaRPr lang="en-US" sz="1000" kern="150" dirty="0">
+              <a:solidFill>
+                <a:srgbClr val="FFFFFF"/>
+              </a:solidFill>
+              <a:latin typeface="Courier New" panose="02070309020205020404" pitchFamily="49" charset="0"/>
+              <a:ea typeface="NSimSun" panose="02010609030101010101" pitchFamily="49" charset="-122"/>
+            </a:endParaRPr>
+          </a:p>
+          <a:p>
+            <a:r>
+              <a:rPr lang="en-GB" sz="1000" kern="150" dirty="0">
+                <a:solidFill>
+                  <a:srgbClr val="FFFFFF"/>
+                </a:solidFill>
+                <a:latin typeface="Courier New" panose="02070309020205020404" pitchFamily="49" charset="0"/>
+                <a:ea typeface="NSimSun" panose="02010609030101010101" pitchFamily="49" charset="-122"/>
+              </a:rPr>
+              <a:t>    </a:t>
+            </a:r>
+            <a:r>
+              <a:rPr lang="en-GB" sz="1000" kern="150" dirty="0">
+                <a:solidFill>
+                  <a:srgbClr val="00FFFF"/>
+                </a:solidFill>
+                <a:latin typeface="Courier New" panose="02070309020205020404" pitchFamily="49" charset="0"/>
+                <a:ea typeface="NSimSun" panose="02010609030101010101" pitchFamily="49" charset="-122"/>
+              </a:rPr>
+              <a:t>throw</a:t>
+            </a:r>
+            <a:r>
+              <a:rPr lang="en-GB" sz="1000" kern="150" dirty="0">
+                <a:solidFill>
+                  <a:srgbClr val="FFFFFF"/>
+                </a:solidFill>
+                <a:latin typeface="Courier New" panose="02070309020205020404" pitchFamily="49" charset="0"/>
+                <a:ea typeface="NSimSun" panose="02010609030101010101" pitchFamily="49" charset="-122"/>
+              </a:rPr>
+              <a:t> </a:t>
+            </a:r>
+            <a:r>
+              <a:rPr lang="en-GB" sz="1000" kern="150" dirty="0">
+                <a:solidFill>
+                  <a:srgbClr val="00FFFF"/>
+                </a:solidFill>
+                <a:latin typeface="Courier New" panose="02070309020205020404" pitchFamily="49" charset="0"/>
+                <a:ea typeface="NSimSun" panose="02010609030101010101" pitchFamily="49" charset="-122"/>
+              </a:rPr>
+              <a:t>new</a:t>
+            </a:r>
+            <a:r>
+              <a:rPr lang="en-GB" sz="1000" kern="150" dirty="0">
+                <a:solidFill>
+                  <a:srgbClr val="FFFFFF"/>
+                </a:solidFill>
+                <a:latin typeface="Courier New" panose="02070309020205020404" pitchFamily="49" charset="0"/>
+                <a:ea typeface="NSimSun" panose="02010609030101010101" pitchFamily="49" charset="-122"/>
+              </a:rPr>
+              <a:t> </a:t>
+            </a:r>
+            <a:r>
+              <a:rPr lang="en-GB" sz="1000" kern="150" dirty="0" err="1">
+                <a:solidFill>
+                  <a:srgbClr val="98FB98"/>
+                </a:solidFill>
+                <a:latin typeface="Courier New" panose="02070309020205020404" pitchFamily="49" charset="0"/>
+                <a:ea typeface="NSimSun" panose="02010609030101010101" pitchFamily="49" charset="-122"/>
+              </a:rPr>
+              <a:t>BuildException</a:t>
+            </a:r>
+            <a:r>
+              <a:rPr lang="en-GB" sz="1000" kern="150" dirty="0">
+                <a:solidFill>
+                  <a:srgbClr val="FFFFFF"/>
+                </a:solidFill>
+                <a:latin typeface="Courier New" panose="02070309020205020404" pitchFamily="49" charset="0"/>
+                <a:ea typeface="NSimSun" panose="02010609030101010101" pitchFamily="49" charset="-122"/>
+              </a:rPr>
+              <a:t>(</a:t>
+            </a:r>
+            <a:r>
+              <a:rPr lang="en-GB" sz="1000" kern="150" dirty="0">
+                <a:solidFill>
+                  <a:srgbClr val="FFA07A"/>
+                </a:solidFill>
+                <a:latin typeface="Courier New" panose="02070309020205020404" pitchFamily="49" charset="0"/>
+                <a:ea typeface="NSimSun" panose="02010609030101010101" pitchFamily="49" charset="-122"/>
+              </a:rPr>
+              <a:t>"You cannot embed a $</a:t>
+            </a:r>
+            <a:r>
+              <a:rPr lang="en-GB" sz="1000" kern="150" dirty="0" err="1">
+                <a:solidFill>
+                  <a:srgbClr val="FFA07A"/>
+                </a:solidFill>
+                <a:latin typeface="Courier New" panose="02070309020205020404" pitchFamily="49" charset="0"/>
+                <a:ea typeface="NSimSun" panose="02010609030101010101" pitchFamily="49" charset="-122"/>
+              </a:rPr>
+              <a:t>childMethod</a:t>
+            </a:r>
+            <a:r>
+              <a:rPr lang="en-GB" sz="1000" kern="150" dirty="0">
+                <a:solidFill>
+                  <a:srgbClr val="FFA07A"/>
+                </a:solidFill>
+                <a:latin typeface="Courier New" panose="02070309020205020404" pitchFamily="49" charset="0"/>
+                <a:ea typeface="NSimSun" panose="02010609030101010101" pitchFamily="49" charset="-122"/>
+              </a:rPr>
+              <a:t> within a $</a:t>
+            </a:r>
+            <a:r>
+              <a:rPr lang="en-GB" sz="1000" kern="150" dirty="0" err="1">
+                <a:solidFill>
+                  <a:srgbClr val="FFA07A"/>
+                </a:solidFill>
+                <a:latin typeface="Courier New" panose="02070309020205020404" pitchFamily="49" charset="0"/>
+                <a:ea typeface="NSimSun" panose="02010609030101010101" pitchFamily="49" charset="-122"/>
+              </a:rPr>
+              <a:t>parentMethod</a:t>
+            </a:r>
+            <a:r>
+              <a:rPr lang="en-GB" sz="1000" kern="150" dirty="0">
+                <a:solidFill>
+                  <a:srgbClr val="FFA07A"/>
+                </a:solidFill>
+                <a:latin typeface="Courier New" panose="02070309020205020404" pitchFamily="49" charset="0"/>
+                <a:ea typeface="NSimSun" panose="02010609030101010101" pitchFamily="49" charset="-122"/>
+              </a:rPr>
+              <a:t>. "</a:t>
+            </a:r>
+            <a:endParaRPr lang="en-US" sz="1000" kern="150" dirty="0">
+              <a:solidFill>
+                <a:srgbClr val="FFFFFF"/>
+              </a:solidFill>
+              <a:latin typeface="Courier New" panose="02070309020205020404" pitchFamily="49" charset="0"/>
+              <a:ea typeface="NSimSun" panose="02010609030101010101" pitchFamily="49" charset="-122"/>
+            </a:endParaRPr>
+          </a:p>
+          <a:p>
+            <a:r>
+              <a:rPr lang="en-GB" sz="1000" kern="150" dirty="0">
+                <a:solidFill>
+                  <a:srgbClr val="FFFFFF"/>
+                </a:solidFill>
+                <a:latin typeface="Courier New" panose="02070309020205020404" pitchFamily="49" charset="0"/>
+                <a:ea typeface="NSimSun" panose="02010609030101010101" pitchFamily="49" charset="-122"/>
+              </a:rPr>
+              <a:t>             + </a:t>
+            </a:r>
+            <a:r>
+              <a:rPr lang="en-GB" sz="1000" kern="150" dirty="0">
+                <a:solidFill>
+                  <a:srgbClr val="FFA07A"/>
+                </a:solidFill>
+                <a:latin typeface="Courier New" panose="02070309020205020404" pitchFamily="49" charset="0"/>
+                <a:ea typeface="NSimSun" panose="02010609030101010101" pitchFamily="49" charset="-122"/>
+              </a:rPr>
+              <a:t>"Valid options are: [${</a:t>
+            </a:r>
+            <a:r>
+              <a:rPr lang="en-GB" sz="1000" kern="150" dirty="0" err="1">
+                <a:solidFill>
+                  <a:srgbClr val="FFA07A"/>
+                </a:solidFill>
+                <a:latin typeface="Courier New" panose="02070309020205020404" pitchFamily="49" charset="0"/>
+                <a:ea typeface="NSimSun" panose="02010609030101010101" pitchFamily="49" charset="-122"/>
+              </a:rPr>
+              <a:t>farm.keySet</a:t>
+            </a:r>
+            <a:r>
+              <a:rPr lang="en-GB" sz="1000" kern="150" dirty="0">
+                <a:solidFill>
+                  <a:srgbClr val="FFA07A"/>
+                </a:solidFill>
+                <a:latin typeface="Courier New" panose="02070309020205020404" pitchFamily="49" charset="0"/>
+                <a:ea typeface="NSimSun" panose="02010609030101010101" pitchFamily="49" charset="-122"/>
+              </a:rPr>
+              <a:t>().collect { </a:t>
+            </a:r>
+            <a:r>
+              <a:rPr lang="en-GB" sz="1000" kern="150" dirty="0" err="1">
+                <a:solidFill>
+                  <a:srgbClr val="FFA07A"/>
+                </a:solidFill>
+                <a:latin typeface="Courier New" panose="02070309020205020404" pitchFamily="49" charset="0"/>
+                <a:ea typeface="NSimSun" panose="02010609030101010101" pitchFamily="49" charset="-122"/>
+              </a:rPr>
+              <a:t>classMethodNames</a:t>
+            </a:r>
+            <a:r>
+              <a:rPr lang="en-GB" sz="1000" kern="150" dirty="0">
+                <a:solidFill>
+                  <a:srgbClr val="FFA07A"/>
+                </a:solidFill>
+                <a:latin typeface="Courier New" panose="02070309020205020404" pitchFamily="49" charset="0"/>
+                <a:ea typeface="NSimSun" panose="02010609030101010101" pitchFamily="49" charset="-122"/>
+              </a:rPr>
+              <a:t>[it]}.join(',')}]"</a:t>
+            </a:r>
+            <a:r>
+              <a:rPr lang="en-GB" sz="1000" kern="150" dirty="0">
+                <a:solidFill>
+                  <a:srgbClr val="FFFFFF"/>
+                </a:solidFill>
+                <a:latin typeface="Courier New" panose="02070309020205020404" pitchFamily="49" charset="0"/>
+                <a:ea typeface="NSimSun" panose="02010609030101010101" pitchFamily="49" charset="-122"/>
+              </a:rPr>
+              <a:t>)</a:t>
+            </a:r>
+            <a:endParaRPr lang="en-US" sz="1000" kern="150" dirty="0">
+              <a:solidFill>
+                <a:srgbClr val="FFFFFF"/>
+              </a:solidFill>
+              <a:latin typeface="Courier New" panose="02070309020205020404" pitchFamily="49" charset="0"/>
+              <a:ea typeface="NSimSun" panose="02010609030101010101" pitchFamily="49" charset="-122"/>
+            </a:endParaRPr>
+          </a:p>
+          <a:p>
+            <a:r>
+              <a:rPr lang="en-GB" sz="1000" kern="150" dirty="0">
+                <a:solidFill>
+                  <a:srgbClr val="FFFFFF"/>
+                </a:solidFill>
+                <a:latin typeface="Courier New" panose="02070309020205020404" pitchFamily="49" charset="0"/>
+                <a:ea typeface="NSimSun" panose="02010609030101010101" pitchFamily="49" charset="-122"/>
+              </a:rPr>
+              <a:t>  }</a:t>
+            </a:r>
+            <a:endParaRPr lang="en-US" sz="1000" kern="150" dirty="0">
+              <a:solidFill>
+                <a:srgbClr val="FFFFFF"/>
+              </a:solidFill>
+              <a:latin typeface="Courier New" panose="02070309020205020404" pitchFamily="49" charset="0"/>
+              <a:ea typeface="NSimSun" panose="02010609030101010101" pitchFamily="49" charset="-122"/>
+            </a:endParaRPr>
+          </a:p>
+          <a:p>
+            <a:r>
+              <a:rPr lang="en-GB" sz="1000" kern="150" dirty="0">
+                <a:solidFill>
+                  <a:srgbClr val="FFFFFF"/>
+                </a:solidFill>
+                <a:latin typeface="Courier New" panose="02070309020205020404" pitchFamily="49" charset="0"/>
+                <a:ea typeface="NSimSun" panose="02010609030101010101" pitchFamily="49" charset="-122"/>
+              </a:rPr>
+              <a:t>  </a:t>
+            </a:r>
+            <a:r>
+              <a:rPr lang="en-GB" sz="1000" kern="150" dirty="0" err="1">
+                <a:solidFill>
+                  <a:srgbClr val="00FFFF"/>
+                </a:solidFill>
+                <a:latin typeface="Courier New" panose="02070309020205020404" pitchFamily="49" charset="0"/>
+                <a:ea typeface="NSimSun" panose="02010609030101010101" pitchFamily="49" charset="-122"/>
+              </a:rPr>
+              <a:t>def</a:t>
+            </a:r>
+            <a:r>
+              <a:rPr lang="en-GB" sz="1000" kern="150" dirty="0">
+                <a:solidFill>
+                  <a:srgbClr val="FFFFFF"/>
+                </a:solidFill>
+                <a:latin typeface="Courier New" panose="02070309020205020404" pitchFamily="49" charset="0"/>
+                <a:ea typeface="NSimSun" panose="02010609030101010101" pitchFamily="49" charset="-122"/>
+              </a:rPr>
+              <a:t> </a:t>
+            </a:r>
+            <a:r>
+              <a:rPr lang="en-GB" sz="1000" kern="150" dirty="0">
+                <a:solidFill>
+                  <a:srgbClr val="EEDD82"/>
+                </a:solidFill>
+                <a:latin typeface="Courier New" panose="02070309020205020404" pitchFamily="49" charset="0"/>
+                <a:ea typeface="NSimSun" panose="02010609030101010101" pitchFamily="49" charset="-122"/>
+              </a:rPr>
+              <a:t>z</a:t>
+            </a:r>
+            <a:r>
+              <a:rPr lang="en-GB" sz="1000" kern="150" dirty="0">
+                <a:solidFill>
+                  <a:srgbClr val="FFFFFF"/>
+                </a:solidFill>
+                <a:latin typeface="Courier New" panose="02070309020205020404" pitchFamily="49" charset="0"/>
+                <a:ea typeface="NSimSun" panose="02010609030101010101" pitchFamily="49" charset="-122"/>
+              </a:rPr>
+              <a:t> = farm[</a:t>
+            </a:r>
+            <a:r>
+              <a:rPr lang="en-GB" sz="1000" kern="150" dirty="0" err="1">
+                <a:solidFill>
+                  <a:srgbClr val="FFFFFF"/>
+                </a:solidFill>
+                <a:latin typeface="Courier New" panose="02070309020205020404" pitchFamily="49" charset="0"/>
+                <a:ea typeface="NSimSun" panose="02010609030101010101" pitchFamily="49" charset="-122"/>
+              </a:rPr>
+              <a:t>child.getClass</a:t>
+            </a:r>
+            <a:r>
+              <a:rPr lang="en-GB" sz="1000" kern="150" dirty="0">
+                <a:solidFill>
+                  <a:srgbClr val="FFFFFF"/>
+                </a:solidFill>
+                <a:latin typeface="Courier New" panose="02070309020205020404" pitchFamily="49" charset="0"/>
+                <a:ea typeface="NSimSun" panose="02010609030101010101" pitchFamily="49" charset="-122"/>
+              </a:rPr>
+              <a:t>()](parent, child)</a:t>
+            </a:r>
+            <a:endParaRPr lang="en-US" sz="1000" kern="150" dirty="0">
+              <a:solidFill>
+                <a:srgbClr val="FFFFFF"/>
+              </a:solidFill>
+              <a:latin typeface="Courier New" panose="02070309020205020404" pitchFamily="49" charset="0"/>
+              <a:ea typeface="NSimSun" panose="02010609030101010101" pitchFamily="49" charset="-122"/>
+            </a:endParaRPr>
+          </a:p>
+          <a:p>
+            <a:r>
+              <a:rPr lang="en-GB" sz="1000" kern="150" dirty="0">
+                <a:solidFill>
+                  <a:srgbClr val="FFFFFF"/>
+                </a:solidFill>
+                <a:latin typeface="Courier New" panose="02070309020205020404" pitchFamily="49" charset="0"/>
+                <a:ea typeface="NSimSun" panose="02010609030101010101" pitchFamily="49" charset="-122"/>
+              </a:rPr>
+              <a:t>  debug </a:t>
+            </a:r>
+            <a:r>
+              <a:rPr lang="en-GB" sz="1000" kern="150" dirty="0">
+                <a:solidFill>
+                  <a:srgbClr val="FFA07A"/>
+                </a:solidFill>
+                <a:latin typeface="Courier New" panose="02070309020205020404" pitchFamily="49" charset="0"/>
+                <a:ea typeface="NSimSun" panose="02010609030101010101" pitchFamily="49" charset="-122"/>
+              </a:rPr>
+              <a:t>"z=$z"</a:t>
+            </a:r>
+            <a:endParaRPr lang="en-US" sz="1000" kern="150" dirty="0">
+              <a:solidFill>
+                <a:srgbClr val="FFFFFF"/>
+              </a:solidFill>
+              <a:latin typeface="Courier New" panose="02070309020205020404" pitchFamily="49" charset="0"/>
+              <a:ea typeface="NSimSun" panose="02010609030101010101" pitchFamily="49" charset="-122"/>
+            </a:endParaRPr>
+          </a:p>
+          <a:p>
+            <a:r>
+              <a:rPr lang="en-GB" sz="1000" kern="150" dirty="0">
+                <a:solidFill>
+                  <a:srgbClr val="FFFFFF"/>
+                </a:solidFill>
+                <a:latin typeface="Courier New" panose="02070309020205020404" pitchFamily="49" charset="0"/>
+                <a:ea typeface="NSimSun" panose="02010609030101010101" pitchFamily="49" charset="-122"/>
+              </a:rPr>
+              <a:t>  z</a:t>
+            </a:r>
+            <a:endParaRPr lang="en-US" sz="1000" kern="150" dirty="0">
+              <a:solidFill>
+                <a:srgbClr val="FFFFFF"/>
+              </a:solidFill>
+              <a:latin typeface="Courier New" panose="02070309020205020404" pitchFamily="49" charset="0"/>
+              <a:ea typeface="NSimSun" panose="02010609030101010101" pitchFamily="49" charset="-122"/>
+            </a:endParaRPr>
+          </a:p>
+          <a:p>
+            <a:pPr>
+              <a:spcAft>
+                <a:spcPts val="595"/>
+              </a:spcAft>
+            </a:pPr>
+            <a:r>
+              <a:rPr lang="en-GB" sz="1000" kern="150" dirty="0">
+                <a:solidFill>
+                  <a:srgbClr val="FFFFFF"/>
+                </a:solidFill>
+                <a:latin typeface="Courier New" panose="02070309020205020404" pitchFamily="49" charset="0"/>
+                <a:ea typeface="NSimSun" panose="02010609030101010101" pitchFamily="49" charset="-122"/>
+              </a:rPr>
+              <a:t>}</a:t>
+            </a:r>
+            <a:endParaRPr lang="en-US" sz="1000" kern="150" dirty="0">
+              <a:solidFill>
+                <a:srgbClr val="FFFFFF"/>
+              </a:solidFill>
+              <a:effectLst/>
+              <a:latin typeface="Courier New" panose="02070309020205020404" pitchFamily="49" charset="0"/>
+              <a:ea typeface="NSimSun" panose="02010609030101010101" pitchFamily="49" charset="-122"/>
+            </a:endParaRPr>
+          </a:p>
+        </p:txBody>
+      </p:sp>
+      <p:sp>
+        <p:nvSpPr>
+          <p:cNvPr id="6" name="CustomShape 2"/>
+          <p:cNvSpPr/>
+          <p:nvPr/>
+        </p:nvSpPr>
+        <p:spPr>
+          <a:xfrm>
+            <a:off x="822960" y="5051906"/>
+            <a:ext cx="7543080" cy="1105825"/>
+          </a:xfrm>
+          <a:prstGeom prst="rect">
+            <a:avLst/>
+          </a:prstGeom>
+          <a:noFill/>
+          <a:ln>
+            <a:noFill/>
+          </a:ln>
+        </p:spPr>
+        <p:style>
+          <a:lnRef idx="0">
+            <a:scrgbClr r="0" g="0" b="0"/>
+          </a:lnRef>
+          <a:fillRef idx="0">
+            <a:scrgbClr r="0" g="0" b="0"/>
+          </a:fillRef>
+          <a:effectRef idx="0">
+            <a:scrgbClr r="0" g="0" b="0"/>
+          </a:effectRef>
+          <a:fontRef idx="minor"/>
+        </p:style>
+        <p:txBody>
+          <a:bodyPr lIns="0" tIns="45000" rIns="0" bIns="45000"/>
+          <a:lstStyle/>
+          <a:p>
+            <a:pPr marL="720">
+              <a:lnSpc>
+                <a:spcPct val="100000"/>
+              </a:lnSpc>
+              <a:buClr>
+                <a:srgbClr val="4E67C8"/>
+              </a:buClr>
+            </a:pPr>
+            <a:r>
+              <a:rPr lang="en-US" sz="2000" spc="-1" dirty="0" smtClean="0">
+                <a:solidFill>
+                  <a:srgbClr val="404040"/>
+                </a:solidFill>
+                <a:uFill>
+                  <a:solidFill>
+                    <a:srgbClr val="FFFFFF"/>
+                  </a:solidFill>
+                </a:uFill>
+                <a:latin typeface="Calibri"/>
+              </a:rPr>
+              <a:t>(</a:t>
+            </a:r>
+            <a:r>
+              <a:rPr lang="en-US" sz="2000" b="0" strike="noStrike" spc="-1" dirty="0" err="1" smtClean="0">
+                <a:solidFill>
+                  <a:srgbClr val="404040"/>
+                </a:solidFill>
+                <a:uFill>
+                  <a:solidFill>
+                    <a:srgbClr val="FFFFFF"/>
+                  </a:solidFill>
+                </a:uFill>
+                <a:latin typeface="Courier New" panose="02070309020205020404" pitchFamily="49" charset="0"/>
+                <a:cs typeface="Courier New" panose="02070309020205020404" pitchFamily="49" charset="0"/>
+              </a:rPr>
+              <a:t>classMethodNames</a:t>
+            </a:r>
+            <a:r>
+              <a:rPr lang="en-US" sz="2000" b="0" strike="noStrike" spc="-1" dirty="0" smtClean="0">
+                <a:solidFill>
+                  <a:srgbClr val="404040"/>
+                </a:solidFill>
+                <a:uFill>
+                  <a:solidFill>
+                    <a:srgbClr val="FFFFFF"/>
+                  </a:solidFill>
+                </a:uFill>
+                <a:latin typeface="Calibri"/>
+              </a:rPr>
+              <a:t> is a map </a:t>
+            </a:r>
+            <a:r>
+              <a:rPr lang="en-US" sz="2000" spc="-1" dirty="0">
+                <a:solidFill>
+                  <a:srgbClr val="404040"/>
+                </a:solidFill>
+                <a:uFill>
+                  <a:solidFill>
+                    <a:srgbClr val="FFFFFF"/>
+                  </a:solidFill>
+                </a:uFill>
+                <a:latin typeface="Calibri"/>
+              </a:rPr>
+              <a:t>from </a:t>
+            </a:r>
+            <a:r>
+              <a:rPr lang="en-US" sz="2000" spc="-1" dirty="0" smtClean="0">
+                <a:solidFill>
+                  <a:srgbClr val="404040"/>
+                </a:solidFill>
+                <a:uFill>
+                  <a:solidFill>
+                    <a:srgbClr val="FFFFFF"/>
+                  </a:solidFill>
+                </a:uFill>
+                <a:latin typeface="Calibri"/>
+              </a:rPr>
+              <a:t>the </a:t>
+            </a:r>
+            <a:r>
+              <a:rPr lang="en-US" sz="2000" spc="-1" dirty="0">
+                <a:solidFill>
+                  <a:srgbClr val="404040"/>
+                </a:solidFill>
+                <a:uFill>
+                  <a:solidFill>
+                    <a:srgbClr val="FFFFFF"/>
+                  </a:solidFill>
+                </a:uFill>
+                <a:latin typeface="Calibri"/>
+              </a:rPr>
+              <a:t>report object class </a:t>
+            </a:r>
+            <a:r>
+              <a:rPr lang="en-US" sz="2000" spc="-1" dirty="0" smtClean="0">
+                <a:solidFill>
+                  <a:srgbClr val="404040"/>
+                </a:solidFill>
+                <a:uFill>
+                  <a:solidFill>
+                    <a:srgbClr val="FFFFFF"/>
+                  </a:solidFill>
+                </a:uFill>
+                <a:latin typeface="Calibri"/>
+              </a:rPr>
+              <a:t>to </a:t>
+            </a:r>
+            <a:r>
+              <a:rPr lang="en-US" sz="2000" spc="-1" dirty="0">
+                <a:solidFill>
+                  <a:srgbClr val="404040"/>
+                </a:solidFill>
+                <a:uFill>
+                  <a:solidFill>
+                    <a:srgbClr val="FFFFFF"/>
+                  </a:solidFill>
+                </a:uFill>
+                <a:latin typeface="Calibri"/>
+              </a:rPr>
+              <a:t>the </a:t>
+            </a:r>
+            <a:r>
+              <a:rPr lang="en-US" sz="2000" spc="-1" dirty="0" smtClean="0">
+                <a:solidFill>
+                  <a:srgbClr val="404040"/>
+                </a:solidFill>
+                <a:uFill>
+                  <a:solidFill>
+                    <a:srgbClr val="FFFFFF"/>
+                  </a:solidFill>
+                </a:uFill>
+                <a:latin typeface="Calibri"/>
+              </a:rPr>
+              <a:t>keyword used </a:t>
+            </a:r>
+            <a:r>
+              <a:rPr lang="en-US" sz="2000" spc="-1" dirty="0">
+                <a:solidFill>
+                  <a:srgbClr val="404040"/>
+                </a:solidFill>
+                <a:uFill>
+                  <a:solidFill>
+                    <a:srgbClr val="FFFFFF"/>
+                  </a:solidFill>
+                </a:uFill>
+                <a:latin typeface="Calibri"/>
+              </a:rPr>
+              <a:t>to build </a:t>
+            </a:r>
+            <a:r>
+              <a:rPr lang="en-US" sz="2000" spc="-1" dirty="0" smtClean="0">
+                <a:solidFill>
+                  <a:srgbClr val="404040"/>
+                </a:solidFill>
+                <a:uFill>
+                  <a:solidFill>
+                    <a:srgbClr val="FFFFFF"/>
+                  </a:solidFill>
+                </a:uFill>
+                <a:latin typeface="Calibri"/>
+              </a:rPr>
+              <a:t>it.  It is used here to produce a meaningful error message.)</a:t>
+            </a:r>
+            <a:endParaRPr lang="en-US" sz="1800" b="0" strike="noStrike" spc="-1" dirty="0">
+              <a:solidFill>
+                <a:srgbClr val="000000"/>
+              </a:solidFill>
+              <a:uFill>
+                <a:solidFill>
+                  <a:srgbClr val="FFFFFF"/>
+                </a:solidFill>
+              </a:uFill>
+              <a:latin typeface="Arial"/>
+            </a:endParaRPr>
+          </a:p>
+          <a:p>
+            <a:pPr>
+              <a:lnSpc>
+                <a:spcPct val="90000"/>
+              </a:lnSpc>
+            </a:pPr>
+            <a:endParaRPr lang="en-US" sz="1800" b="0" strike="noStrike" spc="-1" dirty="0">
               <a:solidFill>
                 <a:srgbClr val="000000"/>
               </a:solidFill>
@@ -35123,7 +37347,7 @@
               </a:lnSpc>
             </a:pPr>
             <a:r>
-              <a:rPr lang="en-US" sz="4800" b="0" strike="noStrike" spc="-46">
+              <a:rPr lang="en-US" sz="4800" b="0" strike="noStrike" spc="-46" dirty="0" err="1" smtClean="0">
                 <a:solidFill>
                   <a:srgbClr val="31489F"/>
                 </a:solidFill>
@@ -35134,9 +37358,9 @@
                 </a:uFill>
                 <a:latin typeface="Calibri Light"/>
               </a:rPr>
-              <a:t>Slide Heading Here</a:t>
-            </a:r>
-            <a:endParaRPr lang="en-US" sz="1800" b="0" strike="noStrike" spc="-1">
+              <a:t>SimpleReportBuilder</a:t>
+            </a:r>
+            <a:endParaRPr lang="en-US" sz="1800" b="0" strike="noStrike" spc="-1" dirty="0">
               <a:solidFill>
                 <a:srgbClr val="000000"/>
               </a:solidFill>
@@ -35159,7 +37383,7 @@
         <p:spPr>
           <a:xfrm>
             <a:off x="822960" y="1845720"/>
-            <a:ext cx="7543080" cy="4022640"/>
+            <a:ext cx="7543080" cy="330321"/>
           </a:xfrm>
           <a:prstGeom prst="rect">
             <a:avLst/>
@@ -35185,154 +37409,83 @@
           <a:bodyPr lIns="0" tIns="45000" rIns="0" bIns="45000"/>
           <a:lstStyle/>
           <a:p>
-            <a:pPr marL="199080" indent="-198360">
-              <a:lnSpc>
-                <a:spcPct val="100000"/>
-              </a:lnSpc>
-              <a:buClr>
-                <a:srgbClr val="4E67C8"/>
-              </a:buClr>
-              <a:buFont typeface="Wingdings 2" charset="2"/>
-              <a:buChar char=""/>
-            </a:pPr>
-            <a:r>
-              <a:rPr lang="en-US" sz="2000" b="0" strike="noStrike" spc="-1">
-                <a:solidFill>
-                  <a:srgbClr val="404040"/>
+            <a:pPr>
+              <a:lnSpc>
+                <a:spcPct val="90000"/>
+              </a:lnSpc>
+            </a:pPr>
+            <a:r>
+              <a:rPr lang="en-US" sz="1800" b="0" strike="noStrike" spc="-1" dirty="0" smtClean="0">
+                <a:solidFill>
+                  <a:srgbClr val="000000"/>
                 </a:solidFill>
                 <a:uFill>
                   <a:solidFill>
                     <a:srgbClr val="FFFFFF"/>
                   </a:solidFill>
                 </a:uFill>
-                <a:latin typeface="Calibri"/>
-              </a:rPr>
-              <a:t>Presentation Text</a:t>
-            </a:r>
-            <a:endParaRPr lang="en-US" sz="1800" b="0" strike="noStrike" spc="-1">
-              <a:solidFill>
-                <a:srgbClr val="000000"/>
-              </a:solidFill>
-              <a:uFill>
-                <a:solidFill>
-                  <a:srgbClr val="FFFFFF"/>
-                </a:solidFill>
-              </a:uFill>
-              <a:latin typeface="Arial"/>
-            </a:endParaRPr>
-          </a:p>
-          <a:p>
-            <a:pPr marL="377280" lvl="3" indent="-198360">
-              <a:lnSpc>
-                <a:spcPct val="100000"/>
-              </a:lnSpc>
-              <a:buClr>
-                <a:srgbClr val="4E67C8"/>
-              </a:buClr>
-              <a:buSzPct val="80000"/>
-              <a:buFont typeface="Wingdings 2" charset="2"/>
-              <a:buChar char=""/>
-            </a:pPr>
-            <a:r>
-              <a:rPr lang="en-US" sz="1500" b="0" strike="noStrike" spc="-1">
-                <a:solidFill>
-                  <a:srgbClr val="404040"/>
+                <a:latin typeface="Arial"/>
+              </a:rPr>
+              <a:t>Here is a sample from the </a:t>
+            </a:r>
+            <a:r>
+              <a:rPr lang="en-US" sz="1800" b="0" strike="noStrike" spc="-1" dirty="0" err="1" smtClean="0">
+                <a:solidFill>
+                  <a:srgbClr val="000000"/>
                 </a:solidFill>
                 <a:uFill>
                   <a:solidFill>
                     <a:srgbClr val="FFFFFF"/>
                   </a:solidFill>
                 </a:uFill>
-                <a:latin typeface="Calibri"/>
-              </a:rPr>
-              <a:t>Screen Captures</a:t>
-            </a:r>
-            <a:endParaRPr lang="en-US" sz="1800" b="0" strike="noStrike" spc="-1">
-              <a:solidFill>
-                <a:srgbClr val="000000"/>
-              </a:solidFill>
-              <a:uFill>
-                <a:solidFill>
-                  <a:srgbClr val="FFFFFF"/>
-                </a:solidFill>
-              </a:uFill>
-              <a:latin typeface="Arial"/>
-            </a:endParaRPr>
-          </a:p>
-          <a:p>
-            <a:pPr marL="377280" lvl="3" indent="-198360">
-              <a:lnSpc>
-                <a:spcPct val="100000"/>
-              </a:lnSpc>
-              <a:buClr>
-                <a:srgbClr val="4E67C8"/>
-              </a:buClr>
-              <a:buSzPct val="80000"/>
-              <a:buFont typeface="Wingdings 2" charset="2"/>
-              <a:buChar char=""/>
-            </a:pPr>
-            <a:r>
-              <a:rPr lang="en-US" sz="1500" b="0" strike="noStrike" spc="-1">
-                <a:solidFill>
-                  <a:srgbClr val="404040"/>
+                <a:latin typeface="Courier New" panose="02070309020205020404" pitchFamily="49" charset="0"/>
+                <a:cs typeface="Courier New" panose="02070309020205020404" pitchFamily="49" charset="0"/>
+              </a:rPr>
+              <a:t>addChildFarm</a:t>
+            </a:r>
+            <a:r>
+              <a:rPr lang="en-US" sz="1800" b="0" strike="noStrike" spc="-1" dirty="0" smtClean="0">
+                <a:solidFill>
+                  <a:srgbClr val="000000"/>
                 </a:solidFill>
                 <a:uFill>
                   <a:solidFill>
                     <a:srgbClr val="FFFFFF"/>
                   </a:solidFill>
                 </a:uFill>
-                <a:latin typeface="Calibri"/>
-              </a:rPr>
-              <a:t>Etc.</a:t>
-            </a:r>
-            <a:endParaRPr lang="en-US" sz="1800" b="0" strike="noStrike" spc="-1">
-              <a:solidFill>
-                <a:srgbClr val="000000"/>
-              </a:solidFill>
-              <a:uFill>
-                <a:solidFill>
-                  <a:srgbClr val="FFFFFF"/>
-                </a:solidFill>
-              </a:uFill>
-              <a:latin typeface="Arial"/>
-            </a:endParaRPr>
-          </a:p>
-          <a:p>
-            <a:pPr marL="199080" indent="-198360">
-              <a:lnSpc>
-                <a:spcPct val="100000"/>
-              </a:lnSpc>
-              <a:buClr>
-                <a:srgbClr val="4E67C8"/>
-              </a:buClr>
-              <a:buFont typeface="Wingdings 2" charset="2"/>
-              <a:buChar char=""/>
-            </a:pPr>
-            <a:r>
-              <a:rPr lang="en-US" sz="2000" b="0" strike="noStrike" spc="-1">
-                <a:solidFill>
-                  <a:srgbClr val="404040"/>
+                <a:latin typeface="Arial"/>
+              </a:rPr>
+              <a:t> used by </a:t>
+            </a:r>
+            <a:r>
+              <a:rPr lang="en-US" sz="1800" b="0" strike="noStrike" spc="-1" dirty="0" err="1" smtClean="0">
+                <a:solidFill>
+                  <a:srgbClr val="000000"/>
                 </a:solidFill>
                 <a:uFill>
                   <a:solidFill>
                     <a:srgbClr val="FFFFFF"/>
                   </a:solidFill>
                 </a:uFill>
-                <a:latin typeface="Calibri"/>
-              </a:rPr>
-              <a:t>Presenters – duplicate this slide as many times as needed</a:t>
-            </a:r>
-            <a:endParaRPr lang="en-US" sz="1800" b="0" strike="noStrike" spc="-1">
-              <a:solidFill>
-                <a:srgbClr val="000000"/>
-              </a:solidFill>
-              <a:uFill>
-                <a:solidFill>
-                  <a:srgbClr val="FFFFFF"/>
-                </a:solidFill>
-              </a:uFill>
-              <a:latin typeface="Arial"/>
-            </a:endParaRPr>
+                <a:latin typeface="Courier New" panose="02070309020205020404" pitchFamily="49" charset="0"/>
+                <a:cs typeface="Courier New" panose="02070309020205020404" pitchFamily="49" charset="0"/>
+              </a:rPr>
+              <a:t>setParent</a:t>
+            </a:r>
+            <a:r>
+              <a:rPr lang="en-US" sz="1800" b="0" strike="noStrike" spc="-1" dirty="0" smtClean="0">
+                <a:solidFill>
+                  <a:srgbClr val="000000"/>
+                </a:solidFill>
+                <a:uFill>
+                  <a:solidFill>
+                    <a:srgbClr val="FFFFFF"/>
+                  </a:solidFill>
+                </a:uFill>
+                <a:latin typeface="Arial"/>
+              </a:rPr>
+              <a:t>.</a:t>
+            </a:r>
           </a:p>
           <a:p>
             <a:pPr>
@@ -35340,7 +37493,7 @@
                 <a:spcPct val="90000"/>
               </a:lnSpc>
             </a:pPr>
-            <a:endParaRPr lang="en-US" sz="1800" b="0" strike="noStrike" spc="-1">
+            <a:endParaRPr lang="en-US" sz="1800" b="0" strike="noStrike" spc="-1" dirty="0">
               <a:solidFill>
                 <a:srgbClr val="000000"/>
               </a:solidFill>
@@ -35419,6 +37572,543 @@
                 </a:solidFill>
               </a:uFill>
               <a:latin typeface="Arial"/>
+            </a:endParaRPr>
+          </a:p>
+        </p:txBody>
+      </p:sp>
+      <p:sp>
+        <p:nvSpPr>
+          <p:cNvPr id="2" name="Rectangle 1"/>
+          <p:cNvSpPr/>
+          <p:nvPr/>
+        </p:nvSpPr>
+        <p:spPr>
+          <a:xfrm>
+            <a:off x="649339" y="2285121"/>
+            <a:ext cx="8194680" cy="3970318"/>
+          </a:xfrm>
+          <a:prstGeom prst="rect">
+            <a:avLst/>
+          </a:prstGeom>
+          <a:solidFill>
+            <a:schemeClr val="tx1"/>
+          </a:solidFill>
+        </p:spPr>
+        <p:txBody>
+          <a:bodyPr wrap="square">
+            <a:spAutoFit/>
+          </a:bodyPr>
+          <a:lstStyle/>
+          <a:p>
+            <a:r>
+              <a:rPr lang="en-GB" sz="1400" kern="150" dirty="0">
+                <a:solidFill>
+                  <a:srgbClr val="00FF00"/>
+                </a:solidFill>
+                <a:latin typeface="Courier New" panose="02070309020205020404" pitchFamily="49" charset="0"/>
+                <a:ea typeface="NSimSun" panose="02010609030101010101" pitchFamily="49" charset="-122"/>
+              </a:rPr>
+              <a:t>/** Each entry in this table is a closure that attaches the child to the </a:t>
+            </a:r>
+            <a:endParaRPr lang="en-US" sz="1400" kern="150" dirty="0">
+              <a:solidFill>
+                <a:srgbClr val="FFFFFF"/>
+              </a:solidFill>
+              <a:latin typeface="Courier New" panose="02070309020205020404" pitchFamily="49" charset="0"/>
+              <a:ea typeface="NSimSun" panose="02010609030101010101" pitchFamily="49" charset="-122"/>
+            </a:endParaRPr>
+          </a:p>
+          <a:p>
+            <a:r>
+              <a:rPr lang="en-GB" sz="1400" kern="150" dirty="0">
+                <a:solidFill>
+                  <a:srgbClr val="00FF00"/>
+                </a:solidFill>
+                <a:latin typeface="Courier New" panose="02070309020205020404" pitchFamily="49" charset="0"/>
+                <a:ea typeface="NSimSun" panose="02010609030101010101" pitchFamily="49" charset="-122"/>
+              </a:rPr>
+              <a:t> *  parent.  The keys for the map are a subset of the cross-product of the </a:t>
+            </a:r>
+            <a:endParaRPr lang="en-US" sz="1400" kern="150" dirty="0">
+              <a:solidFill>
+                <a:srgbClr val="FFFFFF"/>
+              </a:solidFill>
+              <a:latin typeface="Courier New" panose="02070309020205020404" pitchFamily="49" charset="0"/>
+              <a:ea typeface="NSimSun" panose="02010609030101010101" pitchFamily="49" charset="-122"/>
+            </a:endParaRPr>
+          </a:p>
+          <a:p>
+            <a:r>
+              <a:rPr lang="en-GB" sz="1400" kern="150" dirty="0">
+                <a:solidFill>
+                  <a:srgbClr val="00FF00"/>
+                </a:solidFill>
+                <a:latin typeface="Courier New" panose="02070309020205020404" pitchFamily="49" charset="0"/>
+                <a:ea typeface="NSimSun" panose="02010609030101010101" pitchFamily="49" charset="-122"/>
+              </a:rPr>
+              <a:t> *  classes that can go into a </a:t>
+            </a:r>
+            <a:r>
+              <a:rPr lang="en-GB" sz="1400" kern="150" dirty="0" err="1">
+                <a:solidFill>
+                  <a:srgbClr val="00FF00"/>
+                </a:solidFill>
+                <a:latin typeface="Courier New" panose="02070309020205020404" pitchFamily="49" charset="0"/>
+                <a:ea typeface="NSimSun" panose="02010609030101010101" pitchFamily="49" charset="-122"/>
+              </a:rPr>
+              <a:t>SimpleReport</a:t>
+            </a:r>
+            <a:r>
+              <a:rPr lang="en-GB" sz="1400" kern="150" dirty="0">
+                <a:solidFill>
+                  <a:srgbClr val="00FF00"/>
+                </a:solidFill>
+                <a:latin typeface="Courier New" panose="02070309020205020404" pitchFamily="49" charset="0"/>
+                <a:ea typeface="NSimSun" panose="02010609030101010101" pitchFamily="49" charset="-122"/>
+              </a:rPr>
+              <a:t>.</a:t>
+            </a:r>
+            <a:endParaRPr lang="en-US" sz="1400" kern="150" dirty="0">
+              <a:solidFill>
+                <a:srgbClr val="FFFFFF"/>
+              </a:solidFill>
+              <a:latin typeface="Courier New" panose="02070309020205020404" pitchFamily="49" charset="0"/>
+              <a:ea typeface="NSimSun" panose="02010609030101010101" pitchFamily="49" charset="-122"/>
+            </a:endParaRPr>
+          </a:p>
+          <a:p>
+            <a:r>
+              <a:rPr lang="en-GB" sz="1400" kern="150" dirty="0">
+                <a:solidFill>
+                  <a:srgbClr val="00FF00"/>
+                </a:solidFill>
+                <a:latin typeface="Courier New" panose="02070309020205020404" pitchFamily="49" charset="0"/>
+                <a:ea typeface="NSimSun" panose="02010609030101010101" pitchFamily="49" charset="-122"/>
+              </a:rPr>
+              <a:t> *</a:t>
+            </a:r>
+            <a:endParaRPr lang="en-US" sz="1400" kern="150" dirty="0">
+              <a:solidFill>
+                <a:srgbClr val="FFFFFF"/>
+              </a:solidFill>
+              <a:latin typeface="Courier New" panose="02070309020205020404" pitchFamily="49" charset="0"/>
+              <a:ea typeface="NSimSun" panose="02010609030101010101" pitchFamily="49" charset="-122"/>
+            </a:endParaRPr>
+          </a:p>
+          <a:p>
+            <a:r>
+              <a:rPr lang="en-GB" sz="1400" kern="150" dirty="0">
+                <a:solidFill>
+                  <a:srgbClr val="00FF00"/>
+                </a:solidFill>
+                <a:latin typeface="Courier New" panose="02070309020205020404" pitchFamily="49" charset="0"/>
+                <a:ea typeface="NSimSun" panose="02010609030101010101" pitchFamily="49" charset="-122"/>
+              </a:rPr>
+              <a:t> *  Note that the keys of the map are actual Java classes, not their names.</a:t>
+            </a:r>
+            <a:endParaRPr lang="en-US" sz="1400" kern="150" dirty="0">
+              <a:solidFill>
+                <a:srgbClr val="FFFFFF"/>
+              </a:solidFill>
+              <a:latin typeface="Courier New" panose="02070309020205020404" pitchFamily="49" charset="0"/>
+              <a:ea typeface="NSimSun" panose="02010609030101010101" pitchFamily="49" charset="-122"/>
+            </a:endParaRPr>
+          </a:p>
+          <a:p>
+            <a:r>
+              <a:rPr lang="en-GB" sz="1400" kern="150" dirty="0">
+                <a:solidFill>
+                  <a:srgbClr val="00FF00"/>
+                </a:solidFill>
+                <a:latin typeface="Courier New" panose="02070309020205020404" pitchFamily="49" charset="0"/>
+                <a:ea typeface="NSimSun" panose="02010609030101010101" pitchFamily="49" charset="-122"/>
+              </a:rPr>
+              <a:t> *  It is very important that they be wrapped in parentheses.</a:t>
+            </a:r>
+            <a:endParaRPr lang="en-US" sz="1400" kern="150" dirty="0">
+              <a:solidFill>
+                <a:srgbClr val="FFFFFF"/>
+              </a:solidFill>
+              <a:latin typeface="Courier New" panose="02070309020205020404" pitchFamily="49" charset="0"/>
+              <a:ea typeface="NSimSun" panose="02010609030101010101" pitchFamily="49" charset="-122"/>
+            </a:endParaRPr>
+          </a:p>
+          <a:p>
+            <a:r>
+              <a:rPr lang="en-GB" sz="1400" kern="150" dirty="0">
+                <a:solidFill>
+                  <a:srgbClr val="00FF00"/>
+                </a:solidFill>
+                <a:latin typeface="Courier New" panose="02070309020205020404" pitchFamily="49" charset="0"/>
+                <a:ea typeface="NSimSun" panose="02010609030101010101" pitchFamily="49" charset="-122"/>
+              </a:rPr>
+              <a:t> */</a:t>
+            </a:r>
+            <a:endParaRPr lang="en-US" sz="1400" kern="150" dirty="0">
+              <a:solidFill>
+                <a:srgbClr val="FFFFFF"/>
+              </a:solidFill>
+              <a:latin typeface="Courier New" panose="02070309020205020404" pitchFamily="49" charset="0"/>
+              <a:ea typeface="NSimSun" panose="02010609030101010101" pitchFamily="49" charset="-122"/>
+            </a:endParaRPr>
+          </a:p>
+          <a:p>
+            <a:r>
+              <a:rPr lang="en-GB" sz="1400" kern="150" dirty="0" err="1">
+                <a:solidFill>
+                  <a:srgbClr val="00FFFF"/>
+                </a:solidFill>
+                <a:latin typeface="Courier New" panose="02070309020205020404" pitchFamily="49" charset="0"/>
+                <a:ea typeface="NSimSun" panose="02010609030101010101" pitchFamily="49" charset="-122"/>
+              </a:rPr>
+              <a:t>def</a:t>
+            </a:r>
+            <a:r>
+              <a:rPr lang="en-GB" sz="1400" kern="150" dirty="0">
+                <a:solidFill>
+                  <a:srgbClr val="FFFFFF"/>
+                </a:solidFill>
+                <a:latin typeface="Courier New" panose="02070309020205020404" pitchFamily="49" charset="0"/>
+                <a:ea typeface="NSimSun" panose="02010609030101010101" pitchFamily="49" charset="-122"/>
+              </a:rPr>
+              <a:t> </a:t>
+            </a:r>
+            <a:r>
+              <a:rPr lang="en-GB" sz="1400" kern="150" dirty="0" err="1">
+                <a:solidFill>
+                  <a:srgbClr val="EEDD82"/>
+                </a:solidFill>
+                <a:latin typeface="Courier New" panose="02070309020205020404" pitchFamily="49" charset="0"/>
+                <a:ea typeface="NSimSun" panose="02010609030101010101" pitchFamily="49" charset="-122"/>
+              </a:rPr>
+              <a:t>addChildFarm</a:t>
+            </a:r>
+            <a:r>
+              <a:rPr lang="en-GB" sz="1400" kern="150" dirty="0">
+                <a:solidFill>
+                  <a:srgbClr val="FFFFFF"/>
+                </a:solidFill>
+                <a:latin typeface="Courier New" panose="02070309020205020404" pitchFamily="49" charset="0"/>
+                <a:ea typeface="NSimSun" panose="02010609030101010101" pitchFamily="49" charset="-122"/>
+              </a:rPr>
+              <a:t> = [</a:t>
+            </a:r>
+            <a:endParaRPr lang="en-US" sz="1400" kern="150" dirty="0">
+              <a:solidFill>
+                <a:srgbClr val="FFFFFF"/>
+              </a:solidFill>
+              <a:latin typeface="Courier New" panose="02070309020205020404" pitchFamily="49" charset="0"/>
+              <a:ea typeface="NSimSun" panose="02010609030101010101" pitchFamily="49" charset="-122"/>
+            </a:endParaRPr>
+          </a:p>
+          <a:p>
+            <a:r>
+              <a:rPr lang="en-GB" sz="1400" kern="150" dirty="0">
+                <a:solidFill>
+                  <a:srgbClr val="FFFFFF"/>
+                </a:solidFill>
+                <a:latin typeface="Courier New" panose="02070309020205020404" pitchFamily="49" charset="0"/>
+                <a:ea typeface="NSimSun" panose="02010609030101010101" pitchFamily="49" charset="-122"/>
+              </a:rPr>
+              <a:t>  (</a:t>
+            </a:r>
+            <a:r>
+              <a:rPr lang="en-GB" sz="1400" kern="150" dirty="0" err="1">
+                <a:solidFill>
+                  <a:srgbClr val="FFFFFF"/>
+                </a:solidFill>
+                <a:latin typeface="Courier New" panose="02070309020205020404" pitchFamily="49" charset="0"/>
+                <a:ea typeface="NSimSun" panose="02010609030101010101" pitchFamily="49" charset="-122"/>
+              </a:rPr>
+              <a:t>SimpleReport</a:t>
+            </a:r>
+            <a:r>
+              <a:rPr lang="en-GB" sz="1400" kern="150" dirty="0">
+                <a:solidFill>
+                  <a:srgbClr val="FFFFFF"/>
+                </a:solidFill>
+                <a:latin typeface="Courier New" panose="02070309020205020404" pitchFamily="49" charset="0"/>
+                <a:ea typeface="NSimSun" panose="02010609030101010101" pitchFamily="49" charset="-122"/>
+              </a:rPr>
+              <a:t>): [</a:t>
+            </a:r>
+            <a:endParaRPr lang="en-US" sz="1400" kern="150" dirty="0">
+              <a:solidFill>
+                <a:srgbClr val="FFFFFF"/>
+              </a:solidFill>
+              <a:latin typeface="Courier New" panose="02070309020205020404" pitchFamily="49" charset="0"/>
+              <a:ea typeface="NSimSun" panose="02010609030101010101" pitchFamily="49" charset="-122"/>
+            </a:endParaRPr>
+          </a:p>
+          <a:p>
+            <a:r>
+              <a:rPr lang="en-GB" sz="1400" kern="150" dirty="0">
+                <a:solidFill>
+                  <a:srgbClr val="FFFFFF"/>
+                </a:solidFill>
+                <a:latin typeface="Courier New" panose="02070309020205020404" pitchFamily="49" charset="0"/>
+                <a:ea typeface="NSimSun" panose="02010609030101010101" pitchFamily="49" charset="-122"/>
+              </a:rPr>
+              <a:t>    (</a:t>
+            </a:r>
+            <a:r>
+              <a:rPr lang="en-GB" sz="1400" kern="150" dirty="0" err="1">
+                <a:solidFill>
+                  <a:srgbClr val="FFFFFF"/>
+                </a:solidFill>
+                <a:latin typeface="Courier New" panose="02070309020205020404" pitchFamily="49" charset="0"/>
+                <a:ea typeface="NSimSun" panose="02010609030101010101" pitchFamily="49" charset="-122"/>
+              </a:rPr>
+              <a:t>Param</a:t>
+            </a:r>
+            <a:r>
+              <a:rPr lang="en-GB" sz="1400" kern="150" dirty="0">
+                <a:solidFill>
+                  <a:srgbClr val="FFFFFF"/>
+                </a:solidFill>
+                <a:latin typeface="Courier New" panose="02070309020205020404" pitchFamily="49" charset="0"/>
+                <a:ea typeface="NSimSun" panose="02010609030101010101" pitchFamily="49" charset="-122"/>
+              </a:rPr>
+              <a:t>): {</a:t>
+            </a:r>
+            <a:endParaRPr lang="en-US" sz="1400" kern="150" dirty="0">
+              <a:solidFill>
+                <a:srgbClr val="FFFFFF"/>
+              </a:solidFill>
+              <a:latin typeface="Courier New" panose="02070309020205020404" pitchFamily="49" charset="0"/>
+              <a:ea typeface="NSimSun" panose="02010609030101010101" pitchFamily="49" charset="-122"/>
+            </a:endParaRPr>
+          </a:p>
+          <a:p>
+            <a:r>
+              <a:rPr lang="en-GB" sz="1400" kern="150" dirty="0">
+                <a:solidFill>
+                  <a:srgbClr val="FFFFFF"/>
+                </a:solidFill>
+                <a:latin typeface="Courier New" panose="02070309020205020404" pitchFamily="49" charset="0"/>
+                <a:ea typeface="NSimSun" panose="02010609030101010101" pitchFamily="49" charset="-122"/>
+              </a:rPr>
+              <a:t>      parent, child -&gt;</a:t>
+            </a:r>
+            <a:endParaRPr lang="en-US" sz="1400" kern="150" dirty="0">
+              <a:solidFill>
+                <a:srgbClr val="FFFFFF"/>
+              </a:solidFill>
+              <a:latin typeface="Courier New" panose="02070309020205020404" pitchFamily="49" charset="0"/>
+              <a:ea typeface="NSimSun" panose="02010609030101010101" pitchFamily="49" charset="-122"/>
+            </a:endParaRPr>
+          </a:p>
+          <a:p>
+            <a:r>
+              <a:rPr lang="en-GB" sz="1400" kern="150" dirty="0">
+                <a:solidFill>
+                  <a:srgbClr val="FFFFFF"/>
+                </a:solidFill>
+                <a:latin typeface="Courier New" panose="02070309020205020404" pitchFamily="49" charset="0"/>
+                <a:ea typeface="NSimSun" panose="02010609030101010101" pitchFamily="49" charset="-122"/>
+              </a:rPr>
+              <a:t>        </a:t>
+            </a:r>
+            <a:r>
+              <a:rPr lang="en-GB" sz="1400" kern="150" dirty="0" err="1">
+                <a:solidFill>
+                  <a:srgbClr val="FFFFFF"/>
+                </a:solidFill>
+                <a:latin typeface="Courier New" panose="02070309020205020404" pitchFamily="49" charset="0"/>
+                <a:ea typeface="NSimSun" panose="02010609030101010101" pitchFamily="49" charset="-122"/>
+              </a:rPr>
+              <a:t>parent.addParam</a:t>
+            </a:r>
+            <a:r>
+              <a:rPr lang="en-GB" sz="1400" kern="150" dirty="0">
+                <a:solidFill>
+                  <a:srgbClr val="FFFFFF"/>
+                </a:solidFill>
+                <a:latin typeface="Courier New" panose="02070309020205020404" pitchFamily="49" charset="0"/>
+                <a:ea typeface="NSimSun" panose="02010609030101010101" pitchFamily="49" charset="-122"/>
+              </a:rPr>
+              <a:t>(child)</a:t>
+            </a:r>
+            <a:endParaRPr lang="en-US" sz="1400" kern="150" dirty="0">
+              <a:solidFill>
+                <a:srgbClr val="FFFFFF"/>
+              </a:solidFill>
+              <a:latin typeface="Courier New" panose="02070309020205020404" pitchFamily="49" charset="0"/>
+              <a:ea typeface="NSimSun" panose="02010609030101010101" pitchFamily="49" charset="-122"/>
+            </a:endParaRPr>
+          </a:p>
+          <a:p>
+            <a:r>
+              <a:rPr lang="en-GB" sz="1400" kern="150" dirty="0">
+                <a:solidFill>
+                  <a:srgbClr val="FFFFFF"/>
+                </a:solidFill>
+                <a:latin typeface="Courier New" panose="02070309020205020404" pitchFamily="49" charset="0"/>
+                <a:ea typeface="NSimSun" panose="02010609030101010101" pitchFamily="49" charset="-122"/>
+              </a:rPr>
+              <a:t>    },</a:t>
+            </a:r>
+            <a:endParaRPr lang="en-US" sz="1400" kern="150" dirty="0">
+              <a:solidFill>
+                <a:srgbClr val="FFFFFF"/>
+              </a:solidFill>
+              <a:latin typeface="Courier New" panose="02070309020205020404" pitchFamily="49" charset="0"/>
+              <a:ea typeface="NSimSun" panose="02010609030101010101" pitchFamily="49" charset="-122"/>
+            </a:endParaRPr>
+          </a:p>
+          <a:p>
+            <a:r>
+              <a:rPr lang="en-GB" sz="1400" kern="150" dirty="0">
+                <a:solidFill>
+                  <a:srgbClr val="FFFFFF"/>
+                </a:solidFill>
+                <a:latin typeface="Courier New" panose="02070309020205020404" pitchFamily="49" charset="0"/>
+                <a:ea typeface="NSimSun" panose="02010609030101010101" pitchFamily="49" charset="-122"/>
+              </a:rPr>
+              <a:t>    (</a:t>
+            </a:r>
+            <a:r>
+              <a:rPr lang="en-GB" sz="1400" kern="150" dirty="0" err="1">
+                <a:solidFill>
+                  <a:srgbClr val="FFFFFF"/>
+                </a:solidFill>
+                <a:latin typeface="Courier New" panose="02070309020205020404" pitchFamily="49" charset="0"/>
+                <a:ea typeface="NSimSun" panose="02010609030101010101" pitchFamily="49" charset="-122"/>
+              </a:rPr>
+              <a:t>ParamForm</a:t>
+            </a:r>
+            <a:r>
+              <a:rPr lang="en-GB" sz="1400" kern="150" dirty="0">
+                <a:solidFill>
+                  <a:srgbClr val="FFFFFF"/>
+                </a:solidFill>
+                <a:latin typeface="Courier New" panose="02070309020205020404" pitchFamily="49" charset="0"/>
+                <a:ea typeface="NSimSun" panose="02010609030101010101" pitchFamily="49" charset="-122"/>
+              </a:rPr>
+              <a:t>): {</a:t>
+            </a:r>
+            <a:endParaRPr lang="en-US" sz="1400" kern="150" dirty="0">
+              <a:solidFill>
+                <a:srgbClr val="FFFFFF"/>
+              </a:solidFill>
+              <a:latin typeface="Courier New" panose="02070309020205020404" pitchFamily="49" charset="0"/>
+              <a:ea typeface="NSimSun" panose="02010609030101010101" pitchFamily="49" charset="-122"/>
+            </a:endParaRPr>
+          </a:p>
+          <a:p>
+            <a:r>
+              <a:rPr lang="en-GB" sz="1400" kern="150" dirty="0">
+                <a:solidFill>
+                  <a:srgbClr val="FFFFFF"/>
+                </a:solidFill>
+                <a:latin typeface="Courier New" panose="02070309020205020404" pitchFamily="49" charset="0"/>
+                <a:ea typeface="NSimSun" panose="02010609030101010101" pitchFamily="49" charset="-122"/>
+              </a:rPr>
+              <a:t>      parent, child -&gt;</a:t>
+            </a:r>
+            <a:endParaRPr lang="en-US" sz="1400" kern="150" dirty="0">
+              <a:solidFill>
+                <a:srgbClr val="FFFFFF"/>
+              </a:solidFill>
+              <a:latin typeface="Courier New" panose="02070309020205020404" pitchFamily="49" charset="0"/>
+              <a:ea typeface="NSimSun" panose="02010609030101010101" pitchFamily="49" charset="-122"/>
+            </a:endParaRPr>
+          </a:p>
+          <a:p>
+            <a:r>
+              <a:rPr lang="en-GB" sz="1400" kern="150" dirty="0">
+                <a:solidFill>
+                  <a:srgbClr val="FFFFFF"/>
+                </a:solidFill>
+                <a:latin typeface="Courier New" panose="02070309020205020404" pitchFamily="49" charset="0"/>
+                <a:ea typeface="NSimSun" panose="02010609030101010101" pitchFamily="49" charset="-122"/>
+              </a:rPr>
+              <a:t>        assert !</a:t>
+            </a:r>
+            <a:r>
+              <a:rPr lang="en-GB" sz="1400" kern="150" dirty="0" err="1">
+                <a:solidFill>
+                  <a:srgbClr val="FFFFFF"/>
+                </a:solidFill>
+                <a:latin typeface="Courier New" panose="02070309020205020404" pitchFamily="49" charset="0"/>
+                <a:ea typeface="NSimSun" panose="02010609030101010101" pitchFamily="49" charset="-122"/>
+              </a:rPr>
+              <a:t>parent.params</a:t>
+            </a:r>
+            <a:endParaRPr lang="en-US" sz="1400" kern="150" dirty="0">
+              <a:solidFill>
+                <a:srgbClr val="FFFFFF"/>
+              </a:solidFill>
+              <a:latin typeface="Courier New" panose="02070309020205020404" pitchFamily="49" charset="0"/>
+              <a:ea typeface="NSimSun" panose="02010609030101010101" pitchFamily="49" charset="-122"/>
+            </a:endParaRPr>
+          </a:p>
+          <a:p>
+            <a:r>
+              <a:rPr lang="en-GB" sz="1400" kern="150" dirty="0">
+                <a:solidFill>
+                  <a:srgbClr val="FFFFFF"/>
+                </a:solidFill>
+                <a:latin typeface="Courier New" panose="02070309020205020404" pitchFamily="49" charset="0"/>
+                <a:ea typeface="NSimSun" panose="02010609030101010101" pitchFamily="49" charset="-122"/>
+              </a:rPr>
+              <a:t>        </a:t>
+            </a:r>
+            <a:r>
+              <a:rPr lang="en-GB" sz="1400" kern="150" dirty="0" err="1">
+                <a:solidFill>
+                  <a:srgbClr val="FFFFFF"/>
+                </a:solidFill>
+                <a:latin typeface="Courier New" panose="02070309020205020404" pitchFamily="49" charset="0"/>
+                <a:ea typeface="NSimSun" panose="02010609030101010101" pitchFamily="49" charset="-122"/>
+              </a:rPr>
+              <a:t>parent.params</a:t>
+            </a:r>
+            <a:r>
+              <a:rPr lang="en-GB" sz="1400" kern="150" dirty="0">
+                <a:solidFill>
+                  <a:srgbClr val="FFFFFF"/>
+                </a:solidFill>
+                <a:latin typeface="Courier New" panose="02070309020205020404" pitchFamily="49" charset="0"/>
+                <a:ea typeface="NSimSun" panose="02010609030101010101" pitchFamily="49" charset="-122"/>
+              </a:rPr>
+              <a:t> = child</a:t>
+            </a:r>
+            <a:endParaRPr lang="en-US" sz="1400" kern="150" dirty="0">
+              <a:solidFill>
+                <a:srgbClr val="FFFFFF"/>
+              </a:solidFill>
+              <a:latin typeface="Courier New" panose="02070309020205020404" pitchFamily="49" charset="0"/>
+              <a:ea typeface="NSimSun" panose="02010609030101010101" pitchFamily="49" charset="-122"/>
+            </a:endParaRPr>
+          </a:p>
+          <a:p>
+            <a:r>
+              <a:rPr lang="en-GB" sz="1400" kern="150" dirty="0">
+                <a:solidFill>
+                  <a:srgbClr val="FFFFFF"/>
+                </a:solidFill>
+                <a:latin typeface="Courier New" panose="02070309020205020404" pitchFamily="49" charset="0"/>
+                <a:ea typeface="NSimSun" panose="02010609030101010101" pitchFamily="49" charset="-122"/>
+              </a:rPr>
+              <a:t>    </a:t>
+            </a:r>
+            <a:r>
+              <a:rPr lang="en-GB" sz="1400" kern="150" dirty="0" smtClean="0">
+                <a:solidFill>
+                  <a:srgbClr val="FFFFFF"/>
+                </a:solidFill>
+                <a:latin typeface="Courier New" panose="02070309020205020404" pitchFamily="49" charset="0"/>
+                <a:ea typeface="NSimSun" panose="02010609030101010101" pitchFamily="49" charset="-122"/>
+              </a:rPr>
+              <a:t>}</a:t>
+            </a:r>
+            <a:endParaRPr lang="en-US" sz="1400" kern="150" dirty="0">
+              <a:solidFill>
+                <a:srgbClr val="FFFFFF"/>
+              </a:solidFill>
+              <a:latin typeface="Courier New" panose="02070309020205020404" pitchFamily="49" charset="0"/>
+              <a:ea typeface="NSimSun" panose="02010609030101010101" pitchFamily="49" charset="-122"/>
             </a:endParaRPr>
           </a:p>
         </p:txBody>
@@ -36418,7 +39108,7 @@
               </a:lnSpc>
             </a:pPr>
             <a:r>
-              <a:rPr lang="en-US" sz="4800" b="0" strike="noStrike" spc="-46">
+              <a:rPr lang="en-US" sz="4800" spc="-46" dirty="0" smtClean="0">
                 <a:solidFill>
                   <a:srgbClr val="31489F"/>
                 </a:solidFill>
@@ -36429,213 +39119,9 @@
                 </a:uFill>
                 <a:latin typeface="Calibri Light"/>
               </a:rPr>
-              <a:t>Slide Heading Here</a:t>
-            </a:r>
-            <a:endParaRPr lang="en-US" sz="1800" b="0" strike="noStrike" spc="-1">
-              <a:solidFill>
-                <a:srgbClr val="000000"/>
-              </a:solidFill>
-              <a:uFill>
-                <a:solidFill>
-                  <a:srgbClr val="FFFFFF"/>
-                </a:solidFill>
-              </a:uFill>
-              <a:latin typeface="Arial"/>
-            </a:endParaRPr>
-          </a:p>
-        </p:txBody>
-      </p:sp>
-      <p:sp>
-        <p:nvSpPr>
-          <p:cNvPr id="203" name="CustomShape 2"/>
-          <p:cNvSpPr/>
-          <p:nvPr/>
-        </p:nvSpPr>
-        <p:spPr>
-          <a:xfrm>
-            <a:off x="822960" y="1845720"/>
-            <a:ext cx="7543080" cy="4022640"/>
-          </a:xfrm>
-          <a:prstGeom prst="rect">
-            <a:avLst/>
-          </a:prstGeom>
-          <a:noFill/>
-          <a:ln>
-            <a:noFill/>
-          </a:ln>
-        </p:spPr>
-        <p:style>
-          <a:lnRef idx="0">
-            <a:scrgbClr r="0" g="0" b="0"/>
-          </a:lnRef>
-          <a:fillRef idx="0">
-            <a:scrgbClr r="0" g="0" b="0"/>
-          </a:fillRef>
-          <a:effectRef idx="0">
-            <a:scrgbClr r="0" g="0" b="0"/>
-          </a:effectRef>
-          <a:fontRef idx="minor"/>
-        </p:style>
-        <p:txBody>
-          <a:bodyPr lIns="0" tIns="45000" rIns="0" bIns="45000"/>
-          <a:lstStyle/>
-          <a:p>
-            <a:pPr marL="199080" indent="-198360">
-              <a:lnSpc>
-                <a:spcPct val="100000"/>
-              </a:lnSpc>
-              <a:buClr>
-                <a:srgbClr val="4E67C8"/>
-              </a:buClr>
-              <a:buFont typeface="Wingdings 2" charset="2"/>
-              <a:buChar char=""/>
-            </a:pPr>
-            <a:r>
-              <a:rPr lang="en-US" sz="2000" b="0" strike="noStrike" spc="-1">
-                <a:solidFill>
-                  <a:srgbClr val="404040"/>
-                </a:solidFill>
-                <a:uFill>
-                  <a:solidFill>
-                    <a:srgbClr val="FFFFFF"/>
-                  </a:solidFill>
-                </a:uFill>
-                <a:latin typeface="Calibri"/>
-              </a:rPr>
-              <a:t>Presentation Text</a:t>
-            </a:r>
-            <a:endParaRPr lang="en-US" sz="1800" b="0" strike="noStrike" spc="-1">
-              <a:solidFill>
-                <a:srgbClr val="000000"/>
-              </a:solidFill>
-              <a:uFill>
-                <a:solidFill>
-                  <a:srgbClr val="FFFFFF"/>
-                </a:solidFill>
-              </a:uFill>
-              <a:latin typeface="Arial"/>
-            </a:endParaRPr>
-          </a:p>
-          <a:p>
-            <a:pPr marL="377280" lvl="3" indent="-198360">
-              <a:lnSpc>
-                <a:spcPct val="100000"/>
-              </a:lnSpc>
-              <a:buClr>
-                <a:srgbClr val="4E67C8"/>
-              </a:buClr>
-              <a:buSzPct val="80000"/>
-              <a:buFont typeface="Wingdings 2" charset="2"/>
-              <a:buChar char=""/>
-            </a:pPr>
-            <a:r>
-              <a:rPr lang="en-US" sz="1500" b="0" strike="noStrike" spc="-1">
-                <a:solidFill>
-                  <a:srgbClr val="404040"/>
-                </a:solidFill>
-                <a:uFill>
-                  <a:solidFill>
-                    <a:srgbClr val="FFFFFF"/>
-                  </a:solidFill>
-                </a:uFill>
-                <a:latin typeface="Calibri"/>
-              </a:rPr>
-              <a:t>Screen Captures</a:t>
-            </a:r>
-            <a:endParaRPr lang="en-US" sz="1800" b="0" strike="noStrike" spc="-1">
-              <a:solidFill>
-                <a:srgbClr val="000000"/>
-              </a:solidFill>
-              <a:uFill>
-                <a:solidFill>
-                  <a:srgbClr val="FFFFFF"/>
-                </a:solidFill>
-              </a:uFill>
-              <a:latin typeface="Arial"/>
-            </a:endParaRPr>
-          </a:p>
-          <a:p>
-            <a:pPr marL="377280" lvl="3" indent="-198360">
-              <a:lnSpc>
-                <a:spcPct val="100000"/>
-              </a:lnSpc>
-              <a:buClr>
-                <a:srgbClr val="4E67C8"/>
-              </a:buClr>
-              <a:buSzPct val="80000"/>
-              <a:buFont typeface="Wingdings 2" charset="2"/>
-              <a:buChar char=""/>
-            </a:pPr>
-            <a:r>
-              <a:rPr lang="en-US" sz="1500" b="0" strike="noStrike" spc="-1">
-                <a:solidFill>
-                  <a:srgbClr val="404040"/>
-                </a:solidFill>
-                <a:uFill>
-                  <a:solidFill>
-                    <a:srgbClr val="FFFFFF"/>
-                  </a:solidFill>
-                </a:uFill>
-                <a:latin typeface="Calibri"/>
-              </a:rPr>
-              <a:t>Etc.</a:t>
-            </a:r>
-            <a:endParaRPr lang="en-US" sz="1800" b="0" strike="noStrike" spc="-1">
-              <a:solidFill>
-                <a:srgbClr val="000000"/>
-              </a:solidFill>
-              <a:uFill>
-                <a:solidFill>
-                  <a:srgbClr val="FFFFFF"/>
-                </a:solidFill>
-              </a:uFill>
-              <a:latin typeface="Arial"/>
-            </a:endParaRPr>
-          </a:p>
-          <a:p>
-            <a:pPr marL="199080" indent="-198360">
-              <a:lnSpc>
-                <a:spcPct val="100000"/>
-              </a:lnSpc>
-              <a:buClr>
-                <a:srgbClr val="4E67C8"/>
-              </a:buClr>
-              <a:buFont typeface="Wingdings 2" charset="2"/>
-              <a:buChar char=""/>
-            </a:pPr>
-            <a:r>
-              <a:rPr lang="en-US" sz="2000" b="0" strike="noStrike" spc="-1">
-                <a:solidFill>
-                  <a:srgbClr val="404040"/>
-                </a:solidFill>
-                <a:uFill>
-                  <a:solidFill>
-                    <a:srgbClr val="FFFFFF"/>
-                  </a:solidFill>
-                </a:uFill>
-                <a:latin typeface="Calibri"/>
-              </a:rPr>
-              <a:t>Presenters – duplicate this slide as many times as needed</a:t>
-            </a:r>
-            <a:endParaRPr lang="en-US" sz="1800" b="0" strike="noStrike" spc="-1">
-              <a:solidFill>
-                <a:srgbClr val="000000"/>
-              </a:solidFill>
-              <a:uFill>
-                <a:solidFill>
-                  <a:srgbClr val="FFFFFF"/>
-                </a:solidFill>
-              </a:uFill>
-              <a:latin typeface="Arial"/>
-            </a:endParaRPr>
-          </a:p>
-          <a:p>
-            <a:pPr>
-              <a:lnSpc>
-                <a:spcPct val="90000"/>
-              </a:lnSpc>
-            </a:pPr>
-            <a:endParaRPr lang="en-US" sz="1800" b="0" strike="noStrike" spc="-1">
+              <a:t>The Grails Application</a:t>
+            </a:r>
+            <a:endParaRPr lang="en-US" sz="1800" b="0" strike="noStrike" spc="-1" dirty="0">
               <a:solidFill>
                 <a:srgbClr val="000000"/>
               </a:solidFill>
@@ -36705,6 +39191,211 @@
               <a:t>SICAS Summit 2017, Villa Roma</a:t>
             </a:r>
             <a:endParaRPr lang="en-US" sz="1800" b="0" strike="noStrike" spc="-1">
+              <a:solidFill>
+                <a:srgbClr val="000000"/>
+              </a:solidFill>
+              <a:uFill>
+                <a:solidFill>
+                  <a:srgbClr val="FFFFFF"/>
+                </a:solidFill>
+              </a:uFill>
+              <a:latin typeface="Arial"/>
+            </a:endParaRPr>
+          </a:p>
+        </p:txBody>
+      </p:sp>
+      <p:sp>
+        <p:nvSpPr>
+          <p:cNvPr id="5" name="CustomShape 2"/>
+          <p:cNvSpPr/>
+          <p:nvPr/>
+        </p:nvSpPr>
+        <p:spPr>
+          <a:xfrm>
+            <a:off x="975360" y="1905522"/>
+            <a:ext cx="7543080" cy="4022640"/>
+          </a:xfrm>
+          <a:prstGeom prst="rect">
+            <a:avLst/>
+          </a:prstGeom>
+          <a:noFill/>
+          <a:ln>
+            <a:noFill/>
+          </a:ln>
+        </p:spPr>
+        <p:style>
+          <a:lnRef idx="0">
+            <a:scrgbClr r="0" g="0" b="0"/>
+          </a:lnRef>
+          <a:fillRef idx="0">
+            <a:scrgbClr r="0" g="0" b="0"/>
+          </a:fillRef>
+          <a:effectRef idx="0">
+            <a:scrgbClr r="0" g="0" b="0"/>
+          </a:effectRef>
+          <a:fontRef idx="minor"/>
+        </p:style>
+        <p:txBody>
+          <a:bodyPr lIns="0" tIns="45000" rIns="0" bIns="45000"/>
+          <a:lstStyle/>
+          <a:p>
+            <a:pPr marL="199080" indent="-198360">
+              <a:lnSpc>
+                <a:spcPct val="100000"/>
+              </a:lnSpc>
+              <a:buClr>
+                <a:srgbClr val="4E67C8"/>
+              </a:buClr>
+              <a:buFont typeface="Wingdings 2" charset="2"/>
+              <a:buChar char=""/>
+            </a:pPr>
+            <a:r>
+              <a:rPr lang="en-US" sz="2000" spc="-1" dirty="0" smtClean="0">
+                <a:solidFill>
+                  <a:srgbClr val="404040"/>
+                </a:solidFill>
+                <a:uFill>
+                  <a:solidFill>
+                    <a:srgbClr val="FFFFFF"/>
+                  </a:solidFill>
+                </a:uFill>
+                <a:latin typeface="Calibri"/>
+              </a:rPr>
+              <a:t>The library contains no user interaction.</a:t>
+            </a:r>
+          </a:p>
+          <a:p>
+            <a:pPr marL="199080" indent="-198360">
+              <a:lnSpc>
+                <a:spcPct val="100000"/>
+              </a:lnSpc>
+              <a:buClr>
+                <a:srgbClr val="4E67C8"/>
+              </a:buClr>
+              <a:buFont typeface="Wingdings 2" charset="2"/>
+              <a:buChar char=""/>
+            </a:pPr>
+            <a:r>
+              <a:rPr lang="en-US" sz="2000" spc="-1" dirty="0" smtClean="0">
+                <a:solidFill>
+                  <a:srgbClr val="404040"/>
+                </a:solidFill>
+                <a:uFill>
+                  <a:solidFill>
+                    <a:srgbClr val="FFFFFF"/>
+                  </a:solidFill>
+                </a:uFill>
+                <a:latin typeface="Calibri"/>
+              </a:rPr>
+              <a:t>The </a:t>
+            </a:r>
+            <a:r>
+              <a:rPr lang="en-US" sz="2000" b="0" strike="noStrike" spc="-1" dirty="0" smtClean="0">
+                <a:solidFill>
+                  <a:srgbClr val="404040"/>
+                </a:solidFill>
+                <a:uFill>
+                  <a:solidFill>
+                    <a:srgbClr val="FFFFFF"/>
+                  </a:solidFill>
+                </a:uFill>
+                <a:latin typeface="Calibri"/>
+              </a:rPr>
+              <a:t>Grails application is the client interface</a:t>
+            </a:r>
+          </a:p>
+          <a:p>
+            <a:pPr marL="656280" lvl="1" indent="-198360">
+              <a:buClr>
+                <a:srgbClr val="4E67C8"/>
+              </a:buClr>
+              <a:buFont typeface="Wingdings 2" charset="2"/>
+              <a:buChar char=""/>
+            </a:pPr>
+            <a:r>
+              <a:rPr lang="en-US" spc="-1" dirty="0" smtClean="0">
+                <a:solidFill>
+                  <a:srgbClr val="404040"/>
+                </a:solidFill>
+                <a:uFill>
+                  <a:solidFill>
+                    <a:srgbClr val="FFFFFF"/>
+                  </a:solidFill>
+                </a:uFill>
+                <a:latin typeface="Calibri"/>
+              </a:rPr>
+              <a:t>Gathering parameters</a:t>
+            </a:r>
+          </a:p>
+          <a:p>
+            <a:pPr marL="656280" lvl="1" indent="-198360">
+              <a:buClr>
+                <a:srgbClr val="4E67C8"/>
+              </a:buClr>
+              <a:buFont typeface="Wingdings 2" charset="2"/>
+              <a:buChar char=""/>
+            </a:pPr>
+            <a:r>
+              <a:rPr lang="en-US" b="0" strike="noStrike" spc="-1" dirty="0" smtClean="0">
+                <a:solidFill>
+                  <a:srgbClr val="404040"/>
+                </a:solidFill>
+                <a:uFill>
+                  <a:solidFill>
+                    <a:srgbClr val="FFFFFF"/>
+                  </a:solidFill>
+                </a:uFill>
+                <a:latin typeface="Calibri"/>
+              </a:rPr>
+              <a:t>Delivering output</a:t>
+            </a:r>
+          </a:p>
+          <a:p>
+            <a:pPr marL="656280" lvl="1" indent="-198360">
+              <a:buClr>
+                <a:srgbClr val="4E67C8"/>
+              </a:buClr>
+              <a:buFont typeface="Wingdings 2" charset="2"/>
+              <a:buChar char=""/>
+            </a:pPr>
+            <a:r>
+              <a:rPr lang="en-US" spc="-1" dirty="0" smtClean="0">
+                <a:solidFill>
+                  <a:srgbClr val="404040"/>
+                </a:solidFill>
+                <a:uFill>
+                  <a:solidFill>
+                    <a:srgbClr val="FFFFFF"/>
+                  </a:solidFill>
+                </a:uFill>
+                <a:latin typeface="Calibri"/>
+              </a:rPr>
+              <a:t>Controlling access using the JCC menu system</a:t>
+            </a:r>
+          </a:p>
+          <a:p>
+            <a:pPr marL="199080" indent="-198360">
+              <a:buClr>
+                <a:srgbClr val="4E67C8"/>
+              </a:buClr>
+              <a:buFont typeface="Wingdings 2" charset="2"/>
+              <a:buChar char=""/>
+            </a:pPr>
+            <a:r>
+              <a:rPr lang="en-US" b="0" strike="noStrike" spc="-1" dirty="0" smtClean="0">
+                <a:solidFill>
+                  <a:srgbClr val="404040"/>
+                </a:solidFill>
+                <a:uFill>
+                  <a:solidFill>
+                    <a:srgbClr val="FFFFFF"/>
+                  </a:solidFill>
+                </a:uFill>
+                <a:latin typeface="Calibri"/>
+              </a:rPr>
+              <a:t>Other clients are possible</a:t>
+            </a:r>
+            <a:endParaRPr lang="en-US" sz="1800" b="0" strike="noStrike" spc="-1" dirty="0">
               <a:solidFill>
                 <a:srgbClr val="000000"/>
               </a:solidFill>
@@ -36814,7 +39505,7 @@
               </a:lnSpc>
             </a:pPr>
             <a:r>
-              <a:rPr lang="en-US" sz="4800" b="0" strike="noStrike" spc="-46">
+              <a:rPr lang="en-US" sz="4800" b="0" strike="noStrike" spc="-46" dirty="0" smtClean="0">
                 <a:solidFill>
                   <a:srgbClr val="31489F"/>
                 </a:solidFill>
@@ -36825,9 +39516,9 @@
                 </a:uFill>
                 <a:latin typeface="Calibri Light"/>
               </a:rPr>
-              <a:t>Slide Heading Here</a:t>
-            </a:r>
-            <a:endParaRPr lang="en-US" sz="1800" b="0" strike="noStrike" spc="-1">
+              <a:t>Tell me more!</a:t>
+            </a:r>
+            <a:endParaRPr lang="en-US" sz="1800" b="0" strike="noStrike" spc="-1" dirty="0">
               <a:solidFill>
                 <a:srgbClr val="000000"/>
               </a:solidFill>
@@ -36887,7 +39578,7 @@
               <a:buChar char=""/>
             </a:pPr>
             <a:r>
-              <a:rPr lang="en-US" sz="2000" b="0" strike="noStrike" spc="-1">
+              <a:rPr lang="en-US" sz="2000" b="0" strike="noStrike" spc="-1" dirty="0" smtClean="0">
                 <a:solidFill>
                   <a:srgbClr val="404040"/>
                 </a:solidFill>
@@ -36898,34 +39589,128 @@
                 </a:uFill>
                 <a:latin typeface="Calibri"/>
               </a:rPr>
-              <a:t>Presentation Text</a:t>
-            </a:r>
-            <a:endParaRPr lang="en-US" sz="1800" b="0" strike="noStrike" spc="-1">
-              <a:solidFill>
-                <a:srgbClr val="000000"/>
-              </a:solidFill>
-              <a:uFill>
-                <a:solidFill>
-                  <a:srgbClr val="FFFFFF"/>
-                </a:solidFill>
-              </a:uFill>
-              <a:latin typeface="Arial"/>
-            </a:endParaRPr>
-          </a:p>
-          <a:p>
-            <a:pPr marL="377280" lvl="3" indent="-198360">
+              <a:t>The simple report library is available at </a:t>
+            </a:r>
+          </a:p>
+          <a:p>
+            <a:pPr marL="720">
               <a:lnSpc>
                 <a:spcPct val="100000"/>
               </a:lnSpc>
               <a:buClr>
                 <a:srgbClr val="4E67C8"/>
               </a:buClr>
-              <a:buSzPct val="80000"/>
+            </a:pPr>
+            <a:endParaRPr lang="en-US" sz="2000" b="0" strike="noStrike" spc="-1" dirty="0" smtClean="0">
+              <a:solidFill>
+                <a:srgbClr val="404040"/>
+              </a:solidFill>
+              <a:uFill>
+                <a:solidFill>
+                  <a:srgbClr val="FFFFFF"/>
+                </a:solidFill>
+              </a:uFill>
+              <a:latin typeface="Calibri"/>
+            </a:endParaRPr>
+          </a:p>
+          <a:p>
+            <a:pPr marL="720">
+              <a:lnSpc>
+                <a:spcPct val="100000"/>
+              </a:lnSpc>
+              <a:buClr>
+                <a:srgbClr val="4E67C8"/>
+              </a:buClr>
+            </a:pPr>
+            <a:r>
+              <a:rPr lang="en-US" spc="-1" dirty="0" smtClean="0">
+                <a:solidFill>
+                  <a:srgbClr val="000000"/>
+                </a:solidFill>
+                <a:uFill>
+                  <a:solidFill>
+                    <a:srgbClr val="FFFFFF"/>
+                  </a:solidFill>
+                </a:uFill>
+                <a:hlinkClick r:id="rId2"/>
+              </a:rPr>
+              <a:t>	https</a:t>
+            </a:r>
+            <a:r>
+              <a:rPr lang="en-US" spc="-1" dirty="0">
+                <a:solidFill>
+                  <a:srgbClr val="000000"/>
+                </a:solidFill>
+                <a:uFill>
+                  <a:solidFill>
+                    <a:srgbClr val="FFFFFF"/>
+                  </a:solidFill>
+                </a:uFill>
+                <a:hlinkClick r:id="rId2"/>
+              </a:rPr>
+              <a:t>://</a:t>
+            </a:r>
+            <a:r>
+              <a:rPr lang="en-US" spc="-1" dirty="0" smtClean="0">
+                <a:solidFill>
+                  <a:srgbClr val="000000"/>
+                </a:solidFill>
+                <a:uFill>
+                  <a:solidFill>
+                    <a:srgbClr val="FFFFFF"/>
+                  </a:solidFill>
+                </a:uFill>
+                <a:hlinkClick r:id="rId2"/>
+              </a:rPr>
+              <a:t>bitbucket.org/EWCOLE/simple_report</a:t>
+            </a:r>
+            <a:endParaRPr lang="en-US" spc="-1" dirty="0" smtClean="0">
+              <a:solidFill>
+                <a:srgbClr val="000000"/>
+              </a:solidFill>
+              <a:uFill>
+                <a:solidFill>
+                  <a:srgbClr val="FFFFFF"/>
+                </a:solidFill>
+              </a:uFill>
+            </a:endParaRPr>
+          </a:p>
+          <a:p>
+            <a:pPr marL="199080" indent="-198360">
+              <a:lnSpc>
+                <a:spcPct val="100000"/>
+              </a:lnSpc>
+              <a:buClr>
+                <a:srgbClr val="4E67C8"/>
+              </a:buClr>
               <a:buFont typeface="Wingdings 2" charset="2"/>
               <a:buChar char=""/>
             </a:pPr>
-            <a:r>
-              <a:rPr lang="en-US" sz="1500" b="0" strike="noStrike" spc="-1">
+            <a:endParaRPr lang="en-US" sz="1800" b="0" strike="noStrike" spc="-1" dirty="0">
+              <a:solidFill>
+                <a:srgbClr val="000000"/>
+              </a:solidFill>
+              <a:uFill>
+                <a:solidFill>
+                  <a:srgbClr val="FFFFFF"/>
+                </a:solidFill>
+              </a:uFill>
+              <a:latin typeface="Arial"/>
+            </a:endParaRPr>
+          </a:p>
+          <a:p>
+            <a:pPr marL="199080" indent="-198360">
+              <a:lnSpc>
+                <a:spcPct val="100000"/>
+              </a:lnSpc>
+              <a:buClr>
+                <a:srgbClr val="4E67C8"/>
+              </a:buClr>
+              <a:buFont typeface="Wingdings 2" charset="2"/>
+              <a:buChar char=""/>
+            </a:pPr>
+            <a:r>
+              <a:rPr lang="en-US" sz="2000" b="0" strike="noStrike" spc="-1" dirty="0" smtClean="0">
                 <a:solidFill>
                   <a:srgbClr val="404040"/>
                 </a:solidFill>
@@ -36936,34 +39721,10 @@
                 </a:uFill>
                 <a:latin typeface="Calibri"/>
               </a:rPr>
-              <a:t>Screen Captures</a:t>
-            </a:r>
-            <a:endParaRPr lang="en-US" sz="1800" b="0" strike="noStrike" spc="-1">
-              <a:solidFill>
-                <a:srgbClr val="000000"/>
-              </a:solidFill>
-              <a:uFill>
-                <a:solidFill>
-                  <a:srgbClr val="FFFFFF"/>
-                </a:solidFill>
-              </a:uFill>
-              <a:latin typeface="Arial"/>
-            </a:endParaRPr>
-          </a:p>
-          <a:p>
-            <a:pPr marL="377280" lvl="3" indent="-198360">
-              <a:lnSpc>
-                <a:spcPct val="100000"/>
-              </a:lnSpc>
-              <a:buClr>
-                <a:srgbClr val="4E67C8"/>
-              </a:buClr>
-              <a:buSzPct val="80000"/>
-              <a:buFont typeface="Wingdings 2" charset="2"/>
-              <a:buChar char=""/>
-            </a:pPr>
-            <a:r>
-              <a:rPr lang="en-US" sz="1500" b="0" strike="noStrike" spc="-1">
+              <a:t>I can share the Grails application with you </a:t>
+            </a:r>
+            <a:r>
+              <a:rPr lang="en-US" sz="2000" b="0" strike="noStrike" spc="-1" smtClean="0">
                 <a:solidFill>
                   <a:srgbClr val="404040"/>
                 </a:solidFill>
@@ -36974,9 +39735,9 @@
                 </a:uFill>
                 <a:latin typeface="Calibri"/>
               </a:rPr>
-              <a:t>Etc.</a:t>
-            </a:r>
-            <a:endParaRPr lang="en-US" sz="1800" b="0" strike="noStrike" spc="-1">
+              <a:t>upon request.</a:t>
+            </a:r>
+            <a:endParaRPr lang="en-US" sz="1800" b="0" strike="noStrike" spc="-1" dirty="0">
               <a:solidFill>
                 <a:srgbClr val="000000"/>
               </a:solidFill>
@@ -36989,49 +39750,12 @@
             </a:endParaRPr>
           </a:p>
           <a:p>
-            <a:pPr marL="199080" indent="-198360">
-              <a:lnSpc>
-                <a:spcPct val="100000"/>
-              </a:lnSpc>
-              <a:buClr>
-                <a:srgbClr val="4E67C8"/>
-              </a:buClr>
-              <a:buFont typeface="Wingdings 2" charset="2"/>
-              <a:buChar char=""/>
-            </a:pPr>
-            <a:r>
-              <a:rPr lang="en-US" sz="2000" b="0" strike="noStrike" spc="-1">
-                <a:solidFill>
-                  <a:srgbClr val="404040"/>
-                </a:solidFill>
-                <a:uFill>
-                  <a:solidFill>
-                    <a:srgbClr val="FFFFFF"/>
-                  </a:solidFill>
-                </a:uFill>
-                <a:latin typeface="Calibri"/>
-              </a:rPr>
-              <a:t>Presenters – duplicate this slide as many times as needed</a:t>
-            </a:r>
-            <a:endParaRPr lang="en-US" sz="1800" b="0" strike="noStrike" spc="-1">
-              <a:solidFill>
-                <a:srgbClr val="000000"/>
-              </a:solidFill>
-              <a:uFill>
-                <a:solidFill>
-                  <a:srgbClr val="FFFFFF"/>
-                </a:solidFill>
-              </a:uFill>
-              <a:latin typeface="Arial"/>
-            </a:endParaRPr>
-          </a:p>
-          <a:p>
             <a:pPr>
               <a:lnSpc>
                 <a:spcPct val="90000"/>
               </a:lnSpc>
             </a:pPr>
-            <a:endParaRPr lang="en-US" sz="1800" b="0" strike="noStrike" spc="-1">
+            <a:endParaRPr lang="en-US" sz="1800" b="0" strike="noStrike" spc="-1" dirty="0">
               <a:solidFill>
                 <a:srgbClr val="000000"/>
               </a:solidFill>

</xml_diff>